<commit_message>
Add sessions & Update Master Slides
</commit_message>
<xml_diff>
--- a/70-533-00-Template.pptx
+++ b/70-533-00-Template.pptx
@@ -5,10 +5,10 @@
     <p:sldMasterId id="2147483660" r:id="rId1"/>
   </p:sldMasterIdLst>
   <p:notesMasterIdLst>
-    <p:notesMasterId r:id="rId14"/>
+    <p:notesMasterId r:id="rId18"/>
   </p:notesMasterIdLst>
   <p:handoutMasterIdLst>
-    <p:handoutMasterId r:id="rId15"/>
+    <p:handoutMasterId r:id="rId19"/>
   </p:handoutMasterIdLst>
   <p:sldIdLst>
     <p:sldId id="256" r:id="rId2"/>
@@ -21,35 +21,32 @@
     <p:sldId id="323" r:id="rId9"/>
     <p:sldId id="324" r:id="rId10"/>
     <p:sldId id="326" r:id="rId11"/>
-    <p:sldId id="309" r:id="rId12"/>
-    <p:sldId id="310" r:id="rId13"/>
+    <p:sldId id="329" r:id="rId12"/>
+    <p:sldId id="328" r:id="rId13"/>
+    <p:sldId id="327" r:id="rId14"/>
+    <p:sldId id="330" r:id="rId15"/>
+    <p:sldId id="309" r:id="rId16"/>
+    <p:sldId id="310" r:id="rId17"/>
   </p:sldIdLst>
   <p:sldSz cx="9144000" cy="6858000" type="screen4x3"/>
   <p:notesSz cx="6858000" cy="9144000"/>
   <p:embeddedFontLst>
     <p:embeddedFont>
       <p:font typeface="Consolas" panose="020B0609020204030204" pitchFamily="49" charset="0"/>
-      <p:regular r:id="rId16"/>
-      <p:bold r:id="rId17"/>
-      <p:italic r:id="rId18"/>
-      <p:boldItalic r:id="rId19"/>
-    </p:embeddedFont>
-    <p:embeddedFont>
-      <p:font typeface="Calibri" panose="020F0502020204030204" pitchFamily="34" charset="0"/>
       <p:regular r:id="rId20"/>
       <p:bold r:id="rId21"/>
       <p:italic r:id="rId22"/>
       <p:boldItalic r:id="rId23"/>
     </p:embeddedFont>
     <p:embeddedFont>
-      <p:font typeface="Segoe UI" panose="020B0502040204020203" pitchFamily="34" charset="0"/>
+      <p:font typeface="Calibri" panose="020F0502020204030204" pitchFamily="34" charset="0"/>
       <p:regular r:id="rId24"/>
       <p:bold r:id="rId25"/>
       <p:italic r:id="rId26"/>
       <p:boldItalic r:id="rId27"/>
     </p:embeddedFont>
     <p:embeddedFont>
-      <p:font typeface="Verdana" panose="020B0604030504040204" pitchFamily="34" charset="0"/>
+      <p:font typeface="Segoe UI" panose="020B0502040204020203" pitchFamily="34" charset="0"/>
       <p:regular r:id="rId28"/>
       <p:bold r:id="rId29"/>
       <p:italic r:id="rId30"/>
@@ -61,11 +58,18 @@
       <p:italic r:id="rId33"/>
     </p:embeddedFont>
     <p:embeddedFont>
-      <p:font typeface="Segoe" panose="020B0604020202020204" charset="0"/>
+      <p:font typeface="Verdana" panose="020B0604030504040204" pitchFamily="34" charset="0"/>
       <p:regular r:id="rId34"/>
       <p:bold r:id="rId35"/>
       <p:italic r:id="rId36"/>
       <p:boldItalic r:id="rId37"/>
+    </p:embeddedFont>
+    <p:embeddedFont>
+      <p:font typeface="Segoe" panose="020B0604020202020204" charset="0"/>
+      <p:regular r:id="rId38"/>
+      <p:bold r:id="rId39"/>
+      <p:italic r:id="rId40"/>
+      <p:boldItalic r:id="rId41"/>
     </p:embeddedFont>
   </p:embeddedFontLst>
   <p:defaultTextStyle>
@@ -240,6 +244,10 @@
         <p14:section name="Manage Containers with Azure Container Services (ACS)" id="{8462B454-DCB7-4718-BC7C-16D8C399AB26}">
           <p14:sldIdLst>
             <p14:sldId id="326"/>
+            <p14:sldId id="329"/>
+            <p14:sldId id="328"/>
+            <p14:sldId id="327"/>
+            <p14:sldId id="330"/>
             <p14:sldId id="309"/>
             <p14:sldId id="310"/>
           </p14:sldIdLst>
@@ -350,7 +358,7 @@
           <a:p>
             <a:fld id="{7D784404-57E5-4341-9230-5EC072B8C3C5}" type="datetimeFigureOut">
               <a:rPr lang="en-US" smtClean="0"/>
-              <a:t>1/19/2018</a:t>
+              <a:t>1/24/2018</a:t>
             </a:fld>
             <a:endParaRPr lang="en-US"/>
           </a:p>
@@ -527,7 +535,7 @@
           <a:p>
             <a:fld id="{9933EFA3-31EF-403B-8080-9776000D59FF}" type="datetimeFigureOut">
               <a:rPr lang="en-US" smtClean="0"/>
-              <a:t>1/19/2018</a:t>
+              <a:t>1/24/2018</a:t>
             </a:fld>
             <a:endParaRPr lang="en-US" dirty="0"/>
           </a:p>
@@ -1668,9 +1676,7 @@
           <a:bodyPr/>
           <a:lstStyle/>
           <a:p>
-            <a:endParaRPr lang="en-IE" sz="1000" baseline="0" dirty="0">
-              <a:latin typeface="Segoe" panose="020B0502040504020203" pitchFamily="34" charset="0"/>
-            </a:endParaRPr>
+            <a:endParaRPr lang="en-US"/>
           </a:p>
         </p:txBody>
       </p:sp>
@@ -1689,96 +1695,18 @@
           <a:bodyPr/>
           <a:lstStyle/>
           <a:p>
-            <a:fld id="{E2FF7759-803D-4F76-9AEC-98B2D9A07B0D}" type="slidenum">
+            <a:fld id="{F19E9337-0361-41F3-9C17-1F4FFD1214BA}" type="slidenum">
               <a:rPr lang="en-US" smtClean="0"/>
-              <a:pPr/>
               <a:t>11</a:t>
             </a:fld>
             <a:endParaRPr lang="en-US" dirty="0"/>
           </a:p>
         </p:txBody>
       </p:sp>
-      <p:sp>
-        <p:nvSpPr>
-          <p:cNvPr id="5" name="Rectangle 3"/>
-          <p:cNvSpPr>
-            <a:spLocks noGrp="1" noChangeArrowheads="1"/>
-          </p:cNvSpPr>
-          <p:nvPr>
-            <p:ph type="dt" sz="quarter" idx="1"/>
-          </p:nvPr>
-        </p:nvSpPr>
-        <p:spPr>
-          <a:xfrm>
-            <a:off x="264815" y="186683"/>
-            <a:ext cx="1955088" cy="485365"/>
-          </a:xfrm>
-        </p:spPr>
-        <p:txBody>
-          <a:bodyPr/>
-          <a:lstStyle/>
-          <a:p>
-            <a:pPr algn="l">
-              <a:defRPr/>
-            </a:pPr>
-            <a:r>
-              <a:rPr lang="en-US" b="1" dirty="0">
-                <a:latin typeface="Arial" pitchFamily="34" charset="0"/>
-                <a:cs typeface="Arial" pitchFamily="34" charset="0"/>
-              </a:rPr>
-              <a:t>Course 20533D</a:t>
-            </a:r>
-          </a:p>
-          <a:p>
-            <a:pPr algn="l">
-              <a:defRPr/>
-            </a:pPr>
-            <a:r>
-              <a:rPr lang="en-US" b="1" dirty="0">
-                <a:solidFill>
-                  <a:srgbClr val="336699"/>
-                </a:solidFill>
-                <a:latin typeface="Arial" pitchFamily="34" charset="0"/>
-                <a:cs typeface="Arial" pitchFamily="34" charset="0"/>
-              </a:rPr>
-              <a:t>Module</a:t>
-            </a:r>
-            <a:r>
-              <a:rPr lang="en-US" b="1" dirty="0">
-                <a:latin typeface="Arial" pitchFamily="34" charset="0"/>
-                <a:cs typeface="Arial" pitchFamily="34" charset="0"/>
-              </a:rPr>
-              <a:t> </a:t>
-            </a:r>
-            <a:r>
-              <a:rPr lang="en-US" b="1" dirty="0">
-                <a:solidFill>
-                  <a:srgbClr val="336699"/>
-                </a:solidFill>
-                <a:latin typeface="Arial" pitchFamily="34" charset="0"/>
-                <a:cs typeface="Arial" pitchFamily="34" charset="0"/>
-              </a:rPr>
-              <a:t>0: Introduction</a:t>
-            </a:r>
-          </a:p>
-          <a:p>
-            <a:pPr>
-              <a:defRPr/>
-            </a:pPr>
-            <a:endParaRPr lang="en-US" dirty="0"/>
-          </a:p>
-          <a:p>
-            <a:pPr>
-              <a:defRPr/>
-            </a:pPr>
-            <a:endParaRPr lang="en-US" dirty="0"/>
-          </a:p>
-        </p:txBody>
-      </p:sp>
     </p:spTree>
     <p:extLst>
       <p:ext uri="{BB962C8B-B14F-4D97-AF65-F5344CB8AC3E}">
-        <p14:creationId xmlns:p14="http://schemas.microsoft.com/office/powerpoint/2010/main" val="468583715"/>
+        <p14:creationId xmlns:p14="http://schemas.microsoft.com/office/powerpoint/2010/main" val="1348090137"/>
       </p:ext>
     </p:extLst>
   </p:cSld>
@@ -1837,6 +1765,273 @@
           <a:bodyPr/>
           <a:lstStyle/>
           <a:p>
+            <a:endParaRPr lang="en-US"/>
+          </a:p>
+        </p:txBody>
+      </p:sp>
+      <p:sp>
+        <p:nvSpPr>
+          <p:cNvPr id="4" name="Slide Number Placeholder 3"/>
+          <p:cNvSpPr>
+            <a:spLocks noGrp="1"/>
+          </p:cNvSpPr>
+          <p:nvPr>
+            <p:ph type="sldNum" sz="quarter" idx="10"/>
+          </p:nvPr>
+        </p:nvSpPr>
+        <p:spPr/>
+        <p:txBody>
+          <a:bodyPr/>
+          <a:lstStyle/>
+          <a:p>
+            <a:fld id="{F19E9337-0361-41F3-9C17-1F4FFD1214BA}" type="slidenum">
+              <a:rPr lang="en-US" smtClean="0"/>
+              <a:t>12</a:t>
+            </a:fld>
+            <a:endParaRPr lang="en-US" dirty="0"/>
+          </a:p>
+        </p:txBody>
+      </p:sp>
+    </p:spTree>
+    <p:extLst>
+      <p:ext uri="{BB962C8B-B14F-4D97-AF65-F5344CB8AC3E}">
+        <p14:creationId xmlns:p14="http://schemas.microsoft.com/office/powerpoint/2010/main" val="1975770327"/>
+      </p:ext>
+    </p:extLst>
+  </p:cSld>
+  <p:clrMapOvr>
+    <a:masterClrMapping/>
+  </p:clrMapOvr>
+</p:notes>
+</file>
+
+<file path=ppt/notesSlides/notesSlide13.xml><?xml version="1.0" encoding="utf-8"?>
+<p:notes xmlns:a="http://schemas.openxmlformats.org/drawingml/2006/main" xmlns:r="http://schemas.openxmlformats.org/officeDocument/2006/relationships" xmlns:p="http://schemas.openxmlformats.org/presentationml/2006/main">
+  <p:cSld>
+    <p:spTree>
+      <p:nvGrpSpPr>
+        <p:cNvPr id="1" name=""/>
+        <p:cNvGrpSpPr/>
+        <p:nvPr/>
+      </p:nvGrpSpPr>
+      <p:grpSpPr>
+        <a:xfrm>
+          <a:off x="0" y="0"/>
+          <a:ext cx="0" cy="0"/>
+          <a:chOff x="0" y="0"/>
+          <a:chExt cx="0" cy="0"/>
+        </a:xfrm>
+      </p:grpSpPr>
+      <p:sp>
+        <p:nvSpPr>
+          <p:cNvPr id="2" name="Slide Image Placeholder 1"/>
+          <p:cNvSpPr>
+            <a:spLocks noGrp="1" noRot="1" noChangeAspect="1"/>
+          </p:cNvSpPr>
+          <p:nvPr>
+            <p:ph type="sldImg"/>
+          </p:nvPr>
+        </p:nvSpPr>
+        <p:spPr>
+          <a:xfrm>
+            <a:off x="4325938" y="73025"/>
+            <a:ext cx="2466975" cy="1851025"/>
+          </a:xfrm>
+        </p:spPr>
+      </p:sp>
+      <p:sp>
+        <p:nvSpPr>
+          <p:cNvPr id="3" name="Notes Placeholder 2"/>
+          <p:cNvSpPr>
+            <a:spLocks noGrp="1"/>
+          </p:cNvSpPr>
+          <p:nvPr>
+            <p:ph type="body" idx="1"/>
+          </p:nvPr>
+        </p:nvSpPr>
+        <p:spPr/>
+        <p:txBody>
+          <a:bodyPr/>
+          <a:lstStyle/>
+          <a:p>
+            <a:endParaRPr lang="en-US"/>
+          </a:p>
+        </p:txBody>
+      </p:sp>
+      <p:sp>
+        <p:nvSpPr>
+          <p:cNvPr id="4" name="Slide Number Placeholder 3"/>
+          <p:cNvSpPr>
+            <a:spLocks noGrp="1"/>
+          </p:cNvSpPr>
+          <p:nvPr>
+            <p:ph type="sldNum" sz="quarter" idx="10"/>
+          </p:nvPr>
+        </p:nvSpPr>
+        <p:spPr/>
+        <p:txBody>
+          <a:bodyPr/>
+          <a:lstStyle/>
+          <a:p>
+            <a:fld id="{F19E9337-0361-41F3-9C17-1F4FFD1214BA}" type="slidenum">
+              <a:rPr lang="en-US" smtClean="0"/>
+              <a:t>13</a:t>
+            </a:fld>
+            <a:endParaRPr lang="en-US" dirty="0"/>
+          </a:p>
+        </p:txBody>
+      </p:sp>
+    </p:spTree>
+    <p:extLst>
+      <p:ext uri="{BB962C8B-B14F-4D97-AF65-F5344CB8AC3E}">
+        <p14:creationId xmlns:p14="http://schemas.microsoft.com/office/powerpoint/2010/main" val="1509311016"/>
+      </p:ext>
+    </p:extLst>
+  </p:cSld>
+  <p:clrMapOvr>
+    <a:masterClrMapping/>
+  </p:clrMapOvr>
+</p:notes>
+</file>
+
+<file path=ppt/notesSlides/notesSlide14.xml><?xml version="1.0" encoding="utf-8"?>
+<p:notes xmlns:a="http://schemas.openxmlformats.org/drawingml/2006/main" xmlns:r="http://schemas.openxmlformats.org/officeDocument/2006/relationships" xmlns:p="http://schemas.openxmlformats.org/presentationml/2006/main">
+  <p:cSld>
+    <p:spTree>
+      <p:nvGrpSpPr>
+        <p:cNvPr id="1" name=""/>
+        <p:cNvGrpSpPr/>
+        <p:nvPr/>
+      </p:nvGrpSpPr>
+      <p:grpSpPr>
+        <a:xfrm>
+          <a:off x="0" y="0"/>
+          <a:ext cx="0" cy="0"/>
+          <a:chOff x="0" y="0"/>
+          <a:chExt cx="0" cy="0"/>
+        </a:xfrm>
+      </p:grpSpPr>
+      <p:sp>
+        <p:nvSpPr>
+          <p:cNvPr id="2" name="Slide Image Placeholder 1"/>
+          <p:cNvSpPr>
+            <a:spLocks noGrp="1" noRot="1" noChangeAspect="1"/>
+          </p:cNvSpPr>
+          <p:nvPr>
+            <p:ph type="sldImg"/>
+          </p:nvPr>
+        </p:nvSpPr>
+        <p:spPr>
+          <a:xfrm>
+            <a:off x="4325938" y="73025"/>
+            <a:ext cx="2466975" cy="1851025"/>
+          </a:xfrm>
+        </p:spPr>
+      </p:sp>
+      <p:sp>
+        <p:nvSpPr>
+          <p:cNvPr id="3" name="Notes Placeholder 2"/>
+          <p:cNvSpPr>
+            <a:spLocks noGrp="1"/>
+          </p:cNvSpPr>
+          <p:nvPr>
+            <p:ph type="body" idx="1"/>
+          </p:nvPr>
+        </p:nvSpPr>
+        <p:spPr/>
+        <p:txBody>
+          <a:bodyPr/>
+          <a:lstStyle/>
+          <a:p>
+            <a:endParaRPr lang="en-US"/>
+          </a:p>
+        </p:txBody>
+      </p:sp>
+      <p:sp>
+        <p:nvSpPr>
+          <p:cNvPr id="4" name="Slide Number Placeholder 3"/>
+          <p:cNvSpPr>
+            <a:spLocks noGrp="1"/>
+          </p:cNvSpPr>
+          <p:nvPr>
+            <p:ph type="sldNum" sz="quarter" idx="10"/>
+          </p:nvPr>
+        </p:nvSpPr>
+        <p:spPr/>
+        <p:txBody>
+          <a:bodyPr/>
+          <a:lstStyle/>
+          <a:p>
+            <a:fld id="{F19E9337-0361-41F3-9C17-1F4FFD1214BA}" type="slidenum">
+              <a:rPr lang="en-US" smtClean="0"/>
+              <a:t>14</a:t>
+            </a:fld>
+            <a:endParaRPr lang="en-US" dirty="0"/>
+          </a:p>
+        </p:txBody>
+      </p:sp>
+    </p:spTree>
+    <p:extLst>
+      <p:ext uri="{BB962C8B-B14F-4D97-AF65-F5344CB8AC3E}">
+        <p14:creationId xmlns:p14="http://schemas.microsoft.com/office/powerpoint/2010/main" val="2366767114"/>
+      </p:ext>
+    </p:extLst>
+  </p:cSld>
+  <p:clrMapOvr>
+    <a:masterClrMapping/>
+  </p:clrMapOvr>
+</p:notes>
+</file>
+
+<file path=ppt/notesSlides/notesSlide15.xml><?xml version="1.0" encoding="utf-8"?>
+<p:notes xmlns:a="http://schemas.openxmlformats.org/drawingml/2006/main" xmlns:r="http://schemas.openxmlformats.org/officeDocument/2006/relationships" xmlns:p="http://schemas.openxmlformats.org/presentationml/2006/main">
+  <p:cSld>
+    <p:spTree>
+      <p:nvGrpSpPr>
+        <p:cNvPr id="1" name=""/>
+        <p:cNvGrpSpPr/>
+        <p:nvPr/>
+      </p:nvGrpSpPr>
+      <p:grpSpPr>
+        <a:xfrm>
+          <a:off x="0" y="0"/>
+          <a:ext cx="0" cy="0"/>
+          <a:chOff x="0" y="0"/>
+          <a:chExt cx="0" cy="0"/>
+        </a:xfrm>
+      </p:grpSpPr>
+      <p:sp>
+        <p:nvSpPr>
+          <p:cNvPr id="2" name="Slide Image Placeholder 1"/>
+          <p:cNvSpPr>
+            <a:spLocks noGrp="1" noRot="1" noChangeAspect="1"/>
+          </p:cNvSpPr>
+          <p:nvPr>
+            <p:ph type="sldImg"/>
+          </p:nvPr>
+        </p:nvSpPr>
+        <p:spPr>
+          <a:xfrm>
+            <a:off x="4325938" y="73025"/>
+            <a:ext cx="2466975" cy="1851025"/>
+          </a:xfrm>
+        </p:spPr>
+      </p:sp>
+      <p:sp>
+        <p:nvSpPr>
+          <p:cNvPr id="3" name="Notes Placeholder 2"/>
+          <p:cNvSpPr>
+            <a:spLocks noGrp="1"/>
+          </p:cNvSpPr>
+          <p:nvPr>
+            <p:ph type="body" idx="1"/>
+          </p:nvPr>
+        </p:nvSpPr>
+        <p:spPr/>
+        <p:txBody>
+          <a:bodyPr/>
+          <a:lstStyle/>
+          <a:p>
             <a:endParaRPr lang="en-IE" sz="1000" baseline="0" dirty="0">
               <a:latin typeface="Segoe" panose="020B0502040504020203" pitchFamily="34" charset="0"/>
             </a:endParaRPr>
@@ -1861,7 +2056,176 @@
             <a:fld id="{E2FF7759-803D-4F76-9AEC-98B2D9A07B0D}" type="slidenum">
               <a:rPr lang="en-US" smtClean="0"/>
               <a:pPr/>
-              <a:t>12</a:t>
+              <a:t>15</a:t>
+            </a:fld>
+            <a:endParaRPr lang="en-US" dirty="0"/>
+          </a:p>
+        </p:txBody>
+      </p:sp>
+      <p:sp>
+        <p:nvSpPr>
+          <p:cNvPr id="5" name="Rectangle 3"/>
+          <p:cNvSpPr>
+            <a:spLocks noGrp="1" noChangeArrowheads="1"/>
+          </p:cNvSpPr>
+          <p:nvPr>
+            <p:ph type="dt" sz="quarter" idx="1"/>
+          </p:nvPr>
+        </p:nvSpPr>
+        <p:spPr>
+          <a:xfrm>
+            <a:off x="264815" y="186683"/>
+            <a:ext cx="1955088" cy="485365"/>
+          </a:xfrm>
+        </p:spPr>
+        <p:txBody>
+          <a:bodyPr/>
+          <a:lstStyle/>
+          <a:p>
+            <a:pPr algn="l">
+              <a:defRPr/>
+            </a:pPr>
+            <a:r>
+              <a:rPr lang="en-US" b="1" dirty="0">
+                <a:latin typeface="Arial" pitchFamily="34" charset="0"/>
+                <a:cs typeface="Arial" pitchFamily="34" charset="0"/>
+              </a:rPr>
+              <a:t>Course 20533D</a:t>
+            </a:r>
+          </a:p>
+          <a:p>
+            <a:pPr algn="l">
+              <a:defRPr/>
+            </a:pPr>
+            <a:r>
+              <a:rPr lang="en-US" b="1" dirty="0">
+                <a:solidFill>
+                  <a:srgbClr val="336699"/>
+                </a:solidFill>
+                <a:latin typeface="Arial" pitchFamily="34" charset="0"/>
+                <a:cs typeface="Arial" pitchFamily="34" charset="0"/>
+              </a:rPr>
+              <a:t>Module</a:t>
+            </a:r>
+            <a:r>
+              <a:rPr lang="en-US" b="1" dirty="0">
+                <a:latin typeface="Arial" pitchFamily="34" charset="0"/>
+                <a:cs typeface="Arial" pitchFamily="34" charset="0"/>
+              </a:rPr>
+              <a:t> </a:t>
+            </a:r>
+            <a:r>
+              <a:rPr lang="en-US" b="1" dirty="0">
+                <a:solidFill>
+                  <a:srgbClr val="336699"/>
+                </a:solidFill>
+                <a:latin typeface="Arial" pitchFamily="34" charset="0"/>
+                <a:cs typeface="Arial" pitchFamily="34" charset="0"/>
+              </a:rPr>
+              <a:t>0: Introduction</a:t>
+            </a:r>
+          </a:p>
+          <a:p>
+            <a:pPr>
+              <a:defRPr/>
+            </a:pPr>
+            <a:endParaRPr lang="en-US" dirty="0"/>
+          </a:p>
+          <a:p>
+            <a:pPr>
+              <a:defRPr/>
+            </a:pPr>
+            <a:endParaRPr lang="en-US" dirty="0"/>
+          </a:p>
+        </p:txBody>
+      </p:sp>
+    </p:spTree>
+    <p:extLst>
+      <p:ext uri="{BB962C8B-B14F-4D97-AF65-F5344CB8AC3E}">
+        <p14:creationId xmlns:p14="http://schemas.microsoft.com/office/powerpoint/2010/main" val="468583715"/>
+      </p:ext>
+    </p:extLst>
+  </p:cSld>
+  <p:clrMapOvr>
+    <a:masterClrMapping/>
+  </p:clrMapOvr>
+</p:notes>
+</file>
+
+<file path=ppt/notesSlides/notesSlide16.xml><?xml version="1.0" encoding="utf-8"?>
+<p:notes xmlns:a="http://schemas.openxmlformats.org/drawingml/2006/main" xmlns:r="http://schemas.openxmlformats.org/officeDocument/2006/relationships" xmlns:p="http://schemas.openxmlformats.org/presentationml/2006/main">
+  <p:cSld>
+    <p:spTree>
+      <p:nvGrpSpPr>
+        <p:cNvPr id="1" name=""/>
+        <p:cNvGrpSpPr/>
+        <p:nvPr/>
+      </p:nvGrpSpPr>
+      <p:grpSpPr>
+        <a:xfrm>
+          <a:off x="0" y="0"/>
+          <a:ext cx="0" cy="0"/>
+          <a:chOff x="0" y="0"/>
+          <a:chExt cx="0" cy="0"/>
+        </a:xfrm>
+      </p:grpSpPr>
+      <p:sp>
+        <p:nvSpPr>
+          <p:cNvPr id="2" name="Slide Image Placeholder 1"/>
+          <p:cNvSpPr>
+            <a:spLocks noGrp="1" noRot="1" noChangeAspect="1"/>
+          </p:cNvSpPr>
+          <p:nvPr>
+            <p:ph type="sldImg"/>
+          </p:nvPr>
+        </p:nvSpPr>
+        <p:spPr>
+          <a:xfrm>
+            <a:off x="4325938" y="73025"/>
+            <a:ext cx="2466975" cy="1851025"/>
+          </a:xfrm>
+        </p:spPr>
+      </p:sp>
+      <p:sp>
+        <p:nvSpPr>
+          <p:cNvPr id="3" name="Notes Placeholder 2"/>
+          <p:cNvSpPr>
+            <a:spLocks noGrp="1"/>
+          </p:cNvSpPr>
+          <p:nvPr>
+            <p:ph type="body" idx="1"/>
+          </p:nvPr>
+        </p:nvSpPr>
+        <p:spPr/>
+        <p:txBody>
+          <a:bodyPr/>
+          <a:lstStyle/>
+          <a:p>
+            <a:endParaRPr lang="en-IE" sz="1000" baseline="0" dirty="0">
+              <a:latin typeface="Segoe" panose="020B0502040504020203" pitchFamily="34" charset="0"/>
+            </a:endParaRPr>
+          </a:p>
+        </p:txBody>
+      </p:sp>
+      <p:sp>
+        <p:nvSpPr>
+          <p:cNvPr id="4" name="Slide Number Placeholder 3"/>
+          <p:cNvSpPr>
+            <a:spLocks noGrp="1"/>
+          </p:cNvSpPr>
+          <p:nvPr>
+            <p:ph type="sldNum" sz="quarter" idx="10"/>
+          </p:nvPr>
+        </p:nvSpPr>
+        <p:spPr/>
+        <p:txBody>
+          <a:bodyPr/>
+          <a:lstStyle/>
+          <a:p>
+            <a:fld id="{E2FF7759-803D-4F76-9AEC-98B2D9A07B0D}" type="slidenum">
+              <a:rPr lang="en-US" smtClean="0"/>
+              <a:pPr/>
+              <a:t>16</a:t>
             </a:fld>
             <a:endParaRPr lang="en-US" dirty="0"/>
           </a:p>
@@ -2972,6 +3336,161 @@
 </file>
 
 <file path=ppt/slideLayouts/slideLayout10.xml><?xml version="1.0" encoding="utf-8"?>
+<p:sldLayout xmlns:a="http://schemas.openxmlformats.org/drawingml/2006/main" xmlns:r="http://schemas.openxmlformats.org/officeDocument/2006/relationships" xmlns:p="http://schemas.openxmlformats.org/presentationml/2006/main" preserve="1" userDrawn="1">
+  <p:cSld name="Custom Layout">
+    <p:spTree>
+      <p:nvGrpSpPr>
+        <p:cNvPr id="1" name=""/>
+        <p:cNvGrpSpPr/>
+        <p:nvPr/>
+      </p:nvGrpSpPr>
+      <p:grpSpPr>
+        <a:xfrm>
+          <a:off x="0" y="0"/>
+          <a:ext cx="0" cy="0"/>
+          <a:chOff x="0" y="0"/>
+          <a:chExt cx="0" cy="0"/>
+        </a:xfrm>
+      </p:grpSpPr>
+      <p:sp>
+        <p:nvSpPr>
+          <p:cNvPr id="2" name="Title 1">
+            <a:extLst>
+              <a:ext uri="{FF2B5EF4-FFF2-40B4-BE49-F238E27FC236}">
+                <a16:creationId xmlns:a16="http://schemas.microsoft.com/office/drawing/2014/main" id="{F523216E-3091-410D-83D4-F3B694551529}"/>
+              </a:ext>
+            </a:extLst>
+          </p:cNvPr>
+          <p:cNvSpPr>
+            <a:spLocks noGrp="1"/>
+          </p:cNvSpPr>
+          <p:nvPr>
+            <p:ph type="title" hasCustomPrompt="1"/>
+          </p:nvPr>
+        </p:nvSpPr>
+        <p:spPr/>
+        <p:txBody>
+          <a:bodyPr/>
+          <a:lstStyle>
+            <a:lvl1pPr>
+              <a:defRPr/>
+            </a:lvl1pPr>
+          </a:lstStyle>
+          <a:p>
+            <a:r>
+              <a:rPr lang="en-US" dirty="0"/>
+              <a:t>Click to edit Code Title</a:t>
+            </a:r>
+          </a:p>
+        </p:txBody>
+      </p:sp>
+      <p:sp>
+        <p:nvSpPr>
+          <p:cNvPr id="4" name="Text Placeholder 3">
+            <a:extLst>
+              <a:ext uri="{FF2B5EF4-FFF2-40B4-BE49-F238E27FC236}">
+                <a16:creationId xmlns:a16="http://schemas.microsoft.com/office/drawing/2014/main" id="{8AA8E3D7-116C-400A-AC64-F86759F16B62}"/>
+              </a:ext>
+            </a:extLst>
+          </p:cNvPr>
+          <p:cNvSpPr>
+            <a:spLocks noGrp="1"/>
+          </p:cNvSpPr>
+          <p:nvPr>
+            <p:ph type="body" sz="quarter" idx="10" hasCustomPrompt="1"/>
+          </p:nvPr>
+        </p:nvSpPr>
+        <p:spPr>
+          <a:xfrm>
+            <a:off x="93306" y="811763"/>
+            <a:ext cx="8929396" cy="5859625"/>
+          </a:xfrm>
+        </p:spPr>
+        <p:txBody>
+          <a:bodyPr/>
+          <a:lstStyle>
+            <a:lvl1pPr marL="0" indent="0">
+              <a:buNone/>
+              <a:defRPr sz="2400">
+                <a:latin typeface="Consolas" panose="020B0609020204030204" pitchFamily="49" charset="0"/>
+              </a:defRPr>
+            </a:lvl1pPr>
+            <a:lvl2pPr marL="288925" indent="0">
+              <a:buNone/>
+              <a:defRPr sz="2000">
+                <a:latin typeface="Consolas" panose="020B0609020204030204" pitchFamily="49" charset="0"/>
+              </a:defRPr>
+            </a:lvl2pPr>
+            <a:lvl3pPr marL="681037" indent="0">
+              <a:buNone/>
+              <a:defRPr sz="1800">
+                <a:latin typeface="Consolas" panose="020B0609020204030204" pitchFamily="49" charset="0"/>
+              </a:defRPr>
+            </a:lvl3pPr>
+            <a:lvl4pPr marL="1089025" indent="0">
+              <a:buNone/>
+              <a:defRPr sz="1600">
+                <a:latin typeface="Consolas" panose="020B0609020204030204" pitchFamily="49" charset="0"/>
+              </a:defRPr>
+            </a:lvl4pPr>
+            <a:lvl5pPr marL="1376363" indent="0">
+              <a:buNone/>
+              <a:defRPr sz="1600">
+                <a:latin typeface="Consolas" panose="020B0609020204030204" pitchFamily="49" charset="0"/>
+              </a:defRPr>
+            </a:lvl5pPr>
+          </a:lstStyle>
+          <a:p>
+            <a:pPr lvl="0"/>
+            <a:r>
+              <a:rPr lang="en-US" dirty="0"/>
+              <a:t>Edit Code</a:t>
+            </a:r>
+          </a:p>
+          <a:p>
+            <a:pPr lvl="1"/>
+            <a:r>
+              <a:rPr lang="en-US" dirty="0"/>
+              <a:t>Second level</a:t>
+            </a:r>
+          </a:p>
+          <a:p>
+            <a:pPr lvl="2"/>
+            <a:r>
+              <a:rPr lang="en-US" dirty="0"/>
+              <a:t>Third level</a:t>
+            </a:r>
+          </a:p>
+          <a:p>
+            <a:pPr lvl="3"/>
+            <a:r>
+              <a:rPr lang="en-US" dirty="0"/>
+              <a:t>Fourth level</a:t>
+            </a:r>
+          </a:p>
+          <a:p>
+            <a:pPr lvl="4"/>
+            <a:r>
+              <a:rPr lang="en-US" dirty="0"/>
+              <a:t>Fifth level</a:t>
+            </a:r>
+          </a:p>
+        </p:txBody>
+      </p:sp>
+    </p:spTree>
+    <p:extLst>
+      <p:ext uri="{BB962C8B-B14F-4D97-AF65-F5344CB8AC3E}">
+        <p14:creationId xmlns:p14="http://schemas.microsoft.com/office/powerpoint/2010/main" val="1117181669"/>
+      </p:ext>
+    </p:extLst>
+  </p:cSld>
+  <p:clrMapOvr>
+    <a:masterClrMapping/>
+  </p:clrMapOvr>
+</p:sldLayout>
+</file>
+
+<file path=ppt/slideLayouts/slideLayout11.xml><?xml version="1.0" encoding="utf-8"?>
 <p:sldLayout xmlns:a="http://schemas.openxmlformats.org/drawingml/2006/main" xmlns:r="http://schemas.openxmlformats.org/officeDocument/2006/relationships" xmlns:p="http://schemas.openxmlformats.org/presentationml/2006/main" preserve="1" userDrawn="1">
   <p:cSld name="Black Notes slide Layout">
     <p:bg bwMode="black">
@@ -3300,7 +3819,7 @@
 </p:sldLayout>
 </file>
 
-<file path=ppt/slideLayouts/slideLayout11.xml><?xml version="1.0" encoding="utf-8"?>
+<file path=ppt/slideLayouts/slideLayout12.xml><?xml version="1.0" encoding="utf-8"?>
 <p:sldLayout xmlns:a="http://schemas.openxmlformats.org/drawingml/2006/main" xmlns:r="http://schemas.openxmlformats.org/officeDocument/2006/relationships" xmlns:p="http://schemas.openxmlformats.org/presentationml/2006/main" preserve="1" userDrawn="1">
   <p:cSld name="Steps">
     <p:spTree>
@@ -4749,7 +5268,7 @@
 </p:sldLayout>
 </file>
 
-<file path=ppt/slideLayouts/slideLayout12.xml><?xml version="1.0" encoding="utf-8"?>
+<file path=ppt/slideLayouts/slideLayout13.xml><?xml version="1.0" encoding="utf-8"?>
 <p:sldLayout xmlns:a="http://schemas.openxmlformats.org/drawingml/2006/main" xmlns:r="http://schemas.openxmlformats.org/officeDocument/2006/relationships" xmlns:p="http://schemas.openxmlformats.org/presentationml/2006/main" preserve="1" userDrawn="1">
   <p:cSld name="Section Header">
     <p:spTree>
@@ -4935,7 +5454,7 @@
 </p:sldLayout>
 </file>
 
-<file path=ppt/slideLayouts/slideLayout13.xml><?xml version="1.0" encoding="utf-8"?>
+<file path=ppt/slideLayouts/slideLayout14.xml><?xml version="1.0" encoding="utf-8"?>
 <p:sldLayout xmlns:a="http://schemas.openxmlformats.org/drawingml/2006/main" xmlns:r="http://schemas.openxmlformats.org/officeDocument/2006/relationships" xmlns:p="http://schemas.openxmlformats.org/presentationml/2006/main" preserve="1" userDrawn="1">
   <p:cSld name="Two Content">
     <p:spTree>
@@ -5218,7 +5737,7 @@
 </p:sldLayout>
 </file>
 
-<file path=ppt/slideLayouts/slideLayout14.xml><?xml version="1.0" encoding="utf-8"?>
+<file path=ppt/slideLayouts/slideLayout15.xml><?xml version="1.0" encoding="utf-8"?>
 <p:sldLayout xmlns:a="http://schemas.openxmlformats.org/drawingml/2006/main" xmlns:r="http://schemas.openxmlformats.org/officeDocument/2006/relationships" xmlns:p="http://schemas.openxmlformats.org/presentationml/2006/main" preserve="1" userDrawn="1">
   <p:cSld name="Comparison">
     <p:spTree>
@@ -5647,7 +6166,7 @@
 </p:sldLayout>
 </file>
 
-<file path=ppt/slideLayouts/slideLayout15.xml><?xml version="1.0" encoding="utf-8"?>
+<file path=ppt/slideLayouts/slideLayout16.xml><?xml version="1.0" encoding="utf-8"?>
 <p:sldLayout xmlns:a="http://schemas.openxmlformats.org/drawingml/2006/main" xmlns:r="http://schemas.openxmlformats.org/officeDocument/2006/relationships" xmlns:p="http://schemas.openxmlformats.org/presentationml/2006/main" preserve="1" userDrawn="1">
   <p:cSld name="Blank">
     <p:spTree>
@@ -5737,7 +6256,7 @@
 </p:sldLayout>
 </file>
 
-<file path=ppt/slideLayouts/slideLayout16.xml><?xml version="1.0" encoding="utf-8"?>
+<file path=ppt/slideLayouts/slideLayout17.xml><?xml version="1.0" encoding="utf-8"?>
 <p:sldLayout xmlns:a="http://schemas.openxmlformats.org/drawingml/2006/main" xmlns:r="http://schemas.openxmlformats.org/officeDocument/2006/relationships" xmlns:p="http://schemas.openxmlformats.org/presentationml/2006/main" preserve="1" userDrawn="1">
   <p:cSld name="Content with Caption">
     <p:spTree>
@@ -6013,7 +6532,7 @@
 </p:sldLayout>
 </file>
 
-<file path=ppt/slideLayouts/slideLayout17.xml><?xml version="1.0" encoding="utf-8"?>
+<file path=ppt/slideLayouts/slideLayout18.xml><?xml version="1.0" encoding="utf-8"?>
 <p:sldLayout xmlns:a="http://schemas.openxmlformats.org/drawingml/2006/main" xmlns:r="http://schemas.openxmlformats.org/officeDocument/2006/relationships" xmlns:p="http://schemas.openxmlformats.org/presentationml/2006/main" preserve="1" userDrawn="1">
   <p:cSld name="Picture with Caption">
     <p:spTree>
@@ -6264,7 +6783,7 @@
 </p:sldLayout>
 </file>
 
-<file path=ppt/slideLayouts/slideLayout18.xml><?xml version="1.0" encoding="utf-8"?>
+<file path=ppt/slideLayouts/slideLayout19.xml><?xml version="1.0" encoding="utf-8"?>
 <p:sldLayout xmlns:a="http://schemas.openxmlformats.org/drawingml/2006/main" xmlns:r="http://schemas.openxmlformats.org/officeDocument/2006/relationships" xmlns:p="http://schemas.openxmlformats.org/presentationml/2006/main" type="vertTx" preserve="1">
   <p:cSld name="Title and Vertical Text">
     <p:spTree>
@@ -6359,121 +6878,6 @@
     <p:extLst>
       <p:ext uri="{BB962C8B-B14F-4D97-AF65-F5344CB8AC3E}">
         <p14:creationId xmlns:p14="http://schemas.microsoft.com/office/powerpoint/2010/main" val="571518607"/>
-      </p:ext>
-    </p:extLst>
-  </p:cSld>
-  <p:clrMapOvr>
-    <a:masterClrMapping/>
-  </p:clrMapOvr>
-</p:sldLayout>
-</file>
-
-<file path=ppt/slideLayouts/slideLayout19.xml><?xml version="1.0" encoding="utf-8"?>
-<p:sldLayout xmlns:a="http://schemas.openxmlformats.org/drawingml/2006/main" xmlns:r="http://schemas.openxmlformats.org/officeDocument/2006/relationships" xmlns:p="http://schemas.openxmlformats.org/presentationml/2006/main" type="vertTitleAndTx" preserve="1">
-  <p:cSld name="Vertical Title and Text">
-    <p:spTree>
-      <p:nvGrpSpPr>
-        <p:cNvPr id="1" name=""/>
-        <p:cNvGrpSpPr/>
-        <p:nvPr/>
-      </p:nvGrpSpPr>
-      <p:grpSpPr>
-        <a:xfrm>
-          <a:off x="0" y="0"/>
-          <a:ext cx="0" cy="0"/>
-          <a:chOff x="0" y="0"/>
-          <a:chExt cx="0" cy="0"/>
-        </a:xfrm>
-      </p:grpSpPr>
-      <p:sp>
-        <p:nvSpPr>
-          <p:cNvPr id="2" name="Vertical Title 1"/>
-          <p:cNvSpPr>
-            <a:spLocks noGrp="1"/>
-          </p:cNvSpPr>
-          <p:nvPr>
-            <p:ph type="title" orient="vert"/>
-          </p:nvPr>
-        </p:nvSpPr>
-        <p:spPr>
-          <a:xfrm>
-            <a:off x="6291263" y="0"/>
-            <a:ext cx="1943100" cy="5378450"/>
-          </a:xfrm>
-        </p:spPr>
-        <p:txBody>
-          <a:bodyPr vert="eaVert"/>
-          <a:lstStyle/>
-          <a:p>
-            <a:r>
-              <a:rPr lang="en-US"/>
-              <a:t>Click to edit Master title style</a:t>
-            </a:r>
-            <a:endParaRPr lang="en-US" dirty="0"/>
-          </a:p>
-        </p:txBody>
-      </p:sp>
-      <p:sp>
-        <p:nvSpPr>
-          <p:cNvPr id="3" name="Vertical Text Placeholder 2"/>
-          <p:cNvSpPr>
-            <a:spLocks noGrp="1"/>
-          </p:cNvSpPr>
-          <p:nvPr>
-            <p:ph type="body" orient="vert" idx="1"/>
-          </p:nvPr>
-        </p:nvSpPr>
-        <p:spPr>
-          <a:xfrm>
-            <a:off x="458788" y="0"/>
-            <a:ext cx="5680075" cy="5378450"/>
-          </a:xfrm>
-        </p:spPr>
-        <p:txBody>
-          <a:bodyPr vert="eaVert"/>
-          <a:lstStyle/>
-          <a:p>
-            <a:pPr lvl="0"/>
-            <a:r>
-              <a:rPr lang="en-US"/>
-              <a:t>Edit Master text styles</a:t>
-            </a:r>
-          </a:p>
-          <a:p>
-            <a:pPr lvl="1"/>
-            <a:r>
-              <a:rPr lang="en-US"/>
-              <a:t>Second level</a:t>
-            </a:r>
-          </a:p>
-          <a:p>
-            <a:pPr lvl="2"/>
-            <a:r>
-              <a:rPr lang="en-US"/>
-              <a:t>Third level</a:t>
-            </a:r>
-          </a:p>
-          <a:p>
-            <a:pPr lvl="3"/>
-            <a:r>
-              <a:rPr lang="en-US"/>
-              <a:t>Fourth level</a:t>
-            </a:r>
-          </a:p>
-          <a:p>
-            <a:pPr lvl="4"/>
-            <a:r>
-              <a:rPr lang="en-US"/>
-              <a:t>Fifth level</a:t>
-            </a:r>
-            <a:endParaRPr lang="en-US" dirty="0"/>
-          </a:p>
-        </p:txBody>
-      </p:sp>
-    </p:spTree>
-    <p:extLst>
-      <p:ext uri="{BB962C8B-B14F-4D97-AF65-F5344CB8AC3E}">
-        <p14:creationId xmlns:p14="http://schemas.microsoft.com/office/powerpoint/2010/main" val="816485789"/>
       </p:ext>
     </p:extLst>
   </p:cSld>
@@ -6647,6 +7051,121 @@
 </file>
 
 <file path=ppt/slideLayouts/slideLayout20.xml><?xml version="1.0" encoding="utf-8"?>
+<p:sldLayout xmlns:a="http://schemas.openxmlformats.org/drawingml/2006/main" xmlns:r="http://schemas.openxmlformats.org/officeDocument/2006/relationships" xmlns:p="http://schemas.openxmlformats.org/presentationml/2006/main" type="vertTitleAndTx" preserve="1">
+  <p:cSld name="Vertical Title and Text">
+    <p:spTree>
+      <p:nvGrpSpPr>
+        <p:cNvPr id="1" name=""/>
+        <p:cNvGrpSpPr/>
+        <p:nvPr/>
+      </p:nvGrpSpPr>
+      <p:grpSpPr>
+        <a:xfrm>
+          <a:off x="0" y="0"/>
+          <a:ext cx="0" cy="0"/>
+          <a:chOff x="0" y="0"/>
+          <a:chExt cx="0" cy="0"/>
+        </a:xfrm>
+      </p:grpSpPr>
+      <p:sp>
+        <p:nvSpPr>
+          <p:cNvPr id="2" name="Vertical Title 1"/>
+          <p:cNvSpPr>
+            <a:spLocks noGrp="1"/>
+          </p:cNvSpPr>
+          <p:nvPr>
+            <p:ph type="title" orient="vert"/>
+          </p:nvPr>
+        </p:nvSpPr>
+        <p:spPr>
+          <a:xfrm>
+            <a:off x="6291263" y="0"/>
+            <a:ext cx="1943100" cy="5378450"/>
+          </a:xfrm>
+        </p:spPr>
+        <p:txBody>
+          <a:bodyPr vert="eaVert"/>
+          <a:lstStyle/>
+          <a:p>
+            <a:r>
+              <a:rPr lang="en-US"/>
+              <a:t>Click to edit Master title style</a:t>
+            </a:r>
+            <a:endParaRPr lang="en-US" dirty="0"/>
+          </a:p>
+        </p:txBody>
+      </p:sp>
+      <p:sp>
+        <p:nvSpPr>
+          <p:cNvPr id="3" name="Vertical Text Placeholder 2"/>
+          <p:cNvSpPr>
+            <a:spLocks noGrp="1"/>
+          </p:cNvSpPr>
+          <p:nvPr>
+            <p:ph type="body" orient="vert" idx="1"/>
+          </p:nvPr>
+        </p:nvSpPr>
+        <p:spPr>
+          <a:xfrm>
+            <a:off x="458788" y="0"/>
+            <a:ext cx="5680075" cy="5378450"/>
+          </a:xfrm>
+        </p:spPr>
+        <p:txBody>
+          <a:bodyPr vert="eaVert"/>
+          <a:lstStyle/>
+          <a:p>
+            <a:pPr lvl="0"/>
+            <a:r>
+              <a:rPr lang="en-US"/>
+              <a:t>Edit Master text styles</a:t>
+            </a:r>
+          </a:p>
+          <a:p>
+            <a:pPr lvl="1"/>
+            <a:r>
+              <a:rPr lang="en-US"/>
+              <a:t>Second level</a:t>
+            </a:r>
+          </a:p>
+          <a:p>
+            <a:pPr lvl="2"/>
+            <a:r>
+              <a:rPr lang="en-US"/>
+              <a:t>Third level</a:t>
+            </a:r>
+          </a:p>
+          <a:p>
+            <a:pPr lvl="3"/>
+            <a:r>
+              <a:rPr lang="en-US"/>
+              <a:t>Fourth level</a:t>
+            </a:r>
+          </a:p>
+          <a:p>
+            <a:pPr lvl="4"/>
+            <a:r>
+              <a:rPr lang="en-US"/>
+              <a:t>Fifth level</a:t>
+            </a:r>
+            <a:endParaRPr lang="en-US" dirty="0"/>
+          </a:p>
+        </p:txBody>
+      </p:sp>
+    </p:spTree>
+    <p:extLst>
+      <p:ext uri="{BB962C8B-B14F-4D97-AF65-F5344CB8AC3E}">
+        <p14:creationId xmlns:p14="http://schemas.microsoft.com/office/powerpoint/2010/main" val="816485789"/>
+      </p:ext>
+    </p:extLst>
+  </p:cSld>
+  <p:clrMapOvr>
+    <a:masterClrMapping/>
+  </p:clrMapOvr>
+</p:sldLayout>
+</file>
+
+<file path=ppt/slideLayouts/slideLayout21.xml><?xml version="1.0" encoding="utf-8"?>
 <p:sldLayout xmlns:a="http://schemas.openxmlformats.org/drawingml/2006/main" xmlns:r="http://schemas.openxmlformats.org/officeDocument/2006/relationships" xmlns:p="http://schemas.openxmlformats.org/presentationml/2006/main" userDrawn="1">
   <p:cSld name="32pt Slide Title ">
     <p:spTree>
@@ -7386,6 +7905,248 @@
 
 <file path=ppt/slideLayouts/slideLayout5.xml><?xml version="1.0" encoding="utf-8"?>
 <p:sldLayout xmlns:a="http://schemas.openxmlformats.org/drawingml/2006/main" xmlns:r="http://schemas.openxmlformats.org/officeDocument/2006/relationships" xmlns:p="http://schemas.openxmlformats.org/presentationml/2006/main" preserve="1" userDrawn="1">
+  <p:cSld name="Case Study Question">
+    <p:spTree>
+      <p:nvGrpSpPr>
+        <p:cNvPr id="1" name=""/>
+        <p:cNvGrpSpPr/>
+        <p:nvPr/>
+      </p:nvGrpSpPr>
+      <p:grpSpPr>
+        <a:xfrm>
+          <a:off x="0" y="0"/>
+          <a:ext cx="0" cy="0"/>
+          <a:chOff x="0" y="0"/>
+          <a:chExt cx="0" cy="0"/>
+        </a:xfrm>
+      </p:grpSpPr>
+      <p:sp>
+        <p:nvSpPr>
+          <p:cNvPr id="3" name="Rectangle 2">
+            <a:extLst>
+              <a:ext uri="{FF2B5EF4-FFF2-40B4-BE49-F238E27FC236}">
+                <a16:creationId xmlns:a16="http://schemas.microsoft.com/office/drawing/2014/main" id="{45B7C354-0C5C-4196-BE29-DBA8ABB17A4F}"/>
+              </a:ext>
+            </a:extLst>
+          </p:cNvPr>
+          <p:cNvSpPr/>
+          <p:nvPr userDrawn="1"/>
+        </p:nvSpPr>
+        <p:spPr>
+          <a:xfrm>
+            <a:off x="0" y="0"/>
+            <a:ext cx="9144000" cy="6172200"/>
+          </a:xfrm>
+          <a:prstGeom prst="rect">
+            <a:avLst/>
+          </a:prstGeom>
+          <a:solidFill>
+            <a:srgbClr val="669900"/>
+          </a:solidFill>
+          <a:ln>
+            <a:noFill/>
+          </a:ln>
+        </p:spPr>
+        <p:style>
+          <a:lnRef idx="2">
+            <a:schemeClr val="accent1">
+              <a:shade val="50000"/>
+            </a:schemeClr>
+          </a:lnRef>
+          <a:fillRef idx="1">
+            <a:schemeClr val="accent1"/>
+          </a:fillRef>
+          <a:effectRef idx="0">
+            <a:schemeClr val="accent1"/>
+          </a:effectRef>
+          <a:fontRef idx="minor">
+            <a:schemeClr val="lt1"/>
+          </a:fontRef>
+        </p:style>
+        <p:txBody>
+          <a:bodyPr rtlCol="0" anchor="ctr"/>
+          <a:lstStyle/>
+          <a:p>
+            <a:pPr algn="ctr"/>
+            <a:endParaRPr lang="en-US" dirty="0"/>
+          </a:p>
+        </p:txBody>
+      </p:sp>
+      <p:sp>
+        <p:nvSpPr>
+          <p:cNvPr id="2" name="Title 1">
+            <a:extLst>
+              <a:ext uri="{FF2B5EF4-FFF2-40B4-BE49-F238E27FC236}">
+                <a16:creationId xmlns:a16="http://schemas.microsoft.com/office/drawing/2014/main" id="{E7744812-071B-4DDA-A498-60D67CDBA951}"/>
+              </a:ext>
+            </a:extLst>
+          </p:cNvPr>
+          <p:cNvSpPr>
+            <a:spLocks noGrp="1"/>
+          </p:cNvSpPr>
+          <p:nvPr>
+            <p:ph type="title" hasCustomPrompt="1"/>
+          </p:nvPr>
+        </p:nvSpPr>
+        <p:spPr/>
+        <p:txBody>
+          <a:bodyPr/>
+          <a:lstStyle>
+            <a:lvl1pPr>
+              <a:defRPr/>
+            </a:lvl1pPr>
+          </a:lstStyle>
+          <a:p>
+            <a:r>
+              <a:rPr lang="en-US" dirty="0"/>
+              <a:t>Click to edit Scenario Case Study Title</a:t>
+            </a:r>
+          </a:p>
+        </p:txBody>
+      </p:sp>
+      <p:sp>
+        <p:nvSpPr>
+          <p:cNvPr id="4" name="Content Placeholder 2">
+            <a:extLst>
+              <a:ext uri="{FF2B5EF4-FFF2-40B4-BE49-F238E27FC236}">
+                <a16:creationId xmlns:a16="http://schemas.microsoft.com/office/drawing/2014/main" id="{428BF76E-A867-413D-99D3-38C859FD2EBE}"/>
+              </a:ext>
+            </a:extLst>
+          </p:cNvPr>
+          <p:cNvSpPr>
+            <a:spLocks noGrp="1"/>
+          </p:cNvSpPr>
+          <p:nvPr>
+            <p:ph idx="1" hasCustomPrompt="1"/>
+          </p:nvPr>
+        </p:nvSpPr>
+        <p:spPr>
+          <a:xfrm>
+            <a:off x="279475" y="868681"/>
+            <a:ext cx="8574837" cy="5212080"/>
+          </a:xfrm>
+        </p:spPr>
+        <p:txBody>
+          <a:bodyPr/>
+          <a:lstStyle>
+            <a:lvl1pPr marL="0" indent="0">
+              <a:buFont typeface="+mj-lt"/>
+              <a:buNone/>
+              <a:defRPr/>
+            </a:lvl1pPr>
+          </a:lstStyle>
+          <a:p>
+            <a:pPr lvl="0"/>
+            <a:r>
+              <a:rPr lang="en-US" dirty="0"/>
+              <a:t>Edit Scenario Case Study Text</a:t>
+            </a:r>
+          </a:p>
+          <a:p>
+            <a:pPr lvl="1"/>
+            <a:r>
+              <a:rPr lang="en-US" dirty="0"/>
+              <a:t>Second level</a:t>
+            </a:r>
+          </a:p>
+          <a:p>
+            <a:pPr lvl="2"/>
+            <a:r>
+              <a:rPr lang="en-US" dirty="0"/>
+              <a:t>Third level</a:t>
+            </a:r>
+          </a:p>
+          <a:p>
+            <a:pPr lvl="3"/>
+            <a:r>
+              <a:rPr lang="en-US" dirty="0"/>
+              <a:t>Fourth level</a:t>
+            </a:r>
+          </a:p>
+          <a:p>
+            <a:pPr lvl="4"/>
+            <a:r>
+              <a:rPr lang="en-US" dirty="0"/>
+              <a:t>Fifth level</a:t>
+            </a:r>
+          </a:p>
+        </p:txBody>
+      </p:sp>
+      <p:sp>
+        <p:nvSpPr>
+          <p:cNvPr id="5" name="Text Placeholder 4">
+            <a:extLst>
+              <a:ext uri="{FF2B5EF4-FFF2-40B4-BE49-F238E27FC236}">
+                <a16:creationId xmlns:a16="http://schemas.microsoft.com/office/drawing/2014/main" id="{4A939B04-3C34-406A-BE95-60EE5E849FD0}"/>
+              </a:ext>
+            </a:extLst>
+          </p:cNvPr>
+          <p:cNvSpPr>
+            <a:spLocks noGrp="1"/>
+          </p:cNvSpPr>
+          <p:nvPr>
+            <p:ph type="body" sz="quarter" idx="10" hasCustomPrompt="1"/>
+          </p:nvPr>
+        </p:nvSpPr>
+        <p:spPr>
+          <a:xfrm>
+            <a:off x="261188" y="6307137"/>
+            <a:ext cx="8574837" cy="410903"/>
+          </a:xfrm>
+        </p:spPr>
+        <p:txBody>
+          <a:bodyPr/>
+          <a:lstStyle>
+            <a:lvl1pPr marL="0" indent="0">
+              <a:buFont typeface="Arial" panose="020B0604020202020204" pitchFamily="34" charset="0"/>
+              <a:buNone/>
+              <a:defRPr sz="1400"/>
+            </a:lvl1pPr>
+            <a:lvl2pPr marL="574675" indent="-285750">
+              <a:buFont typeface="Arial" panose="020B0604020202020204" pitchFamily="34" charset="0"/>
+              <a:buChar char="•"/>
+              <a:defRPr sz="1600"/>
+            </a:lvl2pPr>
+            <a:lvl3pPr marL="966787" indent="-285750">
+              <a:buFont typeface="Arial" panose="020B0604020202020204" pitchFamily="34" charset="0"/>
+              <a:buChar char="•"/>
+              <a:defRPr sz="1400"/>
+            </a:lvl3pPr>
+            <a:lvl4pPr marL="1260475" indent="-171450">
+              <a:buFont typeface="Arial" panose="020B0604020202020204" pitchFamily="34" charset="0"/>
+              <a:buChar char="•"/>
+              <a:defRPr sz="1200"/>
+            </a:lvl4pPr>
+            <a:lvl5pPr marL="1547813" indent="-171450">
+              <a:buFont typeface="Arial" panose="020B0604020202020204" pitchFamily="34" charset="0"/>
+              <a:buChar char="•"/>
+              <a:defRPr sz="1200"/>
+            </a:lvl5pPr>
+          </a:lstStyle>
+          <a:p>
+            <a:pPr lvl="0"/>
+            <a:r>
+              <a:rPr lang="en-US" dirty="0"/>
+              <a:t>Edit URL</a:t>
+            </a:r>
+          </a:p>
+        </p:txBody>
+      </p:sp>
+    </p:spTree>
+    <p:extLst>
+      <p:ext uri="{BB962C8B-B14F-4D97-AF65-F5344CB8AC3E}">
+        <p14:creationId xmlns:p14="http://schemas.microsoft.com/office/powerpoint/2010/main" val="3504820493"/>
+      </p:ext>
+    </p:extLst>
+  </p:cSld>
+  <p:clrMapOvr>
+    <a:masterClrMapping/>
+  </p:clrMapOvr>
+</p:sldLayout>
+</file>
+
+<file path=ppt/slideLayouts/slideLayout6.xml><?xml version="1.0" encoding="utf-8"?>
+<p:sldLayout xmlns:a="http://schemas.openxmlformats.org/drawingml/2006/main" xmlns:r="http://schemas.openxmlformats.org/officeDocument/2006/relationships" xmlns:p="http://schemas.openxmlformats.org/presentationml/2006/main" preserve="1" userDrawn="1">
   <p:cSld name="Question">
     <p:spTree>
       <p:nvGrpSpPr>
@@ -7502,7 +8263,13 @@
         </p:spPr>
         <p:txBody>
           <a:bodyPr/>
-          <a:lstStyle/>
+          <a:lstStyle>
+            <a:lvl1pPr marL="514350" indent="-514350">
+              <a:buFont typeface="+mj-lt"/>
+              <a:buAutoNum type="arabicParenR"/>
+              <a:defRPr/>
+            </a:lvl1pPr>
+          </a:lstStyle>
           <a:p>
             <a:pPr lvl="0"/>
             <a:r>
@@ -7613,7 +8380,7 @@
 </p:sldLayout>
 </file>
 
-<file path=ppt/slideLayouts/slideLayout6.xml><?xml version="1.0" encoding="utf-8"?>
+<file path=ppt/slideLayouts/slideLayout7.xml><?xml version="1.0" encoding="utf-8"?>
 <p:sldLayout xmlns:a="http://schemas.openxmlformats.org/drawingml/2006/main" xmlns:r="http://schemas.openxmlformats.org/officeDocument/2006/relationships" xmlns:p="http://schemas.openxmlformats.org/presentationml/2006/main" preserve="1" userDrawn="1">
   <p:cSld name="Answer">
     <p:spTree>
@@ -7731,7 +8498,13 @@
         </p:spPr>
         <p:txBody>
           <a:bodyPr/>
-          <a:lstStyle/>
+          <a:lstStyle>
+            <a:lvl1pPr marL="514350" indent="-514350">
+              <a:buFont typeface="+mj-lt"/>
+              <a:buAutoNum type="arabicParenR"/>
+              <a:defRPr/>
+            </a:lvl1pPr>
+          </a:lstStyle>
           <a:p>
             <a:pPr lvl="0"/>
             <a:r>
@@ -7842,8 +8615,8 @@
 </p:sldLayout>
 </file>
 
-<file path=ppt/slideLayouts/slideLayout7.xml><?xml version="1.0" encoding="utf-8"?>
-<p:sldLayout xmlns:a="http://schemas.openxmlformats.org/drawingml/2006/main" xmlns:r="http://schemas.openxmlformats.org/officeDocument/2006/relationships" xmlns:p="http://schemas.openxmlformats.org/presentationml/2006/main" type="obj" preserve="1">
+<file path=ppt/slideLayouts/slideLayout8.xml><?xml version="1.0" encoding="utf-8"?>
+<p:sldLayout xmlns:a="http://schemas.openxmlformats.org/drawingml/2006/main" xmlns:r="http://schemas.openxmlformats.org/officeDocument/2006/relationships" xmlns:p="http://schemas.openxmlformats.org/presentationml/2006/main" preserve="1" userDrawn="1">
   <p:cSld name="Lab">
     <p:bg>
       <p:bgPr>
@@ -8070,61 +8843,60 @@
       </p:sp>
       <p:sp>
         <p:nvSpPr>
-          <p:cNvPr id="9" name="Title 1">
+          <p:cNvPr id="8" name="Text Placeholder 4">
             <a:extLst>
               <a:ext uri="{FF2B5EF4-FFF2-40B4-BE49-F238E27FC236}">
-                <a16:creationId xmlns:a16="http://schemas.microsoft.com/office/drawing/2014/main" id="{C610877B-30C7-48C5-8BDA-CA0DB0C7F805}"/>
+                <a16:creationId xmlns:a16="http://schemas.microsoft.com/office/drawing/2014/main" id="{5F53A04A-F1A4-47F1-8696-966F2AE336F7}"/>
               </a:ext>
             </a:extLst>
           </p:cNvPr>
-          <p:cNvSpPr txBox="1">
-            <a:spLocks/>
-          </p:cNvSpPr>
-          <p:nvPr userDrawn="1"/>
+          <p:cNvSpPr>
+            <a:spLocks noGrp="1"/>
+          </p:cNvSpPr>
+          <p:nvPr>
+            <p:ph type="body" sz="quarter" idx="10" hasCustomPrompt="1"/>
+          </p:nvPr>
         </p:nvSpPr>
         <p:spPr>
           <a:xfrm>
-            <a:off x="151194" y="6219372"/>
-            <a:ext cx="8833654" cy="587829"/>
+            <a:off x="261188" y="6307137"/>
+            <a:ext cx="8574837" cy="410903"/>
           </a:xfrm>
-          <a:prstGeom prst="rect">
-            <a:avLst/>
-          </a:prstGeom>
-          <a:solidFill>
-            <a:schemeClr val="bg1"/>
-          </a:solidFill>
         </p:spPr>
         <p:txBody>
-          <a:bodyPr vert="horz" lIns="68580" tIns="34290" rIns="68580" bIns="34290" rtlCol="0" anchor="ctr">
-            <a:noAutofit/>
-          </a:bodyPr>
+          <a:bodyPr/>
           <a:lstStyle>
-            <a:lvl1pPr algn="l" defTabSz="914400" rtl="0" eaLnBrk="1" latinLnBrk="0" hangingPunct="1">
-              <a:lnSpc>
-                <a:spcPct val="90000"/>
-              </a:lnSpc>
-              <a:spcBef>
-                <a:spcPct val="0"/>
-              </a:spcBef>
+            <a:lvl1pPr marL="0" indent="0">
+              <a:buFont typeface="Arial" panose="020B0604020202020204" pitchFamily="34" charset="0"/>
               <a:buNone/>
-              <a:defRPr sz="4400" kern="1200">
-                <a:solidFill>
-                  <a:schemeClr val="tx1"/>
-                </a:solidFill>
-                <a:latin typeface="+mj-lt"/>
-                <a:ea typeface="+mj-ea"/>
-                <a:cs typeface="+mj-cs"/>
-              </a:defRPr>
+              <a:defRPr sz="1400"/>
             </a:lvl1pPr>
+            <a:lvl2pPr marL="574675" indent="-285750">
+              <a:buFont typeface="Arial" panose="020B0604020202020204" pitchFamily="34" charset="0"/>
+              <a:buChar char="•"/>
+              <a:defRPr sz="1600"/>
+            </a:lvl2pPr>
+            <a:lvl3pPr marL="966787" indent="-285750">
+              <a:buFont typeface="Arial" panose="020B0604020202020204" pitchFamily="34" charset="0"/>
+              <a:buChar char="•"/>
+              <a:defRPr sz="1400"/>
+            </a:lvl3pPr>
+            <a:lvl4pPr marL="1260475" indent="-171450">
+              <a:buFont typeface="Arial" panose="020B0604020202020204" pitchFamily="34" charset="0"/>
+              <a:buChar char="•"/>
+              <a:defRPr sz="1200"/>
+            </a:lvl4pPr>
+            <a:lvl5pPr marL="1547813" indent="-171450">
+              <a:buFont typeface="Arial" panose="020B0604020202020204" pitchFamily="34" charset="0"/>
+              <a:buChar char="•"/>
+              <a:defRPr sz="1200"/>
+            </a:lvl5pPr>
           </a:lstStyle>
           <a:p>
-            <a:r>
-              <a:rPr lang="en-US" sz="1500" u="sng" dirty="0">
-                <a:solidFill>
-                  <a:srgbClr val="0070C0"/>
-                </a:solidFill>
-              </a:rPr>
-              <a:t>Click to edit Lab URL</a:t>
+            <a:pPr lvl="0"/>
+            <a:r>
+              <a:rPr lang="en-US" dirty="0"/>
+              <a:t>Edit URL</a:t>
             </a:r>
           </a:p>
         </p:txBody>
@@ -8142,7 +8914,7 @@
 </p:sldLayout>
 </file>
 
-<file path=ppt/slideLayouts/slideLayout8.xml><?xml version="1.0" encoding="utf-8"?>
+<file path=ppt/slideLayouts/slideLayout9.xml><?xml version="1.0" encoding="utf-8"?>
 <p:sldLayout xmlns:a="http://schemas.openxmlformats.org/drawingml/2006/main" xmlns:r="http://schemas.openxmlformats.org/officeDocument/2006/relationships" xmlns:p="http://schemas.openxmlformats.org/presentationml/2006/main" preserve="1" userDrawn="1">
   <p:cSld name="Content &amp; Code">
     <p:spTree>
@@ -8477,161 +9249,6 @@
 </p:sldLayout>
 </file>
 
-<file path=ppt/slideLayouts/slideLayout9.xml><?xml version="1.0" encoding="utf-8"?>
-<p:sldLayout xmlns:a="http://schemas.openxmlformats.org/drawingml/2006/main" xmlns:r="http://schemas.openxmlformats.org/officeDocument/2006/relationships" xmlns:p="http://schemas.openxmlformats.org/presentationml/2006/main" preserve="1" userDrawn="1">
-  <p:cSld name="Custom Layout">
-    <p:spTree>
-      <p:nvGrpSpPr>
-        <p:cNvPr id="1" name=""/>
-        <p:cNvGrpSpPr/>
-        <p:nvPr/>
-      </p:nvGrpSpPr>
-      <p:grpSpPr>
-        <a:xfrm>
-          <a:off x="0" y="0"/>
-          <a:ext cx="0" cy="0"/>
-          <a:chOff x="0" y="0"/>
-          <a:chExt cx="0" cy="0"/>
-        </a:xfrm>
-      </p:grpSpPr>
-      <p:sp>
-        <p:nvSpPr>
-          <p:cNvPr id="2" name="Title 1">
-            <a:extLst>
-              <a:ext uri="{FF2B5EF4-FFF2-40B4-BE49-F238E27FC236}">
-                <a16:creationId xmlns:a16="http://schemas.microsoft.com/office/drawing/2014/main" id="{F523216E-3091-410D-83D4-F3B694551529}"/>
-              </a:ext>
-            </a:extLst>
-          </p:cNvPr>
-          <p:cNvSpPr>
-            <a:spLocks noGrp="1"/>
-          </p:cNvSpPr>
-          <p:nvPr>
-            <p:ph type="title" hasCustomPrompt="1"/>
-          </p:nvPr>
-        </p:nvSpPr>
-        <p:spPr/>
-        <p:txBody>
-          <a:bodyPr/>
-          <a:lstStyle>
-            <a:lvl1pPr>
-              <a:defRPr/>
-            </a:lvl1pPr>
-          </a:lstStyle>
-          <a:p>
-            <a:r>
-              <a:rPr lang="en-US" dirty="0"/>
-              <a:t>Click to edit Code Title</a:t>
-            </a:r>
-          </a:p>
-        </p:txBody>
-      </p:sp>
-      <p:sp>
-        <p:nvSpPr>
-          <p:cNvPr id="4" name="Text Placeholder 3">
-            <a:extLst>
-              <a:ext uri="{FF2B5EF4-FFF2-40B4-BE49-F238E27FC236}">
-                <a16:creationId xmlns:a16="http://schemas.microsoft.com/office/drawing/2014/main" id="{8AA8E3D7-116C-400A-AC64-F86759F16B62}"/>
-              </a:ext>
-            </a:extLst>
-          </p:cNvPr>
-          <p:cNvSpPr>
-            <a:spLocks noGrp="1"/>
-          </p:cNvSpPr>
-          <p:nvPr>
-            <p:ph type="body" sz="quarter" idx="10" hasCustomPrompt="1"/>
-          </p:nvPr>
-        </p:nvSpPr>
-        <p:spPr>
-          <a:xfrm>
-            <a:off x="93306" y="811763"/>
-            <a:ext cx="8929396" cy="5859625"/>
-          </a:xfrm>
-        </p:spPr>
-        <p:txBody>
-          <a:bodyPr/>
-          <a:lstStyle>
-            <a:lvl1pPr marL="0" indent="0">
-              <a:buNone/>
-              <a:defRPr sz="2400">
-                <a:latin typeface="Consolas" panose="020B0609020204030204" pitchFamily="49" charset="0"/>
-              </a:defRPr>
-            </a:lvl1pPr>
-            <a:lvl2pPr marL="288925" indent="0">
-              <a:buNone/>
-              <a:defRPr sz="2000">
-                <a:latin typeface="Consolas" panose="020B0609020204030204" pitchFamily="49" charset="0"/>
-              </a:defRPr>
-            </a:lvl2pPr>
-            <a:lvl3pPr marL="681037" indent="0">
-              <a:buNone/>
-              <a:defRPr sz="1800">
-                <a:latin typeface="Consolas" panose="020B0609020204030204" pitchFamily="49" charset="0"/>
-              </a:defRPr>
-            </a:lvl3pPr>
-            <a:lvl4pPr marL="1089025" indent="0">
-              <a:buNone/>
-              <a:defRPr sz="1600">
-                <a:latin typeface="Consolas" panose="020B0609020204030204" pitchFamily="49" charset="0"/>
-              </a:defRPr>
-            </a:lvl4pPr>
-            <a:lvl5pPr marL="1376363" indent="0">
-              <a:buNone/>
-              <a:defRPr sz="1600">
-                <a:latin typeface="Consolas" panose="020B0609020204030204" pitchFamily="49" charset="0"/>
-              </a:defRPr>
-            </a:lvl5pPr>
-          </a:lstStyle>
-          <a:p>
-            <a:pPr lvl="0"/>
-            <a:r>
-              <a:rPr lang="en-US" dirty="0"/>
-              <a:t>Edit Code</a:t>
-            </a:r>
-          </a:p>
-          <a:p>
-            <a:pPr lvl="1"/>
-            <a:r>
-              <a:rPr lang="en-US" dirty="0"/>
-              <a:t>Second level</a:t>
-            </a:r>
-          </a:p>
-          <a:p>
-            <a:pPr lvl="2"/>
-            <a:r>
-              <a:rPr lang="en-US" dirty="0"/>
-              <a:t>Third level</a:t>
-            </a:r>
-          </a:p>
-          <a:p>
-            <a:pPr lvl="3"/>
-            <a:r>
-              <a:rPr lang="en-US" dirty="0"/>
-              <a:t>Fourth level</a:t>
-            </a:r>
-          </a:p>
-          <a:p>
-            <a:pPr lvl="4"/>
-            <a:r>
-              <a:rPr lang="en-US" dirty="0"/>
-              <a:t>Fifth level</a:t>
-            </a:r>
-          </a:p>
-        </p:txBody>
-      </p:sp>
-    </p:spTree>
-    <p:extLst>
-      <p:ext uri="{BB962C8B-B14F-4D97-AF65-F5344CB8AC3E}">
-        <p14:creationId xmlns:p14="http://schemas.microsoft.com/office/powerpoint/2010/main" val="1117181669"/>
-      </p:ext>
-    </p:extLst>
-  </p:cSld>
-  <p:clrMapOvr>
-    <a:masterClrMapping/>
-  </p:clrMapOvr>
-</p:sldLayout>
-</file>
-
 <file path=ppt/slideMasters/slideMaster1.xml><?xml version="1.0" encoding="utf-8"?>
 <p:sldMaster xmlns:a="http://schemas.openxmlformats.org/drawingml/2006/main" xmlns:r="http://schemas.openxmlformats.org/officeDocument/2006/relationships" xmlns:p="http://schemas.openxmlformats.org/presentationml/2006/main" preserve="1">
   <p:cSld>
@@ -8908,22 +9525,23 @@
     <p:sldLayoutId id="2147483672" r:id="rId2"/>
     <p:sldLayoutId id="2147483666" r:id="rId3"/>
     <p:sldLayoutId id="2147483701" r:id="rId4"/>
-    <p:sldLayoutId id="2147483662" r:id="rId5"/>
-    <p:sldLayoutId id="2147483699" r:id="rId6"/>
-    <p:sldLayoutId id="2147483702" r:id="rId7"/>
-    <p:sldLayoutId id="2147483700" r:id="rId8"/>
-    <p:sldLayoutId id="2147483705" r:id="rId9"/>
-    <p:sldLayoutId id="2147483703" r:id="rId10"/>
-    <p:sldLayoutId id="2147483706" r:id="rId11"/>
-    <p:sldLayoutId id="2147483663" r:id="rId12"/>
-    <p:sldLayoutId id="2147483664" r:id="rId13"/>
-    <p:sldLayoutId id="2147483665" r:id="rId14"/>
-    <p:sldLayoutId id="2147483667" r:id="rId15"/>
-    <p:sldLayoutId id="2147483668" r:id="rId16"/>
-    <p:sldLayoutId id="2147483669" r:id="rId17"/>
-    <p:sldLayoutId id="2147483670" r:id="rId18"/>
-    <p:sldLayoutId id="2147483671" r:id="rId19"/>
-    <p:sldLayoutId id="2147483673" r:id="rId20"/>
+    <p:sldLayoutId id="2147483707" r:id="rId5"/>
+    <p:sldLayoutId id="2147483662" r:id="rId6"/>
+    <p:sldLayoutId id="2147483699" r:id="rId7"/>
+    <p:sldLayoutId id="2147483702" r:id="rId8"/>
+    <p:sldLayoutId id="2147483700" r:id="rId9"/>
+    <p:sldLayoutId id="2147483705" r:id="rId10"/>
+    <p:sldLayoutId id="2147483703" r:id="rId11"/>
+    <p:sldLayoutId id="2147483706" r:id="rId12"/>
+    <p:sldLayoutId id="2147483663" r:id="rId13"/>
+    <p:sldLayoutId id="2147483664" r:id="rId14"/>
+    <p:sldLayoutId id="2147483665" r:id="rId15"/>
+    <p:sldLayoutId id="2147483667" r:id="rId16"/>
+    <p:sldLayoutId id="2147483668" r:id="rId17"/>
+    <p:sldLayoutId id="2147483669" r:id="rId18"/>
+    <p:sldLayoutId id="2147483670" r:id="rId19"/>
+    <p:sldLayoutId id="2147483671" r:id="rId20"/>
+    <p:sldLayoutId id="2147483673" r:id="rId21"/>
   </p:sldLayoutIdLst>
   <p:txStyles>
     <p:titleStyle>
@@ -9494,7 +10112,11 @@
           <a:lstStyle/>
           <a:p>
             <a:r>
-              <a:rPr lang="en-US" sz="1600" dirty="0"/>
+              <a:rPr lang="en-US" sz="1600" b="1" dirty="0">
+                <a:solidFill>
+                  <a:srgbClr val="FFC000"/>
+                </a:solidFill>
+              </a:rPr>
               <a:t>Design and Implement Azure App Service Apps (10-15%) </a:t>
             </a:r>
           </a:p>
@@ -9552,7 +10174,11 @@
             <p:ph type="body" sz="quarter" idx="10"/>
           </p:nvPr>
         </p:nvSpPr>
-        <p:spPr/>
+        <p:spPr>
+          <a:solidFill>
+            <a:schemeClr val="accent1"/>
+          </a:solidFill>
+        </p:spPr>
         <p:txBody>
           <a:bodyPr/>
           <a:lstStyle/>
@@ -9564,7 +10190,11 @@
               <a:buNone/>
             </a:pPr>
             <a:r>
-              <a:rPr lang="en-US" sz="1400" dirty="0"/>
+              <a:rPr lang="en-US" sz="1400" dirty="0">
+                <a:solidFill>
+                  <a:schemeClr val="tx1"/>
+                </a:solidFill>
+              </a:rPr>
               <a:t>Speaker Information:</a:t>
             </a:r>
           </a:p>
@@ -9575,7 +10205,11 @@
               </a:buClr>
               <a:buNone/>
             </a:pPr>
-            <a:endParaRPr lang="en-US" sz="1400" dirty="0"/>
+            <a:endParaRPr lang="en-US" sz="1400" dirty="0">
+              <a:solidFill>
+                <a:schemeClr val="tx1"/>
+              </a:solidFill>
+            </a:endParaRPr>
           </a:p>
         </p:txBody>
       </p:sp>
@@ -9784,6 +10418,404 @@
       </p:grpSpPr>
       <p:sp>
         <p:nvSpPr>
+          <p:cNvPr id="5" name="Title 4">
+            <a:extLst>
+              <a:ext uri="{FF2B5EF4-FFF2-40B4-BE49-F238E27FC236}">
+                <a16:creationId xmlns:a16="http://schemas.microsoft.com/office/drawing/2014/main" id="{08ADEA70-0291-4B72-9963-1103847B70FB}"/>
+              </a:ext>
+            </a:extLst>
+          </p:cNvPr>
+          <p:cNvSpPr>
+            <a:spLocks noGrp="1"/>
+          </p:cNvSpPr>
+          <p:nvPr>
+            <p:ph type="title"/>
+          </p:nvPr>
+        </p:nvSpPr>
+        <p:spPr/>
+        <p:txBody>
+          <a:bodyPr/>
+          <a:lstStyle/>
+          <a:p>
+            <a:endParaRPr lang="en-US"/>
+          </a:p>
+        </p:txBody>
+      </p:sp>
+      <p:sp>
+        <p:nvSpPr>
+          <p:cNvPr id="7" name="Text Placeholder 6">
+            <a:extLst>
+              <a:ext uri="{FF2B5EF4-FFF2-40B4-BE49-F238E27FC236}">
+                <a16:creationId xmlns:a16="http://schemas.microsoft.com/office/drawing/2014/main" id="{8761CA1C-A62D-4791-80E3-1647AB49EF35}"/>
+              </a:ext>
+            </a:extLst>
+          </p:cNvPr>
+          <p:cNvSpPr>
+            <a:spLocks noGrp="1"/>
+          </p:cNvSpPr>
+          <p:nvPr>
+            <p:ph type="body" sz="quarter" idx="11"/>
+          </p:nvPr>
+        </p:nvSpPr>
+        <p:spPr/>
+        <p:txBody>
+          <a:bodyPr/>
+          <a:lstStyle/>
+          <a:p>
+            <a:endParaRPr lang="en-US"/>
+          </a:p>
+        </p:txBody>
+      </p:sp>
+      <p:sp>
+        <p:nvSpPr>
+          <p:cNvPr id="6" name="Text Placeholder 5">
+            <a:extLst>
+              <a:ext uri="{FF2B5EF4-FFF2-40B4-BE49-F238E27FC236}">
+                <a16:creationId xmlns:a16="http://schemas.microsoft.com/office/drawing/2014/main" id="{898B891A-9DAD-4484-9795-2DB4A3204307}"/>
+              </a:ext>
+            </a:extLst>
+          </p:cNvPr>
+          <p:cNvSpPr>
+            <a:spLocks noGrp="1"/>
+          </p:cNvSpPr>
+          <p:nvPr>
+            <p:ph type="body" sz="quarter" idx="10"/>
+          </p:nvPr>
+        </p:nvSpPr>
+        <p:spPr/>
+        <p:txBody>
+          <a:bodyPr/>
+          <a:lstStyle/>
+          <a:p>
+            <a:endParaRPr lang="en-US"/>
+          </a:p>
+        </p:txBody>
+      </p:sp>
+    </p:spTree>
+    <p:extLst>
+      <p:ext uri="{BB962C8B-B14F-4D97-AF65-F5344CB8AC3E}">
+        <p14:creationId xmlns:p14="http://schemas.microsoft.com/office/powerpoint/2010/main" val="3844760331"/>
+      </p:ext>
+    </p:extLst>
+  </p:cSld>
+  <p:clrMapOvr>
+    <a:masterClrMapping/>
+  </p:clrMapOvr>
+  <p:transition>
+    <p:fade/>
+  </p:transition>
+</p:sld>
+</file>
+
+<file path=ppt/slides/slide12.xml><?xml version="1.0" encoding="utf-8"?>
+<p:sld xmlns:a="http://schemas.openxmlformats.org/drawingml/2006/main" xmlns:r="http://schemas.openxmlformats.org/officeDocument/2006/relationships" xmlns:p="http://schemas.openxmlformats.org/presentationml/2006/main">
+  <p:cSld>
+    <p:spTree>
+      <p:nvGrpSpPr>
+        <p:cNvPr id="1" name=""/>
+        <p:cNvGrpSpPr/>
+        <p:nvPr/>
+      </p:nvGrpSpPr>
+      <p:grpSpPr>
+        <a:xfrm>
+          <a:off x="0" y="0"/>
+          <a:ext cx="0" cy="0"/>
+          <a:chOff x="0" y="0"/>
+          <a:chExt cx="0" cy="0"/>
+        </a:xfrm>
+      </p:grpSpPr>
+      <p:sp>
+        <p:nvSpPr>
+          <p:cNvPr id="5" name="Title 4">
+            <a:extLst>
+              <a:ext uri="{FF2B5EF4-FFF2-40B4-BE49-F238E27FC236}">
+                <a16:creationId xmlns:a16="http://schemas.microsoft.com/office/drawing/2014/main" id="{90782058-14FA-4576-AC47-7C8609E7E48D}"/>
+              </a:ext>
+            </a:extLst>
+          </p:cNvPr>
+          <p:cNvSpPr>
+            <a:spLocks noGrp="1"/>
+          </p:cNvSpPr>
+          <p:nvPr>
+            <p:ph type="title"/>
+          </p:nvPr>
+        </p:nvSpPr>
+        <p:spPr/>
+        <p:txBody>
+          <a:bodyPr/>
+          <a:lstStyle/>
+          <a:p>
+            <a:endParaRPr lang="en-US"/>
+          </a:p>
+        </p:txBody>
+      </p:sp>
+      <p:sp>
+        <p:nvSpPr>
+          <p:cNvPr id="6" name="Content Placeholder 5">
+            <a:extLst>
+              <a:ext uri="{FF2B5EF4-FFF2-40B4-BE49-F238E27FC236}">
+                <a16:creationId xmlns:a16="http://schemas.microsoft.com/office/drawing/2014/main" id="{D8F9C882-E0A7-4A7A-A8B8-2656E1326883}"/>
+              </a:ext>
+            </a:extLst>
+          </p:cNvPr>
+          <p:cNvSpPr>
+            <a:spLocks noGrp="1"/>
+          </p:cNvSpPr>
+          <p:nvPr>
+            <p:ph idx="1"/>
+          </p:nvPr>
+        </p:nvSpPr>
+        <p:spPr/>
+        <p:txBody>
+          <a:bodyPr/>
+          <a:lstStyle/>
+          <a:p>
+            <a:endParaRPr lang="en-US"/>
+          </a:p>
+        </p:txBody>
+      </p:sp>
+      <p:sp>
+        <p:nvSpPr>
+          <p:cNvPr id="7" name="Text Placeholder 6">
+            <a:extLst>
+              <a:ext uri="{FF2B5EF4-FFF2-40B4-BE49-F238E27FC236}">
+                <a16:creationId xmlns:a16="http://schemas.microsoft.com/office/drawing/2014/main" id="{CF4E6B3B-2CE9-4739-AC40-9FDE4F13A195}"/>
+              </a:ext>
+            </a:extLst>
+          </p:cNvPr>
+          <p:cNvSpPr>
+            <a:spLocks noGrp="1"/>
+          </p:cNvSpPr>
+          <p:nvPr>
+            <p:ph type="body" sz="quarter" idx="10"/>
+          </p:nvPr>
+        </p:nvSpPr>
+        <p:spPr/>
+        <p:txBody>
+          <a:bodyPr/>
+          <a:lstStyle/>
+          <a:p>
+            <a:endParaRPr lang="en-US"/>
+          </a:p>
+        </p:txBody>
+      </p:sp>
+    </p:spTree>
+    <p:extLst>
+      <p:ext uri="{BB962C8B-B14F-4D97-AF65-F5344CB8AC3E}">
+        <p14:creationId xmlns:p14="http://schemas.microsoft.com/office/powerpoint/2010/main" val="4208879036"/>
+      </p:ext>
+    </p:extLst>
+  </p:cSld>
+  <p:clrMapOvr>
+    <a:masterClrMapping/>
+  </p:clrMapOvr>
+</p:sld>
+</file>
+
+<file path=ppt/slides/slide13.xml><?xml version="1.0" encoding="utf-8"?>
+<p:sld xmlns:a="http://schemas.openxmlformats.org/drawingml/2006/main" xmlns:r="http://schemas.openxmlformats.org/officeDocument/2006/relationships" xmlns:p="http://schemas.openxmlformats.org/presentationml/2006/main">
+  <p:cSld>
+    <p:spTree>
+      <p:nvGrpSpPr>
+        <p:cNvPr id="1" name=""/>
+        <p:cNvGrpSpPr/>
+        <p:nvPr/>
+      </p:nvGrpSpPr>
+      <p:grpSpPr>
+        <a:xfrm>
+          <a:off x="0" y="0"/>
+          <a:ext cx="0" cy="0"/>
+          <a:chOff x="0" y="0"/>
+          <a:chExt cx="0" cy="0"/>
+        </a:xfrm>
+      </p:grpSpPr>
+      <p:sp>
+        <p:nvSpPr>
+          <p:cNvPr id="5" name="Title 4">
+            <a:extLst>
+              <a:ext uri="{FF2B5EF4-FFF2-40B4-BE49-F238E27FC236}">
+                <a16:creationId xmlns:a16="http://schemas.microsoft.com/office/drawing/2014/main" id="{1EC61856-5169-45C5-9111-875F85B333DC}"/>
+              </a:ext>
+            </a:extLst>
+          </p:cNvPr>
+          <p:cNvSpPr>
+            <a:spLocks noGrp="1"/>
+          </p:cNvSpPr>
+          <p:nvPr>
+            <p:ph type="title"/>
+          </p:nvPr>
+        </p:nvSpPr>
+        <p:spPr/>
+        <p:txBody>
+          <a:bodyPr/>
+          <a:lstStyle/>
+          <a:p>
+            <a:endParaRPr lang="en-US"/>
+          </a:p>
+        </p:txBody>
+      </p:sp>
+      <p:sp>
+        <p:nvSpPr>
+          <p:cNvPr id="6" name="Content Placeholder 5">
+            <a:extLst>
+              <a:ext uri="{FF2B5EF4-FFF2-40B4-BE49-F238E27FC236}">
+                <a16:creationId xmlns:a16="http://schemas.microsoft.com/office/drawing/2014/main" id="{153420EE-FC7C-459F-90FD-1857D3DE4D74}"/>
+              </a:ext>
+            </a:extLst>
+          </p:cNvPr>
+          <p:cNvSpPr>
+            <a:spLocks noGrp="1"/>
+          </p:cNvSpPr>
+          <p:nvPr>
+            <p:ph idx="1"/>
+          </p:nvPr>
+        </p:nvSpPr>
+        <p:spPr/>
+        <p:txBody>
+          <a:bodyPr/>
+          <a:lstStyle/>
+          <a:p>
+            <a:endParaRPr lang="en-US" dirty="0"/>
+          </a:p>
+        </p:txBody>
+      </p:sp>
+      <p:sp>
+        <p:nvSpPr>
+          <p:cNvPr id="7" name="Text Placeholder 6">
+            <a:extLst>
+              <a:ext uri="{FF2B5EF4-FFF2-40B4-BE49-F238E27FC236}">
+                <a16:creationId xmlns:a16="http://schemas.microsoft.com/office/drawing/2014/main" id="{0060A6CD-CF73-4CBE-9026-8943DCA5D1DB}"/>
+              </a:ext>
+            </a:extLst>
+          </p:cNvPr>
+          <p:cNvSpPr>
+            <a:spLocks noGrp="1"/>
+          </p:cNvSpPr>
+          <p:nvPr>
+            <p:ph type="body" sz="quarter" idx="10"/>
+          </p:nvPr>
+        </p:nvSpPr>
+        <p:spPr/>
+        <p:txBody>
+          <a:bodyPr/>
+          <a:lstStyle/>
+          <a:p>
+            <a:endParaRPr lang="en-US"/>
+          </a:p>
+        </p:txBody>
+      </p:sp>
+    </p:spTree>
+    <p:extLst>
+      <p:ext uri="{BB962C8B-B14F-4D97-AF65-F5344CB8AC3E}">
+        <p14:creationId xmlns:p14="http://schemas.microsoft.com/office/powerpoint/2010/main" val="3688551044"/>
+      </p:ext>
+    </p:extLst>
+  </p:cSld>
+  <p:clrMapOvr>
+    <a:masterClrMapping/>
+  </p:clrMapOvr>
+</p:sld>
+</file>
+
+<file path=ppt/slides/slide14.xml><?xml version="1.0" encoding="utf-8"?>
+<p:sld xmlns:a="http://schemas.openxmlformats.org/drawingml/2006/main" xmlns:r="http://schemas.openxmlformats.org/officeDocument/2006/relationships" xmlns:p="http://schemas.openxmlformats.org/presentationml/2006/main">
+  <p:cSld>
+    <p:spTree>
+      <p:nvGrpSpPr>
+        <p:cNvPr id="1" name=""/>
+        <p:cNvGrpSpPr/>
+        <p:nvPr/>
+      </p:nvGrpSpPr>
+      <p:grpSpPr>
+        <a:xfrm>
+          <a:off x="0" y="0"/>
+          <a:ext cx="0" cy="0"/>
+          <a:chOff x="0" y="0"/>
+          <a:chExt cx="0" cy="0"/>
+        </a:xfrm>
+      </p:grpSpPr>
+      <p:sp>
+        <p:nvSpPr>
+          <p:cNvPr id="5" name="Title 4">
+            <a:extLst>
+              <a:ext uri="{FF2B5EF4-FFF2-40B4-BE49-F238E27FC236}">
+                <a16:creationId xmlns:a16="http://schemas.microsoft.com/office/drawing/2014/main" id="{5CC73727-4CA9-4101-B1BF-D8583B9D8EEB}"/>
+              </a:ext>
+            </a:extLst>
+          </p:cNvPr>
+          <p:cNvSpPr>
+            <a:spLocks noGrp="1"/>
+          </p:cNvSpPr>
+          <p:nvPr>
+            <p:ph type="title"/>
+          </p:nvPr>
+        </p:nvSpPr>
+        <p:spPr/>
+        <p:txBody>
+          <a:bodyPr/>
+          <a:lstStyle/>
+          <a:p>
+            <a:endParaRPr lang="en-US"/>
+          </a:p>
+        </p:txBody>
+      </p:sp>
+      <p:sp>
+        <p:nvSpPr>
+          <p:cNvPr id="6" name="Content Placeholder 5">
+            <a:extLst>
+              <a:ext uri="{FF2B5EF4-FFF2-40B4-BE49-F238E27FC236}">
+                <a16:creationId xmlns:a16="http://schemas.microsoft.com/office/drawing/2014/main" id="{8E422FA8-2A28-4AAA-80F8-C4E6A63A9F1F}"/>
+              </a:ext>
+            </a:extLst>
+          </p:cNvPr>
+          <p:cNvSpPr>
+            <a:spLocks noGrp="1"/>
+          </p:cNvSpPr>
+          <p:nvPr>
+            <p:ph idx="1"/>
+          </p:nvPr>
+        </p:nvSpPr>
+        <p:spPr/>
+        <p:txBody>
+          <a:bodyPr/>
+          <a:lstStyle/>
+          <a:p>
+            <a:endParaRPr lang="en-US"/>
+          </a:p>
+        </p:txBody>
+      </p:sp>
+    </p:spTree>
+    <p:extLst>
+      <p:ext uri="{BB962C8B-B14F-4D97-AF65-F5344CB8AC3E}">
+        <p14:creationId xmlns:p14="http://schemas.microsoft.com/office/powerpoint/2010/main" val="201793388"/>
+      </p:ext>
+    </p:extLst>
+  </p:cSld>
+  <p:clrMapOvr>
+    <a:masterClrMapping/>
+  </p:clrMapOvr>
+</p:sld>
+</file>
+
+<file path=ppt/slides/slide15.xml><?xml version="1.0" encoding="utf-8"?>
+<p:sld xmlns:a="http://schemas.openxmlformats.org/drawingml/2006/main" xmlns:r="http://schemas.openxmlformats.org/officeDocument/2006/relationships" xmlns:p="http://schemas.openxmlformats.org/presentationml/2006/main">
+  <p:cSld>
+    <p:spTree>
+      <p:nvGrpSpPr>
+        <p:cNvPr id="1" name=""/>
+        <p:cNvGrpSpPr/>
+        <p:nvPr/>
+      </p:nvGrpSpPr>
+      <p:grpSpPr>
+        <a:xfrm>
+          <a:off x="0" y="0"/>
+          <a:ext cx="0" cy="0"/>
+          <a:chOff x="0" y="0"/>
+          <a:chExt cx="0" cy="0"/>
+        </a:xfrm>
+      </p:grpSpPr>
+      <p:sp>
+        <p:nvSpPr>
           <p:cNvPr id="2" name="Title 1"/>
           <p:cNvSpPr>
             <a:spLocks noGrp="1"/>
@@ -10045,7 +11077,7 @@
 </p:sld>
 </file>
 
-<file path=ppt/slides/slide12.xml><?xml version="1.0" encoding="utf-8"?>
+<file path=ppt/slides/slide16.xml><?xml version="1.0" encoding="utf-8"?>
 <p:sld xmlns:a="http://schemas.openxmlformats.org/drawingml/2006/main" xmlns:r="http://schemas.openxmlformats.org/officeDocument/2006/relationships" xmlns:p="http://schemas.openxmlformats.org/presentationml/2006/main">
   <p:cSld>
     <p:spTree>

</xml_diff>

<commit_message>
Add Demo Slide to template
</commit_message>
<xml_diff>
--- a/70-533-00-Template.pptx
+++ b/70-533-00-Template.pptx
@@ -358,7 +358,7 @@
           <a:p>
             <a:fld id="{7D784404-57E5-4341-9230-5EC072B8C3C5}" type="datetimeFigureOut">
               <a:rPr lang="en-US" smtClean="0"/>
-              <a:t>1/24/2018</a:t>
+              <a:t>1/29/2018</a:t>
             </a:fld>
             <a:endParaRPr lang="en-US"/>
           </a:p>
@@ -535,7 +535,7 @@
           <a:p>
             <a:fld id="{9933EFA3-31EF-403B-8080-9776000D59FF}" type="datetimeFigureOut">
               <a:rPr lang="en-US" smtClean="0"/>
-              <a:t>1/24/2018</a:t>
+              <a:t>1/29/2018</a:t>
             </a:fld>
             <a:endParaRPr lang="en-US" dirty="0"/>
           </a:p>
@@ -3337,6 +3337,341 @@
 
 <file path=ppt/slideLayouts/slideLayout10.xml><?xml version="1.0" encoding="utf-8"?>
 <p:sldLayout xmlns:a="http://schemas.openxmlformats.org/drawingml/2006/main" xmlns:r="http://schemas.openxmlformats.org/officeDocument/2006/relationships" xmlns:p="http://schemas.openxmlformats.org/presentationml/2006/main" preserve="1" userDrawn="1">
+  <p:cSld name="Content &amp; Code">
+    <p:spTree>
+      <p:nvGrpSpPr>
+        <p:cNvPr id="1" name=""/>
+        <p:cNvGrpSpPr/>
+        <p:nvPr/>
+      </p:nvGrpSpPr>
+      <p:grpSpPr>
+        <a:xfrm>
+          <a:off x="0" y="0"/>
+          <a:ext cx="0" cy="0"/>
+          <a:chOff x="0" y="0"/>
+          <a:chExt cx="0" cy="0"/>
+        </a:xfrm>
+      </p:grpSpPr>
+      <p:sp>
+        <p:nvSpPr>
+          <p:cNvPr id="2" name="Title 1"/>
+          <p:cNvSpPr>
+            <a:spLocks noGrp="1"/>
+          </p:cNvSpPr>
+          <p:nvPr>
+            <p:ph type="title" hasCustomPrompt="1"/>
+          </p:nvPr>
+        </p:nvSpPr>
+        <p:spPr>
+          <a:xfrm>
+            <a:off x="151194" y="0"/>
+            <a:ext cx="8833654" cy="878350"/>
+          </a:xfrm>
+        </p:spPr>
+        <p:txBody>
+          <a:bodyPr/>
+          <a:lstStyle>
+            <a:lvl1pPr>
+              <a:defRPr/>
+            </a:lvl1pPr>
+          </a:lstStyle>
+          <a:p>
+            <a:r>
+              <a:rPr lang="en-US" dirty="0"/>
+              <a:t>Content &amp; Code</a:t>
+            </a:r>
+          </a:p>
+        </p:txBody>
+      </p:sp>
+      <p:sp>
+        <p:nvSpPr>
+          <p:cNvPr id="3" name="Content Placeholder 2"/>
+          <p:cNvSpPr>
+            <a:spLocks noGrp="1"/>
+          </p:cNvSpPr>
+          <p:nvPr>
+            <p:ph idx="1"/>
+          </p:nvPr>
+        </p:nvSpPr>
+        <p:spPr>
+          <a:xfrm>
+            <a:off x="151194" y="1231902"/>
+            <a:ext cx="8833654" cy="2421204"/>
+          </a:xfrm>
+        </p:spPr>
+        <p:txBody>
+          <a:bodyPr>
+            <a:normAutofit/>
+          </a:bodyPr>
+          <a:lstStyle>
+            <a:lvl1pPr marL="0" indent="0">
+              <a:buFont typeface="Arial" panose="020B0604020202020204" pitchFamily="34" charset="0"/>
+              <a:buNone/>
+              <a:defRPr sz="2100"/>
+            </a:lvl1pPr>
+            <a:lvl2pPr marL="342900" indent="0">
+              <a:buFont typeface="Arial" panose="020B0604020202020204" pitchFamily="34" charset="0"/>
+              <a:buNone/>
+              <a:defRPr sz="1800"/>
+            </a:lvl2pPr>
+            <a:lvl3pPr marL="685800" indent="0">
+              <a:buFont typeface="Arial" panose="020B0604020202020204" pitchFamily="34" charset="0"/>
+              <a:buNone/>
+              <a:defRPr sz="1500"/>
+            </a:lvl3pPr>
+            <a:lvl4pPr marL="1028700" indent="0">
+              <a:buFont typeface="Arial" panose="020B0604020202020204" pitchFamily="34" charset="0"/>
+              <a:buNone/>
+              <a:defRPr sz="1350"/>
+            </a:lvl4pPr>
+            <a:lvl5pPr marL="1371600" indent="0">
+              <a:buFont typeface="Arial" panose="020B0604020202020204" pitchFamily="34" charset="0"/>
+              <a:buNone/>
+              <a:defRPr sz="1350"/>
+            </a:lvl5pPr>
+          </a:lstStyle>
+          <a:p>
+            <a:pPr lvl="0"/>
+            <a:r>
+              <a:rPr lang="en-US" dirty="0"/>
+              <a:t>Click to edit Master text styles</a:t>
+            </a:r>
+          </a:p>
+          <a:p>
+            <a:pPr lvl="1"/>
+            <a:r>
+              <a:rPr lang="en-US" dirty="0"/>
+              <a:t>Second level</a:t>
+            </a:r>
+          </a:p>
+          <a:p>
+            <a:pPr lvl="2"/>
+            <a:r>
+              <a:rPr lang="en-US" dirty="0"/>
+              <a:t>Third level</a:t>
+            </a:r>
+          </a:p>
+          <a:p>
+            <a:pPr lvl="3"/>
+            <a:r>
+              <a:rPr lang="en-US" dirty="0"/>
+              <a:t>Fourth level</a:t>
+            </a:r>
+          </a:p>
+          <a:p>
+            <a:pPr lvl="4"/>
+            <a:r>
+              <a:rPr lang="en-US" dirty="0"/>
+              <a:t>Fifth level</a:t>
+            </a:r>
+          </a:p>
+        </p:txBody>
+      </p:sp>
+      <p:sp>
+        <p:nvSpPr>
+          <p:cNvPr id="7" name="Rectangle 6">
+            <a:extLst>
+              <a:ext uri="{FF2B5EF4-FFF2-40B4-BE49-F238E27FC236}">
+                <a16:creationId xmlns:a16="http://schemas.microsoft.com/office/drawing/2014/main" id="{06833DA2-9089-4E59-9B9D-7F3A29DCE61C}"/>
+              </a:ext>
+            </a:extLst>
+          </p:cNvPr>
+          <p:cNvSpPr/>
+          <p:nvPr userDrawn="1"/>
+        </p:nvSpPr>
+        <p:spPr bwMode="auto">
+          <a:xfrm>
+            <a:off x="33849" y="3653108"/>
+            <a:ext cx="9020275" cy="3129417"/>
+          </a:xfrm>
+          <a:prstGeom prst="rect">
+            <a:avLst/>
+          </a:prstGeom>
+          <a:solidFill>
+            <a:schemeClr val="accent1"/>
+          </a:solidFill>
+          <a:ln w="3175">
+            <a:noFill/>
+            <a:headEnd type="none" w="med" len="med"/>
+            <a:tailEnd type="none" w="med" len="med"/>
+          </a:ln>
+        </p:spPr>
+        <p:style>
+          <a:lnRef idx="2">
+            <a:schemeClr val="accent1">
+              <a:shade val="50000"/>
+            </a:schemeClr>
+          </a:lnRef>
+          <a:fillRef idx="1">
+            <a:schemeClr val="accent1"/>
+          </a:fillRef>
+          <a:effectRef idx="0">
+            <a:schemeClr val="accent1"/>
+          </a:effectRef>
+          <a:fontRef idx="minor">
+            <a:schemeClr val="lt1"/>
+          </a:fontRef>
+        </p:style>
+        <p:txBody>
+          <a:bodyPr vert="horz" wrap="square" lIns="0" tIns="34290" rIns="0" bIns="34290" numCol="1" rtlCol="0" anchor="ctr" anchorCtr="0" compatLnSpc="1">
+            <a:prstTxWarp prst="textNoShape">
+              <a:avLst/>
+            </a:prstTxWarp>
+          </a:bodyPr>
+          <a:lstStyle/>
+          <a:p>
+            <a:pPr algn="ctr" defTabSz="685577" fontAlgn="base">
+              <a:spcBef>
+                <a:spcPct val="0"/>
+              </a:spcBef>
+              <a:spcAft>
+                <a:spcPct val="0"/>
+              </a:spcAft>
+            </a:pPr>
+            <a:endParaRPr lang="en-US" sz="1471" dirty="0">
+              <a:gradFill>
+                <a:gsLst>
+                  <a:gs pos="0">
+                    <a:srgbClr val="FFFFFF"/>
+                  </a:gs>
+                  <a:gs pos="100000">
+                    <a:srgbClr val="FFFFFF"/>
+                  </a:gs>
+                </a:gsLst>
+                <a:lin ang="5400000" scaled="0"/>
+              </a:gradFill>
+            </a:endParaRPr>
+          </a:p>
+        </p:txBody>
+      </p:sp>
+      <p:sp>
+        <p:nvSpPr>
+          <p:cNvPr id="10" name="Content Placeholder 2">
+            <a:extLst>
+              <a:ext uri="{FF2B5EF4-FFF2-40B4-BE49-F238E27FC236}">
+                <a16:creationId xmlns:a16="http://schemas.microsoft.com/office/drawing/2014/main" id="{A7A07890-C86B-4334-9F28-D4C01C01B9F8}"/>
+              </a:ext>
+            </a:extLst>
+          </p:cNvPr>
+          <p:cNvSpPr>
+            <a:spLocks noGrp="1"/>
+          </p:cNvSpPr>
+          <p:nvPr>
+            <p:ph idx="10" hasCustomPrompt="1"/>
+          </p:nvPr>
+        </p:nvSpPr>
+        <p:spPr>
+          <a:xfrm>
+            <a:off x="151194" y="3795486"/>
+            <a:ext cx="8833654" cy="2910114"/>
+          </a:xfrm>
+          <a:solidFill>
+            <a:schemeClr val="bg1"/>
+          </a:solidFill>
+          <a:ln w="60325" cmpd="sng">
+            <a:solidFill>
+              <a:srgbClr val="0070C0"/>
+            </a:solidFill>
+          </a:ln>
+        </p:spPr>
+        <p:txBody>
+          <a:bodyPr>
+            <a:normAutofit/>
+          </a:bodyPr>
+          <a:lstStyle>
+            <a:lvl1pPr marL="0" indent="0" defTabSz="0">
+              <a:buFont typeface="Arial" panose="020B0604020202020204" pitchFamily="34" charset="0"/>
+              <a:buNone/>
+              <a:defRPr sz="1200">
+                <a:latin typeface="Courier New" panose="02070309020205020404" pitchFamily="49" charset="0"/>
+                <a:cs typeface="Courier New" panose="02070309020205020404" pitchFamily="49" charset="0"/>
+              </a:defRPr>
+            </a:lvl1pPr>
+            <a:lvl2pPr marL="342900" indent="0" defTabSz="0">
+              <a:buFont typeface="Arial" panose="020B0604020202020204" pitchFamily="34" charset="0"/>
+              <a:buNone/>
+              <a:defRPr sz="1200">
+                <a:latin typeface="Courier New" panose="02070309020205020404" pitchFamily="49" charset="0"/>
+                <a:cs typeface="Courier New" panose="02070309020205020404" pitchFamily="49" charset="0"/>
+              </a:defRPr>
+            </a:lvl2pPr>
+            <a:lvl3pPr marL="685800" indent="0" defTabSz="0">
+              <a:buFont typeface="Arial" panose="020B0604020202020204" pitchFamily="34" charset="0"/>
+              <a:buNone/>
+              <a:defRPr sz="1200">
+                <a:latin typeface="Courier New" panose="02070309020205020404" pitchFamily="49" charset="0"/>
+                <a:cs typeface="Courier New" panose="02070309020205020404" pitchFamily="49" charset="0"/>
+              </a:defRPr>
+            </a:lvl3pPr>
+            <a:lvl4pPr marL="1028700" indent="0" defTabSz="0">
+              <a:buFont typeface="Arial" panose="020B0604020202020204" pitchFamily="34" charset="0"/>
+              <a:buNone/>
+              <a:defRPr sz="1200">
+                <a:latin typeface="Courier New" panose="02070309020205020404" pitchFamily="49" charset="0"/>
+                <a:cs typeface="Courier New" panose="02070309020205020404" pitchFamily="49" charset="0"/>
+              </a:defRPr>
+            </a:lvl4pPr>
+            <a:lvl5pPr marL="1371600" indent="0" defTabSz="0">
+              <a:buFont typeface="Arial" panose="020B0604020202020204" pitchFamily="34" charset="0"/>
+              <a:buNone/>
+              <a:defRPr sz="1200">
+                <a:latin typeface="Courier New" panose="02070309020205020404" pitchFamily="49" charset="0"/>
+                <a:cs typeface="Courier New" panose="02070309020205020404" pitchFamily="49" charset="0"/>
+              </a:defRPr>
+            </a:lvl5pPr>
+          </a:lstStyle>
+          <a:p>
+            <a:pPr lvl="0"/>
+            <a:r>
+              <a:rPr lang="en-US" dirty="0"/>
+              <a:t>Click to Edit/Paste/Insert Code or Paste/Insert Screenshot</a:t>
+            </a:r>
+          </a:p>
+          <a:p>
+            <a:pPr lvl="1"/>
+            <a:r>
+              <a:rPr lang="en-US" dirty="0"/>
+              <a:t>	Second level</a:t>
+            </a:r>
+          </a:p>
+          <a:p>
+            <a:pPr lvl="2"/>
+            <a:r>
+              <a:rPr lang="en-US" dirty="0"/>
+              <a:t>Third level</a:t>
+            </a:r>
+          </a:p>
+          <a:p>
+            <a:pPr lvl="3"/>
+            <a:r>
+              <a:rPr lang="en-US" dirty="0"/>
+              <a:t>Fourth level</a:t>
+            </a:r>
+          </a:p>
+          <a:p>
+            <a:pPr lvl="4"/>
+            <a:r>
+              <a:rPr lang="en-US" dirty="0"/>
+              <a:t>Fifth level</a:t>
+            </a:r>
+          </a:p>
+        </p:txBody>
+      </p:sp>
+    </p:spTree>
+    <p:extLst>
+      <p:ext uri="{BB962C8B-B14F-4D97-AF65-F5344CB8AC3E}">
+        <p14:creationId xmlns:p14="http://schemas.microsoft.com/office/powerpoint/2010/main" val="1605699000"/>
+      </p:ext>
+    </p:extLst>
+  </p:cSld>
+  <p:clrMapOvr>
+    <a:masterClrMapping/>
+  </p:clrMapOvr>
+</p:sldLayout>
+</file>
+
+<file path=ppt/slideLayouts/slideLayout11.xml><?xml version="1.0" encoding="utf-8"?>
+<p:sldLayout xmlns:a="http://schemas.openxmlformats.org/drawingml/2006/main" xmlns:r="http://schemas.openxmlformats.org/officeDocument/2006/relationships" xmlns:p="http://schemas.openxmlformats.org/presentationml/2006/main" preserve="1" userDrawn="1">
   <p:cSld name="Custom Layout">
     <p:spTree>
       <p:nvGrpSpPr>
@@ -3402,8 +3737,8 @@
         </p:nvSpPr>
         <p:spPr>
           <a:xfrm>
-            <a:off x="93306" y="811763"/>
-            <a:ext cx="8929396" cy="5859625"/>
+            <a:off x="93306" y="1055077"/>
+            <a:ext cx="8929396" cy="5616311"/>
           </a:xfrm>
         </p:spPr>
         <p:txBody>
@@ -3490,7 +3825,7 @@
 </p:sldLayout>
 </file>
 
-<file path=ppt/slideLayouts/slideLayout11.xml><?xml version="1.0" encoding="utf-8"?>
+<file path=ppt/slideLayouts/slideLayout12.xml><?xml version="1.0" encoding="utf-8"?>
 <p:sldLayout xmlns:a="http://schemas.openxmlformats.org/drawingml/2006/main" xmlns:r="http://schemas.openxmlformats.org/officeDocument/2006/relationships" xmlns:p="http://schemas.openxmlformats.org/presentationml/2006/main" preserve="1" userDrawn="1">
   <p:cSld name="Black Notes slide Layout">
     <p:bg bwMode="black">
@@ -3819,7 +4154,7 @@
 </p:sldLayout>
 </file>
 
-<file path=ppt/slideLayouts/slideLayout12.xml><?xml version="1.0" encoding="utf-8"?>
+<file path=ppt/slideLayouts/slideLayout13.xml><?xml version="1.0" encoding="utf-8"?>
 <p:sldLayout xmlns:a="http://schemas.openxmlformats.org/drawingml/2006/main" xmlns:r="http://schemas.openxmlformats.org/officeDocument/2006/relationships" xmlns:p="http://schemas.openxmlformats.org/presentationml/2006/main" preserve="1" userDrawn="1">
   <p:cSld name="Steps">
     <p:spTree>
@@ -5268,7 +5603,7 @@
 </p:sldLayout>
 </file>
 
-<file path=ppt/slideLayouts/slideLayout13.xml><?xml version="1.0" encoding="utf-8"?>
+<file path=ppt/slideLayouts/slideLayout14.xml><?xml version="1.0" encoding="utf-8"?>
 <p:sldLayout xmlns:a="http://schemas.openxmlformats.org/drawingml/2006/main" xmlns:r="http://schemas.openxmlformats.org/officeDocument/2006/relationships" xmlns:p="http://schemas.openxmlformats.org/presentationml/2006/main" preserve="1" userDrawn="1">
   <p:cSld name="Section Header">
     <p:spTree>
@@ -5454,7 +5789,7 @@
 </p:sldLayout>
 </file>
 
-<file path=ppt/slideLayouts/slideLayout14.xml><?xml version="1.0" encoding="utf-8"?>
+<file path=ppt/slideLayouts/slideLayout15.xml><?xml version="1.0" encoding="utf-8"?>
 <p:sldLayout xmlns:a="http://schemas.openxmlformats.org/drawingml/2006/main" xmlns:r="http://schemas.openxmlformats.org/officeDocument/2006/relationships" xmlns:p="http://schemas.openxmlformats.org/presentationml/2006/main" preserve="1" userDrawn="1">
   <p:cSld name="Two Content">
     <p:spTree>
@@ -5506,7 +5841,7 @@
         </p:nvSpPr>
         <p:spPr>
           <a:xfrm>
-            <a:off x="458788" y="992188"/>
+            <a:off x="458788" y="1018564"/>
             <a:ext cx="3798887" cy="4386262"/>
           </a:xfrm>
         </p:spPr>
@@ -5591,7 +5926,7 @@
         </p:nvSpPr>
         <p:spPr>
           <a:xfrm>
-            <a:off x="4410075" y="992188"/>
+            <a:off x="4410075" y="1018564"/>
             <a:ext cx="3800475" cy="4386262"/>
           </a:xfrm>
         </p:spPr>
@@ -5737,7 +6072,7 @@
 </p:sldLayout>
 </file>
 
-<file path=ppt/slideLayouts/slideLayout15.xml><?xml version="1.0" encoding="utf-8"?>
+<file path=ppt/slideLayouts/slideLayout16.xml><?xml version="1.0" encoding="utf-8"?>
 <p:sldLayout xmlns:a="http://schemas.openxmlformats.org/drawingml/2006/main" xmlns:r="http://schemas.openxmlformats.org/officeDocument/2006/relationships" xmlns:p="http://schemas.openxmlformats.org/presentationml/2006/main" preserve="1" userDrawn="1">
   <p:cSld name="Comparison">
     <p:spTree>
@@ -5766,8 +6101,8 @@
         </p:nvSpPr>
         <p:spPr>
           <a:xfrm>
-            <a:off x="457200" y="0"/>
-            <a:ext cx="8229600" cy="807720"/>
+            <a:off x="123092" y="0"/>
+            <a:ext cx="8563708" cy="807720"/>
           </a:xfrm>
         </p:spPr>
         <p:txBody>
@@ -5797,7 +6132,7 @@
         </p:nvSpPr>
         <p:spPr>
           <a:xfrm>
-            <a:off x="457200" y="1535113"/>
+            <a:off x="457200" y="1086704"/>
             <a:ext cx="4040188" cy="639762"/>
           </a:xfrm>
         </p:spPr>
@@ -5866,8 +6201,8 @@
         </p:nvSpPr>
         <p:spPr>
           <a:xfrm>
-            <a:off x="457200" y="2174875"/>
-            <a:ext cx="4040188" cy="3951288"/>
+            <a:off x="457200" y="1726466"/>
+            <a:ext cx="4040188" cy="4392980"/>
           </a:xfrm>
         </p:spPr>
         <p:txBody>
@@ -5951,7 +6286,7 @@
         </p:nvSpPr>
         <p:spPr>
           <a:xfrm>
-            <a:off x="4645025" y="1535113"/>
+            <a:off x="4645025" y="1086704"/>
             <a:ext cx="4041775" cy="639762"/>
           </a:xfrm>
         </p:spPr>
@@ -6020,8 +6355,8 @@
         </p:nvSpPr>
         <p:spPr>
           <a:xfrm>
-            <a:off x="4645025" y="2174875"/>
-            <a:ext cx="4041775" cy="3951288"/>
+            <a:off x="4645025" y="1726466"/>
+            <a:ext cx="4041775" cy="4392980"/>
           </a:xfrm>
         </p:spPr>
         <p:txBody>
@@ -6166,7 +6501,7 @@
 </p:sldLayout>
 </file>
 
-<file path=ppt/slideLayouts/slideLayout16.xml><?xml version="1.0" encoding="utf-8"?>
+<file path=ppt/slideLayouts/slideLayout17.xml><?xml version="1.0" encoding="utf-8"?>
 <p:sldLayout xmlns:a="http://schemas.openxmlformats.org/drawingml/2006/main" xmlns:r="http://schemas.openxmlformats.org/officeDocument/2006/relationships" xmlns:p="http://schemas.openxmlformats.org/presentationml/2006/main" preserve="1" userDrawn="1">
   <p:cSld name="Blank">
     <p:spTree>
@@ -6256,7 +6591,7 @@
 </p:sldLayout>
 </file>
 
-<file path=ppt/slideLayouts/slideLayout17.xml><?xml version="1.0" encoding="utf-8"?>
+<file path=ppt/slideLayouts/slideLayout18.xml><?xml version="1.0" encoding="utf-8"?>
 <p:sldLayout xmlns:a="http://schemas.openxmlformats.org/drawingml/2006/main" xmlns:r="http://schemas.openxmlformats.org/officeDocument/2006/relationships" xmlns:p="http://schemas.openxmlformats.org/presentationml/2006/main" preserve="1" userDrawn="1">
   <p:cSld name="Content with Caption">
     <p:spTree>
@@ -6275,6 +6610,148 @@
       </p:grpSpPr>
       <p:sp>
         <p:nvSpPr>
+          <p:cNvPr id="7" name="Rectangle 6">
+            <a:extLst>
+              <a:ext uri="{FF2B5EF4-FFF2-40B4-BE49-F238E27FC236}">
+                <a16:creationId xmlns:a16="http://schemas.microsoft.com/office/drawing/2014/main" id="{6AF9706F-69F9-4C5B-878A-257B9A487E19}"/>
+              </a:ext>
+            </a:extLst>
+          </p:cNvPr>
+          <p:cNvSpPr/>
+          <p:nvPr userDrawn="1"/>
+        </p:nvSpPr>
+        <p:spPr bwMode="auto">
+          <a:xfrm>
+            <a:off x="3546230" y="0"/>
+            <a:ext cx="5597769" cy="1424354"/>
+          </a:xfrm>
+          <a:prstGeom prst="rect">
+            <a:avLst/>
+          </a:prstGeom>
+          <a:solidFill>
+            <a:schemeClr val="bg1"/>
+          </a:solidFill>
+          <a:ln w="9525" cap="flat" cmpd="sng" algn="ctr">
+            <a:noFill/>
+            <a:prstDash val="solid"/>
+            <a:round/>
+            <a:headEnd type="none" w="med" len="med"/>
+            <a:tailEnd type="none" w="med" len="med"/>
+          </a:ln>
+          <a:effectLst/>
+        </p:spPr>
+        <p:txBody>
+          <a:bodyPr vert="horz" wrap="square" lIns="182880" tIns="45720" rIns="182880" bIns="45720" numCol="1" rtlCol="0" anchor="ctr" anchorCtr="0" compatLnSpc="1">
+            <a:prstTxWarp prst="textNoShape">
+              <a:avLst/>
+            </a:prstTxWarp>
+          </a:bodyPr>
+          <a:lstStyle/>
+          <a:p>
+            <a:pPr marL="0" marR="0" indent="0" algn="ctr" defTabSz="914400" rtl="0" eaLnBrk="0" fontAlgn="base" latinLnBrk="0" hangingPunct="0">
+              <a:lnSpc>
+                <a:spcPct val="100000"/>
+              </a:lnSpc>
+              <a:spcBef>
+                <a:spcPct val="0"/>
+              </a:spcBef>
+              <a:spcAft>
+                <a:spcPct val="0"/>
+              </a:spcAft>
+              <a:buClrTx/>
+              <a:buSzTx/>
+              <a:buFontTx/>
+              <a:buNone/>
+              <a:tabLst/>
+            </a:pPr>
+            <a:endParaRPr kumimoji="0" lang="en-US" sz="1800" b="1" i="0" u="none" strike="noStrike" cap="none" normalizeH="0" baseline="0">
+              <a:ln>
+                <a:noFill/>
+              </a:ln>
+              <a:solidFill>
+                <a:schemeClr val="tx1"/>
+              </a:solidFill>
+              <a:effectLst/>
+              <a:latin typeface="Verdana" pitchFamily="34" charset="0"/>
+            </a:endParaRPr>
+          </a:p>
+        </p:txBody>
+      </p:sp>
+      <p:sp>
+        <p:nvSpPr>
+          <p:cNvPr id="6" name="Rectangle 5">
+            <a:extLst>
+              <a:ext uri="{FF2B5EF4-FFF2-40B4-BE49-F238E27FC236}">
+                <a16:creationId xmlns:a16="http://schemas.microsoft.com/office/drawing/2014/main" id="{D4E7A39D-4325-4D40-AA41-B4787F9B32F3}"/>
+              </a:ext>
+            </a:extLst>
+          </p:cNvPr>
+          <p:cNvSpPr/>
+          <p:nvPr userDrawn="1"/>
+        </p:nvSpPr>
+        <p:spPr bwMode="auto">
+          <a:xfrm>
+            <a:off x="0" y="0"/>
+            <a:ext cx="3534508" cy="1424354"/>
+          </a:xfrm>
+          <a:prstGeom prst="rect">
+            <a:avLst/>
+          </a:prstGeom>
+          <a:solidFill>
+            <a:srgbClr val="0070C0"/>
+          </a:solidFill>
+          <a:ln w="9525" cap="flat" cmpd="sng" algn="ctr">
+            <a:noFill/>
+            <a:prstDash val="solid"/>
+            <a:round/>
+            <a:headEnd type="none" w="med" len="med"/>
+            <a:tailEnd type="none" w="med" len="med"/>
+          </a:ln>
+          <a:effectLst>
+            <a:outerShdw dist="35921" dir="2700000" algn="ctr" rotWithShape="0">
+              <a:srgbClr val="AFAFAF"/>
+            </a:outerShdw>
+          </a:effectLst>
+        </p:spPr>
+        <p:txBody>
+          <a:bodyPr vert="horz" wrap="square" lIns="182880" tIns="45720" rIns="182880" bIns="45720" numCol="1" rtlCol="0" anchor="ctr" anchorCtr="0" compatLnSpc="1">
+            <a:prstTxWarp prst="textNoShape">
+              <a:avLst/>
+            </a:prstTxWarp>
+          </a:bodyPr>
+          <a:lstStyle/>
+          <a:p>
+            <a:pPr marL="0" marR="0" indent="0" algn="ctr" defTabSz="914400" rtl="0" eaLnBrk="0" fontAlgn="base" latinLnBrk="0" hangingPunct="0">
+              <a:lnSpc>
+                <a:spcPct val="100000"/>
+              </a:lnSpc>
+              <a:spcBef>
+                <a:spcPct val="0"/>
+              </a:spcBef>
+              <a:spcAft>
+                <a:spcPct val="0"/>
+              </a:spcAft>
+              <a:buClrTx/>
+              <a:buSzTx/>
+              <a:buFontTx/>
+              <a:buNone/>
+              <a:tabLst/>
+            </a:pPr>
+            <a:endParaRPr kumimoji="0" lang="en-US" sz="1800" b="1" i="0" u="none" strike="noStrike" cap="none" normalizeH="0" baseline="0">
+              <a:ln>
+                <a:noFill/>
+              </a:ln>
+              <a:solidFill>
+                <a:schemeClr val="tx1"/>
+              </a:solidFill>
+              <a:effectLst/>
+              <a:latin typeface="Verdana" pitchFamily="34" charset="0"/>
+            </a:endParaRPr>
+          </a:p>
+        </p:txBody>
+      </p:sp>
+      <p:sp>
+        <p:nvSpPr>
           <p:cNvPr id="2" name="Title 1"/>
           <p:cNvSpPr>
             <a:spLocks noGrp="1"/>
@@ -6285,8 +6762,8 @@
         </p:nvSpPr>
         <p:spPr>
           <a:xfrm>
-            <a:off x="457200" y="273050"/>
-            <a:ext cx="3008313" cy="1162050"/>
+            <a:off x="246186" y="273050"/>
+            <a:ext cx="3219328" cy="1162050"/>
           </a:xfrm>
         </p:spPr>
         <p:txBody>
@@ -6298,10 +6775,9 @@
           </a:lstStyle>
           <a:p>
             <a:r>
-              <a:rPr lang="en-US"/>
+              <a:rPr lang="en-US" dirty="0"/>
               <a:t>Click to edit Master title style</a:t>
             </a:r>
-            <a:endParaRPr lang="en-US" dirty="0"/>
           </a:p>
         </p:txBody>
       </p:sp>
@@ -6327,7 +6803,7 @@
             <a:lvl1pPr>
               <a:defRPr sz="3200">
                 <a:solidFill>
-                  <a:schemeClr val="bg1"/>
+                  <a:schemeClr val="tx1"/>
                 </a:solidFill>
               </a:defRPr>
             </a:lvl1pPr>
@@ -6359,38 +6835,37 @@
           <a:p>
             <a:pPr lvl="0"/>
             <a:r>
-              <a:rPr lang="en-US"/>
+              <a:rPr lang="en-US" dirty="0"/>
               <a:t>Edit Master text styles</a:t>
             </a:r>
           </a:p>
           <a:p>
             <a:pPr lvl="1"/>
             <a:r>
-              <a:rPr lang="en-US"/>
+              <a:rPr lang="en-US" dirty="0"/>
               <a:t>Second level</a:t>
             </a:r>
           </a:p>
           <a:p>
             <a:pPr lvl="2"/>
             <a:r>
-              <a:rPr lang="en-US"/>
+              <a:rPr lang="en-US" dirty="0"/>
               <a:t>Third level</a:t>
             </a:r>
           </a:p>
           <a:p>
             <a:pPr lvl="3"/>
             <a:r>
-              <a:rPr lang="en-US"/>
+              <a:rPr lang="en-US" dirty="0"/>
               <a:t>Fourth level</a:t>
             </a:r>
           </a:p>
           <a:p>
             <a:pPr lvl="4"/>
             <a:r>
-              <a:rPr lang="en-US"/>
+              <a:rPr lang="en-US" dirty="0"/>
               <a:t>Fifth level</a:t>
             </a:r>
-            <a:endParaRPr lang="en-US" dirty="0"/>
           </a:p>
         </p:txBody>
       </p:sp>
@@ -6406,8 +6881,8 @@
         </p:nvSpPr>
         <p:spPr>
           <a:xfrm>
-            <a:off x="457200" y="1435100"/>
-            <a:ext cx="3008313" cy="4691063"/>
+            <a:off x="263770" y="1435100"/>
+            <a:ext cx="3201744" cy="4691063"/>
           </a:xfrm>
         </p:spPr>
         <p:txBody>
@@ -6453,7 +6928,7 @@
           <a:p>
             <a:pPr lvl="0"/>
             <a:r>
-              <a:rPr lang="en-US"/>
+              <a:rPr lang="en-US" dirty="0"/>
               <a:t>Edit Master text styles</a:t>
             </a:r>
           </a:p>
@@ -6532,7 +7007,7 @@
 </p:sldLayout>
 </file>
 
-<file path=ppt/slideLayouts/slideLayout18.xml><?xml version="1.0" encoding="utf-8"?>
+<file path=ppt/slideLayouts/slideLayout19.xml><?xml version="1.0" encoding="utf-8"?>
 <p:sldLayout xmlns:a="http://schemas.openxmlformats.org/drawingml/2006/main" xmlns:r="http://schemas.openxmlformats.org/officeDocument/2006/relationships" xmlns:p="http://schemas.openxmlformats.org/presentationml/2006/main" preserve="1" userDrawn="1">
   <p:cSld name="Picture with Caption">
     <p:spTree>
@@ -6592,8 +7067,8 @@
         </p:nvSpPr>
         <p:spPr>
           <a:xfrm>
-            <a:off x="1792288" y="612775"/>
-            <a:ext cx="5486400" cy="4114800"/>
+            <a:off x="1792288" y="1116623"/>
+            <a:ext cx="5486400" cy="3610952"/>
           </a:xfrm>
         </p:spPr>
         <p:txBody>
@@ -6783,110 +7258,6 @@
 </p:sldLayout>
 </file>
 
-<file path=ppt/slideLayouts/slideLayout19.xml><?xml version="1.0" encoding="utf-8"?>
-<p:sldLayout xmlns:a="http://schemas.openxmlformats.org/drawingml/2006/main" xmlns:r="http://schemas.openxmlformats.org/officeDocument/2006/relationships" xmlns:p="http://schemas.openxmlformats.org/presentationml/2006/main" type="vertTx" preserve="1">
-  <p:cSld name="Title and Vertical Text">
-    <p:spTree>
-      <p:nvGrpSpPr>
-        <p:cNvPr id="1" name=""/>
-        <p:cNvGrpSpPr/>
-        <p:nvPr/>
-      </p:nvGrpSpPr>
-      <p:grpSpPr>
-        <a:xfrm>
-          <a:off x="0" y="0"/>
-          <a:ext cx="0" cy="0"/>
-          <a:chOff x="0" y="0"/>
-          <a:chExt cx="0" cy="0"/>
-        </a:xfrm>
-      </p:grpSpPr>
-      <p:sp>
-        <p:nvSpPr>
-          <p:cNvPr id="2" name="Title 1"/>
-          <p:cNvSpPr>
-            <a:spLocks noGrp="1"/>
-          </p:cNvSpPr>
-          <p:nvPr>
-            <p:ph type="title"/>
-          </p:nvPr>
-        </p:nvSpPr>
-        <p:spPr/>
-        <p:txBody>
-          <a:bodyPr/>
-          <a:lstStyle/>
-          <a:p>
-            <a:r>
-              <a:rPr lang="en-US"/>
-              <a:t>Click to edit Master title style</a:t>
-            </a:r>
-          </a:p>
-        </p:txBody>
-      </p:sp>
-      <p:sp>
-        <p:nvSpPr>
-          <p:cNvPr id="3" name="Vertical Text Placeholder 2"/>
-          <p:cNvSpPr>
-            <a:spLocks noGrp="1"/>
-          </p:cNvSpPr>
-          <p:nvPr>
-            <p:ph type="body" orient="vert" idx="1"/>
-          </p:nvPr>
-        </p:nvSpPr>
-        <p:spPr/>
-        <p:txBody>
-          <a:bodyPr vert="eaVert"/>
-          <a:lstStyle/>
-          <a:p>
-            <a:pPr lvl="0"/>
-            <a:r>
-              <a:rPr lang="en-US"/>
-              <a:t>Edit Master text styles</a:t>
-            </a:r>
-          </a:p>
-          <a:p>
-            <a:pPr lvl="1"/>
-            <a:r>
-              <a:rPr lang="en-US"/>
-              <a:t>Second level</a:t>
-            </a:r>
-          </a:p>
-          <a:p>
-            <a:pPr lvl="2"/>
-            <a:r>
-              <a:rPr lang="en-US"/>
-              <a:t>Third level</a:t>
-            </a:r>
-          </a:p>
-          <a:p>
-            <a:pPr lvl="3"/>
-            <a:r>
-              <a:rPr lang="en-US"/>
-              <a:t>Fourth level</a:t>
-            </a:r>
-          </a:p>
-          <a:p>
-            <a:pPr lvl="4"/>
-            <a:r>
-              <a:rPr lang="en-US"/>
-              <a:t>Fifth level</a:t>
-            </a:r>
-            <a:endParaRPr lang="en-US" dirty="0"/>
-          </a:p>
-        </p:txBody>
-      </p:sp>
-    </p:spTree>
-    <p:extLst>
-      <p:ext uri="{BB962C8B-B14F-4D97-AF65-F5344CB8AC3E}">
-        <p14:creationId xmlns:p14="http://schemas.microsoft.com/office/powerpoint/2010/main" val="571518607"/>
-      </p:ext>
-    </p:extLst>
-  </p:cSld>
-  <p:clrMapOvr>
-    <a:masterClrMapping/>
-  </p:clrMapOvr>
-</p:sldLayout>
-</file>
-
 <file path=ppt/slideLayouts/slideLayout2.xml><?xml version="1.0" encoding="utf-8"?>
 <p:sldLayout xmlns:a="http://schemas.openxmlformats.org/drawingml/2006/main" xmlns:r="http://schemas.openxmlformats.org/officeDocument/2006/relationships" xmlns:p="http://schemas.openxmlformats.org/presentationml/2006/main" preserve="1" userDrawn="1">
   <p:cSld name="Title and Text">
@@ -7051,6 +7422,110 @@
 </file>
 
 <file path=ppt/slideLayouts/slideLayout20.xml><?xml version="1.0" encoding="utf-8"?>
+<p:sldLayout xmlns:a="http://schemas.openxmlformats.org/drawingml/2006/main" xmlns:r="http://schemas.openxmlformats.org/officeDocument/2006/relationships" xmlns:p="http://schemas.openxmlformats.org/presentationml/2006/main" type="vertTx" preserve="1">
+  <p:cSld name="Title and Vertical Text">
+    <p:spTree>
+      <p:nvGrpSpPr>
+        <p:cNvPr id="1" name=""/>
+        <p:cNvGrpSpPr/>
+        <p:nvPr/>
+      </p:nvGrpSpPr>
+      <p:grpSpPr>
+        <a:xfrm>
+          <a:off x="0" y="0"/>
+          <a:ext cx="0" cy="0"/>
+          <a:chOff x="0" y="0"/>
+          <a:chExt cx="0" cy="0"/>
+        </a:xfrm>
+      </p:grpSpPr>
+      <p:sp>
+        <p:nvSpPr>
+          <p:cNvPr id="2" name="Title 1"/>
+          <p:cNvSpPr>
+            <a:spLocks noGrp="1"/>
+          </p:cNvSpPr>
+          <p:nvPr>
+            <p:ph type="title"/>
+          </p:nvPr>
+        </p:nvSpPr>
+        <p:spPr/>
+        <p:txBody>
+          <a:bodyPr/>
+          <a:lstStyle/>
+          <a:p>
+            <a:r>
+              <a:rPr lang="en-US"/>
+              <a:t>Click to edit Master title style</a:t>
+            </a:r>
+          </a:p>
+        </p:txBody>
+      </p:sp>
+      <p:sp>
+        <p:nvSpPr>
+          <p:cNvPr id="3" name="Vertical Text Placeholder 2"/>
+          <p:cNvSpPr>
+            <a:spLocks noGrp="1"/>
+          </p:cNvSpPr>
+          <p:nvPr>
+            <p:ph type="body" orient="vert" idx="1"/>
+          </p:nvPr>
+        </p:nvSpPr>
+        <p:spPr/>
+        <p:txBody>
+          <a:bodyPr vert="eaVert"/>
+          <a:lstStyle/>
+          <a:p>
+            <a:pPr lvl="0"/>
+            <a:r>
+              <a:rPr lang="en-US"/>
+              <a:t>Edit Master text styles</a:t>
+            </a:r>
+          </a:p>
+          <a:p>
+            <a:pPr lvl="1"/>
+            <a:r>
+              <a:rPr lang="en-US"/>
+              <a:t>Second level</a:t>
+            </a:r>
+          </a:p>
+          <a:p>
+            <a:pPr lvl="2"/>
+            <a:r>
+              <a:rPr lang="en-US"/>
+              <a:t>Third level</a:t>
+            </a:r>
+          </a:p>
+          <a:p>
+            <a:pPr lvl="3"/>
+            <a:r>
+              <a:rPr lang="en-US"/>
+              <a:t>Fourth level</a:t>
+            </a:r>
+          </a:p>
+          <a:p>
+            <a:pPr lvl="4"/>
+            <a:r>
+              <a:rPr lang="en-US"/>
+              <a:t>Fifth level</a:t>
+            </a:r>
+            <a:endParaRPr lang="en-US" dirty="0"/>
+          </a:p>
+        </p:txBody>
+      </p:sp>
+    </p:spTree>
+    <p:extLst>
+      <p:ext uri="{BB962C8B-B14F-4D97-AF65-F5344CB8AC3E}">
+        <p14:creationId xmlns:p14="http://schemas.microsoft.com/office/powerpoint/2010/main" val="571518607"/>
+      </p:ext>
+    </p:extLst>
+  </p:cSld>
+  <p:clrMapOvr>
+    <a:masterClrMapping/>
+  </p:clrMapOvr>
+</p:sldLayout>
+</file>
+
+<file path=ppt/slideLayouts/slideLayout21.xml><?xml version="1.0" encoding="utf-8"?>
 <p:sldLayout xmlns:a="http://schemas.openxmlformats.org/drawingml/2006/main" xmlns:r="http://schemas.openxmlformats.org/officeDocument/2006/relationships" xmlns:p="http://schemas.openxmlformats.org/presentationml/2006/main" type="vertTitleAndTx" preserve="1">
   <p:cSld name="Vertical Title and Text">
     <p:spTree>
@@ -7079,19 +7554,26 @@
         </p:nvSpPr>
         <p:spPr>
           <a:xfrm>
-            <a:off x="6291263" y="0"/>
+            <a:off x="6291263" y="1002321"/>
             <a:ext cx="1943100" cy="5378450"/>
           </a:xfrm>
         </p:spPr>
         <p:txBody>
           <a:bodyPr vert="eaVert"/>
-          <a:lstStyle/>
-          <a:p>
-            <a:r>
-              <a:rPr lang="en-US"/>
+          <a:lstStyle>
+            <a:lvl1pPr>
+              <a:defRPr>
+                <a:solidFill>
+                  <a:schemeClr val="tx1"/>
+                </a:solidFill>
+              </a:defRPr>
+            </a:lvl1pPr>
+          </a:lstStyle>
+          <a:p>
+            <a:r>
+              <a:rPr lang="en-US" dirty="0"/>
               <a:t>Click to edit Master title style</a:t>
             </a:r>
-            <a:endParaRPr lang="en-US" dirty="0"/>
           </a:p>
         </p:txBody>
       </p:sp>
@@ -7107,7 +7589,7 @@
         </p:nvSpPr>
         <p:spPr>
           <a:xfrm>
-            <a:off x="458788" y="0"/>
+            <a:off x="458788" y="1002321"/>
             <a:ext cx="5680075" cy="5378450"/>
           </a:xfrm>
         </p:spPr>
@@ -7165,9 +7647,9 @@
 </p:sldLayout>
 </file>
 
-<file path=ppt/slideLayouts/slideLayout21.xml><?xml version="1.0" encoding="utf-8"?>
+<file path=ppt/slideLayouts/slideLayout22.xml><?xml version="1.0" encoding="utf-8"?>
 <p:sldLayout xmlns:a="http://schemas.openxmlformats.org/drawingml/2006/main" xmlns:r="http://schemas.openxmlformats.org/officeDocument/2006/relationships" xmlns:p="http://schemas.openxmlformats.org/presentationml/2006/main" userDrawn="1">
-  <p:cSld name="32pt Slide Title ">
+  <p:cSld name="28pt Slide Title ">
     <p:spTree>
       <p:nvGrpSpPr>
         <p:cNvPr id="1" name=""/>
@@ -7321,8 +7803,8 @@
         </p:nvSpPr>
         <p:spPr>
           <a:xfrm>
-            <a:off x="457200" y="6324600"/>
-            <a:ext cx="2895600" cy="365125"/>
+            <a:off x="457199" y="6324600"/>
+            <a:ext cx="8212015" cy="365125"/>
           </a:xfrm>
           <a:prstGeom prst="rect">
             <a:avLst/>
@@ -8177,7 +8659,7 @@
         <p:spPr>
           <a:xfrm>
             <a:off x="0" y="0"/>
-            <a:ext cx="9144000" cy="1371600"/>
+            <a:ext cx="9144000" cy="1586204"/>
           </a:xfrm>
           <a:prstGeom prst="rect">
             <a:avLst/>
@@ -8226,8 +8708,8 @@
         </p:nvSpPr>
         <p:spPr>
           <a:xfrm>
-            <a:off x="460375" y="-3"/>
-            <a:ext cx="7773988" cy="1296957"/>
+            <a:off x="93306" y="-3"/>
+            <a:ext cx="8836089" cy="1511562"/>
           </a:xfrm>
         </p:spPr>
         <p:txBody>
@@ -8252,13 +8734,13 @@
             <a:spLocks noGrp="1"/>
           </p:cNvSpPr>
           <p:nvPr>
-            <p:ph idx="1"/>
+            <p:ph idx="1" hasCustomPrompt="1"/>
           </p:nvPr>
         </p:nvSpPr>
         <p:spPr>
           <a:xfrm>
-            <a:off x="261187" y="1482871"/>
-            <a:ext cx="8574837" cy="4712995"/>
+            <a:off x="261187" y="1698171"/>
+            <a:ext cx="8574837" cy="4497695"/>
           </a:xfrm>
         </p:spPr>
         <p:txBody>
@@ -8274,7 +8756,7 @@
             <a:pPr lvl="0"/>
             <a:r>
               <a:rPr lang="en-US" dirty="0"/>
-              <a:t>Edit Master text styles</a:t>
+              <a:t>Edit Question</a:t>
             </a:r>
           </a:p>
           <a:p>
@@ -8412,7 +8894,7 @@
         <p:spPr>
           <a:xfrm>
             <a:off x="0" y="0"/>
-            <a:ext cx="9144000" cy="1371600"/>
+            <a:ext cx="9144000" cy="1591408"/>
           </a:xfrm>
           <a:prstGeom prst="rect">
             <a:avLst/>
@@ -8461,8 +8943,8 @@
         </p:nvSpPr>
         <p:spPr>
           <a:xfrm>
-            <a:off x="460375" y="-3"/>
-            <a:ext cx="7773988" cy="1296957"/>
+            <a:off x="167054" y="-3"/>
+            <a:ext cx="8862646" cy="1485903"/>
           </a:xfrm>
         </p:spPr>
         <p:txBody>
@@ -8475,7 +8957,7 @@
           <a:p>
             <a:r>
               <a:rPr lang="en-US" dirty="0"/>
-              <a:t>Answer…</a:t>
+              <a:t>Answer Repeat Question Here…</a:t>
             </a:r>
           </a:p>
         </p:txBody>
@@ -8487,13 +8969,13 @@
             <a:spLocks noGrp="1"/>
           </p:cNvSpPr>
           <p:nvPr>
-            <p:ph idx="1"/>
+            <p:ph idx="1" hasCustomPrompt="1"/>
           </p:nvPr>
         </p:nvSpPr>
         <p:spPr>
           <a:xfrm>
-            <a:off x="261187" y="1482871"/>
-            <a:ext cx="8574837" cy="4712995"/>
+            <a:off x="261187" y="1661746"/>
+            <a:ext cx="8574837" cy="4534120"/>
           </a:xfrm>
         </p:spPr>
         <p:txBody>
@@ -8509,7 +8991,7 @@
             <a:pPr lvl="0"/>
             <a:r>
               <a:rPr lang="en-US" dirty="0"/>
-              <a:t>Edit Master text styles</a:t>
+              <a:t>Paste Answers from Question Slide</a:t>
             </a:r>
           </a:p>
           <a:p>
@@ -8616,6 +9098,349 @@
 </file>
 
 <file path=ppt/slideLayouts/slideLayout8.xml><?xml version="1.0" encoding="utf-8"?>
+<p:sldLayout xmlns:a="http://schemas.openxmlformats.org/drawingml/2006/main" xmlns:r="http://schemas.openxmlformats.org/officeDocument/2006/relationships" xmlns:p="http://schemas.openxmlformats.org/presentationml/2006/main" showMasterSp="0" preserve="1" userDrawn="1">
+  <p:cSld name="Demo">
+    <p:bg>
+      <p:bgPr>
+        <a:solidFill>
+          <a:srgbClr val="7030A0"/>
+        </a:solidFill>
+        <a:effectLst/>
+      </p:bgPr>
+    </p:bg>
+    <p:spTree>
+      <p:nvGrpSpPr>
+        <p:cNvPr id="1" name=""/>
+        <p:cNvGrpSpPr/>
+        <p:nvPr/>
+      </p:nvGrpSpPr>
+      <p:grpSpPr>
+        <a:xfrm>
+          <a:off x="0" y="0"/>
+          <a:ext cx="0" cy="0"/>
+          <a:chOff x="0" y="0"/>
+          <a:chExt cx="0" cy="0"/>
+        </a:xfrm>
+      </p:grpSpPr>
+      <p:sp>
+        <p:nvSpPr>
+          <p:cNvPr id="726019" name="Rectangle 3"/>
+          <p:cNvSpPr>
+            <a:spLocks noGrp="1" noChangeArrowheads="1"/>
+          </p:cNvSpPr>
+          <p:nvPr>
+            <p:ph type="ctrTitle" sz="quarter" hasCustomPrompt="1"/>
+          </p:nvPr>
+        </p:nvSpPr>
+        <p:spPr>
+          <a:xfrm>
+            <a:off x="307911" y="770219"/>
+            <a:ext cx="8379200" cy="1011928"/>
+          </a:xfrm>
+          <a:solidFill>
+            <a:srgbClr val="7030A0"/>
+          </a:solidFill>
+          <a:ln algn="ctr"/>
+        </p:spPr>
+        <p:txBody>
+          <a:bodyPr wrap="square" tIns="0" rIns="0" bIns="0" anchor="t" anchorCtr="0">
+            <a:noAutofit/>
+          </a:bodyPr>
+          <a:lstStyle>
+            <a:lvl1pPr algn="l">
+              <a:spcBef>
+                <a:spcPct val="60000"/>
+              </a:spcBef>
+              <a:buClr>
+                <a:schemeClr val="hlink"/>
+              </a:buClr>
+              <a:buSzPct val="90000"/>
+              <a:buFontTx/>
+              <a:buNone/>
+              <a:defRPr sz="3800" baseline="0">
+                <a:solidFill>
+                  <a:schemeClr val="bg1"/>
+                </a:solidFill>
+                <a:latin typeface="Segoe UI" pitchFamily="34" charset="0"/>
+                <a:ea typeface="Segoe UI" pitchFamily="34" charset="0"/>
+                <a:cs typeface="Segoe UI" pitchFamily="34" charset="0"/>
+              </a:defRPr>
+            </a:lvl1pPr>
+          </a:lstStyle>
+          <a:p>
+            <a:r>
+              <a:rPr lang="en-US" dirty="0"/>
+              <a:t>Demo Title</a:t>
+            </a:r>
+          </a:p>
+        </p:txBody>
+      </p:sp>
+      <p:sp>
+        <p:nvSpPr>
+          <p:cNvPr id="726020" name="Rectangle 4"/>
+          <p:cNvSpPr>
+            <a:spLocks noGrp="1" noChangeArrowheads="1"/>
+          </p:cNvSpPr>
+          <p:nvPr>
+            <p:ph type="subTitle" sz="quarter" idx="1" hasCustomPrompt="1"/>
+          </p:nvPr>
+        </p:nvSpPr>
+        <p:spPr>
+          <a:xfrm>
+            <a:off x="3685592" y="2110581"/>
+            <a:ext cx="5290768" cy="3722293"/>
+          </a:xfrm>
+          <a:solidFill>
+            <a:srgbClr val="7030A0"/>
+          </a:solidFill>
+        </p:spPr>
+        <p:txBody>
+          <a:bodyPr lIns="91440" tIns="45720" rIns="91440" bIns="45720"/>
+          <a:lstStyle>
+            <a:lvl1pPr marL="285750" indent="-285750" algn="l">
+              <a:lnSpc>
+                <a:spcPct val="95000"/>
+              </a:lnSpc>
+              <a:spcBef>
+                <a:spcPct val="60000"/>
+              </a:spcBef>
+              <a:buClr>
+                <a:schemeClr val="bg1"/>
+              </a:buClr>
+              <a:buFont typeface="Wingdings" panose="05000000000000000000" pitchFamily="2" charset="2"/>
+              <a:buChar char="Ø"/>
+              <a:defRPr sz="1800">
+                <a:solidFill>
+                  <a:schemeClr val="tx1"/>
+                </a:solidFill>
+                <a:latin typeface="Segoe UI" pitchFamily="34" charset="0"/>
+                <a:ea typeface="Segoe UI" pitchFamily="34" charset="0"/>
+                <a:cs typeface="Segoe UI" pitchFamily="34" charset="0"/>
+              </a:defRPr>
+            </a:lvl1pPr>
+            <a:lvl2pPr marL="288925" indent="0">
+              <a:buNone/>
+              <a:defRPr/>
+            </a:lvl2pPr>
+          </a:lstStyle>
+          <a:p>
+            <a:r>
+              <a:rPr lang="en-US" dirty="0"/>
+              <a:t>Enter Description(s)</a:t>
+            </a:r>
+          </a:p>
+          <a:p>
+            <a:endParaRPr lang="en-US" dirty="0"/>
+          </a:p>
+        </p:txBody>
+      </p:sp>
+      <p:sp>
+        <p:nvSpPr>
+          <p:cNvPr id="7" name="Text Placeholder 6">
+            <a:extLst>
+              <a:ext uri="{FF2B5EF4-FFF2-40B4-BE49-F238E27FC236}">
+                <a16:creationId xmlns:a16="http://schemas.microsoft.com/office/drawing/2014/main" id="{05E1913A-614D-4F38-AB69-5348B29CCD5D}"/>
+              </a:ext>
+            </a:extLst>
+          </p:cNvPr>
+          <p:cNvSpPr>
+            <a:spLocks noGrp="1"/>
+          </p:cNvSpPr>
+          <p:nvPr>
+            <p:ph type="body" sz="quarter" idx="10"/>
+          </p:nvPr>
+        </p:nvSpPr>
+        <p:spPr>
+          <a:xfrm>
+            <a:off x="261938" y="2756542"/>
+            <a:ext cx="3241675" cy="2851150"/>
+          </a:xfrm>
+        </p:spPr>
+        <p:txBody>
+          <a:bodyPr/>
+          <a:lstStyle>
+            <a:lvl1pPr>
+              <a:defRPr sz="2000">
+                <a:solidFill>
+                  <a:schemeClr val="bg1"/>
+                </a:solidFill>
+              </a:defRPr>
+            </a:lvl1pPr>
+          </a:lstStyle>
+          <a:p>
+            <a:pPr lvl="0"/>
+            <a:r>
+              <a:rPr lang="en-US" dirty="0"/>
+              <a:t>Edit Master text</a:t>
+            </a:r>
+          </a:p>
+        </p:txBody>
+      </p:sp>
+      <p:sp>
+        <p:nvSpPr>
+          <p:cNvPr id="11" name="Text Placeholder 10">
+            <a:extLst>
+              <a:ext uri="{FF2B5EF4-FFF2-40B4-BE49-F238E27FC236}">
+                <a16:creationId xmlns:a16="http://schemas.microsoft.com/office/drawing/2014/main" id="{6A2AE784-2CA5-4194-B30C-8D50C676A59B}"/>
+              </a:ext>
+            </a:extLst>
+          </p:cNvPr>
+          <p:cNvSpPr>
+            <a:spLocks noGrp="1"/>
+          </p:cNvSpPr>
+          <p:nvPr>
+            <p:ph type="body" sz="quarter" idx="11" hasCustomPrompt="1"/>
+          </p:nvPr>
+        </p:nvSpPr>
+        <p:spPr>
+          <a:xfrm>
+            <a:off x="261938" y="6018240"/>
+            <a:ext cx="8714421" cy="391882"/>
+          </a:xfrm>
+          <a:solidFill>
+            <a:schemeClr val="bg1"/>
+          </a:solidFill>
+        </p:spPr>
+        <p:txBody>
+          <a:bodyPr/>
+          <a:lstStyle>
+            <a:lvl1pPr marL="0" indent="0">
+              <a:buNone/>
+              <a:defRPr sz="1400">
+                <a:solidFill>
+                  <a:srgbClr val="3399FF"/>
+                </a:solidFill>
+              </a:defRPr>
+            </a:lvl1pPr>
+            <a:lvl2pPr>
+              <a:defRPr>
+                <a:solidFill>
+                  <a:schemeClr val="bg1">
+                    <a:lumMod val="75000"/>
+                  </a:schemeClr>
+                </a:solidFill>
+              </a:defRPr>
+            </a:lvl2pPr>
+            <a:lvl3pPr>
+              <a:defRPr>
+                <a:solidFill>
+                  <a:schemeClr val="bg1">
+                    <a:lumMod val="75000"/>
+                  </a:schemeClr>
+                </a:solidFill>
+              </a:defRPr>
+            </a:lvl3pPr>
+            <a:lvl4pPr>
+              <a:defRPr>
+                <a:solidFill>
+                  <a:schemeClr val="bg1">
+                    <a:lumMod val="75000"/>
+                  </a:schemeClr>
+                </a:solidFill>
+              </a:defRPr>
+            </a:lvl4pPr>
+            <a:lvl5pPr>
+              <a:defRPr>
+                <a:solidFill>
+                  <a:schemeClr val="bg1">
+                    <a:lumMod val="75000"/>
+                  </a:schemeClr>
+                </a:solidFill>
+              </a:defRPr>
+            </a:lvl5pPr>
+          </a:lstStyle>
+          <a:p>
+            <a:pPr lvl="0"/>
+            <a:r>
+              <a:rPr lang="en-US" dirty="0"/>
+              <a:t>URL</a:t>
+            </a:r>
+          </a:p>
+        </p:txBody>
+      </p:sp>
+      <p:sp>
+        <p:nvSpPr>
+          <p:cNvPr id="12" name="TextBox 11">
+            <a:extLst>
+              <a:ext uri="{FF2B5EF4-FFF2-40B4-BE49-F238E27FC236}">
+                <a16:creationId xmlns:a16="http://schemas.microsoft.com/office/drawing/2014/main" id="{E1C05B86-1160-4370-A04A-9508198B968C}"/>
+              </a:ext>
+            </a:extLst>
+          </p:cNvPr>
+          <p:cNvSpPr txBox="1"/>
+          <p:nvPr userDrawn="1"/>
+        </p:nvSpPr>
+        <p:spPr>
+          <a:xfrm>
+            <a:off x="6662057" y="6512893"/>
+            <a:ext cx="2388641" cy="307777"/>
+          </a:xfrm>
+          <a:prstGeom prst="rect">
+            <a:avLst/>
+          </a:prstGeom>
+          <a:noFill/>
+        </p:spPr>
+        <p:txBody>
+          <a:bodyPr wrap="square" rtlCol="0">
+            <a:spAutoFit/>
+          </a:bodyPr>
+          <a:lstStyle/>
+          <a:p>
+            <a:r>
+              <a:rPr lang="en-US" sz="1400" dirty="0"/>
+              <a:t>#70-533 @ITProGuru</a:t>
+            </a:r>
+          </a:p>
+        </p:txBody>
+      </p:sp>
+      <p:sp>
+        <p:nvSpPr>
+          <p:cNvPr id="8" name="Rectangle 7">
+            <a:extLst>
+              <a:ext uri="{FF2B5EF4-FFF2-40B4-BE49-F238E27FC236}">
+                <a16:creationId xmlns:a16="http://schemas.microsoft.com/office/drawing/2014/main" id="{2E5CD9C4-3903-4CFA-9CED-0878686ABD1A}"/>
+              </a:ext>
+            </a:extLst>
+          </p:cNvPr>
+          <p:cNvSpPr/>
+          <p:nvPr userDrawn="1"/>
+        </p:nvSpPr>
+        <p:spPr>
+          <a:xfrm>
+            <a:off x="158449" y="117610"/>
+            <a:ext cx="1903085" cy="715581"/>
+          </a:xfrm>
+          <a:prstGeom prst="rect">
+            <a:avLst/>
+          </a:prstGeom>
+        </p:spPr>
+        <p:txBody>
+          <a:bodyPr wrap="none">
+            <a:spAutoFit/>
+          </a:bodyPr>
+          <a:lstStyle/>
+          <a:p>
+            <a:r>
+              <a:rPr lang="en-US" sz="4050" dirty="0"/>
+              <a:t>DEMO</a:t>
+            </a:r>
+          </a:p>
+        </p:txBody>
+      </p:sp>
+    </p:spTree>
+    <p:extLst>
+      <p:ext uri="{BB962C8B-B14F-4D97-AF65-F5344CB8AC3E}">
+        <p14:creationId xmlns:p14="http://schemas.microsoft.com/office/powerpoint/2010/main" val="2828235629"/>
+      </p:ext>
+    </p:extLst>
+  </p:cSld>
+  <p:clrMapOvr>
+    <a:masterClrMapping/>
+  </p:clrMapOvr>
+</p:sldLayout>
+</file>
+
+<file path=ppt/slideLayouts/slideLayout9.xml><?xml version="1.0" encoding="utf-8"?>
 <p:sldLayout xmlns:a="http://schemas.openxmlformats.org/drawingml/2006/main" xmlns:r="http://schemas.openxmlformats.org/officeDocument/2006/relationships" xmlns:p="http://schemas.openxmlformats.org/presentationml/2006/main" preserve="1" userDrawn="1">
   <p:cSld name="Lab">
     <p:bg>
@@ -8744,9 +9569,9 @@
             <a:normAutofit/>
           </a:bodyPr>
           <a:lstStyle>
-            <a:lvl1pPr marL="0" indent="0">
-              <a:buFontTx/>
-              <a:buNone/>
+            <a:lvl1pPr marL="514350" indent="-514350">
+              <a:buFont typeface="+mj-lt"/>
+              <a:buAutoNum type="arabicParenR"/>
               <a:defRPr sz="2700"/>
             </a:lvl1pPr>
             <a:lvl2pPr marL="342900" indent="0">
@@ -8905,341 +9730,6 @@
     <p:extLst>
       <p:ext uri="{BB962C8B-B14F-4D97-AF65-F5344CB8AC3E}">
         <p14:creationId xmlns:p14="http://schemas.microsoft.com/office/powerpoint/2010/main" val="2625449846"/>
-      </p:ext>
-    </p:extLst>
-  </p:cSld>
-  <p:clrMapOvr>
-    <a:masterClrMapping/>
-  </p:clrMapOvr>
-</p:sldLayout>
-</file>
-
-<file path=ppt/slideLayouts/slideLayout9.xml><?xml version="1.0" encoding="utf-8"?>
-<p:sldLayout xmlns:a="http://schemas.openxmlformats.org/drawingml/2006/main" xmlns:r="http://schemas.openxmlformats.org/officeDocument/2006/relationships" xmlns:p="http://schemas.openxmlformats.org/presentationml/2006/main" preserve="1" userDrawn="1">
-  <p:cSld name="Content &amp; Code">
-    <p:spTree>
-      <p:nvGrpSpPr>
-        <p:cNvPr id="1" name=""/>
-        <p:cNvGrpSpPr/>
-        <p:nvPr/>
-      </p:nvGrpSpPr>
-      <p:grpSpPr>
-        <a:xfrm>
-          <a:off x="0" y="0"/>
-          <a:ext cx="0" cy="0"/>
-          <a:chOff x="0" y="0"/>
-          <a:chExt cx="0" cy="0"/>
-        </a:xfrm>
-      </p:grpSpPr>
-      <p:sp>
-        <p:nvSpPr>
-          <p:cNvPr id="2" name="Title 1"/>
-          <p:cNvSpPr>
-            <a:spLocks noGrp="1"/>
-          </p:cNvSpPr>
-          <p:nvPr>
-            <p:ph type="title" hasCustomPrompt="1"/>
-          </p:nvPr>
-        </p:nvSpPr>
-        <p:spPr>
-          <a:xfrm>
-            <a:off x="151194" y="0"/>
-            <a:ext cx="8833654" cy="878350"/>
-          </a:xfrm>
-        </p:spPr>
-        <p:txBody>
-          <a:bodyPr/>
-          <a:lstStyle>
-            <a:lvl1pPr>
-              <a:defRPr/>
-            </a:lvl1pPr>
-          </a:lstStyle>
-          <a:p>
-            <a:r>
-              <a:rPr lang="en-US" dirty="0"/>
-              <a:t>Content &amp; Code</a:t>
-            </a:r>
-          </a:p>
-        </p:txBody>
-      </p:sp>
-      <p:sp>
-        <p:nvSpPr>
-          <p:cNvPr id="3" name="Content Placeholder 2"/>
-          <p:cNvSpPr>
-            <a:spLocks noGrp="1"/>
-          </p:cNvSpPr>
-          <p:nvPr>
-            <p:ph idx="1"/>
-          </p:nvPr>
-        </p:nvSpPr>
-        <p:spPr>
-          <a:xfrm>
-            <a:off x="151194" y="1231902"/>
-            <a:ext cx="8833654" cy="2421204"/>
-          </a:xfrm>
-        </p:spPr>
-        <p:txBody>
-          <a:bodyPr>
-            <a:normAutofit/>
-          </a:bodyPr>
-          <a:lstStyle>
-            <a:lvl1pPr marL="0" indent="0">
-              <a:buFont typeface="Arial" panose="020B0604020202020204" pitchFamily="34" charset="0"/>
-              <a:buNone/>
-              <a:defRPr sz="2100"/>
-            </a:lvl1pPr>
-            <a:lvl2pPr marL="342900" indent="0">
-              <a:buFont typeface="Arial" panose="020B0604020202020204" pitchFamily="34" charset="0"/>
-              <a:buNone/>
-              <a:defRPr sz="1800"/>
-            </a:lvl2pPr>
-            <a:lvl3pPr marL="685800" indent="0">
-              <a:buFont typeface="Arial" panose="020B0604020202020204" pitchFamily="34" charset="0"/>
-              <a:buNone/>
-              <a:defRPr sz="1500"/>
-            </a:lvl3pPr>
-            <a:lvl4pPr marL="1028700" indent="0">
-              <a:buFont typeface="Arial" panose="020B0604020202020204" pitchFamily="34" charset="0"/>
-              <a:buNone/>
-              <a:defRPr sz="1350"/>
-            </a:lvl4pPr>
-            <a:lvl5pPr marL="1371600" indent="0">
-              <a:buFont typeface="Arial" panose="020B0604020202020204" pitchFamily="34" charset="0"/>
-              <a:buNone/>
-              <a:defRPr sz="1350"/>
-            </a:lvl5pPr>
-          </a:lstStyle>
-          <a:p>
-            <a:pPr lvl="0"/>
-            <a:r>
-              <a:rPr lang="en-US" dirty="0"/>
-              <a:t>Click to edit Master text styles</a:t>
-            </a:r>
-          </a:p>
-          <a:p>
-            <a:pPr lvl="1"/>
-            <a:r>
-              <a:rPr lang="en-US" dirty="0"/>
-              <a:t>Second level</a:t>
-            </a:r>
-          </a:p>
-          <a:p>
-            <a:pPr lvl="2"/>
-            <a:r>
-              <a:rPr lang="en-US" dirty="0"/>
-              <a:t>Third level</a:t>
-            </a:r>
-          </a:p>
-          <a:p>
-            <a:pPr lvl="3"/>
-            <a:r>
-              <a:rPr lang="en-US" dirty="0"/>
-              <a:t>Fourth level</a:t>
-            </a:r>
-          </a:p>
-          <a:p>
-            <a:pPr lvl="4"/>
-            <a:r>
-              <a:rPr lang="en-US" dirty="0"/>
-              <a:t>Fifth level</a:t>
-            </a:r>
-          </a:p>
-        </p:txBody>
-      </p:sp>
-      <p:sp>
-        <p:nvSpPr>
-          <p:cNvPr id="7" name="Rectangle 6">
-            <a:extLst>
-              <a:ext uri="{FF2B5EF4-FFF2-40B4-BE49-F238E27FC236}">
-                <a16:creationId xmlns:a16="http://schemas.microsoft.com/office/drawing/2014/main" id="{06833DA2-9089-4E59-9B9D-7F3A29DCE61C}"/>
-              </a:ext>
-            </a:extLst>
-          </p:cNvPr>
-          <p:cNvSpPr/>
-          <p:nvPr userDrawn="1"/>
-        </p:nvSpPr>
-        <p:spPr bwMode="auto">
-          <a:xfrm>
-            <a:off x="33849" y="3653108"/>
-            <a:ext cx="9020275" cy="3129417"/>
-          </a:xfrm>
-          <a:prstGeom prst="rect">
-            <a:avLst/>
-          </a:prstGeom>
-          <a:solidFill>
-            <a:schemeClr val="accent1"/>
-          </a:solidFill>
-          <a:ln w="3175">
-            <a:noFill/>
-            <a:headEnd type="none" w="med" len="med"/>
-            <a:tailEnd type="none" w="med" len="med"/>
-          </a:ln>
-        </p:spPr>
-        <p:style>
-          <a:lnRef idx="2">
-            <a:schemeClr val="accent1">
-              <a:shade val="50000"/>
-            </a:schemeClr>
-          </a:lnRef>
-          <a:fillRef idx="1">
-            <a:schemeClr val="accent1"/>
-          </a:fillRef>
-          <a:effectRef idx="0">
-            <a:schemeClr val="accent1"/>
-          </a:effectRef>
-          <a:fontRef idx="minor">
-            <a:schemeClr val="lt1"/>
-          </a:fontRef>
-        </p:style>
-        <p:txBody>
-          <a:bodyPr vert="horz" wrap="square" lIns="0" tIns="34290" rIns="0" bIns="34290" numCol="1" rtlCol="0" anchor="ctr" anchorCtr="0" compatLnSpc="1">
-            <a:prstTxWarp prst="textNoShape">
-              <a:avLst/>
-            </a:prstTxWarp>
-          </a:bodyPr>
-          <a:lstStyle/>
-          <a:p>
-            <a:pPr algn="ctr" defTabSz="685577" fontAlgn="base">
-              <a:spcBef>
-                <a:spcPct val="0"/>
-              </a:spcBef>
-              <a:spcAft>
-                <a:spcPct val="0"/>
-              </a:spcAft>
-            </a:pPr>
-            <a:endParaRPr lang="en-US" sz="1471" dirty="0">
-              <a:gradFill>
-                <a:gsLst>
-                  <a:gs pos="0">
-                    <a:srgbClr val="FFFFFF"/>
-                  </a:gs>
-                  <a:gs pos="100000">
-                    <a:srgbClr val="FFFFFF"/>
-                  </a:gs>
-                </a:gsLst>
-                <a:lin ang="5400000" scaled="0"/>
-              </a:gradFill>
-            </a:endParaRPr>
-          </a:p>
-        </p:txBody>
-      </p:sp>
-      <p:sp>
-        <p:nvSpPr>
-          <p:cNvPr id="10" name="Content Placeholder 2">
-            <a:extLst>
-              <a:ext uri="{FF2B5EF4-FFF2-40B4-BE49-F238E27FC236}">
-                <a16:creationId xmlns:a16="http://schemas.microsoft.com/office/drawing/2014/main" id="{A7A07890-C86B-4334-9F28-D4C01C01B9F8}"/>
-              </a:ext>
-            </a:extLst>
-          </p:cNvPr>
-          <p:cNvSpPr>
-            <a:spLocks noGrp="1"/>
-          </p:cNvSpPr>
-          <p:nvPr>
-            <p:ph idx="10" hasCustomPrompt="1"/>
-          </p:nvPr>
-        </p:nvSpPr>
-        <p:spPr>
-          <a:xfrm>
-            <a:off x="151194" y="3795486"/>
-            <a:ext cx="8833654" cy="2910114"/>
-          </a:xfrm>
-          <a:solidFill>
-            <a:schemeClr val="bg1"/>
-          </a:solidFill>
-          <a:ln w="60325" cmpd="sng">
-            <a:solidFill>
-              <a:srgbClr val="0070C0"/>
-            </a:solidFill>
-          </a:ln>
-        </p:spPr>
-        <p:txBody>
-          <a:bodyPr>
-            <a:normAutofit/>
-          </a:bodyPr>
-          <a:lstStyle>
-            <a:lvl1pPr marL="0" indent="0" defTabSz="0">
-              <a:buFont typeface="Arial" panose="020B0604020202020204" pitchFamily="34" charset="0"/>
-              <a:buNone/>
-              <a:defRPr sz="1200">
-                <a:latin typeface="Courier New" panose="02070309020205020404" pitchFamily="49" charset="0"/>
-                <a:cs typeface="Courier New" panose="02070309020205020404" pitchFamily="49" charset="0"/>
-              </a:defRPr>
-            </a:lvl1pPr>
-            <a:lvl2pPr marL="342900" indent="0" defTabSz="0">
-              <a:buFont typeface="Arial" panose="020B0604020202020204" pitchFamily="34" charset="0"/>
-              <a:buNone/>
-              <a:defRPr sz="1200">
-                <a:latin typeface="Courier New" panose="02070309020205020404" pitchFamily="49" charset="0"/>
-                <a:cs typeface="Courier New" panose="02070309020205020404" pitchFamily="49" charset="0"/>
-              </a:defRPr>
-            </a:lvl2pPr>
-            <a:lvl3pPr marL="685800" indent="0" defTabSz="0">
-              <a:buFont typeface="Arial" panose="020B0604020202020204" pitchFamily="34" charset="0"/>
-              <a:buNone/>
-              <a:defRPr sz="1200">
-                <a:latin typeface="Courier New" panose="02070309020205020404" pitchFamily="49" charset="0"/>
-                <a:cs typeface="Courier New" panose="02070309020205020404" pitchFamily="49" charset="0"/>
-              </a:defRPr>
-            </a:lvl3pPr>
-            <a:lvl4pPr marL="1028700" indent="0" defTabSz="0">
-              <a:buFont typeface="Arial" panose="020B0604020202020204" pitchFamily="34" charset="0"/>
-              <a:buNone/>
-              <a:defRPr sz="1200">
-                <a:latin typeface="Courier New" panose="02070309020205020404" pitchFamily="49" charset="0"/>
-                <a:cs typeface="Courier New" panose="02070309020205020404" pitchFamily="49" charset="0"/>
-              </a:defRPr>
-            </a:lvl4pPr>
-            <a:lvl5pPr marL="1371600" indent="0" defTabSz="0">
-              <a:buFont typeface="Arial" panose="020B0604020202020204" pitchFamily="34" charset="0"/>
-              <a:buNone/>
-              <a:defRPr sz="1200">
-                <a:latin typeface="Courier New" panose="02070309020205020404" pitchFamily="49" charset="0"/>
-                <a:cs typeface="Courier New" panose="02070309020205020404" pitchFamily="49" charset="0"/>
-              </a:defRPr>
-            </a:lvl5pPr>
-          </a:lstStyle>
-          <a:p>
-            <a:pPr lvl="0"/>
-            <a:r>
-              <a:rPr lang="en-US" dirty="0"/>
-              <a:t>Click to Edit/Paste/Insert Code or Paste/Insert Screenshot</a:t>
-            </a:r>
-          </a:p>
-          <a:p>
-            <a:pPr lvl="1"/>
-            <a:r>
-              <a:rPr lang="en-US" dirty="0"/>
-              <a:t>	Second level</a:t>
-            </a:r>
-          </a:p>
-          <a:p>
-            <a:pPr lvl="2"/>
-            <a:r>
-              <a:rPr lang="en-US" dirty="0"/>
-              <a:t>Third level</a:t>
-            </a:r>
-          </a:p>
-          <a:p>
-            <a:pPr lvl="3"/>
-            <a:r>
-              <a:rPr lang="en-US" dirty="0"/>
-              <a:t>Fourth level</a:t>
-            </a:r>
-          </a:p>
-          <a:p>
-            <a:pPr lvl="4"/>
-            <a:r>
-              <a:rPr lang="en-US" dirty="0"/>
-              <a:t>Fifth level</a:t>
-            </a:r>
-          </a:p>
-        </p:txBody>
-      </p:sp>
-    </p:spTree>
-    <p:extLst>
-      <p:ext uri="{BB962C8B-B14F-4D97-AF65-F5344CB8AC3E}">
-        <p14:creationId xmlns:p14="http://schemas.microsoft.com/office/powerpoint/2010/main" val="1605699000"/>
       </p:ext>
     </p:extLst>
   </p:cSld>
@@ -9282,8 +9772,8 @@
         </p:nvSpPr>
         <p:spPr>
           <a:xfrm>
-            <a:off x="0" y="0"/>
-            <a:ext cx="9144000" cy="704088"/>
+            <a:off x="0" y="-1"/>
+            <a:ext cx="9144000" cy="1002323"/>
           </a:xfrm>
           <a:prstGeom prst="rect">
             <a:avLst/>
@@ -9370,8 +9860,8 @@
         </p:nvSpPr>
         <p:spPr bwMode="auto">
           <a:xfrm>
-            <a:off x="460375" y="-2"/>
-            <a:ext cx="7773988" cy="740664"/>
+            <a:off x="140678" y="-3"/>
+            <a:ext cx="8827476" cy="896817"/>
           </a:xfrm>
           <a:prstGeom prst="rect">
             <a:avLst/>
@@ -9528,20 +10018,21 @@
     <p:sldLayoutId id="2147483707" r:id="rId5"/>
     <p:sldLayoutId id="2147483662" r:id="rId6"/>
     <p:sldLayoutId id="2147483699" r:id="rId7"/>
-    <p:sldLayoutId id="2147483702" r:id="rId8"/>
-    <p:sldLayoutId id="2147483700" r:id="rId9"/>
-    <p:sldLayoutId id="2147483705" r:id="rId10"/>
-    <p:sldLayoutId id="2147483703" r:id="rId11"/>
-    <p:sldLayoutId id="2147483706" r:id="rId12"/>
-    <p:sldLayoutId id="2147483663" r:id="rId13"/>
-    <p:sldLayoutId id="2147483664" r:id="rId14"/>
-    <p:sldLayoutId id="2147483665" r:id="rId15"/>
-    <p:sldLayoutId id="2147483667" r:id="rId16"/>
-    <p:sldLayoutId id="2147483668" r:id="rId17"/>
-    <p:sldLayoutId id="2147483669" r:id="rId18"/>
-    <p:sldLayoutId id="2147483670" r:id="rId19"/>
-    <p:sldLayoutId id="2147483671" r:id="rId20"/>
-    <p:sldLayoutId id="2147483673" r:id="rId21"/>
+    <p:sldLayoutId id="2147483708" r:id="rId8"/>
+    <p:sldLayoutId id="2147483702" r:id="rId9"/>
+    <p:sldLayoutId id="2147483700" r:id="rId10"/>
+    <p:sldLayoutId id="2147483705" r:id="rId11"/>
+    <p:sldLayoutId id="2147483703" r:id="rId12"/>
+    <p:sldLayoutId id="2147483706" r:id="rId13"/>
+    <p:sldLayoutId id="2147483663" r:id="rId14"/>
+    <p:sldLayoutId id="2147483664" r:id="rId15"/>
+    <p:sldLayoutId id="2147483665" r:id="rId16"/>
+    <p:sldLayoutId id="2147483667" r:id="rId17"/>
+    <p:sldLayoutId id="2147483668" r:id="rId18"/>
+    <p:sldLayoutId id="2147483669" r:id="rId19"/>
+    <p:sldLayoutId id="2147483670" r:id="rId20"/>
+    <p:sldLayoutId id="2147483671" r:id="rId21"/>
+    <p:sldLayoutId id="2147483673" r:id="rId22"/>
   </p:sldLayoutIdLst>
   <p:txStyles>
     <p:titleStyle>

</xml_diff>

<commit_message>
2018-02-07 First Event Updates
</commit_message>
<xml_diff>
--- a/70-533-00-Template.pptx
+++ b/70-533-00-Template.pptx
@@ -32,44 +32,44 @@
   <p:notesSz cx="6858000" cy="9144000"/>
   <p:embeddedFontLst>
     <p:embeddedFont>
-      <p:font typeface="Segoe UI" panose="020B0502040204020203" pitchFamily="34" charset="0"/>
+      <p:font typeface="Segoe" panose="020B0604020202020204" charset="0"/>
       <p:regular r:id="rId20"/>
       <p:bold r:id="rId21"/>
       <p:italic r:id="rId22"/>
       <p:boldItalic r:id="rId23"/>
     </p:embeddedFont>
     <p:embeddedFont>
-      <p:font typeface="Verdana" panose="020B0604030504040204" pitchFamily="34" charset="0"/>
+      <p:font typeface="Consolas" panose="020B0609020204030204" pitchFamily="49" charset="0"/>
       <p:regular r:id="rId24"/>
       <p:bold r:id="rId25"/>
       <p:italic r:id="rId26"/>
       <p:boldItalic r:id="rId27"/>
     </p:embeddedFont>
     <p:embeddedFont>
-      <p:font typeface="Consolas" panose="020B0609020204030204" pitchFamily="49" charset="0"/>
+      <p:font typeface="Calibri" panose="020F0502020204030204" pitchFamily="34" charset="0"/>
       <p:regular r:id="rId28"/>
       <p:bold r:id="rId29"/>
       <p:italic r:id="rId30"/>
       <p:boldItalic r:id="rId31"/>
     </p:embeddedFont>
     <p:embeddedFont>
-      <p:font typeface="Calibri" panose="020F0502020204030204" pitchFamily="34" charset="0"/>
+      <p:font typeface="Segoe UI Light" panose="020B0502040204020203" pitchFamily="34" charset="0"/>
       <p:regular r:id="rId32"/>
-      <p:bold r:id="rId33"/>
-      <p:italic r:id="rId34"/>
-      <p:boldItalic r:id="rId35"/>
+      <p:italic r:id="rId33"/>
     </p:embeddedFont>
     <p:embeddedFont>
-      <p:font typeface="Segoe" panose="020B0604020202020204" charset="0"/>
-      <p:regular r:id="rId36"/>
-      <p:bold r:id="rId37"/>
-      <p:italic r:id="rId38"/>
-      <p:boldItalic r:id="rId39"/>
+      <p:font typeface="Segoe UI" panose="020B0502040204020203" pitchFamily="34" charset="0"/>
+      <p:regular r:id="rId34"/>
+      <p:bold r:id="rId35"/>
+      <p:italic r:id="rId36"/>
+      <p:boldItalic r:id="rId37"/>
     </p:embeddedFont>
     <p:embeddedFont>
-      <p:font typeface="Segoe UI Light" panose="020B0502040204020203" pitchFamily="34" charset="0"/>
-      <p:regular r:id="rId40"/>
-      <p:italic r:id="rId41"/>
+      <p:font typeface="Verdana" panose="020B0604030504040204" pitchFamily="34" charset="0"/>
+      <p:regular r:id="rId38"/>
+      <p:bold r:id="rId39"/>
+      <p:italic r:id="rId40"/>
+      <p:boldItalic r:id="rId41"/>
     </p:embeddedFont>
   </p:embeddedFontLst>
   <p:defaultTextStyle>
@@ -358,7 +358,7 @@
           <a:p>
             <a:fld id="{7D784404-57E5-4341-9230-5EC072B8C3C5}" type="datetimeFigureOut">
               <a:rPr lang="en-US" smtClean="0"/>
-              <a:t>2/6/2018</a:t>
+              <a:t>2/7/2018</a:t>
             </a:fld>
             <a:endParaRPr lang="en-US"/>
           </a:p>
@@ -535,7 +535,7 @@
           <a:p>
             <a:fld id="{9933EFA3-31EF-403B-8080-9776000D59FF}" type="datetimeFigureOut">
               <a:rPr lang="en-US" smtClean="0"/>
-              <a:t>2/6/2018</a:t>
+              <a:t>2/7/2018</a:t>
             </a:fld>
             <a:endParaRPr lang="en-US" dirty="0"/>
           </a:p>
@@ -3035,7 +3035,7 @@
 
 <file path=ppt/slideLayouts/slideLayout1.xml><?xml version="1.0" encoding="utf-8"?>
 <p:sldLayout xmlns:a="http://schemas.openxmlformats.org/drawingml/2006/main" xmlns:r="http://schemas.openxmlformats.org/officeDocument/2006/relationships" xmlns:p="http://schemas.openxmlformats.org/presentationml/2006/main" showMasterSp="0" preserve="1" userDrawn="1">
-  <p:cSld name="Title Slide">
+  <p:cSld name="Speaker Intro">
     <p:bg>
       <p:bgPr>
         <a:solidFill>
@@ -3123,8 +3123,8 @@
         </p:nvSpPr>
         <p:spPr>
           <a:xfrm>
-            <a:off x="3685592" y="2110581"/>
-            <a:ext cx="5290768" cy="3722293"/>
+            <a:off x="3685592" y="2595282"/>
+            <a:ext cx="5290768" cy="3237592"/>
           </a:xfrm>
         </p:spPr>
         <p:txBody>
@@ -3176,7 +3176,7 @@
             <a:spLocks noGrp="1"/>
           </p:cNvSpPr>
           <p:nvPr>
-            <p:ph type="body" sz="quarter" idx="10"/>
+            <p:ph type="body" sz="quarter" idx="10" hasCustomPrompt="1"/>
           </p:nvPr>
         </p:nvSpPr>
         <p:spPr>
@@ -3184,14 +3184,18 @@
             <a:off x="261938" y="2756542"/>
             <a:ext cx="3241675" cy="2851150"/>
           </a:xfrm>
+          <a:solidFill>
+            <a:schemeClr val="bg1"/>
+          </a:solidFill>
         </p:spPr>
         <p:txBody>
           <a:bodyPr/>
           <a:lstStyle>
-            <a:lvl1pPr>
-              <a:defRPr sz="2000">
+            <a:lvl1pPr marL="0" indent="0">
+              <a:buNone/>
+              <a:defRPr sz="2000" baseline="0">
                 <a:solidFill>
-                  <a:schemeClr val="bg1"/>
+                  <a:srgbClr val="0070C0"/>
                 </a:solidFill>
               </a:defRPr>
             </a:lvl1pPr>
@@ -3200,7 +3204,7 @@
             <a:pPr lvl="0"/>
             <a:r>
               <a:rPr lang="en-US" dirty="0"/>
-              <a:t>Edit Master text</a:t>
+              <a:t>Speaker Information:</a:t>
             </a:r>
           </a:p>
         </p:txBody>
@@ -3322,10 +3326,77 @@
           </a:p>
         </p:txBody>
       </p:sp>
+      <p:sp>
+        <p:nvSpPr>
+          <p:cNvPr id="8" name="Text Placeholder 6">
+            <a:extLst>
+              <a:ext uri="{FF2B5EF4-FFF2-40B4-BE49-F238E27FC236}">
+                <a16:creationId xmlns:a16="http://schemas.microsoft.com/office/drawing/2014/main" id="{02AE59D8-F91B-4102-844E-46CD5A0795C5}"/>
+              </a:ext>
+            </a:extLst>
+          </p:cNvPr>
+          <p:cNvSpPr>
+            <a:spLocks noGrp="1"/>
+          </p:cNvSpPr>
+          <p:nvPr>
+            <p:ph type="body" sz="quarter" idx="12" hasCustomPrompt="1"/>
+          </p:nvPr>
+        </p:nvSpPr>
+        <p:spPr>
+          <a:xfrm>
+            <a:off x="275386" y="1689742"/>
+            <a:ext cx="8595190" cy="780034"/>
+          </a:xfrm>
+          <a:noFill/>
+        </p:spPr>
+        <p:txBody>
+          <a:bodyPr/>
+          <a:lstStyle>
+            <a:lvl1pPr marL="0" indent="0">
+              <a:buNone/>
+              <a:defRPr sz="2000" baseline="0">
+                <a:solidFill>
+                  <a:schemeClr val="bg1"/>
+                </a:solidFill>
+              </a:defRPr>
+            </a:lvl1pPr>
+          </a:lstStyle>
+          <a:p>
+            <a:pPr lvl="0"/>
+            <a:r>
+              <a:rPr lang="en-US" dirty="0" err="1"/>
+              <a:t>WiFi</a:t>
+            </a:r>
+            <a:r>
+              <a:rPr lang="en-US" dirty="0"/>
+              <a:t>: </a:t>
+            </a:r>
+            <a:r>
+              <a:rPr lang="en-US" dirty="0" err="1"/>
+              <a:t>msftguest</a:t>
+            </a:r>
+            <a:r>
+              <a:rPr lang="en-US" dirty="0"/>
+              <a:t> =&gt; event code: msevent11lz</a:t>
+            </a:r>
+          </a:p>
+          <a:p>
+            <a:pPr lvl="0"/>
+            <a:r>
+              <a:rPr lang="en-US" dirty="0"/>
+              <a:t>Content &amp; Labs: http://github.com/guruskill/70-533</a:t>
+            </a:r>
+          </a:p>
+          <a:p>
+            <a:pPr lvl="0"/>
+            <a:endParaRPr lang="en-US" dirty="0"/>
+          </a:p>
+        </p:txBody>
+      </p:sp>
     </p:spTree>
     <p:extLst>
       <p:ext uri="{BB962C8B-B14F-4D97-AF65-F5344CB8AC3E}">
-        <p14:creationId xmlns:p14="http://schemas.microsoft.com/office/powerpoint/2010/main" val="3414292977"/>
+        <p14:creationId xmlns:p14="http://schemas.microsoft.com/office/powerpoint/2010/main" val="1372218119"/>
       </p:ext>
     </p:extLst>
   </p:cSld>
@@ -3336,6 +3407,309 @@
 </file>
 
 <file path=ppt/slideLayouts/slideLayout10.xml><?xml version="1.0" encoding="utf-8"?>
+<p:sldLayout xmlns:a="http://schemas.openxmlformats.org/drawingml/2006/main" xmlns:r="http://schemas.openxmlformats.org/officeDocument/2006/relationships" xmlns:p="http://schemas.openxmlformats.org/presentationml/2006/main" preserve="1" userDrawn="1">
+  <p:cSld name="Lab">
+    <p:bg>
+      <p:bgPr>
+        <a:solidFill>
+          <a:schemeClr val="bg1"/>
+        </a:solidFill>
+        <a:effectLst/>
+      </p:bgPr>
+    </p:bg>
+    <p:spTree>
+      <p:nvGrpSpPr>
+        <p:cNvPr id="1" name=""/>
+        <p:cNvGrpSpPr/>
+        <p:nvPr/>
+      </p:nvGrpSpPr>
+      <p:grpSpPr>
+        <a:xfrm>
+          <a:off x="0" y="0"/>
+          <a:ext cx="0" cy="0"/>
+          <a:chOff x="0" y="0"/>
+          <a:chExt cx="0" cy="0"/>
+        </a:xfrm>
+      </p:grpSpPr>
+      <p:sp>
+        <p:nvSpPr>
+          <p:cNvPr id="6" name="Rectangle 5">
+            <a:extLst>
+              <a:ext uri="{FF2B5EF4-FFF2-40B4-BE49-F238E27FC236}">
+                <a16:creationId xmlns:a16="http://schemas.microsoft.com/office/drawing/2014/main" id="{855B8EEB-D399-4AF3-B7D1-E78E1898CC1F}"/>
+              </a:ext>
+            </a:extLst>
+          </p:cNvPr>
+          <p:cNvSpPr/>
+          <p:nvPr userDrawn="1"/>
+        </p:nvSpPr>
+        <p:spPr>
+          <a:xfrm>
+            <a:off x="0" y="0"/>
+            <a:ext cx="9144000" cy="1371600"/>
+          </a:xfrm>
+          <a:prstGeom prst="rect">
+            <a:avLst/>
+          </a:prstGeom>
+          <a:solidFill>
+            <a:srgbClr val="7030A0"/>
+          </a:solidFill>
+          <a:ln>
+            <a:noFill/>
+          </a:ln>
+        </p:spPr>
+        <p:style>
+          <a:lnRef idx="2">
+            <a:schemeClr val="accent1">
+              <a:shade val="50000"/>
+            </a:schemeClr>
+          </a:lnRef>
+          <a:fillRef idx="1">
+            <a:schemeClr val="accent1"/>
+          </a:fillRef>
+          <a:effectRef idx="0">
+            <a:schemeClr val="accent1"/>
+          </a:effectRef>
+          <a:fontRef idx="minor">
+            <a:schemeClr val="lt1"/>
+          </a:fontRef>
+        </p:style>
+        <p:txBody>
+          <a:bodyPr rtlCol="0" anchor="ctr"/>
+          <a:lstStyle/>
+          <a:p>
+            <a:pPr algn="ctr"/>
+            <a:endParaRPr lang="en-US" dirty="0"/>
+          </a:p>
+        </p:txBody>
+      </p:sp>
+      <p:sp>
+        <p:nvSpPr>
+          <p:cNvPr id="2" name="Title 1"/>
+          <p:cNvSpPr>
+            <a:spLocks noGrp="1"/>
+          </p:cNvSpPr>
+          <p:nvPr>
+            <p:ph type="title" hasCustomPrompt="1"/>
+          </p:nvPr>
+        </p:nvSpPr>
+        <p:spPr>
+          <a:xfrm>
+            <a:off x="1473233" y="1"/>
+            <a:ext cx="7511614" cy="1231901"/>
+          </a:xfrm>
+        </p:spPr>
+        <p:txBody>
+          <a:bodyPr/>
+          <a:lstStyle>
+            <a:lvl1pPr>
+              <a:defRPr sz="2400"/>
+            </a:lvl1pPr>
+          </a:lstStyle>
+          <a:p>
+            <a:r>
+              <a:rPr lang="en-US" dirty="0"/>
+              <a:t>Click to edit Lab title</a:t>
+            </a:r>
+          </a:p>
+        </p:txBody>
+      </p:sp>
+      <p:sp>
+        <p:nvSpPr>
+          <p:cNvPr id="3" name="Content Placeholder 2"/>
+          <p:cNvSpPr>
+            <a:spLocks noGrp="1"/>
+          </p:cNvSpPr>
+          <p:nvPr>
+            <p:ph idx="1" hasCustomPrompt="1"/>
+          </p:nvPr>
+        </p:nvSpPr>
+        <p:spPr>
+          <a:xfrm>
+            <a:off x="151194" y="1371600"/>
+            <a:ext cx="8833654" cy="4793789"/>
+          </a:xfrm>
+        </p:spPr>
+        <p:txBody>
+          <a:bodyPr>
+            <a:normAutofit/>
+          </a:bodyPr>
+          <a:lstStyle>
+            <a:lvl1pPr marL="514350" indent="-514350">
+              <a:buFont typeface="+mj-lt"/>
+              <a:buAutoNum type="arabicParenR"/>
+              <a:defRPr sz="2700"/>
+            </a:lvl1pPr>
+            <a:lvl2pPr marL="342900" indent="0">
+              <a:buFontTx/>
+              <a:buNone/>
+              <a:defRPr sz="2400"/>
+            </a:lvl2pPr>
+            <a:lvl3pPr marL="685800" indent="0">
+              <a:buFontTx/>
+              <a:buNone/>
+              <a:defRPr sz="2100"/>
+            </a:lvl3pPr>
+            <a:lvl4pPr marL="1028700" indent="0">
+              <a:buFontTx/>
+              <a:buNone/>
+              <a:defRPr sz="1800"/>
+            </a:lvl4pPr>
+            <a:lvl5pPr marL="1371600" indent="0">
+              <a:buFontTx/>
+              <a:buNone/>
+              <a:defRPr sz="1800"/>
+            </a:lvl5pPr>
+          </a:lstStyle>
+          <a:p>
+            <a:pPr lvl="0"/>
+            <a:r>
+              <a:rPr lang="en-US" dirty="0"/>
+              <a:t>Click to edit Master text styles</a:t>
+            </a:r>
+          </a:p>
+          <a:p>
+            <a:pPr lvl="1"/>
+            <a:r>
+              <a:rPr lang="en-US" dirty="0"/>
+              <a:t>Second level </a:t>
+            </a:r>
+          </a:p>
+          <a:p>
+            <a:pPr lvl="1"/>
+            <a:r>
+              <a:rPr lang="en-US" dirty="0"/>
+              <a:t>	Third level</a:t>
+            </a:r>
+          </a:p>
+          <a:p>
+            <a:pPr lvl="3"/>
+            <a:r>
+              <a:rPr lang="en-US" dirty="0"/>
+              <a:t>Fourth level</a:t>
+            </a:r>
+          </a:p>
+          <a:p>
+            <a:pPr lvl="4"/>
+            <a:r>
+              <a:rPr lang="en-US" dirty="0"/>
+              <a:t>Fifth level</a:t>
+            </a:r>
+          </a:p>
+        </p:txBody>
+      </p:sp>
+      <p:sp>
+        <p:nvSpPr>
+          <p:cNvPr id="7" name="Rectangle 6">
+            <a:extLst>
+              <a:ext uri="{FF2B5EF4-FFF2-40B4-BE49-F238E27FC236}">
+                <a16:creationId xmlns:a16="http://schemas.microsoft.com/office/drawing/2014/main" id="{36E8BE26-ED1E-4BC3-AABB-33679E13D11C}"/>
+              </a:ext>
+            </a:extLst>
+          </p:cNvPr>
+          <p:cNvSpPr/>
+          <p:nvPr userDrawn="1"/>
+        </p:nvSpPr>
+        <p:spPr>
+          <a:xfrm>
+            <a:off x="158449" y="117610"/>
+            <a:ext cx="1314784" cy="715581"/>
+          </a:xfrm>
+          <a:prstGeom prst="rect">
+            <a:avLst/>
+          </a:prstGeom>
+        </p:spPr>
+        <p:txBody>
+          <a:bodyPr wrap="none">
+            <a:spAutoFit/>
+          </a:bodyPr>
+          <a:lstStyle/>
+          <a:p>
+            <a:r>
+              <a:rPr lang="en-US" sz="4050" dirty="0">
+                <a:solidFill>
+                  <a:srgbClr val="00B0F0"/>
+                </a:solidFill>
+              </a:rPr>
+              <a:t>LAB</a:t>
+            </a:r>
+          </a:p>
+        </p:txBody>
+      </p:sp>
+      <p:sp>
+        <p:nvSpPr>
+          <p:cNvPr id="8" name="Text Placeholder 4">
+            <a:extLst>
+              <a:ext uri="{FF2B5EF4-FFF2-40B4-BE49-F238E27FC236}">
+                <a16:creationId xmlns:a16="http://schemas.microsoft.com/office/drawing/2014/main" id="{5F53A04A-F1A4-47F1-8696-966F2AE336F7}"/>
+              </a:ext>
+            </a:extLst>
+          </p:cNvPr>
+          <p:cNvSpPr>
+            <a:spLocks noGrp="1"/>
+          </p:cNvSpPr>
+          <p:nvPr>
+            <p:ph type="body" sz="quarter" idx="10" hasCustomPrompt="1"/>
+          </p:nvPr>
+        </p:nvSpPr>
+        <p:spPr>
+          <a:xfrm>
+            <a:off x="261188" y="6307137"/>
+            <a:ext cx="8574837" cy="410903"/>
+          </a:xfrm>
+        </p:spPr>
+        <p:txBody>
+          <a:bodyPr/>
+          <a:lstStyle>
+            <a:lvl1pPr marL="0" indent="0">
+              <a:buFont typeface="Arial" panose="020B0604020202020204" pitchFamily="34" charset="0"/>
+              <a:buNone/>
+              <a:defRPr sz="1400"/>
+            </a:lvl1pPr>
+            <a:lvl2pPr marL="574675" indent="-285750">
+              <a:buFont typeface="Arial" panose="020B0604020202020204" pitchFamily="34" charset="0"/>
+              <a:buChar char="•"/>
+              <a:defRPr sz="1600"/>
+            </a:lvl2pPr>
+            <a:lvl3pPr marL="966787" indent="-285750">
+              <a:buFont typeface="Arial" panose="020B0604020202020204" pitchFamily="34" charset="0"/>
+              <a:buChar char="•"/>
+              <a:defRPr sz="1400"/>
+            </a:lvl3pPr>
+            <a:lvl4pPr marL="1260475" indent="-171450">
+              <a:buFont typeface="Arial" panose="020B0604020202020204" pitchFamily="34" charset="0"/>
+              <a:buChar char="•"/>
+              <a:defRPr sz="1200"/>
+            </a:lvl4pPr>
+            <a:lvl5pPr marL="1547813" indent="-171450">
+              <a:buFont typeface="Arial" panose="020B0604020202020204" pitchFamily="34" charset="0"/>
+              <a:buChar char="•"/>
+              <a:defRPr sz="1200"/>
+            </a:lvl5pPr>
+          </a:lstStyle>
+          <a:p>
+            <a:pPr lvl="0"/>
+            <a:r>
+              <a:rPr lang="en-US" dirty="0"/>
+              <a:t>Edit URL</a:t>
+            </a:r>
+          </a:p>
+        </p:txBody>
+      </p:sp>
+    </p:spTree>
+    <p:extLst>
+      <p:ext uri="{BB962C8B-B14F-4D97-AF65-F5344CB8AC3E}">
+        <p14:creationId xmlns:p14="http://schemas.microsoft.com/office/powerpoint/2010/main" val="2625449846"/>
+      </p:ext>
+    </p:extLst>
+  </p:cSld>
+  <p:clrMapOvr>
+    <a:masterClrMapping/>
+  </p:clrMapOvr>
+</p:sldLayout>
+</file>
+
+<file path=ppt/slideLayouts/slideLayout11.xml><?xml version="1.0" encoding="utf-8"?>
 <p:sldLayout xmlns:a="http://schemas.openxmlformats.org/drawingml/2006/main" xmlns:r="http://schemas.openxmlformats.org/officeDocument/2006/relationships" xmlns:p="http://schemas.openxmlformats.org/presentationml/2006/main" preserve="1" userDrawn="1">
   <p:cSld name="Content &amp; Code">
     <p:spTree>
@@ -3670,7 +4044,7 @@
 </p:sldLayout>
 </file>
 
-<file path=ppt/slideLayouts/slideLayout11.xml><?xml version="1.0" encoding="utf-8"?>
+<file path=ppt/slideLayouts/slideLayout12.xml><?xml version="1.0" encoding="utf-8"?>
 <p:sldLayout xmlns:a="http://schemas.openxmlformats.org/drawingml/2006/main" xmlns:r="http://schemas.openxmlformats.org/officeDocument/2006/relationships" xmlns:p="http://schemas.openxmlformats.org/presentationml/2006/main" preserve="1" userDrawn="1">
   <p:cSld name="Custom Layout">
     <p:spTree>
@@ -3825,7 +4199,7 @@
 </p:sldLayout>
 </file>
 
-<file path=ppt/slideLayouts/slideLayout12.xml><?xml version="1.0" encoding="utf-8"?>
+<file path=ppt/slideLayouts/slideLayout13.xml><?xml version="1.0" encoding="utf-8"?>
 <p:sldLayout xmlns:a="http://schemas.openxmlformats.org/drawingml/2006/main" xmlns:r="http://schemas.openxmlformats.org/officeDocument/2006/relationships" xmlns:p="http://schemas.openxmlformats.org/presentationml/2006/main" preserve="1" userDrawn="1">
   <p:cSld name="Black Notes slide Layout">
     <p:bg bwMode="black">
@@ -4154,7 +4528,7 @@
 </p:sldLayout>
 </file>
 
-<file path=ppt/slideLayouts/slideLayout13.xml><?xml version="1.0" encoding="utf-8"?>
+<file path=ppt/slideLayouts/slideLayout14.xml><?xml version="1.0" encoding="utf-8"?>
 <p:sldLayout xmlns:a="http://schemas.openxmlformats.org/drawingml/2006/main" xmlns:r="http://schemas.openxmlformats.org/officeDocument/2006/relationships" xmlns:p="http://schemas.openxmlformats.org/presentationml/2006/main" preserve="1" userDrawn="1">
   <p:cSld name="Steps">
     <p:spTree>
@@ -5603,7 +5977,7 @@
 </p:sldLayout>
 </file>
 
-<file path=ppt/slideLayouts/slideLayout14.xml><?xml version="1.0" encoding="utf-8"?>
+<file path=ppt/slideLayouts/slideLayout15.xml><?xml version="1.0" encoding="utf-8"?>
 <p:sldLayout xmlns:a="http://schemas.openxmlformats.org/drawingml/2006/main" xmlns:r="http://schemas.openxmlformats.org/officeDocument/2006/relationships" xmlns:p="http://schemas.openxmlformats.org/presentationml/2006/main" preserve="1" userDrawn="1">
   <p:cSld name="Section Header">
     <p:spTree>
@@ -5789,7 +6163,7 @@
 </p:sldLayout>
 </file>
 
-<file path=ppt/slideLayouts/slideLayout15.xml><?xml version="1.0" encoding="utf-8"?>
+<file path=ppt/slideLayouts/slideLayout16.xml><?xml version="1.0" encoding="utf-8"?>
 <p:sldLayout xmlns:a="http://schemas.openxmlformats.org/drawingml/2006/main" xmlns:r="http://schemas.openxmlformats.org/officeDocument/2006/relationships" xmlns:p="http://schemas.openxmlformats.org/presentationml/2006/main" preserve="1" userDrawn="1">
   <p:cSld name="Two Content">
     <p:spTree>
@@ -6072,7 +6446,7 @@
 </p:sldLayout>
 </file>
 
-<file path=ppt/slideLayouts/slideLayout16.xml><?xml version="1.0" encoding="utf-8"?>
+<file path=ppt/slideLayouts/slideLayout17.xml><?xml version="1.0" encoding="utf-8"?>
 <p:sldLayout xmlns:a="http://schemas.openxmlformats.org/drawingml/2006/main" xmlns:r="http://schemas.openxmlformats.org/officeDocument/2006/relationships" xmlns:p="http://schemas.openxmlformats.org/presentationml/2006/main" preserve="1" userDrawn="1">
   <p:cSld name="Comparison">
     <p:spTree>
@@ -6501,7 +6875,7 @@
 </p:sldLayout>
 </file>
 
-<file path=ppt/slideLayouts/slideLayout17.xml><?xml version="1.0" encoding="utf-8"?>
+<file path=ppt/slideLayouts/slideLayout18.xml><?xml version="1.0" encoding="utf-8"?>
 <p:sldLayout xmlns:a="http://schemas.openxmlformats.org/drawingml/2006/main" xmlns:r="http://schemas.openxmlformats.org/officeDocument/2006/relationships" xmlns:p="http://schemas.openxmlformats.org/presentationml/2006/main" preserve="1" userDrawn="1">
   <p:cSld name="Blank">
     <p:spTree>
@@ -6591,7 +6965,7 @@
 </p:sldLayout>
 </file>
 
-<file path=ppt/slideLayouts/slideLayout18.xml><?xml version="1.0" encoding="utf-8"?>
+<file path=ppt/slideLayouts/slideLayout19.xml><?xml version="1.0" encoding="utf-8"?>
 <p:sldLayout xmlns:a="http://schemas.openxmlformats.org/drawingml/2006/main" xmlns:r="http://schemas.openxmlformats.org/officeDocument/2006/relationships" xmlns:p="http://schemas.openxmlformats.org/presentationml/2006/main" preserve="1" userDrawn="1">
   <p:cSld name="Content with Caption">
     <p:spTree>
@@ -7007,7 +7381,309 @@
 </p:sldLayout>
 </file>
 
-<file path=ppt/slideLayouts/slideLayout19.xml><?xml version="1.0" encoding="utf-8"?>
+<file path=ppt/slideLayouts/slideLayout2.xml><?xml version="1.0" encoding="utf-8"?>
+<p:sldLayout xmlns:a="http://schemas.openxmlformats.org/drawingml/2006/main" xmlns:r="http://schemas.openxmlformats.org/officeDocument/2006/relationships" xmlns:p="http://schemas.openxmlformats.org/presentationml/2006/main" showMasterSp="0" preserve="1" userDrawn="1">
+  <p:cSld name="Title Slide">
+    <p:bg>
+      <p:bgPr>
+        <a:solidFill>
+          <a:srgbClr val="0070C0"/>
+        </a:solidFill>
+        <a:effectLst/>
+      </p:bgPr>
+    </p:bg>
+    <p:spTree>
+      <p:nvGrpSpPr>
+        <p:cNvPr id="1" name=""/>
+        <p:cNvGrpSpPr/>
+        <p:nvPr/>
+      </p:nvGrpSpPr>
+      <p:grpSpPr>
+        <a:xfrm>
+          <a:off x="0" y="0"/>
+          <a:ext cx="0" cy="0"/>
+          <a:chOff x="0" y="0"/>
+          <a:chExt cx="0" cy="0"/>
+        </a:xfrm>
+      </p:grpSpPr>
+      <p:sp>
+        <p:nvSpPr>
+          <p:cNvPr id="726019" name="Rectangle 3"/>
+          <p:cNvSpPr>
+            <a:spLocks noGrp="1" noChangeArrowheads="1"/>
+          </p:cNvSpPr>
+          <p:nvPr>
+            <p:ph type="ctrTitle" sz="quarter" hasCustomPrompt="1"/>
+          </p:nvPr>
+        </p:nvSpPr>
+        <p:spPr>
+          <a:xfrm>
+            <a:off x="597160" y="508962"/>
+            <a:ext cx="8379200" cy="1011928"/>
+          </a:xfrm>
+          <a:solidFill>
+            <a:srgbClr val="3399FF"/>
+          </a:solidFill>
+          <a:ln algn="ctr"/>
+        </p:spPr>
+        <p:txBody>
+          <a:bodyPr wrap="square" tIns="0" rIns="0" bIns="0" anchor="t" anchorCtr="0">
+            <a:noAutofit/>
+          </a:bodyPr>
+          <a:lstStyle>
+            <a:lvl1pPr algn="l">
+              <a:spcBef>
+                <a:spcPct val="60000"/>
+              </a:spcBef>
+              <a:buClr>
+                <a:schemeClr val="hlink"/>
+              </a:buClr>
+              <a:buSzPct val="90000"/>
+              <a:buFontTx/>
+              <a:buNone/>
+              <a:defRPr sz="3800" baseline="0">
+                <a:solidFill>
+                  <a:schemeClr val="bg1"/>
+                </a:solidFill>
+                <a:latin typeface="Segoe UI" pitchFamily="34" charset="0"/>
+                <a:ea typeface="Segoe UI" pitchFamily="34" charset="0"/>
+                <a:cs typeface="Segoe UI" pitchFamily="34" charset="0"/>
+              </a:defRPr>
+            </a:lvl1pPr>
+          </a:lstStyle>
+          <a:p>
+            <a:r>
+              <a:rPr lang="en-US" dirty="0"/>
+              <a:t>Topic</a:t>
+            </a:r>
+          </a:p>
+        </p:txBody>
+      </p:sp>
+      <p:sp>
+        <p:nvSpPr>
+          <p:cNvPr id="726020" name="Rectangle 4"/>
+          <p:cNvSpPr>
+            <a:spLocks noGrp="1" noChangeArrowheads="1"/>
+          </p:cNvSpPr>
+          <p:nvPr>
+            <p:ph type="subTitle" sz="quarter" idx="1" hasCustomPrompt="1"/>
+          </p:nvPr>
+        </p:nvSpPr>
+        <p:spPr>
+          <a:xfrm>
+            <a:off x="3685592" y="2110581"/>
+            <a:ext cx="5290768" cy="3722293"/>
+          </a:xfrm>
+        </p:spPr>
+        <p:txBody>
+          <a:bodyPr lIns="91440" tIns="45720" rIns="91440" bIns="45720"/>
+          <a:lstStyle>
+            <a:lvl1pPr marL="285750" indent="-285750" algn="l">
+              <a:lnSpc>
+                <a:spcPct val="95000"/>
+              </a:lnSpc>
+              <a:spcBef>
+                <a:spcPct val="60000"/>
+              </a:spcBef>
+              <a:buClr>
+                <a:schemeClr val="bg1"/>
+              </a:buClr>
+              <a:buFont typeface="Wingdings" panose="05000000000000000000" pitchFamily="2" charset="2"/>
+              <a:buChar char="Ø"/>
+              <a:defRPr sz="1800">
+                <a:solidFill>
+                  <a:schemeClr val="bg1"/>
+                </a:solidFill>
+                <a:latin typeface="Segoe UI" pitchFamily="34" charset="0"/>
+                <a:ea typeface="Segoe UI" pitchFamily="34" charset="0"/>
+                <a:cs typeface="Segoe UI" pitchFamily="34" charset="0"/>
+              </a:defRPr>
+            </a:lvl1pPr>
+          </a:lstStyle>
+          <a:p>
+            <a:r>
+              <a:rPr lang="en-US" dirty="0"/>
+              <a:t>Topic Description</a:t>
+            </a:r>
+          </a:p>
+          <a:p>
+            <a:endParaRPr lang="en-US" dirty="0"/>
+          </a:p>
+        </p:txBody>
+      </p:sp>
+      <p:sp>
+        <p:nvSpPr>
+          <p:cNvPr id="7" name="Text Placeholder 6">
+            <a:extLst>
+              <a:ext uri="{FF2B5EF4-FFF2-40B4-BE49-F238E27FC236}">
+                <a16:creationId xmlns:a16="http://schemas.microsoft.com/office/drawing/2014/main" id="{05E1913A-614D-4F38-AB69-5348B29CCD5D}"/>
+              </a:ext>
+            </a:extLst>
+          </p:cNvPr>
+          <p:cNvSpPr>
+            <a:spLocks noGrp="1"/>
+          </p:cNvSpPr>
+          <p:nvPr>
+            <p:ph type="body" sz="quarter" idx="10"/>
+          </p:nvPr>
+        </p:nvSpPr>
+        <p:spPr>
+          <a:xfrm>
+            <a:off x="261938" y="2756542"/>
+            <a:ext cx="3241675" cy="2851150"/>
+          </a:xfrm>
+        </p:spPr>
+        <p:txBody>
+          <a:bodyPr/>
+          <a:lstStyle>
+            <a:lvl1pPr>
+              <a:defRPr sz="2000">
+                <a:solidFill>
+                  <a:schemeClr val="bg1"/>
+                </a:solidFill>
+              </a:defRPr>
+            </a:lvl1pPr>
+          </a:lstStyle>
+          <a:p>
+            <a:pPr lvl="0"/>
+            <a:r>
+              <a:rPr lang="en-US" dirty="0"/>
+              <a:t>Edit Master text</a:t>
+            </a:r>
+          </a:p>
+        </p:txBody>
+      </p:sp>
+      <p:sp>
+        <p:nvSpPr>
+          <p:cNvPr id="11" name="Text Placeholder 10">
+            <a:extLst>
+              <a:ext uri="{FF2B5EF4-FFF2-40B4-BE49-F238E27FC236}">
+                <a16:creationId xmlns:a16="http://schemas.microsoft.com/office/drawing/2014/main" id="{6A2AE784-2CA5-4194-B30C-8D50C676A59B}"/>
+              </a:ext>
+            </a:extLst>
+          </p:cNvPr>
+          <p:cNvSpPr>
+            <a:spLocks noGrp="1"/>
+          </p:cNvSpPr>
+          <p:nvPr>
+            <p:ph type="body" sz="quarter" idx="11" hasCustomPrompt="1"/>
+          </p:nvPr>
+        </p:nvSpPr>
+        <p:spPr>
+          <a:xfrm>
+            <a:off x="261938" y="6018240"/>
+            <a:ext cx="8714421" cy="391882"/>
+          </a:xfrm>
+          <a:solidFill>
+            <a:schemeClr val="bg1"/>
+          </a:solidFill>
+        </p:spPr>
+        <p:txBody>
+          <a:bodyPr/>
+          <a:lstStyle>
+            <a:lvl1pPr marL="0" indent="0">
+              <a:buNone/>
+              <a:defRPr sz="1400">
+                <a:solidFill>
+                  <a:srgbClr val="3399FF"/>
+                </a:solidFill>
+              </a:defRPr>
+            </a:lvl1pPr>
+            <a:lvl2pPr>
+              <a:defRPr>
+                <a:solidFill>
+                  <a:schemeClr val="bg1">
+                    <a:lumMod val="75000"/>
+                  </a:schemeClr>
+                </a:solidFill>
+              </a:defRPr>
+            </a:lvl2pPr>
+            <a:lvl3pPr>
+              <a:defRPr>
+                <a:solidFill>
+                  <a:schemeClr val="bg1">
+                    <a:lumMod val="75000"/>
+                  </a:schemeClr>
+                </a:solidFill>
+              </a:defRPr>
+            </a:lvl3pPr>
+            <a:lvl4pPr>
+              <a:defRPr>
+                <a:solidFill>
+                  <a:schemeClr val="bg1">
+                    <a:lumMod val="75000"/>
+                  </a:schemeClr>
+                </a:solidFill>
+              </a:defRPr>
+            </a:lvl4pPr>
+            <a:lvl5pPr>
+              <a:defRPr>
+                <a:solidFill>
+                  <a:schemeClr val="bg1">
+                    <a:lumMod val="75000"/>
+                  </a:schemeClr>
+                </a:solidFill>
+              </a:defRPr>
+            </a:lvl5pPr>
+          </a:lstStyle>
+          <a:p>
+            <a:pPr lvl="0"/>
+            <a:r>
+              <a:rPr lang="en-US" dirty="0"/>
+              <a:t>URL</a:t>
+            </a:r>
+          </a:p>
+        </p:txBody>
+      </p:sp>
+      <p:sp>
+        <p:nvSpPr>
+          <p:cNvPr id="12" name="TextBox 11">
+            <a:extLst>
+              <a:ext uri="{FF2B5EF4-FFF2-40B4-BE49-F238E27FC236}">
+                <a16:creationId xmlns:a16="http://schemas.microsoft.com/office/drawing/2014/main" id="{E1C05B86-1160-4370-A04A-9508198B968C}"/>
+              </a:ext>
+            </a:extLst>
+          </p:cNvPr>
+          <p:cNvSpPr txBox="1"/>
+          <p:nvPr userDrawn="1"/>
+        </p:nvSpPr>
+        <p:spPr>
+          <a:xfrm>
+            <a:off x="6662057" y="6512893"/>
+            <a:ext cx="2388641" cy="307777"/>
+          </a:xfrm>
+          <a:prstGeom prst="rect">
+            <a:avLst/>
+          </a:prstGeom>
+          <a:noFill/>
+        </p:spPr>
+        <p:txBody>
+          <a:bodyPr wrap="square" rtlCol="0">
+            <a:spAutoFit/>
+          </a:bodyPr>
+          <a:lstStyle/>
+          <a:p>
+            <a:r>
+              <a:rPr lang="en-US" sz="1400" dirty="0"/>
+              <a:t>#70-533 @ITProGuru</a:t>
+            </a:r>
+          </a:p>
+        </p:txBody>
+      </p:sp>
+    </p:spTree>
+    <p:extLst>
+      <p:ext uri="{BB962C8B-B14F-4D97-AF65-F5344CB8AC3E}">
+        <p14:creationId xmlns:p14="http://schemas.microsoft.com/office/powerpoint/2010/main" val="3414292977"/>
+      </p:ext>
+    </p:extLst>
+  </p:cSld>
+  <p:clrMapOvr>
+    <a:masterClrMapping/>
+  </p:clrMapOvr>
+</p:sldLayout>
+</file>
+
+<file path=ppt/slideLayouts/slideLayout20.xml><?xml version="1.0" encoding="utf-8"?>
 <p:sldLayout xmlns:a="http://schemas.openxmlformats.org/drawingml/2006/main" xmlns:r="http://schemas.openxmlformats.org/officeDocument/2006/relationships" xmlns:p="http://schemas.openxmlformats.org/presentationml/2006/main" preserve="1" userDrawn="1">
   <p:cSld name="Picture with Caption">
     <p:spTree>
@@ -7258,170 +7934,7 @@
 </p:sldLayout>
 </file>
 
-<file path=ppt/slideLayouts/slideLayout2.xml><?xml version="1.0" encoding="utf-8"?>
-<p:sldLayout xmlns:a="http://schemas.openxmlformats.org/drawingml/2006/main" xmlns:r="http://schemas.openxmlformats.org/officeDocument/2006/relationships" xmlns:p="http://schemas.openxmlformats.org/presentationml/2006/main" preserve="1" userDrawn="1">
-  <p:cSld name="Title and Text">
-    <p:spTree>
-      <p:nvGrpSpPr>
-        <p:cNvPr id="1" name=""/>
-        <p:cNvGrpSpPr/>
-        <p:nvPr/>
-      </p:nvGrpSpPr>
-      <p:grpSpPr>
-        <a:xfrm>
-          <a:off x="0" y="0"/>
-          <a:ext cx="0" cy="0"/>
-          <a:chOff x="0" y="0"/>
-          <a:chExt cx="0" cy="0"/>
-        </a:xfrm>
-      </p:grpSpPr>
-      <p:sp>
-        <p:nvSpPr>
-          <p:cNvPr id="2" name="Title 1"/>
-          <p:cNvSpPr>
-            <a:spLocks noGrp="1"/>
-          </p:cNvSpPr>
-          <p:nvPr>
-            <p:ph type="title"/>
-          </p:nvPr>
-        </p:nvSpPr>
-        <p:spPr/>
-        <p:txBody>
-          <a:bodyPr/>
-          <a:lstStyle/>
-          <a:p>
-            <a:r>
-              <a:rPr lang="en-US"/>
-              <a:t>Click to edit Master title style</a:t>
-            </a:r>
-          </a:p>
-        </p:txBody>
-      </p:sp>
-      <p:sp>
-        <p:nvSpPr>
-          <p:cNvPr id="3" name="Text Placeholder 2"/>
-          <p:cNvSpPr>
-            <a:spLocks noGrp="1"/>
-          </p:cNvSpPr>
-          <p:nvPr>
-            <p:ph type="body" idx="1"/>
-          </p:nvPr>
-        </p:nvSpPr>
-        <p:spPr/>
-        <p:txBody>
-          <a:bodyPr/>
-          <a:lstStyle/>
-          <a:p>
-            <a:pPr lvl="0"/>
-            <a:r>
-              <a:rPr lang="en-US" dirty="0"/>
-              <a:t>Edit Master text styles</a:t>
-            </a:r>
-          </a:p>
-          <a:p>
-            <a:pPr lvl="1"/>
-            <a:r>
-              <a:rPr lang="en-US" dirty="0"/>
-              <a:t>Second level</a:t>
-            </a:r>
-          </a:p>
-          <a:p>
-            <a:pPr lvl="2"/>
-            <a:r>
-              <a:rPr lang="en-US" dirty="0"/>
-              <a:t>Third level</a:t>
-            </a:r>
-          </a:p>
-          <a:p>
-            <a:pPr lvl="3"/>
-            <a:r>
-              <a:rPr lang="en-US" dirty="0"/>
-              <a:t>Fourth level</a:t>
-            </a:r>
-          </a:p>
-          <a:p>
-            <a:pPr lvl="4"/>
-            <a:r>
-              <a:rPr lang="en-US" dirty="0"/>
-              <a:t>Fifth level</a:t>
-            </a:r>
-          </a:p>
-        </p:txBody>
-      </p:sp>
-      <p:sp>
-        <p:nvSpPr>
-          <p:cNvPr id="4" name="Text Placeholder 4">
-            <a:extLst>
-              <a:ext uri="{FF2B5EF4-FFF2-40B4-BE49-F238E27FC236}">
-                <a16:creationId xmlns:a16="http://schemas.microsoft.com/office/drawing/2014/main" id="{1E308FE5-C3CD-4C2B-84FD-DAE006C3200F}"/>
-              </a:ext>
-            </a:extLst>
-          </p:cNvPr>
-          <p:cNvSpPr>
-            <a:spLocks noGrp="1"/>
-          </p:cNvSpPr>
-          <p:nvPr>
-            <p:ph type="body" sz="quarter" idx="10" hasCustomPrompt="1"/>
-          </p:nvPr>
-        </p:nvSpPr>
-        <p:spPr>
-          <a:xfrm>
-            <a:off x="261188" y="6307137"/>
-            <a:ext cx="8574837" cy="410903"/>
-          </a:xfrm>
-        </p:spPr>
-        <p:txBody>
-          <a:bodyPr/>
-          <a:lstStyle>
-            <a:lvl1pPr marL="0" indent="0">
-              <a:buFont typeface="Arial" panose="020B0604020202020204" pitchFamily="34" charset="0"/>
-              <a:buNone/>
-              <a:defRPr sz="1400"/>
-            </a:lvl1pPr>
-            <a:lvl2pPr marL="574675" indent="-285750">
-              <a:buFont typeface="Arial" panose="020B0604020202020204" pitchFamily="34" charset="0"/>
-              <a:buChar char="•"/>
-              <a:defRPr sz="1600"/>
-            </a:lvl2pPr>
-            <a:lvl3pPr marL="966787" indent="-285750">
-              <a:buFont typeface="Arial" panose="020B0604020202020204" pitchFamily="34" charset="0"/>
-              <a:buChar char="•"/>
-              <a:defRPr sz="1400"/>
-            </a:lvl3pPr>
-            <a:lvl4pPr marL="1260475" indent="-171450">
-              <a:buFont typeface="Arial" panose="020B0604020202020204" pitchFamily="34" charset="0"/>
-              <a:buChar char="•"/>
-              <a:defRPr sz="1200"/>
-            </a:lvl4pPr>
-            <a:lvl5pPr marL="1547813" indent="-171450">
-              <a:buFont typeface="Arial" panose="020B0604020202020204" pitchFamily="34" charset="0"/>
-              <a:buChar char="•"/>
-              <a:defRPr sz="1200"/>
-            </a:lvl5pPr>
-          </a:lstStyle>
-          <a:p>
-            <a:pPr lvl="0"/>
-            <a:r>
-              <a:rPr lang="en-US" dirty="0"/>
-              <a:t>Edit URL</a:t>
-            </a:r>
-          </a:p>
-        </p:txBody>
-      </p:sp>
-    </p:spTree>
-    <p:extLst>
-      <p:ext uri="{BB962C8B-B14F-4D97-AF65-F5344CB8AC3E}">
-        <p14:creationId xmlns:p14="http://schemas.microsoft.com/office/powerpoint/2010/main" val="2569415734"/>
-      </p:ext>
-    </p:extLst>
-  </p:cSld>
-  <p:clrMapOvr>
-    <a:masterClrMapping/>
-  </p:clrMapOvr>
-</p:sldLayout>
-</file>
-
-<file path=ppt/slideLayouts/slideLayout20.xml><?xml version="1.0" encoding="utf-8"?>
+<file path=ppt/slideLayouts/slideLayout21.xml><?xml version="1.0" encoding="utf-8"?>
 <p:sldLayout xmlns:a="http://schemas.openxmlformats.org/drawingml/2006/main" xmlns:r="http://schemas.openxmlformats.org/officeDocument/2006/relationships" xmlns:p="http://schemas.openxmlformats.org/presentationml/2006/main" type="vertTx" preserve="1">
   <p:cSld name="Title and Vertical Text">
     <p:spTree>
@@ -7525,7 +8038,7 @@
 </p:sldLayout>
 </file>
 
-<file path=ppt/slideLayouts/slideLayout21.xml><?xml version="1.0" encoding="utf-8"?>
+<file path=ppt/slideLayouts/slideLayout22.xml><?xml version="1.0" encoding="utf-8"?>
 <p:sldLayout xmlns:a="http://schemas.openxmlformats.org/drawingml/2006/main" xmlns:r="http://schemas.openxmlformats.org/officeDocument/2006/relationships" xmlns:p="http://schemas.openxmlformats.org/presentationml/2006/main" type="vertTitleAndTx" preserve="1">
   <p:cSld name="Vertical Title and Text">
     <p:spTree>
@@ -7647,7 +8160,7 @@
 </p:sldLayout>
 </file>
 
-<file path=ppt/slideLayouts/slideLayout22.xml><?xml version="1.0" encoding="utf-8"?>
+<file path=ppt/slideLayouts/slideLayout23.xml><?xml version="1.0" encoding="utf-8"?>
 <p:sldLayout xmlns:a="http://schemas.openxmlformats.org/drawingml/2006/main" xmlns:r="http://schemas.openxmlformats.org/officeDocument/2006/relationships" xmlns:p="http://schemas.openxmlformats.org/presentationml/2006/main" userDrawn="1">
   <p:cSld name="28pt Slide Title ">
     <p:spTree>
@@ -7935,7 +8448,7 @@
 
 <file path=ppt/slideLayouts/slideLayout3.xml><?xml version="1.0" encoding="utf-8"?>
 <p:sldLayout xmlns:a="http://schemas.openxmlformats.org/drawingml/2006/main" xmlns:r="http://schemas.openxmlformats.org/officeDocument/2006/relationships" xmlns:p="http://schemas.openxmlformats.org/presentationml/2006/main" preserve="1" userDrawn="1">
-  <p:cSld name="Title Only">
+  <p:cSld name="Title and Text">
     <p:spTree>
       <p:nvGrpSpPr>
         <p:cNvPr id="1" name=""/>
@@ -7966,7 +8479,7 @@
           <a:lstStyle/>
           <a:p>
             <a:r>
-              <a:rPr lang="en-US"/>
+              <a:rPr lang="en-US" dirty="0"/>
               <a:t>Click to edit Master title style</a:t>
             </a:r>
           </a:p>
@@ -7974,10 +8487,61 @@
       </p:sp>
       <p:sp>
         <p:nvSpPr>
-          <p:cNvPr id="3" name="Text Placeholder 4">
+          <p:cNvPr id="3" name="Text Placeholder 2"/>
+          <p:cNvSpPr>
+            <a:spLocks noGrp="1"/>
+          </p:cNvSpPr>
+          <p:nvPr>
+            <p:ph type="body" idx="1"/>
+          </p:nvPr>
+        </p:nvSpPr>
+        <p:spPr/>
+        <p:txBody>
+          <a:bodyPr/>
+          <a:lstStyle/>
+          <a:p>
+            <a:pPr lvl="0"/>
+            <a:r>
+              <a:rPr lang="en-US" dirty="0"/>
+              <a:t>Edit Master text styles</a:t>
+            </a:r>
+          </a:p>
+          <a:p>
+            <a:pPr lvl="1"/>
+            <a:r>
+              <a:rPr lang="en-US" dirty="0"/>
+              <a:t>Second level</a:t>
+            </a:r>
+          </a:p>
+          <a:p>
+            <a:pPr lvl="2"/>
+            <a:r>
+              <a:rPr lang="en-US" dirty="0"/>
+              <a:t>Third level</a:t>
+            </a:r>
+          </a:p>
+          <a:p>
+            <a:pPr lvl="3"/>
+            <a:r>
+              <a:rPr lang="en-US" dirty="0"/>
+              <a:t>Fourth level</a:t>
+            </a:r>
+          </a:p>
+          <a:p>
+            <a:pPr lvl="4"/>
+            <a:r>
+              <a:rPr lang="en-US" dirty="0"/>
+              <a:t>Fifth level</a:t>
+            </a:r>
+          </a:p>
+        </p:txBody>
+      </p:sp>
+      <p:sp>
+        <p:nvSpPr>
+          <p:cNvPr id="4" name="Text Placeholder 4">
             <a:extLst>
               <a:ext uri="{FF2B5EF4-FFF2-40B4-BE49-F238E27FC236}">
-                <a16:creationId xmlns:a16="http://schemas.microsoft.com/office/drawing/2014/main" id="{0FDE037B-5AC3-4803-B046-88D8FAB98146}"/>
+                <a16:creationId xmlns:a16="http://schemas.microsoft.com/office/drawing/2014/main" id="{1E308FE5-C3CD-4C2B-84FD-DAE006C3200F}"/>
               </a:ext>
             </a:extLst>
           </p:cNvPr>
@@ -8035,6 +8599,118 @@
     </p:spTree>
     <p:extLst>
       <p:ext uri="{BB962C8B-B14F-4D97-AF65-F5344CB8AC3E}">
+        <p14:creationId xmlns:p14="http://schemas.microsoft.com/office/powerpoint/2010/main" val="2569415734"/>
+      </p:ext>
+    </p:extLst>
+  </p:cSld>
+  <p:clrMapOvr>
+    <a:masterClrMapping/>
+  </p:clrMapOvr>
+</p:sldLayout>
+</file>
+
+<file path=ppt/slideLayouts/slideLayout4.xml><?xml version="1.0" encoding="utf-8"?>
+<p:sldLayout xmlns:a="http://schemas.openxmlformats.org/drawingml/2006/main" xmlns:r="http://schemas.openxmlformats.org/officeDocument/2006/relationships" xmlns:p="http://schemas.openxmlformats.org/presentationml/2006/main" preserve="1" userDrawn="1">
+  <p:cSld name="Title Only">
+    <p:spTree>
+      <p:nvGrpSpPr>
+        <p:cNvPr id="1" name=""/>
+        <p:cNvGrpSpPr/>
+        <p:nvPr/>
+      </p:nvGrpSpPr>
+      <p:grpSpPr>
+        <a:xfrm>
+          <a:off x="0" y="0"/>
+          <a:ext cx="0" cy="0"/>
+          <a:chOff x="0" y="0"/>
+          <a:chExt cx="0" cy="0"/>
+        </a:xfrm>
+      </p:grpSpPr>
+      <p:sp>
+        <p:nvSpPr>
+          <p:cNvPr id="2" name="Title 1"/>
+          <p:cNvSpPr>
+            <a:spLocks noGrp="1"/>
+          </p:cNvSpPr>
+          <p:nvPr>
+            <p:ph type="title"/>
+          </p:nvPr>
+        </p:nvSpPr>
+        <p:spPr/>
+        <p:txBody>
+          <a:bodyPr/>
+          <a:lstStyle/>
+          <a:p>
+            <a:r>
+              <a:rPr lang="en-US"/>
+              <a:t>Click to edit Master title style</a:t>
+            </a:r>
+          </a:p>
+        </p:txBody>
+      </p:sp>
+      <p:sp>
+        <p:nvSpPr>
+          <p:cNvPr id="3" name="Text Placeholder 4">
+            <a:extLst>
+              <a:ext uri="{FF2B5EF4-FFF2-40B4-BE49-F238E27FC236}">
+                <a16:creationId xmlns:a16="http://schemas.microsoft.com/office/drawing/2014/main" id="{0FDE037B-5AC3-4803-B046-88D8FAB98146}"/>
+              </a:ext>
+            </a:extLst>
+          </p:cNvPr>
+          <p:cNvSpPr>
+            <a:spLocks noGrp="1"/>
+          </p:cNvSpPr>
+          <p:nvPr>
+            <p:ph type="body" sz="quarter" idx="10" hasCustomPrompt="1"/>
+          </p:nvPr>
+        </p:nvSpPr>
+        <p:spPr>
+          <a:xfrm>
+            <a:off x="261188" y="6307137"/>
+            <a:ext cx="8574837" cy="410903"/>
+          </a:xfrm>
+        </p:spPr>
+        <p:txBody>
+          <a:bodyPr/>
+          <a:lstStyle>
+            <a:lvl1pPr marL="0" indent="0">
+              <a:buFont typeface="Arial" panose="020B0604020202020204" pitchFamily="34" charset="0"/>
+              <a:buNone/>
+              <a:defRPr sz="1400"/>
+            </a:lvl1pPr>
+            <a:lvl2pPr marL="574675" indent="-285750">
+              <a:buFont typeface="Arial" panose="020B0604020202020204" pitchFamily="34" charset="0"/>
+              <a:buChar char="•"/>
+              <a:defRPr sz="1600"/>
+            </a:lvl2pPr>
+            <a:lvl3pPr marL="966787" indent="-285750">
+              <a:buFont typeface="Arial" panose="020B0604020202020204" pitchFamily="34" charset="0"/>
+              <a:buChar char="•"/>
+              <a:defRPr sz="1400"/>
+            </a:lvl3pPr>
+            <a:lvl4pPr marL="1260475" indent="-171450">
+              <a:buFont typeface="Arial" panose="020B0604020202020204" pitchFamily="34" charset="0"/>
+              <a:buChar char="•"/>
+              <a:defRPr sz="1200"/>
+            </a:lvl4pPr>
+            <a:lvl5pPr marL="1547813" indent="-171450">
+              <a:buFont typeface="Arial" panose="020B0604020202020204" pitchFamily="34" charset="0"/>
+              <a:buChar char="•"/>
+              <a:defRPr sz="1200"/>
+            </a:lvl5pPr>
+          </a:lstStyle>
+          <a:p>
+            <a:pPr lvl="0"/>
+            <a:r>
+              <a:rPr lang="en-US" dirty="0"/>
+              <a:t>Edit URL</a:t>
+            </a:r>
+          </a:p>
+        </p:txBody>
+      </p:sp>
+    </p:spTree>
+    <p:extLst>
+      <p:ext uri="{BB962C8B-B14F-4D97-AF65-F5344CB8AC3E}">
         <p14:creationId xmlns:p14="http://schemas.microsoft.com/office/powerpoint/2010/main" val="386383214"/>
       </p:ext>
     </p:extLst>
@@ -8045,7 +8721,7 @@
 </p:sldLayout>
 </file>
 
-<file path=ppt/slideLayouts/slideLayout4.xml><?xml version="1.0" encoding="utf-8"?>
+<file path=ppt/slideLayouts/slideLayout5.xml><?xml version="1.0" encoding="utf-8"?>
 <p:sldLayout xmlns:a="http://schemas.openxmlformats.org/drawingml/2006/main" xmlns:r="http://schemas.openxmlformats.org/officeDocument/2006/relationships" xmlns:p="http://schemas.openxmlformats.org/presentationml/2006/main" preserve="1" userDrawn="1">
   <p:cSld name="Exam Tip">
     <p:spTree>
@@ -8385,7 +9061,7 @@
 </p:sldLayout>
 </file>
 
-<file path=ppt/slideLayouts/slideLayout5.xml><?xml version="1.0" encoding="utf-8"?>
+<file path=ppt/slideLayouts/slideLayout6.xml><?xml version="1.0" encoding="utf-8"?>
 <p:sldLayout xmlns:a="http://schemas.openxmlformats.org/drawingml/2006/main" xmlns:r="http://schemas.openxmlformats.org/officeDocument/2006/relationships" xmlns:p="http://schemas.openxmlformats.org/presentationml/2006/main" preserve="1" userDrawn="1">
   <p:cSld name="Case Study Question">
     <p:spTree>
@@ -8627,7 +9303,7 @@
 </p:sldLayout>
 </file>
 
-<file path=ppt/slideLayouts/slideLayout6.xml><?xml version="1.0" encoding="utf-8"?>
+<file path=ppt/slideLayouts/slideLayout7.xml><?xml version="1.0" encoding="utf-8"?>
 <p:sldLayout xmlns:a="http://schemas.openxmlformats.org/drawingml/2006/main" xmlns:r="http://schemas.openxmlformats.org/officeDocument/2006/relationships" xmlns:p="http://schemas.openxmlformats.org/presentationml/2006/main" preserve="1" userDrawn="1">
   <p:cSld name="Question">
     <p:spTree>
@@ -8659,7 +9335,7 @@
         <p:spPr>
           <a:xfrm>
             <a:off x="0" y="0"/>
-            <a:ext cx="9144000" cy="1586204"/>
+            <a:ext cx="9144000" cy="2008094"/>
           </a:xfrm>
           <a:prstGeom prst="rect">
             <a:avLst/>
@@ -8708,21 +9384,25 @@
         </p:nvSpPr>
         <p:spPr>
           <a:xfrm>
-            <a:off x="93306" y="-3"/>
-            <a:ext cx="8836089" cy="1511562"/>
+            <a:off x="93306" y="-4"/>
+            <a:ext cx="8836089" cy="1824321"/>
           </a:xfrm>
         </p:spPr>
         <p:txBody>
           <a:bodyPr/>
           <a:lstStyle>
             <a:lvl1pPr>
-              <a:defRPr/>
+              <a:defRPr>
+                <a:solidFill>
+                  <a:schemeClr val="bg1"/>
+                </a:solidFill>
+              </a:defRPr>
             </a:lvl1pPr>
           </a:lstStyle>
           <a:p>
             <a:r>
               <a:rPr lang="en-US" dirty="0"/>
-              <a:t>Question….</a:t>
+              <a:t>Question…. This is a test</a:t>
             </a:r>
           </a:p>
         </p:txBody>
@@ -8739,8 +9419,8 @@
         </p:nvSpPr>
         <p:spPr>
           <a:xfrm>
-            <a:off x="261187" y="1698171"/>
-            <a:ext cx="8574837" cy="4497695"/>
+            <a:off x="261187" y="2057400"/>
+            <a:ext cx="8574837" cy="4138466"/>
           </a:xfrm>
         </p:spPr>
         <p:txBody>
@@ -8862,7 +9542,7 @@
 </p:sldLayout>
 </file>
 
-<file path=ppt/slideLayouts/slideLayout7.xml><?xml version="1.0" encoding="utf-8"?>
+<file path=ppt/slideLayouts/slideLayout8.xml><?xml version="1.0" encoding="utf-8"?>
 <p:sldLayout xmlns:a="http://schemas.openxmlformats.org/drawingml/2006/main" xmlns:r="http://schemas.openxmlformats.org/officeDocument/2006/relationships" xmlns:p="http://schemas.openxmlformats.org/presentationml/2006/main" preserve="1" userDrawn="1">
   <p:cSld name="Answer">
     <p:spTree>
@@ -8881,10 +9561,10 @@
       </p:grpSpPr>
       <p:sp>
         <p:nvSpPr>
-          <p:cNvPr id="6" name="Rectangle 5">
+          <p:cNvPr id="7" name="Rectangle 6">
             <a:extLst>
               <a:ext uri="{FF2B5EF4-FFF2-40B4-BE49-F238E27FC236}">
-                <a16:creationId xmlns:a16="http://schemas.microsoft.com/office/drawing/2014/main" id="{18074CDC-0128-42E8-B232-786D9C2CD277}"/>
+                <a16:creationId xmlns:a16="http://schemas.microsoft.com/office/drawing/2014/main" id="{E17D637C-ACFC-4A4F-854E-9FA928AAF434}"/>
               </a:ext>
             </a:extLst>
           </p:cNvPr>
@@ -8894,7 +9574,7 @@
         <p:spPr>
           <a:xfrm>
             <a:off x="0" y="0"/>
-            <a:ext cx="9144000" cy="1591408"/>
+            <a:ext cx="9144000" cy="2008094"/>
           </a:xfrm>
           <a:prstGeom prst="rect">
             <a:avLst/>
@@ -8944,14 +9624,18 @@
         <p:spPr>
           <a:xfrm>
             <a:off x="167054" y="-3"/>
-            <a:ext cx="8862646" cy="1485903"/>
+            <a:ext cx="8862646" cy="1931897"/>
           </a:xfrm>
         </p:spPr>
         <p:txBody>
           <a:bodyPr/>
           <a:lstStyle>
             <a:lvl1pPr>
-              <a:defRPr/>
+              <a:defRPr sz="2400">
+                <a:solidFill>
+                  <a:schemeClr val="bg1"/>
+                </a:solidFill>
+              </a:defRPr>
             </a:lvl1pPr>
           </a:lstStyle>
           <a:p>
@@ -8974,8 +9658,8 @@
         </p:nvSpPr>
         <p:spPr>
           <a:xfrm>
-            <a:off x="261187" y="1661746"/>
-            <a:ext cx="8574837" cy="4534120"/>
+            <a:off x="261187" y="2061882"/>
+            <a:ext cx="8574837" cy="4133984"/>
           </a:xfrm>
         </p:spPr>
         <p:txBody>
@@ -9097,7 +9781,7 @@
 </p:sldLayout>
 </file>
 
-<file path=ppt/slideLayouts/slideLayout8.xml><?xml version="1.0" encoding="utf-8"?>
+<file path=ppt/slideLayouts/slideLayout9.xml><?xml version="1.0" encoding="utf-8"?>
 <p:sldLayout xmlns:a="http://schemas.openxmlformats.org/drawingml/2006/main" xmlns:r="http://schemas.openxmlformats.org/officeDocument/2006/relationships" xmlns:p="http://schemas.openxmlformats.org/presentationml/2006/main" showMasterSp="0" preserve="1" userDrawn="1">
   <p:cSld name="Demo">
     <p:bg>
@@ -9444,309 +10128,6 @@
 </p:sldLayout>
 </file>
 
-<file path=ppt/slideLayouts/slideLayout9.xml><?xml version="1.0" encoding="utf-8"?>
-<p:sldLayout xmlns:a="http://schemas.openxmlformats.org/drawingml/2006/main" xmlns:r="http://schemas.openxmlformats.org/officeDocument/2006/relationships" xmlns:p="http://schemas.openxmlformats.org/presentationml/2006/main" preserve="1" userDrawn="1">
-  <p:cSld name="Lab">
-    <p:bg>
-      <p:bgPr>
-        <a:solidFill>
-          <a:schemeClr val="bg1"/>
-        </a:solidFill>
-        <a:effectLst/>
-      </p:bgPr>
-    </p:bg>
-    <p:spTree>
-      <p:nvGrpSpPr>
-        <p:cNvPr id="1" name=""/>
-        <p:cNvGrpSpPr/>
-        <p:nvPr/>
-      </p:nvGrpSpPr>
-      <p:grpSpPr>
-        <a:xfrm>
-          <a:off x="0" y="0"/>
-          <a:ext cx="0" cy="0"/>
-          <a:chOff x="0" y="0"/>
-          <a:chExt cx="0" cy="0"/>
-        </a:xfrm>
-      </p:grpSpPr>
-      <p:sp>
-        <p:nvSpPr>
-          <p:cNvPr id="6" name="Rectangle 5">
-            <a:extLst>
-              <a:ext uri="{FF2B5EF4-FFF2-40B4-BE49-F238E27FC236}">
-                <a16:creationId xmlns:a16="http://schemas.microsoft.com/office/drawing/2014/main" id="{855B8EEB-D399-4AF3-B7D1-E78E1898CC1F}"/>
-              </a:ext>
-            </a:extLst>
-          </p:cNvPr>
-          <p:cNvSpPr/>
-          <p:nvPr userDrawn="1"/>
-        </p:nvSpPr>
-        <p:spPr>
-          <a:xfrm>
-            <a:off x="0" y="0"/>
-            <a:ext cx="9144000" cy="1371600"/>
-          </a:xfrm>
-          <a:prstGeom prst="rect">
-            <a:avLst/>
-          </a:prstGeom>
-          <a:solidFill>
-            <a:srgbClr val="7030A0"/>
-          </a:solidFill>
-          <a:ln>
-            <a:noFill/>
-          </a:ln>
-        </p:spPr>
-        <p:style>
-          <a:lnRef idx="2">
-            <a:schemeClr val="accent1">
-              <a:shade val="50000"/>
-            </a:schemeClr>
-          </a:lnRef>
-          <a:fillRef idx="1">
-            <a:schemeClr val="accent1"/>
-          </a:fillRef>
-          <a:effectRef idx="0">
-            <a:schemeClr val="accent1"/>
-          </a:effectRef>
-          <a:fontRef idx="minor">
-            <a:schemeClr val="lt1"/>
-          </a:fontRef>
-        </p:style>
-        <p:txBody>
-          <a:bodyPr rtlCol="0" anchor="ctr"/>
-          <a:lstStyle/>
-          <a:p>
-            <a:pPr algn="ctr"/>
-            <a:endParaRPr lang="en-US" dirty="0"/>
-          </a:p>
-        </p:txBody>
-      </p:sp>
-      <p:sp>
-        <p:nvSpPr>
-          <p:cNvPr id="2" name="Title 1"/>
-          <p:cNvSpPr>
-            <a:spLocks noGrp="1"/>
-          </p:cNvSpPr>
-          <p:nvPr>
-            <p:ph type="title" hasCustomPrompt="1"/>
-          </p:nvPr>
-        </p:nvSpPr>
-        <p:spPr>
-          <a:xfrm>
-            <a:off x="1473233" y="1"/>
-            <a:ext cx="7511614" cy="1231901"/>
-          </a:xfrm>
-        </p:spPr>
-        <p:txBody>
-          <a:bodyPr/>
-          <a:lstStyle>
-            <a:lvl1pPr>
-              <a:defRPr/>
-            </a:lvl1pPr>
-          </a:lstStyle>
-          <a:p>
-            <a:r>
-              <a:rPr lang="en-US" dirty="0"/>
-              <a:t>Click to edit Lab title</a:t>
-            </a:r>
-          </a:p>
-        </p:txBody>
-      </p:sp>
-      <p:sp>
-        <p:nvSpPr>
-          <p:cNvPr id="3" name="Content Placeholder 2"/>
-          <p:cNvSpPr>
-            <a:spLocks noGrp="1"/>
-          </p:cNvSpPr>
-          <p:nvPr>
-            <p:ph idx="1" hasCustomPrompt="1"/>
-          </p:nvPr>
-        </p:nvSpPr>
-        <p:spPr>
-          <a:xfrm>
-            <a:off x="151194" y="1371600"/>
-            <a:ext cx="8833654" cy="4793789"/>
-          </a:xfrm>
-        </p:spPr>
-        <p:txBody>
-          <a:bodyPr>
-            <a:normAutofit/>
-          </a:bodyPr>
-          <a:lstStyle>
-            <a:lvl1pPr marL="514350" indent="-514350">
-              <a:buFont typeface="+mj-lt"/>
-              <a:buAutoNum type="arabicParenR"/>
-              <a:defRPr sz="2700"/>
-            </a:lvl1pPr>
-            <a:lvl2pPr marL="342900" indent="0">
-              <a:buFontTx/>
-              <a:buNone/>
-              <a:defRPr sz="2400"/>
-            </a:lvl2pPr>
-            <a:lvl3pPr marL="685800" indent="0">
-              <a:buFontTx/>
-              <a:buNone/>
-              <a:defRPr sz="2100"/>
-            </a:lvl3pPr>
-            <a:lvl4pPr marL="1028700" indent="0">
-              <a:buFontTx/>
-              <a:buNone/>
-              <a:defRPr sz="1800"/>
-            </a:lvl4pPr>
-            <a:lvl5pPr marL="1371600" indent="0">
-              <a:buFontTx/>
-              <a:buNone/>
-              <a:defRPr sz="1800"/>
-            </a:lvl5pPr>
-          </a:lstStyle>
-          <a:p>
-            <a:pPr lvl="0"/>
-            <a:r>
-              <a:rPr lang="en-US" dirty="0"/>
-              <a:t>Click to edit Master text styles</a:t>
-            </a:r>
-          </a:p>
-          <a:p>
-            <a:pPr lvl="1"/>
-            <a:r>
-              <a:rPr lang="en-US" dirty="0"/>
-              <a:t>Second level </a:t>
-            </a:r>
-          </a:p>
-          <a:p>
-            <a:pPr lvl="1"/>
-            <a:r>
-              <a:rPr lang="en-US" dirty="0"/>
-              <a:t>	Third level</a:t>
-            </a:r>
-          </a:p>
-          <a:p>
-            <a:pPr lvl="3"/>
-            <a:r>
-              <a:rPr lang="en-US" dirty="0"/>
-              <a:t>Fourth level</a:t>
-            </a:r>
-          </a:p>
-          <a:p>
-            <a:pPr lvl="4"/>
-            <a:r>
-              <a:rPr lang="en-US" dirty="0"/>
-              <a:t>Fifth level</a:t>
-            </a:r>
-          </a:p>
-        </p:txBody>
-      </p:sp>
-      <p:sp>
-        <p:nvSpPr>
-          <p:cNvPr id="7" name="Rectangle 6">
-            <a:extLst>
-              <a:ext uri="{FF2B5EF4-FFF2-40B4-BE49-F238E27FC236}">
-                <a16:creationId xmlns:a16="http://schemas.microsoft.com/office/drawing/2014/main" id="{36E8BE26-ED1E-4BC3-AABB-33679E13D11C}"/>
-              </a:ext>
-            </a:extLst>
-          </p:cNvPr>
-          <p:cNvSpPr/>
-          <p:nvPr userDrawn="1"/>
-        </p:nvSpPr>
-        <p:spPr>
-          <a:xfrm>
-            <a:off x="158449" y="117610"/>
-            <a:ext cx="1314784" cy="715581"/>
-          </a:xfrm>
-          <a:prstGeom prst="rect">
-            <a:avLst/>
-          </a:prstGeom>
-        </p:spPr>
-        <p:txBody>
-          <a:bodyPr wrap="none">
-            <a:spAutoFit/>
-          </a:bodyPr>
-          <a:lstStyle/>
-          <a:p>
-            <a:r>
-              <a:rPr lang="en-US" sz="4050" dirty="0">
-                <a:solidFill>
-                  <a:srgbClr val="00B0F0"/>
-                </a:solidFill>
-              </a:rPr>
-              <a:t>LAB</a:t>
-            </a:r>
-          </a:p>
-        </p:txBody>
-      </p:sp>
-      <p:sp>
-        <p:nvSpPr>
-          <p:cNvPr id="8" name="Text Placeholder 4">
-            <a:extLst>
-              <a:ext uri="{FF2B5EF4-FFF2-40B4-BE49-F238E27FC236}">
-                <a16:creationId xmlns:a16="http://schemas.microsoft.com/office/drawing/2014/main" id="{5F53A04A-F1A4-47F1-8696-966F2AE336F7}"/>
-              </a:ext>
-            </a:extLst>
-          </p:cNvPr>
-          <p:cNvSpPr>
-            <a:spLocks noGrp="1"/>
-          </p:cNvSpPr>
-          <p:nvPr>
-            <p:ph type="body" sz="quarter" idx="10" hasCustomPrompt="1"/>
-          </p:nvPr>
-        </p:nvSpPr>
-        <p:spPr>
-          <a:xfrm>
-            <a:off x="261188" y="6307137"/>
-            <a:ext cx="8574837" cy="410903"/>
-          </a:xfrm>
-        </p:spPr>
-        <p:txBody>
-          <a:bodyPr/>
-          <a:lstStyle>
-            <a:lvl1pPr marL="0" indent="0">
-              <a:buFont typeface="Arial" panose="020B0604020202020204" pitchFamily="34" charset="0"/>
-              <a:buNone/>
-              <a:defRPr sz="1400"/>
-            </a:lvl1pPr>
-            <a:lvl2pPr marL="574675" indent="-285750">
-              <a:buFont typeface="Arial" panose="020B0604020202020204" pitchFamily="34" charset="0"/>
-              <a:buChar char="•"/>
-              <a:defRPr sz="1600"/>
-            </a:lvl2pPr>
-            <a:lvl3pPr marL="966787" indent="-285750">
-              <a:buFont typeface="Arial" panose="020B0604020202020204" pitchFamily="34" charset="0"/>
-              <a:buChar char="•"/>
-              <a:defRPr sz="1400"/>
-            </a:lvl3pPr>
-            <a:lvl4pPr marL="1260475" indent="-171450">
-              <a:buFont typeface="Arial" panose="020B0604020202020204" pitchFamily="34" charset="0"/>
-              <a:buChar char="•"/>
-              <a:defRPr sz="1200"/>
-            </a:lvl4pPr>
-            <a:lvl5pPr marL="1547813" indent="-171450">
-              <a:buFont typeface="Arial" panose="020B0604020202020204" pitchFamily="34" charset="0"/>
-              <a:buChar char="•"/>
-              <a:defRPr sz="1200"/>
-            </a:lvl5pPr>
-          </a:lstStyle>
-          <a:p>
-            <a:pPr lvl="0"/>
-            <a:r>
-              <a:rPr lang="en-US" dirty="0"/>
-              <a:t>Edit URL</a:t>
-            </a:r>
-          </a:p>
-        </p:txBody>
-      </p:sp>
-    </p:spTree>
-    <p:extLst>
-      <p:ext uri="{BB962C8B-B14F-4D97-AF65-F5344CB8AC3E}">
-        <p14:creationId xmlns:p14="http://schemas.microsoft.com/office/powerpoint/2010/main" val="2625449846"/>
-      </p:ext>
-    </p:extLst>
-  </p:cSld>
-  <p:clrMapOvr>
-    <a:masterClrMapping/>
-  </p:clrMapOvr>
-</p:sldLayout>
-</file>
-
 <file path=ppt/slideMasters/slideMaster1.xml><?xml version="1.0" encoding="utf-8"?>
 <p:sldMaster xmlns:a="http://schemas.openxmlformats.org/drawingml/2006/main" xmlns:r="http://schemas.openxmlformats.org/officeDocument/2006/relationships" xmlns:p="http://schemas.openxmlformats.org/presentationml/2006/main" preserve="1">
   <p:cSld>
@@ -10019,28 +10400,29 @@
   </p:cSld>
   <p:clrMap bg1="lt1" tx1="dk1" bg2="lt2" tx2="dk2" accent1="accent1" accent2="accent2" accent3="accent3" accent4="accent4" accent5="accent5" accent6="accent6" hlink="hlink" folHlink="folHlink"/>
   <p:sldLayoutIdLst>
-    <p:sldLayoutId id="2147483661" r:id="rId1"/>
-    <p:sldLayoutId id="2147483672" r:id="rId2"/>
-    <p:sldLayoutId id="2147483666" r:id="rId3"/>
-    <p:sldLayoutId id="2147483701" r:id="rId4"/>
-    <p:sldLayoutId id="2147483707" r:id="rId5"/>
-    <p:sldLayoutId id="2147483662" r:id="rId6"/>
-    <p:sldLayoutId id="2147483699" r:id="rId7"/>
-    <p:sldLayoutId id="2147483708" r:id="rId8"/>
-    <p:sldLayoutId id="2147483702" r:id="rId9"/>
-    <p:sldLayoutId id="2147483700" r:id="rId10"/>
-    <p:sldLayoutId id="2147483705" r:id="rId11"/>
-    <p:sldLayoutId id="2147483703" r:id="rId12"/>
-    <p:sldLayoutId id="2147483706" r:id="rId13"/>
-    <p:sldLayoutId id="2147483663" r:id="rId14"/>
-    <p:sldLayoutId id="2147483664" r:id="rId15"/>
-    <p:sldLayoutId id="2147483665" r:id="rId16"/>
-    <p:sldLayoutId id="2147483667" r:id="rId17"/>
-    <p:sldLayoutId id="2147483668" r:id="rId18"/>
-    <p:sldLayoutId id="2147483669" r:id="rId19"/>
-    <p:sldLayoutId id="2147483670" r:id="rId20"/>
-    <p:sldLayoutId id="2147483671" r:id="rId21"/>
-    <p:sldLayoutId id="2147483673" r:id="rId22"/>
+    <p:sldLayoutId id="2147483709" r:id="rId1"/>
+    <p:sldLayoutId id="2147483661" r:id="rId2"/>
+    <p:sldLayoutId id="2147483672" r:id="rId3"/>
+    <p:sldLayoutId id="2147483666" r:id="rId4"/>
+    <p:sldLayoutId id="2147483701" r:id="rId5"/>
+    <p:sldLayoutId id="2147483707" r:id="rId6"/>
+    <p:sldLayoutId id="2147483662" r:id="rId7"/>
+    <p:sldLayoutId id="2147483699" r:id="rId8"/>
+    <p:sldLayoutId id="2147483708" r:id="rId9"/>
+    <p:sldLayoutId id="2147483702" r:id="rId10"/>
+    <p:sldLayoutId id="2147483700" r:id="rId11"/>
+    <p:sldLayoutId id="2147483705" r:id="rId12"/>
+    <p:sldLayoutId id="2147483703" r:id="rId13"/>
+    <p:sldLayoutId id="2147483706" r:id="rId14"/>
+    <p:sldLayoutId id="2147483663" r:id="rId15"/>
+    <p:sldLayoutId id="2147483664" r:id="rId16"/>
+    <p:sldLayoutId id="2147483665" r:id="rId17"/>
+    <p:sldLayoutId id="2147483667" r:id="rId18"/>
+    <p:sldLayoutId id="2147483668" r:id="rId19"/>
+    <p:sldLayoutId id="2147483669" r:id="rId20"/>
+    <p:sldLayoutId id="2147483670" r:id="rId21"/>
+    <p:sldLayoutId id="2147483671" r:id="rId22"/>
+    <p:sldLayoutId id="2147483673" r:id="rId23"/>
   </p:sldLayoutIdLst>
   <p:txStyles>
     <p:titleStyle>

</xml_diff>

<commit_message>
Add and fix slides in template
</commit_message>
<xml_diff>
--- a/70-533-00-Template.pptx
+++ b/70-533-00-Template.pptx
@@ -32,7 +32,7 @@
   <p:notesSz cx="6858000" cy="9144000"/>
   <p:embeddedFontLst>
     <p:embeddedFont>
-      <p:font typeface="Segoe" panose="020B0604020202020204" charset="0"/>
+      <p:font typeface="Calibri" panose="020F0502020204030204" pitchFamily="34" charset="0"/>
       <p:regular r:id="rId20"/>
       <p:bold r:id="rId21"/>
       <p:italic r:id="rId22"/>
@@ -46,30 +46,30 @@
       <p:boldItalic r:id="rId27"/>
     </p:embeddedFont>
     <p:embeddedFont>
-      <p:font typeface="Calibri" panose="020F0502020204030204" pitchFamily="34" charset="0"/>
+      <p:font typeface="Segoe" panose="020B0604020202020204" charset="0"/>
       <p:regular r:id="rId28"/>
       <p:bold r:id="rId29"/>
       <p:italic r:id="rId30"/>
       <p:boldItalic r:id="rId31"/>
     </p:embeddedFont>
     <p:embeddedFont>
-      <p:font typeface="Segoe UI Light" panose="020B0502040204020203" pitchFamily="34" charset="0"/>
+      <p:font typeface="Segoe UI" panose="020B0502040204020203" pitchFamily="34" charset="0"/>
       <p:regular r:id="rId32"/>
-      <p:italic r:id="rId33"/>
-    </p:embeddedFont>
-    <p:embeddedFont>
-      <p:font typeface="Segoe UI" panose="020B0502040204020203" pitchFamily="34" charset="0"/>
-      <p:regular r:id="rId34"/>
-      <p:bold r:id="rId35"/>
-      <p:italic r:id="rId36"/>
-      <p:boldItalic r:id="rId37"/>
+      <p:bold r:id="rId33"/>
+      <p:italic r:id="rId34"/>
+      <p:boldItalic r:id="rId35"/>
     </p:embeddedFont>
     <p:embeddedFont>
       <p:font typeface="Verdana" panose="020B0604030504040204" pitchFamily="34" charset="0"/>
-      <p:regular r:id="rId38"/>
-      <p:bold r:id="rId39"/>
-      <p:italic r:id="rId40"/>
-      <p:boldItalic r:id="rId41"/>
+      <p:regular r:id="rId36"/>
+      <p:bold r:id="rId37"/>
+      <p:italic r:id="rId38"/>
+      <p:boldItalic r:id="rId39"/>
+    </p:embeddedFont>
+    <p:embeddedFont>
+      <p:font typeface="Segoe UI Light" panose="020B0502040204020203" pitchFamily="34" charset="0"/>
+      <p:regular r:id="rId40"/>
+      <p:italic r:id="rId41"/>
     </p:embeddedFont>
   </p:embeddedFontLst>
   <p:defaultTextStyle>
@@ -264,6 +264,10 @@
 </p:presentation>
 </file>
 
+<file path=ppt/revisionInfo.xml><?xml version="1.0" encoding="utf-8"?>
+<p1510:revInfo xmlns:a="http://schemas.openxmlformats.org/drawingml/2006/main" xmlns:r="http://schemas.openxmlformats.org/officeDocument/2006/relationships" xmlns:p1510="http://schemas.microsoft.com/office/powerpoint/2015/10/main"/>
+</file>
+
 <file path=ppt/handoutMasters/handoutMaster1.xml><?xml version="1.0" encoding="utf-8"?>
 <p:handoutMaster xmlns:a="http://schemas.openxmlformats.org/drawingml/2006/main" xmlns:r="http://schemas.openxmlformats.org/officeDocument/2006/relationships" xmlns:p="http://schemas.openxmlformats.org/presentationml/2006/main">
   <p:cSld>
@@ -358,7 +362,7 @@
           <a:p>
             <a:fld id="{7D784404-57E5-4341-9230-5EC072B8C3C5}" type="datetimeFigureOut">
               <a:rPr lang="en-US" smtClean="0"/>
-              <a:t>2/7/2018</a:t>
+              <a:t>5/12/2018</a:t>
             </a:fld>
             <a:endParaRPr lang="en-US"/>
           </a:p>
@@ -535,7 +539,7 @@
           <a:p>
             <a:fld id="{9933EFA3-31EF-403B-8080-9776000D59FF}" type="datetimeFigureOut">
               <a:rPr lang="en-US" smtClean="0"/>
-              <a:t>2/7/2018</a:t>
+              <a:t>5/12/2018</a:t>
             </a:fld>
             <a:endParaRPr lang="en-US" dirty="0"/>
           </a:p>
@@ -3407,6 +3411,353 @@
 </file>
 
 <file path=ppt/slideLayouts/slideLayout10.xml><?xml version="1.0" encoding="utf-8"?>
+<p:sldLayout xmlns:a="http://schemas.openxmlformats.org/drawingml/2006/main" xmlns:r="http://schemas.openxmlformats.org/officeDocument/2006/relationships" xmlns:p="http://schemas.openxmlformats.org/presentationml/2006/main" showMasterSp="0" preserve="1" userDrawn="1">
+  <p:cSld name="Demo">
+    <p:bg>
+      <p:bgPr>
+        <a:solidFill>
+          <a:srgbClr val="7030A0"/>
+        </a:solidFill>
+        <a:effectLst/>
+      </p:bgPr>
+    </p:bg>
+    <p:spTree>
+      <p:nvGrpSpPr>
+        <p:cNvPr id="1" name=""/>
+        <p:cNvGrpSpPr/>
+        <p:nvPr/>
+      </p:nvGrpSpPr>
+      <p:grpSpPr>
+        <a:xfrm>
+          <a:off x="0" y="0"/>
+          <a:ext cx="0" cy="0"/>
+          <a:chOff x="0" y="0"/>
+          <a:chExt cx="0" cy="0"/>
+        </a:xfrm>
+      </p:grpSpPr>
+      <p:sp>
+        <p:nvSpPr>
+          <p:cNvPr id="726019" name="Rectangle 3"/>
+          <p:cNvSpPr>
+            <a:spLocks noGrp="1" noChangeArrowheads="1"/>
+          </p:cNvSpPr>
+          <p:nvPr>
+            <p:ph type="ctrTitle" sz="quarter" hasCustomPrompt="1"/>
+          </p:nvPr>
+        </p:nvSpPr>
+        <p:spPr>
+          <a:xfrm>
+            <a:off x="307911" y="770219"/>
+            <a:ext cx="8379200" cy="1011928"/>
+          </a:xfrm>
+          <a:solidFill>
+            <a:srgbClr val="7030A0"/>
+          </a:solidFill>
+          <a:ln algn="ctr"/>
+        </p:spPr>
+        <p:txBody>
+          <a:bodyPr wrap="square" tIns="0" rIns="0" bIns="0" anchor="t" anchorCtr="0">
+            <a:noAutofit/>
+          </a:bodyPr>
+          <a:lstStyle>
+            <a:lvl1pPr algn="l">
+              <a:spcBef>
+                <a:spcPct val="60000"/>
+              </a:spcBef>
+              <a:buClr>
+                <a:schemeClr val="hlink"/>
+              </a:buClr>
+              <a:buSzPct val="90000"/>
+              <a:buFontTx/>
+              <a:buNone/>
+              <a:defRPr sz="3800" baseline="0">
+                <a:solidFill>
+                  <a:schemeClr val="bg1"/>
+                </a:solidFill>
+                <a:latin typeface="Segoe UI" pitchFamily="34" charset="0"/>
+                <a:ea typeface="Segoe UI" pitchFamily="34" charset="0"/>
+                <a:cs typeface="Segoe UI" pitchFamily="34" charset="0"/>
+              </a:defRPr>
+            </a:lvl1pPr>
+          </a:lstStyle>
+          <a:p>
+            <a:r>
+              <a:rPr lang="en-US" dirty="0"/>
+              <a:t>Demo Title</a:t>
+            </a:r>
+          </a:p>
+        </p:txBody>
+      </p:sp>
+      <p:sp>
+        <p:nvSpPr>
+          <p:cNvPr id="726020" name="Rectangle 4"/>
+          <p:cNvSpPr>
+            <a:spLocks noGrp="1" noChangeArrowheads="1"/>
+          </p:cNvSpPr>
+          <p:nvPr>
+            <p:ph type="subTitle" sz="quarter" idx="1" hasCustomPrompt="1"/>
+          </p:nvPr>
+        </p:nvSpPr>
+        <p:spPr>
+          <a:xfrm>
+            <a:off x="3685592" y="2110581"/>
+            <a:ext cx="5290768" cy="3722293"/>
+          </a:xfrm>
+          <a:solidFill>
+            <a:srgbClr val="7030A0"/>
+          </a:solidFill>
+        </p:spPr>
+        <p:txBody>
+          <a:bodyPr lIns="91440" tIns="45720" rIns="91440" bIns="45720"/>
+          <a:lstStyle>
+            <a:lvl1pPr marL="285750" indent="-285750" algn="l">
+              <a:lnSpc>
+                <a:spcPct val="95000"/>
+              </a:lnSpc>
+              <a:spcBef>
+                <a:spcPct val="60000"/>
+              </a:spcBef>
+              <a:buClr>
+                <a:schemeClr val="bg1"/>
+              </a:buClr>
+              <a:buFont typeface="Wingdings" panose="05000000000000000000" pitchFamily="2" charset="2"/>
+              <a:buChar char="Ø"/>
+              <a:defRPr sz="1800">
+                <a:solidFill>
+                  <a:schemeClr val="bg1"/>
+                </a:solidFill>
+                <a:latin typeface="Segoe UI" pitchFamily="34" charset="0"/>
+                <a:ea typeface="Segoe UI" pitchFamily="34" charset="0"/>
+                <a:cs typeface="Segoe UI" pitchFamily="34" charset="0"/>
+              </a:defRPr>
+            </a:lvl1pPr>
+            <a:lvl2pPr marL="288925" indent="0">
+              <a:buNone/>
+              <a:defRPr/>
+            </a:lvl2pPr>
+          </a:lstStyle>
+          <a:p>
+            <a:r>
+              <a:rPr lang="en-US" dirty="0"/>
+              <a:t>Enter Description(s)</a:t>
+            </a:r>
+          </a:p>
+          <a:p>
+            <a:endParaRPr lang="en-US" dirty="0"/>
+          </a:p>
+        </p:txBody>
+      </p:sp>
+      <p:sp>
+        <p:nvSpPr>
+          <p:cNvPr id="7" name="Text Placeholder 6">
+            <a:extLst>
+              <a:ext uri="{FF2B5EF4-FFF2-40B4-BE49-F238E27FC236}">
+                <a16:creationId xmlns:a16="http://schemas.microsoft.com/office/drawing/2014/main" id="{05E1913A-614D-4F38-AB69-5348B29CCD5D}"/>
+              </a:ext>
+            </a:extLst>
+          </p:cNvPr>
+          <p:cNvSpPr>
+            <a:spLocks noGrp="1"/>
+          </p:cNvSpPr>
+          <p:nvPr>
+            <p:ph type="body" sz="quarter" idx="10"/>
+          </p:nvPr>
+        </p:nvSpPr>
+        <p:spPr>
+          <a:xfrm>
+            <a:off x="261938" y="2756542"/>
+            <a:ext cx="3241675" cy="2851150"/>
+          </a:xfrm>
+        </p:spPr>
+        <p:txBody>
+          <a:bodyPr/>
+          <a:lstStyle>
+            <a:lvl1pPr>
+              <a:defRPr sz="2000">
+                <a:solidFill>
+                  <a:schemeClr val="bg1"/>
+                </a:solidFill>
+              </a:defRPr>
+            </a:lvl1pPr>
+          </a:lstStyle>
+          <a:p>
+            <a:pPr lvl="0"/>
+            <a:r>
+              <a:rPr lang="en-US" dirty="0"/>
+              <a:t>Edit Master text</a:t>
+            </a:r>
+          </a:p>
+        </p:txBody>
+      </p:sp>
+      <p:sp>
+        <p:nvSpPr>
+          <p:cNvPr id="11" name="Text Placeholder 10">
+            <a:extLst>
+              <a:ext uri="{FF2B5EF4-FFF2-40B4-BE49-F238E27FC236}">
+                <a16:creationId xmlns:a16="http://schemas.microsoft.com/office/drawing/2014/main" id="{6A2AE784-2CA5-4194-B30C-8D50C676A59B}"/>
+              </a:ext>
+            </a:extLst>
+          </p:cNvPr>
+          <p:cNvSpPr>
+            <a:spLocks noGrp="1"/>
+          </p:cNvSpPr>
+          <p:nvPr>
+            <p:ph type="body" sz="quarter" idx="11" hasCustomPrompt="1"/>
+          </p:nvPr>
+        </p:nvSpPr>
+        <p:spPr>
+          <a:xfrm>
+            <a:off x="261938" y="6018240"/>
+            <a:ext cx="8714421" cy="391882"/>
+          </a:xfrm>
+          <a:solidFill>
+            <a:schemeClr val="bg1"/>
+          </a:solidFill>
+        </p:spPr>
+        <p:txBody>
+          <a:bodyPr/>
+          <a:lstStyle>
+            <a:lvl1pPr marL="0" indent="0">
+              <a:buNone/>
+              <a:defRPr sz="1400">
+                <a:solidFill>
+                  <a:srgbClr val="3399FF"/>
+                </a:solidFill>
+              </a:defRPr>
+            </a:lvl1pPr>
+            <a:lvl2pPr>
+              <a:defRPr>
+                <a:solidFill>
+                  <a:schemeClr val="bg1">
+                    <a:lumMod val="75000"/>
+                  </a:schemeClr>
+                </a:solidFill>
+              </a:defRPr>
+            </a:lvl2pPr>
+            <a:lvl3pPr>
+              <a:defRPr>
+                <a:solidFill>
+                  <a:schemeClr val="bg1">
+                    <a:lumMod val="75000"/>
+                  </a:schemeClr>
+                </a:solidFill>
+              </a:defRPr>
+            </a:lvl3pPr>
+            <a:lvl4pPr>
+              <a:defRPr>
+                <a:solidFill>
+                  <a:schemeClr val="bg1">
+                    <a:lumMod val="75000"/>
+                  </a:schemeClr>
+                </a:solidFill>
+              </a:defRPr>
+            </a:lvl4pPr>
+            <a:lvl5pPr>
+              <a:defRPr>
+                <a:solidFill>
+                  <a:schemeClr val="bg1">
+                    <a:lumMod val="75000"/>
+                  </a:schemeClr>
+                </a:solidFill>
+              </a:defRPr>
+            </a:lvl5pPr>
+          </a:lstStyle>
+          <a:p>
+            <a:pPr lvl="0"/>
+            <a:r>
+              <a:rPr lang="en-US" dirty="0"/>
+              <a:t>URL</a:t>
+            </a:r>
+          </a:p>
+        </p:txBody>
+      </p:sp>
+      <p:sp>
+        <p:nvSpPr>
+          <p:cNvPr id="12" name="TextBox 11">
+            <a:extLst>
+              <a:ext uri="{FF2B5EF4-FFF2-40B4-BE49-F238E27FC236}">
+                <a16:creationId xmlns:a16="http://schemas.microsoft.com/office/drawing/2014/main" id="{E1C05B86-1160-4370-A04A-9508198B968C}"/>
+              </a:ext>
+            </a:extLst>
+          </p:cNvPr>
+          <p:cNvSpPr txBox="1"/>
+          <p:nvPr userDrawn="1"/>
+        </p:nvSpPr>
+        <p:spPr>
+          <a:xfrm>
+            <a:off x="6662057" y="6512893"/>
+            <a:ext cx="2388641" cy="307777"/>
+          </a:xfrm>
+          <a:prstGeom prst="rect">
+            <a:avLst/>
+          </a:prstGeom>
+          <a:noFill/>
+        </p:spPr>
+        <p:txBody>
+          <a:bodyPr wrap="square" rtlCol="0">
+            <a:spAutoFit/>
+          </a:bodyPr>
+          <a:lstStyle/>
+          <a:p>
+            <a:r>
+              <a:rPr lang="en-US" sz="1400" dirty="0"/>
+              <a:t>#70-533 @ITProGuru</a:t>
+            </a:r>
+          </a:p>
+        </p:txBody>
+      </p:sp>
+      <p:sp>
+        <p:nvSpPr>
+          <p:cNvPr id="8" name="Rectangle 7">
+            <a:extLst>
+              <a:ext uri="{FF2B5EF4-FFF2-40B4-BE49-F238E27FC236}">
+                <a16:creationId xmlns:a16="http://schemas.microsoft.com/office/drawing/2014/main" id="{2E5CD9C4-3903-4CFA-9CED-0878686ABD1A}"/>
+              </a:ext>
+            </a:extLst>
+          </p:cNvPr>
+          <p:cNvSpPr/>
+          <p:nvPr userDrawn="1"/>
+        </p:nvSpPr>
+        <p:spPr>
+          <a:xfrm>
+            <a:off x="158449" y="117610"/>
+            <a:ext cx="1903085" cy="715581"/>
+          </a:xfrm>
+          <a:prstGeom prst="rect">
+            <a:avLst/>
+          </a:prstGeom>
+        </p:spPr>
+        <p:txBody>
+          <a:bodyPr wrap="none">
+            <a:spAutoFit/>
+          </a:bodyPr>
+          <a:lstStyle/>
+          <a:p>
+            <a:r>
+              <a:rPr lang="en-US" sz="4050" dirty="0">
+                <a:solidFill>
+                  <a:srgbClr val="00B0F0"/>
+                </a:solidFill>
+              </a:rPr>
+              <a:t>DEMO</a:t>
+            </a:r>
+          </a:p>
+        </p:txBody>
+      </p:sp>
+    </p:spTree>
+    <p:extLst>
+      <p:ext uri="{BB962C8B-B14F-4D97-AF65-F5344CB8AC3E}">
+        <p14:creationId xmlns:p14="http://schemas.microsoft.com/office/powerpoint/2010/main" val="2828235629"/>
+      </p:ext>
+    </p:extLst>
+  </p:cSld>
+  <p:clrMapOvr>
+    <a:masterClrMapping/>
+  </p:clrMapOvr>
+</p:sldLayout>
+</file>
+
+<file path=ppt/slideLayouts/slideLayout11.xml><?xml version="1.0" encoding="utf-8"?>
 <p:sldLayout xmlns:a="http://schemas.openxmlformats.org/drawingml/2006/main" xmlns:r="http://schemas.openxmlformats.org/officeDocument/2006/relationships" xmlns:p="http://schemas.openxmlformats.org/presentationml/2006/main" preserve="1" userDrawn="1">
   <p:cSld name="Lab">
     <p:bg>
@@ -3709,7 +4060,7 @@
 </p:sldLayout>
 </file>
 
-<file path=ppt/slideLayouts/slideLayout11.xml><?xml version="1.0" encoding="utf-8"?>
+<file path=ppt/slideLayouts/slideLayout12.xml><?xml version="1.0" encoding="utf-8"?>
 <p:sldLayout xmlns:a="http://schemas.openxmlformats.org/drawingml/2006/main" xmlns:r="http://schemas.openxmlformats.org/officeDocument/2006/relationships" xmlns:p="http://schemas.openxmlformats.org/presentationml/2006/main" preserve="1" userDrawn="1">
   <p:cSld name="Content &amp; Code">
     <p:spTree>
@@ -4044,7 +4395,7 @@
 </p:sldLayout>
 </file>
 
-<file path=ppt/slideLayouts/slideLayout12.xml><?xml version="1.0" encoding="utf-8"?>
+<file path=ppt/slideLayouts/slideLayout13.xml><?xml version="1.0" encoding="utf-8"?>
 <p:sldLayout xmlns:a="http://schemas.openxmlformats.org/drawingml/2006/main" xmlns:r="http://schemas.openxmlformats.org/officeDocument/2006/relationships" xmlns:p="http://schemas.openxmlformats.org/presentationml/2006/main" preserve="1" userDrawn="1">
   <p:cSld name="Custom Layout">
     <p:spTree>
@@ -4199,7 +4550,7 @@
 </p:sldLayout>
 </file>
 
-<file path=ppt/slideLayouts/slideLayout13.xml><?xml version="1.0" encoding="utf-8"?>
+<file path=ppt/slideLayouts/slideLayout14.xml><?xml version="1.0" encoding="utf-8"?>
 <p:sldLayout xmlns:a="http://schemas.openxmlformats.org/drawingml/2006/main" xmlns:r="http://schemas.openxmlformats.org/officeDocument/2006/relationships" xmlns:p="http://schemas.openxmlformats.org/presentationml/2006/main" preserve="1" userDrawn="1">
   <p:cSld name="Black Notes slide Layout">
     <p:bg bwMode="black">
@@ -4528,7 +4879,7 @@
 </p:sldLayout>
 </file>
 
-<file path=ppt/slideLayouts/slideLayout14.xml><?xml version="1.0" encoding="utf-8"?>
+<file path=ppt/slideLayouts/slideLayout15.xml><?xml version="1.0" encoding="utf-8"?>
 <p:sldLayout xmlns:a="http://schemas.openxmlformats.org/drawingml/2006/main" xmlns:r="http://schemas.openxmlformats.org/officeDocument/2006/relationships" xmlns:p="http://schemas.openxmlformats.org/presentationml/2006/main" preserve="1" userDrawn="1">
   <p:cSld name="Steps">
     <p:spTree>
@@ -5977,7 +6328,7 @@
 </p:sldLayout>
 </file>
 
-<file path=ppt/slideLayouts/slideLayout15.xml><?xml version="1.0" encoding="utf-8"?>
+<file path=ppt/slideLayouts/slideLayout16.xml><?xml version="1.0" encoding="utf-8"?>
 <p:sldLayout xmlns:a="http://schemas.openxmlformats.org/drawingml/2006/main" xmlns:r="http://schemas.openxmlformats.org/officeDocument/2006/relationships" xmlns:p="http://schemas.openxmlformats.org/presentationml/2006/main" preserve="1" userDrawn="1">
   <p:cSld name="Section Header">
     <p:spTree>
@@ -6163,7 +6514,7 @@
 </p:sldLayout>
 </file>
 
-<file path=ppt/slideLayouts/slideLayout16.xml><?xml version="1.0" encoding="utf-8"?>
+<file path=ppt/slideLayouts/slideLayout17.xml><?xml version="1.0" encoding="utf-8"?>
 <p:sldLayout xmlns:a="http://schemas.openxmlformats.org/drawingml/2006/main" xmlns:r="http://schemas.openxmlformats.org/officeDocument/2006/relationships" xmlns:p="http://schemas.openxmlformats.org/presentationml/2006/main" preserve="1" userDrawn="1">
   <p:cSld name="Two Content">
     <p:spTree>
@@ -6446,7 +6797,7 @@
 </p:sldLayout>
 </file>
 
-<file path=ppt/slideLayouts/slideLayout17.xml><?xml version="1.0" encoding="utf-8"?>
+<file path=ppt/slideLayouts/slideLayout18.xml><?xml version="1.0" encoding="utf-8"?>
 <p:sldLayout xmlns:a="http://schemas.openxmlformats.org/drawingml/2006/main" xmlns:r="http://schemas.openxmlformats.org/officeDocument/2006/relationships" xmlns:p="http://schemas.openxmlformats.org/presentationml/2006/main" preserve="1" userDrawn="1">
   <p:cSld name="Comparison">
     <p:spTree>
@@ -6875,7 +7226,7 @@
 </p:sldLayout>
 </file>
 
-<file path=ppt/slideLayouts/slideLayout18.xml><?xml version="1.0" encoding="utf-8"?>
+<file path=ppt/slideLayouts/slideLayout19.xml><?xml version="1.0" encoding="utf-8"?>
 <p:sldLayout xmlns:a="http://schemas.openxmlformats.org/drawingml/2006/main" xmlns:r="http://schemas.openxmlformats.org/officeDocument/2006/relationships" xmlns:p="http://schemas.openxmlformats.org/presentationml/2006/main" preserve="1" userDrawn="1">
   <p:cSld name="Blank">
     <p:spTree>
@@ -6956,422 +7307,6 @@
     <p:extLst>
       <p:ext uri="{BB962C8B-B14F-4D97-AF65-F5344CB8AC3E}">
         <p14:creationId xmlns:p14="http://schemas.microsoft.com/office/powerpoint/2010/main" val="483153834"/>
-      </p:ext>
-    </p:extLst>
-  </p:cSld>
-  <p:clrMapOvr>
-    <a:masterClrMapping/>
-  </p:clrMapOvr>
-</p:sldLayout>
-</file>
-
-<file path=ppt/slideLayouts/slideLayout19.xml><?xml version="1.0" encoding="utf-8"?>
-<p:sldLayout xmlns:a="http://schemas.openxmlformats.org/drawingml/2006/main" xmlns:r="http://schemas.openxmlformats.org/officeDocument/2006/relationships" xmlns:p="http://schemas.openxmlformats.org/presentationml/2006/main" preserve="1" userDrawn="1">
-  <p:cSld name="Content with Caption">
-    <p:spTree>
-      <p:nvGrpSpPr>
-        <p:cNvPr id="1" name=""/>
-        <p:cNvGrpSpPr/>
-        <p:nvPr/>
-      </p:nvGrpSpPr>
-      <p:grpSpPr>
-        <a:xfrm>
-          <a:off x="0" y="0"/>
-          <a:ext cx="0" cy="0"/>
-          <a:chOff x="0" y="0"/>
-          <a:chExt cx="0" cy="0"/>
-        </a:xfrm>
-      </p:grpSpPr>
-      <p:sp>
-        <p:nvSpPr>
-          <p:cNvPr id="7" name="Rectangle 6">
-            <a:extLst>
-              <a:ext uri="{FF2B5EF4-FFF2-40B4-BE49-F238E27FC236}">
-                <a16:creationId xmlns:a16="http://schemas.microsoft.com/office/drawing/2014/main" id="{6AF9706F-69F9-4C5B-878A-257B9A487E19}"/>
-              </a:ext>
-            </a:extLst>
-          </p:cNvPr>
-          <p:cNvSpPr/>
-          <p:nvPr userDrawn="1"/>
-        </p:nvSpPr>
-        <p:spPr bwMode="auto">
-          <a:xfrm>
-            <a:off x="3546230" y="0"/>
-            <a:ext cx="5597769" cy="1424354"/>
-          </a:xfrm>
-          <a:prstGeom prst="rect">
-            <a:avLst/>
-          </a:prstGeom>
-          <a:solidFill>
-            <a:schemeClr val="bg1"/>
-          </a:solidFill>
-          <a:ln w="9525" cap="flat" cmpd="sng" algn="ctr">
-            <a:noFill/>
-            <a:prstDash val="solid"/>
-            <a:round/>
-            <a:headEnd type="none" w="med" len="med"/>
-            <a:tailEnd type="none" w="med" len="med"/>
-          </a:ln>
-          <a:effectLst/>
-        </p:spPr>
-        <p:txBody>
-          <a:bodyPr vert="horz" wrap="square" lIns="182880" tIns="45720" rIns="182880" bIns="45720" numCol="1" rtlCol="0" anchor="ctr" anchorCtr="0" compatLnSpc="1">
-            <a:prstTxWarp prst="textNoShape">
-              <a:avLst/>
-            </a:prstTxWarp>
-          </a:bodyPr>
-          <a:lstStyle/>
-          <a:p>
-            <a:pPr marL="0" marR="0" indent="0" algn="ctr" defTabSz="914400" rtl="0" eaLnBrk="0" fontAlgn="base" latinLnBrk="0" hangingPunct="0">
-              <a:lnSpc>
-                <a:spcPct val="100000"/>
-              </a:lnSpc>
-              <a:spcBef>
-                <a:spcPct val="0"/>
-              </a:spcBef>
-              <a:spcAft>
-                <a:spcPct val="0"/>
-              </a:spcAft>
-              <a:buClrTx/>
-              <a:buSzTx/>
-              <a:buFontTx/>
-              <a:buNone/>
-              <a:tabLst/>
-            </a:pPr>
-            <a:endParaRPr kumimoji="0" lang="en-US" sz="1800" b="1" i="0" u="none" strike="noStrike" cap="none" normalizeH="0" baseline="0">
-              <a:ln>
-                <a:noFill/>
-              </a:ln>
-              <a:solidFill>
-                <a:schemeClr val="tx1"/>
-              </a:solidFill>
-              <a:effectLst/>
-              <a:latin typeface="Verdana" pitchFamily="34" charset="0"/>
-            </a:endParaRPr>
-          </a:p>
-        </p:txBody>
-      </p:sp>
-      <p:sp>
-        <p:nvSpPr>
-          <p:cNvPr id="6" name="Rectangle 5">
-            <a:extLst>
-              <a:ext uri="{FF2B5EF4-FFF2-40B4-BE49-F238E27FC236}">
-                <a16:creationId xmlns:a16="http://schemas.microsoft.com/office/drawing/2014/main" id="{D4E7A39D-4325-4D40-AA41-B4787F9B32F3}"/>
-              </a:ext>
-            </a:extLst>
-          </p:cNvPr>
-          <p:cNvSpPr/>
-          <p:nvPr userDrawn="1"/>
-        </p:nvSpPr>
-        <p:spPr bwMode="auto">
-          <a:xfrm>
-            <a:off x="0" y="0"/>
-            <a:ext cx="3534508" cy="1424354"/>
-          </a:xfrm>
-          <a:prstGeom prst="rect">
-            <a:avLst/>
-          </a:prstGeom>
-          <a:solidFill>
-            <a:srgbClr val="0070C0"/>
-          </a:solidFill>
-          <a:ln w="9525" cap="flat" cmpd="sng" algn="ctr">
-            <a:noFill/>
-            <a:prstDash val="solid"/>
-            <a:round/>
-            <a:headEnd type="none" w="med" len="med"/>
-            <a:tailEnd type="none" w="med" len="med"/>
-          </a:ln>
-          <a:effectLst>
-            <a:outerShdw dist="35921" dir="2700000" algn="ctr" rotWithShape="0">
-              <a:srgbClr val="AFAFAF"/>
-            </a:outerShdw>
-          </a:effectLst>
-        </p:spPr>
-        <p:txBody>
-          <a:bodyPr vert="horz" wrap="square" lIns="182880" tIns="45720" rIns="182880" bIns="45720" numCol="1" rtlCol="0" anchor="ctr" anchorCtr="0" compatLnSpc="1">
-            <a:prstTxWarp prst="textNoShape">
-              <a:avLst/>
-            </a:prstTxWarp>
-          </a:bodyPr>
-          <a:lstStyle/>
-          <a:p>
-            <a:pPr marL="0" marR="0" indent="0" algn="ctr" defTabSz="914400" rtl="0" eaLnBrk="0" fontAlgn="base" latinLnBrk="0" hangingPunct="0">
-              <a:lnSpc>
-                <a:spcPct val="100000"/>
-              </a:lnSpc>
-              <a:spcBef>
-                <a:spcPct val="0"/>
-              </a:spcBef>
-              <a:spcAft>
-                <a:spcPct val="0"/>
-              </a:spcAft>
-              <a:buClrTx/>
-              <a:buSzTx/>
-              <a:buFontTx/>
-              <a:buNone/>
-              <a:tabLst/>
-            </a:pPr>
-            <a:endParaRPr kumimoji="0" lang="en-US" sz="1800" b="1" i="0" u="none" strike="noStrike" cap="none" normalizeH="0" baseline="0">
-              <a:ln>
-                <a:noFill/>
-              </a:ln>
-              <a:solidFill>
-                <a:schemeClr val="tx1"/>
-              </a:solidFill>
-              <a:effectLst/>
-              <a:latin typeface="Verdana" pitchFamily="34" charset="0"/>
-            </a:endParaRPr>
-          </a:p>
-        </p:txBody>
-      </p:sp>
-      <p:sp>
-        <p:nvSpPr>
-          <p:cNvPr id="2" name="Title 1"/>
-          <p:cNvSpPr>
-            <a:spLocks noGrp="1"/>
-          </p:cNvSpPr>
-          <p:nvPr>
-            <p:ph type="title"/>
-          </p:nvPr>
-        </p:nvSpPr>
-        <p:spPr>
-          <a:xfrm>
-            <a:off x="246186" y="273050"/>
-            <a:ext cx="3219328" cy="1162050"/>
-          </a:xfrm>
-        </p:spPr>
-        <p:txBody>
-          <a:bodyPr anchor="t"/>
-          <a:lstStyle>
-            <a:lvl1pPr algn="l">
-              <a:defRPr sz="2000" b="0"/>
-            </a:lvl1pPr>
-          </a:lstStyle>
-          <a:p>
-            <a:r>
-              <a:rPr lang="en-US" dirty="0"/>
-              <a:t>Click to edit Master title style</a:t>
-            </a:r>
-          </a:p>
-        </p:txBody>
-      </p:sp>
-      <p:sp>
-        <p:nvSpPr>
-          <p:cNvPr id="3" name="Content Placeholder 2"/>
-          <p:cNvSpPr>
-            <a:spLocks noGrp="1"/>
-          </p:cNvSpPr>
-          <p:nvPr>
-            <p:ph idx="1"/>
-          </p:nvPr>
-        </p:nvSpPr>
-        <p:spPr>
-          <a:xfrm>
-            <a:off x="3575050" y="273050"/>
-            <a:ext cx="5111750" cy="5853113"/>
-          </a:xfrm>
-        </p:spPr>
-        <p:txBody>
-          <a:bodyPr/>
-          <a:lstStyle>
-            <a:lvl1pPr>
-              <a:defRPr sz="3200">
-                <a:solidFill>
-                  <a:schemeClr val="tx1"/>
-                </a:solidFill>
-              </a:defRPr>
-            </a:lvl1pPr>
-            <a:lvl2pPr>
-              <a:defRPr sz="2800"/>
-            </a:lvl2pPr>
-            <a:lvl3pPr>
-              <a:defRPr sz="2400"/>
-            </a:lvl3pPr>
-            <a:lvl4pPr>
-              <a:defRPr sz="2000"/>
-            </a:lvl4pPr>
-            <a:lvl5pPr>
-              <a:defRPr sz="2000"/>
-            </a:lvl5pPr>
-            <a:lvl6pPr>
-              <a:defRPr sz="2000"/>
-            </a:lvl6pPr>
-            <a:lvl7pPr>
-              <a:defRPr sz="2000"/>
-            </a:lvl7pPr>
-            <a:lvl8pPr>
-              <a:defRPr sz="2000"/>
-            </a:lvl8pPr>
-            <a:lvl9pPr>
-              <a:defRPr sz="2000"/>
-            </a:lvl9pPr>
-          </a:lstStyle>
-          <a:p>
-            <a:pPr lvl="0"/>
-            <a:r>
-              <a:rPr lang="en-US" dirty="0"/>
-              <a:t>Edit Master text styles</a:t>
-            </a:r>
-          </a:p>
-          <a:p>
-            <a:pPr lvl="1"/>
-            <a:r>
-              <a:rPr lang="en-US" dirty="0"/>
-              <a:t>Second level</a:t>
-            </a:r>
-          </a:p>
-          <a:p>
-            <a:pPr lvl="2"/>
-            <a:r>
-              <a:rPr lang="en-US" dirty="0"/>
-              <a:t>Third level</a:t>
-            </a:r>
-          </a:p>
-          <a:p>
-            <a:pPr lvl="3"/>
-            <a:r>
-              <a:rPr lang="en-US" dirty="0"/>
-              <a:t>Fourth level</a:t>
-            </a:r>
-          </a:p>
-          <a:p>
-            <a:pPr lvl="4"/>
-            <a:r>
-              <a:rPr lang="en-US" dirty="0"/>
-              <a:t>Fifth level</a:t>
-            </a:r>
-          </a:p>
-        </p:txBody>
-      </p:sp>
-      <p:sp>
-        <p:nvSpPr>
-          <p:cNvPr id="4" name="Text Placeholder 3"/>
-          <p:cNvSpPr>
-            <a:spLocks noGrp="1"/>
-          </p:cNvSpPr>
-          <p:nvPr>
-            <p:ph type="body" sz="half" idx="2"/>
-          </p:nvPr>
-        </p:nvSpPr>
-        <p:spPr>
-          <a:xfrm>
-            <a:off x="263770" y="1435100"/>
-            <a:ext cx="3201744" cy="4691063"/>
-          </a:xfrm>
-        </p:spPr>
-        <p:txBody>
-          <a:bodyPr/>
-          <a:lstStyle>
-            <a:lvl1pPr marL="0" indent="0">
-              <a:buNone/>
-              <a:defRPr sz="1400"/>
-            </a:lvl1pPr>
-            <a:lvl2pPr marL="457200" indent="0">
-              <a:buNone/>
-              <a:defRPr sz="1200"/>
-            </a:lvl2pPr>
-            <a:lvl3pPr marL="914400" indent="0">
-              <a:buNone/>
-              <a:defRPr sz="1000"/>
-            </a:lvl3pPr>
-            <a:lvl4pPr marL="1371600" indent="0">
-              <a:buNone/>
-              <a:defRPr sz="900"/>
-            </a:lvl4pPr>
-            <a:lvl5pPr marL="1828800" indent="0">
-              <a:buNone/>
-              <a:defRPr sz="900"/>
-            </a:lvl5pPr>
-            <a:lvl6pPr marL="2286000" indent="0">
-              <a:buNone/>
-              <a:defRPr sz="900"/>
-            </a:lvl6pPr>
-            <a:lvl7pPr marL="2743200" indent="0">
-              <a:buNone/>
-              <a:defRPr sz="900"/>
-            </a:lvl7pPr>
-            <a:lvl8pPr marL="3200400" indent="0">
-              <a:buNone/>
-              <a:defRPr sz="900"/>
-            </a:lvl8pPr>
-            <a:lvl9pPr marL="3657600" indent="0">
-              <a:buNone/>
-              <a:defRPr sz="900"/>
-            </a:lvl9pPr>
-          </a:lstStyle>
-          <a:p>
-            <a:pPr lvl="0"/>
-            <a:r>
-              <a:rPr lang="en-US" dirty="0"/>
-              <a:t>Edit Master text styles</a:t>
-            </a:r>
-          </a:p>
-        </p:txBody>
-      </p:sp>
-      <p:sp>
-        <p:nvSpPr>
-          <p:cNvPr id="5" name="Text Placeholder 4">
-            <a:extLst>
-              <a:ext uri="{FF2B5EF4-FFF2-40B4-BE49-F238E27FC236}">
-                <a16:creationId xmlns:a16="http://schemas.microsoft.com/office/drawing/2014/main" id="{90A4200F-D9E6-4624-905A-FC78FABE78C8}"/>
-              </a:ext>
-            </a:extLst>
-          </p:cNvPr>
-          <p:cNvSpPr>
-            <a:spLocks noGrp="1"/>
-          </p:cNvSpPr>
-          <p:nvPr>
-            <p:ph type="body" sz="quarter" idx="10" hasCustomPrompt="1"/>
-          </p:nvPr>
-        </p:nvSpPr>
-        <p:spPr>
-          <a:xfrm>
-            <a:off x="261188" y="6307137"/>
-            <a:ext cx="8574837" cy="410903"/>
-          </a:xfrm>
-        </p:spPr>
-        <p:txBody>
-          <a:bodyPr/>
-          <a:lstStyle>
-            <a:lvl1pPr marL="0" indent="0">
-              <a:buFont typeface="Arial" panose="020B0604020202020204" pitchFamily="34" charset="0"/>
-              <a:buNone/>
-              <a:defRPr sz="1400"/>
-            </a:lvl1pPr>
-            <a:lvl2pPr marL="574675" indent="-285750">
-              <a:buFont typeface="Arial" panose="020B0604020202020204" pitchFamily="34" charset="0"/>
-              <a:buChar char="•"/>
-              <a:defRPr sz="1600"/>
-            </a:lvl2pPr>
-            <a:lvl3pPr marL="966787" indent="-285750">
-              <a:buFont typeface="Arial" panose="020B0604020202020204" pitchFamily="34" charset="0"/>
-              <a:buChar char="•"/>
-              <a:defRPr sz="1400"/>
-            </a:lvl3pPr>
-            <a:lvl4pPr marL="1260475" indent="-171450">
-              <a:buFont typeface="Arial" panose="020B0604020202020204" pitchFamily="34" charset="0"/>
-              <a:buChar char="•"/>
-              <a:defRPr sz="1200"/>
-            </a:lvl4pPr>
-            <a:lvl5pPr marL="1547813" indent="-171450">
-              <a:buFont typeface="Arial" panose="020B0604020202020204" pitchFamily="34" charset="0"/>
-              <a:buChar char="•"/>
-              <a:defRPr sz="1200"/>
-            </a:lvl5pPr>
-          </a:lstStyle>
-          <a:p>
-            <a:pPr lvl="0"/>
-            <a:r>
-              <a:rPr lang="en-US" dirty="0"/>
-              <a:t>Edit URL</a:t>
-            </a:r>
-          </a:p>
-        </p:txBody>
-      </p:sp>
-    </p:spTree>
-    <p:extLst>
-      <p:ext uri="{BB962C8B-B14F-4D97-AF65-F5344CB8AC3E}">
-        <p14:creationId xmlns:p14="http://schemas.microsoft.com/office/powerpoint/2010/main" val="3332487751"/>
       </p:ext>
     </p:extLst>
   </p:cSld>
@@ -7685,6 +7620,422 @@
 
 <file path=ppt/slideLayouts/slideLayout20.xml><?xml version="1.0" encoding="utf-8"?>
 <p:sldLayout xmlns:a="http://schemas.openxmlformats.org/drawingml/2006/main" xmlns:r="http://schemas.openxmlformats.org/officeDocument/2006/relationships" xmlns:p="http://schemas.openxmlformats.org/presentationml/2006/main" preserve="1" userDrawn="1">
+  <p:cSld name="Content with Caption">
+    <p:spTree>
+      <p:nvGrpSpPr>
+        <p:cNvPr id="1" name=""/>
+        <p:cNvGrpSpPr/>
+        <p:nvPr/>
+      </p:nvGrpSpPr>
+      <p:grpSpPr>
+        <a:xfrm>
+          <a:off x="0" y="0"/>
+          <a:ext cx="0" cy="0"/>
+          <a:chOff x="0" y="0"/>
+          <a:chExt cx="0" cy="0"/>
+        </a:xfrm>
+      </p:grpSpPr>
+      <p:sp>
+        <p:nvSpPr>
+          <p:cNvPr id="7" name="Rectangle 6">
+            <a:extLst>
+              <a:ext uri="{FF2B5EF4-FFF2-40B4-BE49-F238E27FC236}">
+                <a16:creationId xmlns:a16="http://schemas.microsoft.com/office/drawing/2014/main" id="{6AF9706F-69F9-4C5B-878A-257B9A487E19}"/>
+              </a:ext>
+            </a:extLst>
+          </p:cNvPr>
+          <p:cNvSpPr/>
+          <p:nvPr userDrawn="1"/>
+        </p:nvSpPr>
+        <p:spPr bwMode="auto">
+          <a:xfrm>
+            <a:off x="3546230" y="0"/>
+            <a:ext cx="5597769" cy="1424354"/>
+          </a:xfrm>
+          <a:prstGeom prst="rect">
+            <a:avLst/>
+          </a:prstGeom>
+          <a:solidFill>
+            <a:schemeClr val="bg1"/>
+          </a:solidFill>
+          <a:ln w="9525" cap="flat" cmpd="sng" algn="ctr">
+            <a:noFill/>
+            <a:prstDash val="solid"/>
+            <a:round/>
+            <a:headEnd type="none" w="med" len="med"/>
+            <a:tailEnd type="none" w="med" len="med"/>
+          </a:ln>
+          <a:effectLst/>
+        </p:spPr>
+        <p:txBody>
+          <a:bodyPr vert="horz" wrap="square" lIns="182880" tIns="45720" rIns="182880" bIns="45720" numCol="1" rtlCol="0" anchor="ctr" anchorCtr="0" compatLnSpc="1">
+            <a:prstTxWarp prst="textNoShape">
+              <a:avLst/>
+            </a:prstTxWarp>
+          </a:bodyPr>
+          <a:lstStyle/>
+          <a:p>
+            <a:pPr marL="0" marR="0" indent="0" algn="ctr" defTabSz="914400" rtl="0" eaLnBrk="0" fontAlgn="base" latinLnBrk="0" hangingPunct="0">
+              <a:lnSpc>
+                <a:spcPct val="100000"/>
+              </a:lnSpc>
+              <a:spcBef>
+                <a:spcPct val="0"/>
+              </a:spcBef>
+              <a:spcAft>
+                <a:spcPct val="0"/>
+              </a:spcAft>
+              <a:buClrTx/>
+              <a:buSzTx/>
+              <a:buFontTx/>
+              <a:buNone/>
+              <a:tabLst/>
+            </a:pPr>
+            <a:endParaRPr kumimoji="0" lang="en-US" sz="1800" b="1" i="0" u="none" strike="noStrike" cap="none" normalizeH="0" baseline="0">
+              <a:ln>
+                <a:noFill/>
+              </a:ln>
+              <a:solidFill>
+                <a:schemeClr val="tx1"/>
+              </a:solidFill>
+              <a:effectLst/>
+              <a:latin typeface="Verdana" pitchFamily="34" charset="0"/>
+            </a:endParaRPr>
+          </a:p>
+        </p:txBody>
+      </p:sp>
+      <p:sp>
+        <p:nvSpPr>
+          <p:cNvPr id="6" name="Rectangle 5">
+            <a:extLst>
+              <a:ext uri="{FF2B5EF4-FFF2-40B4-BE49-F238E27FC236}">
+                <a16:creationId xmlns:a16="http://schemas.microsoft.com/office/drawing/2014/main" id="{D4E7A39D-4325-4D40-AA41-B4787F9B32F3}"/>
+              </a:ext>
+            </a:extLst>
+          </p:cNvPr>
+          <p:cNvSpPr/>
+          <p:nvPr userDrawn="1"/>
+        </p:nvSpPr>
+        <p:spPr bwMode="auto">
+          <a:xfrm>
+            <a:off x="0" y="0"/>
+            <a:ext cx="3534508" cy="1424354"/>
+          </a:xfrm>
+          <a:prstGeom prst="rect">
+            <a:avLst/>
+          </a:prstGeom>
+          <a:solidFill>
+            <a:srgbClr val="0070C0"/>
+          </a:solidFill>
+          <a:ln w="9525" cap="flat" cmpd="sng" algn="ctr">
+            <a:noFill/>
+            <a:prstDash val="solid"/>
+            <a:round/>
+            <a:headEnd type="none" w="med" len="med"/>
+            <a:tailEnd type="none" w="med" len="med"/>
+          </a:ln>
+          <a:effectLst>
+            <a:outerShdw dist="35921" dir="2700000" algn="ctr" rotWithShape="0">
+              <a:srgbClr val="AFAFAF"/>
+            </a:outerShdw>
+          </a:effectLst>
+        </p:spPr>
+        <p:txBody>
+          <a:bodyPr vert="horz" wrap="square" lIns="182880" tIns="45720" rIns="182880" bIns="45720" numCol="1" rtlCol="0" anchor="ctr" anchorCtr="0" compatLnSpc="1">
+            <a:prstTxWarp prst="textNoShape">
+              <a:avLst/>
+            </a:prstTxWarp>
+          </a:bodyPr>
+          <a:lstStyle/>
+          <a:p>
+            <a:pPr marL="0" marR="0" indent="0" algn="ctr" defTabSz="914400" rtl="0" eaLnBrk="0" fontAlgn="base" latinLnBrk="0" hangingPunct="0">
+              <a:lnSpc>
+                <a:spcPct val="100000"/>
+              </a:lnSpc>
+              <a:spcBef>
+                <a:spcPct val="0"/>
+              </a:spcBef>
+              <a:spcAft>
+                <a:spcPct val="0"/>
+              </a:spcAft>
+              <a:buClrTx/>
+              <a:buSzTx/>
+              <a:buFontTx/>
+              <a:buNone/>
+              <a:tabLst/>
+            </a:pPr>
+            <a:endParaRPr kumimoji="0" lang="en-US" sz="1800" b="1" i="0" u="none" strike="noStrike" cap="none" normalizeH="0" baseline="0">
+              <a:ln>
+                <a:noFill/>
+              </a:ln>
+              <a:solidFill>
+                <a:schemeClr val="tx1"/>
+              </a:solidFill>
+              <a:effectLst/>
+              <a:latin typeface="Verdana" pitchFamily="34" charset="0"/>
+            </a:endParaRPr>
+          </a:p>
+        </p:txBody>
+      </p:sp>
+      <p:sp>
+        <p:nvSpPr>
+          <p:cNvPr id="2" name="Title 1"/>
+          <p:cNvSpPr>
+            <a:spLocks noGrp="1"/>
+          </p:cNvSpPr>
+          <p:nvPr>
+            <p:ph type="title"/>
+          </p:nvPr>
+        </p:nvSpPr>
+        <p:spPr>
+          <a:xfrm>
+            <a:off x="246186" y="273050"/>
+            <a:ext cx="3219328" cy="1162050"/>
+          </a:xfrm>
+        </p:spPr>
+        <p:txBody>
+          <a:bodyPr anchor="t"/>
+          <a:lstStyle>
+            <a:lvl1pPr algn="l">
+              <a:defRPr sz="2000" b="0"/>
+            </a:lvl1pPr>
+          </a:lstStyle>
+          <a:p>
+            <a:r>
+              <a:rPr lang="en-US" dirty="0"/>
+              <a:t>Click to edit Master title style</a:t>
+            </a:r>
+          </a:p>
+        </p:txBody>
+      </p:sp>
+      <p:sp>
+        <p:nvSpPr>
+          <p:cNvPr id="3" name="Content Placeholder 2"/>
+          <p:cNvSpPr>
+            <a:spLocks noGrp="1"/>
+          </p:cNvSpPr>
+          <p:nvPr>
+            <p:ph idx="1"/>
+          </p:nvPr>
+        </p:nvSpPr>
+        <p:spPr>
+          <a:xfrm>
+            <a:off x="3575050" y="273050"/>
+            <a:ext cx="5111750" cy="5853113"/>
+          </a:xfrm>
+        </p:spPr>
+        <p:txBody>
+          <a:bodyPr/>
+          <a:lstStyle>
+            <a:lvl1pPr>
+              <a:defRPr sz="3200">
+                <a:solidFill>
+                  <a:schemeClr val="tx1"/>
+                </a:solidFill>
+              </a:defRPr>
+            </a:lvl1pPr>
+            <a:lvl2pPr>
+              <a:defRPr sz="2800"/>
+            </a:lvl2pPr>
+            <a:lvl3pPr>
+              <a:defRPr sz="2400"/>
+            </a:lvl3pPr>
+            <a:lvl4pPr>
+              <a:defRPr sz="2000"/>
+            </a:lvl4pPr>
+            <a:lvl5pPr>
+              <a:defRPr sz="2000"/>
+            </a:lvl5pPr>
+            <a:lvl6pPr>
+              <a:defRPr sz="2000"/>
+            </a:lvl6pPr>
+            <a:lvl7pPr>
+              <a:defRPr sz="2000"/>
+            </a:lvl7pPr>
+            <a:lvl8pPr>
+              <a:defRPr sz="2000"/>
+            </a:lvl8pPr>
+            <a:lvl9pPr>
+              <a:defRPr sz="2000"/>
+            </a:lvl9pPr>
+          </a:lstStyle>
+          <a:p>
+            <a:pPr lvl="0"/>
+            <a:r>
+              <a:rPr lang="en-US" dirty="0"/>
+              <a:t>Edit Master text styles</a:t>
+            </a:r>
+          </a:p>
+          <a:p>
+            <a:pPr lvl="1"/>
+            <a:r>
+              <a:rPr lang="en-US" dirty="0"/>
+              <a:t>Second level</a:t>
+            </a:r>
+          </a:p>
+          <a:p>
+            <a:pPr lvl="2"/>
+            <a:r>
+              <a:rPr lang="en-US" dirty="0"/>
+              <a:t>Third level</a:t>
+            </a:r>
+          </a:p>
+          <a:p>
+            <a:pPr lvl="3"/>
+            <a:r>
+              <a:rPr lang="en-US" dirty="0"/>
+              <a:t>Fourth level</a:t>
+            </a:r>
+          </a:p>
+          <a:p>
+            <a:pPr lvl="4"/>
+            <a:r>
+              <a:rPr lang="en-US" dirty="0"/>
+              <a:t>Fifth level</a:t>
+            </a:r>
+          </a:p>
+        </p:txBody>
+      </p:sp>
+      <p:sp>
+        <p:nvSpPr>
+          <p:cNvPr id="4" name="Text Placeholder 3"/>
+          <p:cNvSpPr>
+            <a:spLocks noGrp="1"/>
+          </p:cNvSpPr>
+          <p:nvPr>
+            <p:ph type="body" sz="half" idx="2"/>
+          </p:nvPr>
+        </p:nvSpPr>
+        <p:spPr>
+          <a:xfrm>
+            <a:off x="263770" y="1435100"/>
+            <a:ext cx="3201744" cy="4691063"/>
+          </a:xfrm>
+        </p:spPr>
+        <p:txBody>
+          <a:bodyPr/>
+          <a:lstStyle>
+            <a:lvl1pPr marL="0" indent="0">
+              <a:buNone/>
+              <a:defRPr sz="1400"/>
+            </a:lvl1pPr>
+            <a:lvl2pPr marL="457200" indent="0">
+              <a:buNone/>
+              <a:defRPr sz="1200"/>
+            </a:lvl2pPr>
+            <a:lvl3pPr marL="914400" indent="0">
+              <a:buNone/>
+              <a:defRPr sz="1000"/>
+            </a:lvl3pPr>
+            <a:lvl4pPr marL="1371600" indent="0">
+              <a:buNone/>
+              <a:defRPr sz="900"/>
+            </a:lvl4pPr>
+            <a:lvl5pPr marL="1828800" indent="0">
+              <a:buNone/>
+              <a:defRPr sz="900"/>
+            </a:lvl5pPr>
+            <a:lvl6pPr marL="2286000" indent="0">
+              <a:buNone/>
+              <a:defRPr sz="900"/>
+            </a:lvl6pPr>
+            <a:lvl7pPr marL="2743200" indent="0">
+              <a:buNone/>
+              <a:defRPr sz="900"/>
+            </a:lvl7pPr>
+            <a:lvl8pPr marL="3200400" indent="0">
+              <a:buNone/>
+              <a:defRPr sz="900"/>
+            </a:lvl8pPr>
+            <a:lvl9pPr marL="3657600" indent="0">
+              <a:buNone/>
+              <a:defRPr sz="900"/>
+            </a:lvl9pPr>
+          </a:lstStyle>
+          <a:p>
+            <a:pPr lvl="0"/>
+            <a:r>
+              <a:rPr lang="en-US" dirty="0"/>
+              <a:t>Edit Master text styles</a:t>
+            </a:r>
+          </a:p>
+        </p:txBody>
+      </p:sp>
+      <p:sp>
+        <p:nvSpPr>
+          <p:cNvPr id="5" name="Text Placeholder 4">
+            <a:extLst>
+              <a:ext uri="{FF2B5EF4-FFF2-40B4-BE49-F238E27FC236}">
+                <a16:creationId xmlns:a16="http://schemas.microsoft.com/office/drawing/2014/main" id="{90A4200F-D9E6-4624-905A-FC78FABE78C8}"/>
+              </a:ext>
+            </a:extLst>
+          </p:cNvPr>
+          <p:cNvSpPr>
+            <a:spLocks noGrp="1"/>
+          </p:cNvSpPr>
+          <p:nvPr>
+            <p:ph type="body" sz="quarter" idx="10" hasCustomPrompt="1"/>
+          </p:nvPr>
+        </p:nvSpPr>
+        <p:spPr>
+          <a:xfrm>
+            <a:off x="261188" y="6307137"/>
+            <a:ext cx="8574837" cy="410903"/>
+          </a:xfrm>
+        </p:spPr>
+        <p:txBody>
+          <a:bodyPr/>
+          <a:lstStyle>
+            <a:lvl1pPr marL="0" indent="0">
+              <a:buFont typeface="Arial" panose="020B0604020202020204" pitchFamily="34" charset="0"/>
+              <a:buNone/>
+              <a:defRPr sz="1400"/>
+            </a:lvl1pPr>
+            <a:lvl2pPr marL="574675" indent="-285750">
+              <a:buFont typeface="Arial" panose="020B0604020202020204" pitchFamily="34" charset="0"/>
+              <a:buChar char="•"/>
+              <a:defRPr sz="1600"/>
+            </a:lvl2pPr>
+            <a:lvl3pPr marL="966787" indent="-285750">
+              <a:buFont typeface="Arial" panose="020B0604020202020204" pitchFamily="34" charset="0"/>
+              <a:buChar char="•"/>
+              <a:defRPr sz="1400"/>
+            </a:lvl3pPr>
+            <a:lvl4pPr marL="1260475" indent="-171450">
+              <a:buFont typeface="Arial" panose="020B0604020202020204" pitchFamily="34" charset="0"/>
+              <a:buChar char="•"/>
+              <a:defRPr sz="1200"/>
+            </a:lvl4pPr>
+            <a:lvl5pPr marL="1547813" indent="-171450">
+              <a:buFont typeface="Arial" panose="020B0604020202020204" pitchFamily="34" charset="0"/>
+              <a:buChar char="•"/>
+              <a:defRPr sz="1200"/>
+            </a:lvl5pPr>
+          </a:lstStyle>
+          <a:p>
+            <a:pPr lvl="0"/>
+            <a:r>
+              <a:rPr lang="en-US" dirty="0"/>
+              <a:t>Edit URL</a:t>
+            </a:r>
+          </a:p>
+        </p:txBody>
+      </p:sp>
+    </p:spTree>
+    <p:extLst>
+      <p:ext uri="{BB962C8B-B14F-4D97-AF65-F5344CB8AC3E}">
+        <p14:creationId xmlns:p14="http://schemas.microsoft.com/office/powerpoint/2010/main" val="3332487751"/>
+      </p:ext>
+    </p:extLst>
+  </p:cSld>
+  <p:clrMapOvr>
+    <a:masterClrMapping/>
+  </p:clrMapOvr>
+</p:sldLayout>
+</file>
+
+<file path=ppt/slideLayouts/slideLayout21.xml><?xml version="1.0" encoding="utf-8"?>
+<p:sldLayout xmlns:a="http://schemas.openxmlformats.org/drawingml/2006/main" xmlns:r="http://schemas.openxmlformats.org/officeDocument/2006/relationships" xmlns:p="http://schemas.openxmlformats.org/presentationml/2006/main" preserve="1" userDrawn="1">
   <p:cSld name="Picture with Caption">
     <p:spTree>
       <p:nvGrpSpPr>
@@ -7934,7 +8285,7 @@
 </p:sldLayout>
 </file>
 
-<file path=ppt/slideLayouts/slideLayout21.xml><?xml version="1.0" encoding="utf-8"?>
+<file path=ppt/slideLayouts/slideLayout22.xml><?xml version="1.0" encoding="utf-8"?>
 <p:sldLayout xmlns:a="http://schemas.openxmlformats.org/drawingml/2006/main" xmlns:r="http://schemas.openxmlformats.org/officeDocument/2006/relationships" xmlns:p="http://schemas.openxmlformats.org/presentationml/2006/main" type="vertTx" preserve="1">
   <p:cSld name="Title and Vertical Text">
     <p:spTree>
@@ -8038,7 +8389,7 @@
 </p:sldLayout>
 </file>
 
-<file path=ppt/slideLayouts/slideLayout22.xml><?xml version="1.0" encoding="utf-8"?>
+<file path=ppt/slideLayouts/slideLayout23.xml><?xml version="1.0" encoding="utf-8"?>
 <p:sldLayout xmlns:a="http://schemas.openxmlformats.org/drawingml/2006/main" xmlns:r="http://schemas.openxmlformats.org/officeDocument/2006/relationships" xmlns:p="http://schemas.openxmlformats.org/presentationml/2006/main" type="vertTitleAndTx" preserve="1">
   <p:cSld name="Vertical Title and Text">
     <p:spTree>
@@ -8160,9 +8511,17 @@
 </p:sldLayout>
 </file>
 
-<file path=ppt/slideLayouts/slideLayout23.xml><?xml version="1.0" encoding="utf-8"?>
-<p:sldLayout xmlns:a="http://schemas.openxmlformats.org/drawingml/2006/main" xmlns:r="http://schemas.openxmlformats.org/officeDocument/2006/relationships" xmlns:p="http://schemas.openxmlformats.org/presentationml/2006/main" userDrawn="1">
-  <p:cSld name="28pt Slide Title ">
+<file path=ppt/slideLayouts/slideLayout24.xml><?xml version="1.0" encoding="utf-8"?>
+<p:sldLayout xmlns:a="http://schemas.openxmlformats.org/drawingml/2006/main" xmlns:r="http://schemas.openxmlformats.org/officeDocument/2006/relationships" xmlns:p="http://schemas.openxmlformats.org/presentationml/2006/main" preserve="1" userDrawn="1">
+  <p:cSld name="Title Solid">
+    <p:bg bwMode="auto">
+      <p:bgPr>
+        <a:solidFill>
+          <a:schemeClr val="accent2"/>
+        </a:solidFill>
+        <a:effectLst/>
+      </p:bgPr>
+    </p:bg>
     <p:spTree>
       <p:nvGrpSpPr>
         <p:cNvPr id="1" name=""/>
@@ -8179,276 +8538,323 @@
       </p:grpSpPr>
       <p:sp>
         <p:nvSpPr>
-          <p:cNvPr id="8" name="Rectangle 7"/>
+          <p:cNvPr id="2" name="Rectangle 1">
+            <a:extLst>
+              <a:ext uri="{FF2B5EF4-FFF2-40B4-BE49-F238E27FC236}">
+                <a16:creationId xmlns:a16="http://schemas.microsoft.com/office/drawing/2014/main" id="{91D05E55-498C-4995-A911-E5A445AB70ED}"/>
+              </a:ext>
+            </a:extLst>
+          </p:cNvPr>
           <p:cNvSpPr/>
           <p:nvPr userDrawn="1"/>
         </p:nvSpPr>
-        <p:spPr>
+        <p:spPr bwMode="auto">
           <a:xfrm>
-            <a:off x="0" y="0"/>
-            <a:ext cx="9144000" cy="822960"/>
+            <a:off x="1" y="1"/>
+            <a:ext cx="9143999" cy="1011115"/>
           </a:xfrm>
           <a:prstGeom prst="rect">
             <a:avLst/>
           </a:prstGeom>
           <a:solidFill>
-            <a:srgbClr val="0070C0"/>
+            <a:srgbClr val="8DACD0"/>
           </a:solidFill>
-          <a:ln>
+          <a:ln w="9525" cap="flat" cmpd="sng" algn="ctr">
             <a:noFill/>
+            <a:prstDash val="solid"/>
+            <a:round/>
+            <a:headEnd type="none" w="med" len="med"/>
+            <a:tailEnd type="none" w="med" len="med"/>
           </a:ln>
+          <a:effectLst/>
         </p:spPr>
-        <p:style>
-          <a:lnRef idx="2">
-            <a:schemeClr val="accent1">
-              <a:shade val="50000"/>
-            </a:schemeClr>
-          </a:lnRef>
-          <a:fillRef idx="1">
-            <a:schemeClr val="accent1"/>
-          </a:fillRef>
-          <a:effectRef idx="0">
-            <a:schemeClr val="accent1"/>
-          </a:effectRef>
-          <a:fontRef idx="minor">
-            <a:schemeClr val="lt1"/>
-          </a:fontRef>
-        </p:style>
-        <p:txBody>
-          <a:bodyPr rtlCol="0" anchor="ctr"/>
+        <p:txBody>
+          <a:bodyPr rot="0" spcFirstLastPara="0" vertOverflow="overflow" horzOverflow="overflow" vert="horz" wrap="square" lIns="137160" tIns="34290" rIns="137160" bIns="34290" numCol="1" spcCol="0" rtlCol="0" fromWordArt="0" anchor="ctr" anchorCtr="0" forceAA="0" compatLnSpc="1">
+            <a:prstTxWarp prst="textNoShape">
+              <a:avLst/>
+            </a:prstTxWarp>
+            <a:noAutofit/>
+          </a:bodyPr>
           <a:lstStyle/>
           <a:p>
-            <a:pPr algn="ctr"/>
-            <a:endParaRPr lang="en-US" dirty="0"/>
-          </a:p>
-        </p:txBody>
-      </p:sp>
-      <p:sp>
-        <p:nvSpPr>
-          <p:cNvPr id="2" name="Title 1"/>
-          <p:cNvSpPr>
-            <a:spLocks noGrp="1"/>
-          </p:cNvSpPr>
-          <p:nvPr>
-            <p:ph type="title" hasCustomPrompt="1"/>
+            <a:pPr marL="0" marR="0" indent="0" algn="ctr" defTabSz="685800" rtl="0" eaLnBrk="0" fontAlgn="base" latinLnBrk="0" hangingPunct="0">
+              <a:lnSpc>
+                <a:spcPct val="100000"/>
+              </a:lnSpc>
+              <a:spcBef>
+                <a:spcPct val="0"/>
+              </a:spcBef>
+              <a:spcAft>
+                <a:spcPct val="0"/>
+              </a:spcAft>
+              <a:buClrTx/>
+              <a:buSzTx/>
+              <a:buFontTx/>
+              <a:buNone/>
+              <a:tabLst/>
+            </a:pPr>
+            <a:endParaRPr kumimoji="0" lang="en-US" sz="1350" b="1" i="0" u="none" strike="noStrike" cap="none" normalizeH="0" baseline="0">
+              <a:ln>
+                <a:noFill/>
+              </a:ln>
+              <a:solidFill>
+                <a:schemeClr val="tx1"/>
+              </a:solidFill>
+              <a:effectLst/>
+              <a:latin typeface="Verdana" pitchFamily="34" charset="0"/>
+            </a:endParaRPr>
+          </a:p>
+        </p:txBody>
+      </p:sp>
+      <p:sp>
+        <p:nvSpPr>
+          <p:cNvPr id="5" name="Text Placeholder 4"/>
+          <p:cNvSpPr>
+            <a:spLocks noGrp="1"/>
+          </p:cNvSpPr>
+          <p:nvPr>
+            <p:ph type="body" sz="quarter" idx="12"/>
           </p:nvPr>
         </p:nvSpPr>
         <p:spPr>
           <a:xfrm>
-            <a:off x="457200" y="0"/>
-            <a:ext cx="8229600" cy="822960"/>
+            <a:off x="203326" y="2617669"/>
+            <a:ext cx="8528661" cy="2889997"/>
           </a:xfrm>
+          <a:noFill/>
         </p:spPr>
         <p:txBody>
-          <a:bodyPr>
+          <a:bodyPr lIns="146304" tIns="109728" rIns="146304" bIns="109728">
             <a:noAutofit/>
           </a:bodyPr>
           <a:lstStyle>
-            <a:lvl1pPr algn="l">
-              <a:lnSpc>
-                <a:spcPct val="90000"/>
-              </a:lnSpc>
-              <a:defRPr sz="2800" baseline="0">
-                <a:solidFill>
-                  <a:schemeClr val="bg1"/>
-                </a:solidFill>
-                <a:latin typeface="Segoe UI Light" panose="020B0502040204020203" pitchFamily="34" charset="0"/>
-                <a:ea typeface="Segoe UI Light" panose="020B0502040204020203" pitchFamily="34" charset="0"/>
-                <a:cs typeface="Segoe UI Light" panose="020B0502040204020203" pitchFamily="34" charset="0"/>
+            <a:lvl1pPr marL="0" indent="0">
+              <a:spcBef>
+                <a:spcPts val="0"/>
+              </a:spcBef>
+              <a:buNone/>
+              <a:defRPr sz="2647" spc="0" baseline="0">
+                <a:gradFill>
+                  <a:gsLst>
+                    <a:gs pos="0">
+                      <a:schemeClr val="tx1"/>
+                    </a:gs>
+                    <a:gs pos="100000">
+                      <a:schemeClr val="tx1"/>
+                    </a:gs>
+                  </a:gsLst>
+                  <a:lin ang="5400000" scaled="0"/>
+                </a:gradFill>
+                <a:latin typeface="+mj-lt"/>
               </a:defRPr>
             </a:lvl1pPr>
           </a:lstStyle>
           <a:p>
-            <a:r>
-              <a:rPr lang="en-US" dirty="0"/>
-              <a:t>28pt Slide Title</a:t>
-            </a:r>
-          </a:p>
-        </p:txBody>
-      </p:sp>
-      <p:sp>
-        <p:nvSpPr>
-          <p:cNvPr id="10" name="Slide Number Placeholder 9"/>
-          <p:cNvSpPr>
-            <a:spLocks noGrp="1"/>
-          </p:cNvSpPr>
-          <p:nvPr>
-            <p:ph type="sldNum" sz="quarter" idx="12"/>
-          </p:nvPr>
-        </p:nvSpPr>
-        <p:spPr/>
-        <p:txBody>
-          <a:bodyPr/>
+            <a:pPr lvl="0"/>
+            <a:endParaRPr lang="en-US" dirty="0"/>
+          </a:p>
+        </p:txBody>
+      </p:sp>
+      <p:sp>
+        <p:nvSpPr>
+          <p:cNvPr id="9" name="Title 1"/>
+          <p:cNvSpPr>
+            <a:spLocks noGrp="1"/>
+          </p:cNvSpPr>
+          <p:nvPr>
+            <p:ph type="title"/>
+          </p:nvPr>
+        </p:nvSpPr>
+        <p:spPr>
+          <a:xfrm>
+            <a:off x="203328" y="893136"/>
+            <a:ext cx="8528660" cy="1552353"/>
+          </a:xfrm>
+          <a:noFill/>
+        </p:spPr>
+        <p:txBody>
+          <a:bodyPr lIns="146304" tIns="91440" rIns="146304" bIns="91440" anchor="t" anchorCtr="0"/>
           <a:lstStyle>
             <a:lvl1pPr>
-              <a:defRPr sz="1200">
-                <a:solidFill>
-                  <a:schemeClr val="tx1">
-                    <a:lumMod val="65000"/>
-                    <a:lumOff val="35000"/>
-                  </a:schemeClr>
-                </a:solidFill>
-                <a:latin typeface="Segoe UI" pitchFamily="34" charset="0"/>
-                <a:ea typeface="Segoe UI" pitchFamily="34" charset="0"/>
-                <a:cs typeface="Segoe UI" pitchFamily="34" charset="0"/>
+              <a:defRPr sz="4412" spc="-74" baseline="0">
+                <a:gradFill>
+                  <a:gsLst>
+                    <a:gs pos="3333">
+                      <a:schemeClr val="tx1"/>
+                    </a:gs>
+                    <a:gs pos="39000">
+                      <a:schemeClr val="tx1"/>
+                    </a:gs>
+                  </a:gsLst>
+                  <a:lin ang="5400000" scaled="0"/>
+                </a:gradFill>
               </a:defRPr>
             </a:lvl1pPr>
           </a:lstStyle>
           <a:p>
-            <a:fld id="{D814DA60-3BEE-4BCE-BEDB-E433FD970963}" type="slidenum">
-              <a:rPr lang="en-US" smtClean="0"/>
-              <a:pPr/>
-              <a:t>‹#›</a:t>
-            </a:fld>
             <a:endParaRPr lang="en-US" dirty="0"/>
           </a:p>
         </p:txBody>
       </p:sp>
-      <p:sp>
-        <p:nvSpPr>
-          <p:cNvPr id="6" name="Footer Placeholder 8"/>
-          <p:cNvSpPr>
-            <a:spLocks noGrp="1"/>
-          </p:cNvSpPr>
-          <p:nvPr>
-            <p:ph type="ftr" sz="quarter" idx="11"/>
-          </p:nvPr>
-        </p:nvSpPr>
-        <p:spPr>
+      <p:pic>
+        <p:nvPicPr>
+          <p:cNvPr id="6" name="Picture 5"/>
+          <p:cNvPicPr>
+            <a:picLocks noChangeAspect="1"/>
+          </p:cNvPicPr>
+          <p:nvPr userDrawn="1"/>
+        </p:nvPicPr>
+        <p:blipFill>
+          <a:blip r:embed="rId2" cstate="print">
+            <a:extLst>
+              <a:ext uri="{BEBA8EAE-BF5A-486C-A8C5-ECC9F3942E4B}">
+                <a14:imgProps xmlns:a14="http://schemas.microsoft.com/office/drawing/2010/main">
+                  <a14:imgLayer r:embed="rId3">
+                    <a14:imgEffect>
+                      <a14:brightnessContrast bright="-1000"/>
+                    </a14:imgEffect>
+                  </a14:imgLayer>
+                </a14:imgProps>
+              </a:ext>
+              <a:ext uri="{28A0092B-C50C-407E-A947-70E740481C1C}">
+                <a14:useLocalDpi xmlns:a14="http://schemas.microsoft.com/office/drawing/2010/main" val="0"/>
+              </a:ext>
+            </a:extLst>
+          </a:blip>
+          <a:stretch>
+            <a:fillRect/>
+          </a:stretch>
+        </p:blipFill>
+        <p:spPr bwMode="black">
           <a:xfrm>
-            <a:off x="457199" y="6324600"/>
-            <a:ext cx="8212015" cy="365125"/>
+            <a:off x="336992" y="6061767"/>
+            <a:ext cx="1141803" cy="326167"/>
           </a:xfrm>
           <a:prstGeom prst="rect">
             <a:avLst/>
           </a:prstGeom>
         </p:spPr>
-        <p:txBody>
-          <a:bodyPr/>
-          <a:lstStyle>
-            <a:lvl1pPr algn="l">
-              <a:defRPr/>
-            </a:lvl1pPr>
-          </a:lstStyle>
-          <a:p>
-            <a:endParaRPr lang="en-US" dirty="0"/>
-          </a:p>
-        </p:txBody>
-      </p:sp>
-      <p:sp>
-        <p:nvSpPr>
-          <p:cNvPr id="9" name="Text Placeholder 4"/>
-          <p:cNvSpPr>
-            <a:spLocks noGrp="1"/>
-          </p:cNvSpPr>
-          <p:nvPr>
-            <p:ph type="body" sz="quarter" idx="13"/>
-          </p:nvPr>
-        </p:nvSpPr>
-        <p:spPr>
+      </p:pic>
+      <p:sp>
+        <p:nvSpPr>
+          <p:cNvPr id="8" name="Rectangle 6"/>
+          <p:cNvSpPr>
+            <a:spLocks noChangeArrowheads="1"/>
+          </p:cNvSpPr>
+          <p:nvPr userDrawn="1"/>
+        </p:nvSpPr>
+        <p:spPr bwMode="auto">
           <a:xfrm>
-            <a:off x="457200" y="1066800"/>
-            <a:ext cx="8229600" cy="5105400"/>
+            <a:off x="2335" y="4309989"/>
+            <a:ext cx="9141665" cy="2551127"/>
           </a:xfrm>
           <a:prstGeom prst="rect">
             <a:avLst/>
           </a:prstGeom>
+          <a:noFill/>
+          <a:ln>
+            <a:noFill/>
+          </a:ln>
+          <a:extLst>
+            <a:ext uri="{909E8E84-426E-40DD-AFC4-6F175D3DCCD1}">
+              <a14:hiddenFill xmlns:a14="http://schemas.microsoft.com/office/drawing/2010/main">
+                <a:solidFill>
+                  <a:srgbClr val="FFFFFF"/>
+                </a:solidFill>
+              </a14:hiddenFill>
+            </a:ext>
+            <a:ext uri="{91240B29-F687-4F45-9708-019B960494DF}">
+              <a14:hiddenLine xmlns:a14="http://schemas.microsoft.com/office/drawing/2010/main" w="9525">
+                <a:solidFill>
+                  <a:srgbClr val="000000"/>
+                </a:solidFill>
+                <a:miter lim="800000"/>
+                <a:headEnd/>
+                <a:tailEnd/>
+              </a14:hiddenLine>
+            </a:ext>
+          </a:extLst>
         </p:spPr>
         <p:txBody>
-          <a:bodyPr/>
-          <a:lstStyle>
-            <a:lvl1pPr marL="457200" indent="-457200">
-              <a:buClr>
-                <a:srgbClr val="0070C0"/>
-              </a:buClr>
-              <a:buFont typeface="Arial" pitchFamily="34" charset="0"/>
-              <a:buChar char="•"/>
-              <a:defRPr sz="2800" b="0">
-                <a:latin typeface="Segoe UI" pitchFamily="34" charset="0"/>
-                <a:ea typeface="Segoe UI" pitchFamily="34" charset="0"/>
-                <a:cs typeface="Segoe UI" pitchFamily="34" charset="0"/>
-              </a:defRPr>
-            </a:lvl1pPr>
-            <a:lvl2pPr marL="800100" indent="-342900">
-              <a:buClr>
-                <a:srgbClr val="0070C0"/>
-              </a:buClr>
-              <a:buFont typeface="Arial" pitchFamily="34" charset="0"/>
-              <a:buChar char="•"/>
-              <a:defRPr sz="2400" b="0">
-                <a:latin typeface="Segoe UI" pitchFamily="34" charset="0"/>
-                <a:ea typeface="Segoe UI" pitchFamily="34" charset="0"/>
-                <a:cs typeface="Segoe UI" pitchFamily="34" charset="0"/>
-              </a:defRPr>
-            </a:lvl2pPr>
-            <a:lvl3pPr marL="1257300" indent="-342900">
-              <a:buClr>
-                <a:srgbClr val="0070C0"/>
-              </a:buClr>
-              <a:buFont typeface="Arial" pitchFamily="34" charset="0"/>
-              <a:buChar char="•"/>
-              <a:defRPr sz="2000" b="0">
-                <a:latin typeface="Segoe UI" pitchFamily="34" charset="0"/>
-                <a:ea typeface="Segoe UI" pitchFamily="34" charset="0"/>
-                <a:cs typeface="Segoe UI" pitchFamily="34" charset="0"/>
-              </a:defRPr>
-            </a:lvl3pPr>
-            <a:lvl4pPr marL="1371600" indent="0">
+          <a:bodyPr vert="horz" wrap="square" lIns="67232" tIns="33616" rIns="67232" bIns="33616" numCol="1" anchor="t" anchorCtr="0" compatLnSpc="1">
+            <a:prstTxWarp prst="textNoShape">
+              <a:avLst/>
+            </a:prstTxWarp>
+          </a:bodyPr>
+          <a:lstStyle/>
+          <a:p>
+            <a:pPr marL="0" marR="0" lvl="0" indent="0" algn="l" defTabSz="342900" rtl="0" eaLnBrk="1" fontAlgn="auto" latinLnBrk="0" hangingPunct="1">
+              <a:lnSpc>
+                <a:spcPct val="100000"/>
+              </a:lnSpc>
+              <a:spcBef>
+                <a:spcPts val="0"/>
+              </a:spcBef>
+              <a:spcAft>
+                <a:spcPts val="0"/>
+              </a:spcAft>
+              <a:buClrTx/>
+              <a:buSzTx/>
+              <a:buFontTx/>
               <a:buNone/>
-              <a:defRPr>
-                <a:latin typeface="Segoe UI" pitchFamily="34" charset="0"/>
-                <a:ea typeface="Segoe UI" pitchFamily="34" charset="0"/>
-                <a:cs typeface="Segoe UI" pitchFamily="34" charset="0"/>
-              </a:defRPr>
-            </a:lvl4pPr>
-            <a:lvl5pPr>
-              <a:defRPr>
-                <a:latin typeface="Segoe UI" pitchFamily="34" charset="0"/>
-                <a:ea typeface="Segoe UI" pitchFamily="34" charset="0"/>
-                <a:cs typeface="Segoe UI" pitchFamily="34" charset="0"/>
-              </a:defRPr>
-            </a:lvl5pPr>
-          </a:lstStyle>
-          <a:p>
-            <a:pPr lvl="0"/>
-            <a:r>
-              <a:rPr lang="en-US" dirty="0"/>
-              <a:t>Click to edit Master text styles</a:t>
-            </a:r>
-          </a:p>
-          <a:p>
-            <a:pPr lvl="1"/>
-            <a:r>
-              <a:rPr lang="en-US" dirty="0"/>
-              <a:t>Second level</a:t>
-            </a:r>
-          </a:p>
-          <a:p>
-            <a:pPr lvl="2"/>
-            <a:r>
-              <a:rPr lang="en-US" dirty="0"/>
-              <a:t>Third level</a:t>
-            </a:r>
+              <a:tabLst/>
+              <a:defRPr/>
+            </a:pPr>
+            <a:endParaRPr kumimoji="0" lang="en-US" sz="1324" b="0" i="0" u="none" strike="noStrike" kern="1200" cap="none" spc="0" normalizeH="0" baseline="0" noProof="0">
+              <a:ln>
+                <a:noFill/>
+              </a:ln>
+              <a:solidFill>
+                <a:prstClr val="black"/>
+              </a:solidFill>
+              <a:effectLst/>
+              <a:uLnTx/>
+              <a:uFillTx/>
+              <a:latin typeface="Calibri" panose="020F0502020204030204"/>
+              <a:ea typeface="+mn-ea"/>
+              <a:cs typeface="+mn-cs"/>
+            </a:endParaRPr>
           </a:p>
         </p:txBody>
       </p:sp>
     </p:spTree>
     <p:extLst>
       <p:ext uri="{BB962C8B-B14F-4D97-AF65-F5344CB8AC3E}">
-        <p14:creationId xmlns:p14="http://schemas.microsoft.com/office/powerpoint/2010/main" val="2705765972"/>
+        <p14:creationId xmlns:p14="http://schemas.microsoft.com/office/powerpoint/2010/main" val="745185817"/>
       </p:ext>
     </p:extLst>
   </p:cSld>
   <p:clrMapOvr>
     <a:masterClrMapping/>
   </p:clrMapOvr>
-  <p:hf hdr="0" ftr="0" dt="0"/>
+  <p:transition spd="slow">
+    <p:push/>
+  </p:transition>
+  <p:extLst mod="1">
+    <p:ext uri="{DCECCB84-F9BA-43D5-87BE-67443E8EF086}">
+      <p15:sldGuideLst xmlns:p15="http://schemas.microsoft.com/office/powerpoint/2012/main">
+        <p15:guide id="1" orient="horz" pos="4406">
+          <p15:clr>
+            <a:srgbClr val="C35EA4"/>
+          </p15:clr>
+        </p15:guide>
+      </p15:sldGuideLst>
+    </p:ext>
+  </p:extLst>
 </p:sldLayout>
 </file>
 
-<file path=ppt/slideLayouts/slideLayout3.xml><?xml version="1.0" encoding="utf-8"?>
+<file path=ppt/slideLayouts/slideLayout25.xml><?xml version="1.0" encoding="utf-8"?>
 <p:sldLayout xmlns:a="http://schemas.openxmlformats.org/drawingml/2006/main" xmlns:r="http://schemas.openxmlformats.org/officeDocument/2006/relationships" xmlns:p="http://schemas.openxmlformats.org/presentationml/2006/main" preserve="1" userDrawn="1">
-  <p:cSld name="Title and Text">
+  <p:cSld name="Title Solid - ANIMATED">
+    <p:bg bwMode="auto">
+      <p:bgPr>
+        <a:solidFill>
+          <a:schemeClr val="accent2"/>
+        </a:solidFill>
+        <a:effectLst/>
+      </p:bgPr>
+    </p:bg>
     <p:spTree>
       <p:nvGrpSpPr>
         <p:cNvPr id="1" name=""/>
@@ -8465,45 +8871,1133 @@
       </p:grpSpPr>
       <p:sp>
         <p:nvSpPr>
+          <p:cNvPr id="12" name="Rectangle 5"/>
+          <p:cNvSpPr>
+            <a:spLocks noChangeArrowheads="1"/>
+          </p:cNvSpPr>
+          <p:nvPr userDrawn="1"/>
+        </p:nvSpPr>
+        <p:spPr bwMode="auto">
+          <a:xfrm>
+            <a:off x="2335" y="4309989"/>
+            <a:ext cx="9141665" cy="2551127"/>
+          </a:xfrm>
+          <a:prstGeom prst="rect">
+            <a:avLst/>
+          </a:prstGeom>
+          <a:solidFill>
+            <a:srgbClr val="4DA0E2"/>
+          </a:solidFill>
+          <a:ln>
+            <a:noFill/>
+          </a:ln>
+        </p:spPr>
+        <p:txBody>
+          <a:bodyPr vert="horz" wrap="square" lIns="67232" tIns="33616" rIns="67232" bIns="33616" numCol="1" anchor="t" anchorCtr="0" compatLnSpc="1">
+            <a:prstTxWarp prst="textNoShape">
+              <a:avLst/>
+            </a:prstTxWarp>
+          </a:bodyPr>
+          <a:lstStyle/>
+          <a:p>
+            <a:pPr marL="0" marR="0" lvl="0" indent="0" algn="l" defTabSz="342900" rtl="0" eaLnBrk="1" fontAlgn="auto" latinLnBrk="0" hangingPunct="1">
+              <a:lnSpc>
+                <a:spcPct val="100000"/>
+              </a:lnSpc>
+              <a:spcBef>
+                <a:spcPts val="0"/>
+              </a:spcBef>
+              <a:spcAft>
+                <a:spcPts val="0"/>
+              </a:spcAft>
+              <a:buClrTx/>
+              <a:buSzTx/>
+              <a:buFontTx/>
+              <a:buNone/>
+              <a:tabLst/>
+              <a:defRPr/>
+            </a:pPr>
+            <a:endParaRPr kumimoji="0" lang="en-US" sz="1324" b="0" i="0" u="none" strike="noStrike" kern="1200" cap="none" spc="0" normalizeH="0" baseline="0" noProof="0">
+              <a:ln>
+                <a:noFill/>
+              </a:ln>
+              <a:solidFill>
+                <a:prstClr val="black"/>
+              </a:solidFill>
+              <a:effectLst/>
+              <a:uLnTx/>
+              <a:uFillTx/>
+              <a:latin typeface="Calibri" panose="020F0502020204030204"/>
+              <a:ea typeface="+mn-ea"/>
+              <a:cs typeface="+mn-cs"/>
+            </a:endParaRPr>
+          </a:p>
+        </p:txBody>
+      </p:sp>
+      <p:sp>
+        <p:nvSpPr>
+          <p:cNvPr id="10" name="Rectangle 7"/>
+          <p:cNvSpPr>
+            <a:spLocks noChangeArrowheads="1"/>
+          </p:cNvSpPr>
+          <p:nvPr userDrawn="1"/>
+        </p:nvSpPr>
+        <p:spPr bwMode="auto">
+          <a:xfrm>
+            <a:off x="1" y="5729528"/>
+            <a:ext cx="9141666" cy="1131586"/>
+          </a:xfrm>
+          <a:prstGeom prst="rect">
+            <a:avLst/>
+          </a:prstGeom>
+          <a:solidFill>
+            <a:srgbClr val="00188F"/>
+          </a:solidFill>
+          <a:ln>
+            <a:noFill/>
+          </a:ln>
+          <a:extLst/>
+        </p:spPr>
+        <p:txBody>
+          <a:bodyPr vert="horz" wrap="square" lIns="67232" tIns="33616" rIns="67232" bIns="33616" numCol="1" anchor="t" anchorCtr="0" compatLnSpc="1">
+            <a:prstTxWarp prst="textNoShape">
+              <a:avLst/>
+            </a:prstTxWarp>
+          </a:bodyPr>
+          <a:lstStyle/>
+          <a:p>
+            <a:pPr marL="0" marR="0" lvl="0" indent="0" algn="l" defTabSz="342900" rtl="0" eaLnBrk="1" fontAlgn="auto" latinLnBrk="0" hangingPunct="1">
+              <a:lnSpc>
+                <a:spcPct val="100000"/>
+              </a:lnSpc>
+              <a:spcBef>
+                <a:spcPts val="0"/>
+              </a:spcBef>
+              <a:spcAft>
+                <a:spcPts val="0"/>
+              </a:spcAft>
+              <a:buClrTx/>
+              <a:buSzTx/>
+              <a:buFontTx/>
+              <a:buNone/>
+              <a:tabLst/>
+              <a:defRPr/>
+            </a:pPr>
+            <a:endParaRPr kumimoji="0" lang="en-US" sz="1324" b="0" i="0" u="none" strike="noStrike" kern="1200" cap="none" spc="0" normalizeH="0" baseline="0" noProof="0">
+              <a:ln>
+                <a:noFill/>
+              </a:ln>
+              <a:solidFill>
+                <a:prstClr val="black"/>
+              </a:solidFill>
+              <a:effectLst/>
+              <a:uLnTx/>
+              <a:uFillTx/>
+              <a:latin typeface="Calibri" panose="020F0502020204030204"/>
+              <a:ea typeface="+mn-ea"/>
+              <a:cs typeface="+mn-cs"/>
+            </a:endParaRPr>
+          </a:p>
+        </p:txBody>
+      </p:sp>
+      <p:sp>
+        <p:nvSpPr>
+          <p:cNvPr id="11" name="Rectangle 8"/>
+          <p:cNvSpPr>
+            <a:spLocks noChangeArrowheads="1"/>
+          </p:cNvSpPr>
+          <p:nvPr userDrawn="1"/>
+        </p:nvSpPr>
+        <p:spPr bwMode="auto">
+          <a:xfrm>
+            <a:off x="2335" y="3343393"/>
+            <a:ext cx="9139333" cy="277059"/>
+          </a:xfrm>
+          <a:prstGeom prst="rect">
+            <a:avLst/>
+          </a:prstGeom>
+          <a:solidFill>
+            <a:srgbClr val="25B9EC"/>
+          </a:solidFill>
+          <a:ln>
+            <a:noFill/>
+          </a:ln>
+          <a:extLst>
+            <a:ext uri="{91240B29-F687-4F45-9708-019B960494DF}">
+              <a14:hiddenLine xmlns:a14="http://schemas.microsoft.com/office/drawing/2010/main" w="9525">
+                <a:solidFill>
+                  <a:srgbClr val="000000"/>
+                </a:solidFill>
+                <a:miter lim="800000"/>
+                <a:headEnd/>
+                <a:tailEnd/>
+              </a14:hiddenLine>
+            </a:ext>
+          </a:extLst>
+        </p:spPr>
+        <p:txBody>
+          <a:bodyPr vert="horz" wrap="square" lIns="67232" tIns="33616" rIns="67232" bIns="33616" numCol="1" anchor="t" anchorCtr="0" compatLnSpc="1">
+            <a:prstTxWarp prst="textNoShape">
+              <a:avLst/>
+            </a:prstTxWarp>
+          </a:bodyPr>
+          <a:lstStyle/>
+          <a:p>
+            <a:pPr marL="0" marR="0" lvl="0" indent="0" algn="l" defTabSz="342900" rtl="0" eaLnBrk="1" fontAlgn="auto" latinLnBrk="0" hangingPunct="1">
+              <a:lnSpc>
+                <a:spcPct val="100000"/>
+              </a:lnSpc>
+              <a:spcBef>
+                <a:spcPts val="0"/>
+              </a:spcBef>
+              <a:spcAft>
+                <a:spcPts val="0"/>
+              </a:spcAft>
+              <a:buClrTx/>
+              <a:buSzTx/>
+              <a:buFontTx/>
+              <a:buNone/>
+              <a:tabLst/>
+              <a:defRPr/>
+            </a:pPr>
+            <a:endParaRPr kumimoji="0" lang="en-US" sz="1324" b="0" i="0" u="none" strike="noStrike" kern="1200" cap="none" spc="0" normalizeH="0" baseline="0" noProof="0">
+              <a:ln>
+                <a:noFill/>
+              </a:ln>
+              <a:solidFill>
+                <a:prstClr val="black"/>
+              </a:solidFill>
+              <a:effectLst/>
+              <a:uLnTx/>
+              <a:uFillTx/>
+              <a:latin typeface="Calibri" panose="020F0502020204030204"/>
+              <a:ea typeface="+mn-ea"/>
+              <a:cs typeface="+mn-cs"/>
+            </a:endParaRPr>
+          </a:p>
+        </p:txBody>
+      </p:sp>
+      <p:sp>
+        <p:nvSpPr>
+          <p:cNvPr id="13" name="Rectangle 12"/>
+          <p:cNvSpPr/>
+          <p:nvPr userDrawn="1"/>
+        </p:nvSpPr>
+        <p:spPr bwMode="white">
+          <a:xfrm>
+            <a:off x="0" y="-312"/>
+            <a:ext cx="9143533" cy="6858623"/>
+          </a:xfrm>
+          <a:prstGeom prst="rect">
+            <a:avLst/>
+          </a:prstGeom>
+          <a:solidFill>
+            <a:schemeClr val="accent2"/>
+          </a:solidFill>
+          <a:ln>
+            <a:noFill/>
+            <a:headEnd type="none" w="med" len="med"/>
+            <a:tailEnd type="none" w="med" len="med"/>
+          </a:ln>
+          <a:effectLst/>
+        </p:spPr>
+        <p:style>
+          <a:lnRef idx="1">
+            <a:schemeClr val="accent2"/>
+          </a:lnRef>
+          <a:fillRef idx="3">
+            <a:schemeClr val="accent2"/>
+          </a:fillRef>
+          <a:effectRef idx="2">
+            <a:schemeClr val="accent2"/>
+          </a:effectRef>
+          <a:fontRef idx="minor">
+            <a:schemeClr val="lt1"/>
+          </a:fontRef>
+        </p:style>
+        <p:txBody>
+          <a:bodyPr rot="0" spcFirstLastPara="0" vertOverflow="overflow" horzOverflow="overflow" vert="horz" wrap="square" lIns="134464" tIns="107571" rIns="134464" bIns="107571" numCol="1" spcCol="0" rtlCol="0" fromWordArt="0" anchor="t" anchorCtr="0" forceAA="0" compatLnSpc="1">
+            <a:prstTxWarp prst="textNoShape">
+              <a:avLst/>
+            </a:prstTxWarp>
+            <a:noAutofit/>
+          </a:bodyPr>
+          <a:lstStyle/>
+          <a:p>
+            <a:pPr marL="0" marR="0" lvl="0" indent="0" algn="ctr" defTabSz="685577" rtl="0" eaLnBrk="1" fontAlgn="base" latinLnBrk="0" hangingPunct="1">
+              <a:lnSpc>
+                <a:spcPct val="90000"/>
+              </a:lnSpc>
+              <a:spcBef>
+                <a:spcPct val="0"/>
+              </a:spcBef>
+              <a:spcAft>
+                <a:spcPct val="0"/>
+              </a:spcAft>
+              <a:buClrTx/>
+              <a:buSzTx/>
+              <a:buFontTx/>
+              <a:buNone/>
+              <a:tabLst/>
+              <a:defRPr/>
+            </a:pPr>
+            <a:endParaRPr kumimoji="0" lang="en-US" sz="1765" b="0" i="0" u="none" strike="noStrike" kern="1200" cap="none" spc="0" normalizeH="0" baseline="0" noProof="0" dirty="0" err="1">
+              <a:ln>
+                <a:noFill/>
+              </a:ln>
+              <a:gradFill>
+                <a:gsLst>
+                  <a:gs pos="0">
+                    <a:srgbClr val="FFFFFF"/>
+                  </a:gs>
+                  <a:gs pos="100000">
+                    <a:srgbClr val="FFFFFF"/>
+                  </a:gs>
+                </a:gsLst>
+                <a:lin ang="5400000" scaled="0"/>
+              </a:gradFill>
+              <a:effectLst/>
+              <a:uLnTx/>
+              <a:uFillTx/>
+              <a:latin typeface="Calibri" panose="020F0502020204030204"/>
+              <a:ea typeface="Segoe UI" pitchFamily="34" charset="0"/>
+              <a:cs typeface="Segoe UI" pitchFamily="34" charset="0"/>
+            </a:endParaRPr>
+          </a:p>
+        </p:txBody>
+      </p:sp>
+      <p:sp>
+        <p:nvSpPr>
+          <p:cNvPr id="5" name="Text Placeholder 4"/>
+          <p:cNvSpPr>
+            <a:spLocks noGrp="1"/>
+          </p:cNvSpPr>
+          <p:nvPr>
+            <p:ph type="body" sz="quarter" idx="12"/>
+          </p:nvPr>
+        </p:nvSpPr>
+        <p:spPr>
+          <a:xfrm>
+            <a:off x="203327" y="3176063"/>
+            <a:ext cx="8574912" cy="1794661"/>
+          </a:xfrm>
+          <a:noFill/>
+        </p:spPr>
+        <p:txBody>
+          <a:bodyPr lIns="146304" tIns="109728" rIns="146304" bIns="109728">
+            <a:noAutofit/>
+          </a:bodyPr>
+          <a:lstStyle>
+            <a:lvl1pPr marL="0" indent="0">
+              <a:spcBef>
+                <a:spcPts val="0"/>
+              </a:spcBef>
+              <a:buNone/>
+              <a:defRPr sz="2647" spc="0" baseline="0">
+                <a:gradFill>
+                  <a:gsLst>
+                    <a:gs pos="0">
+                      <a:schemeClr val="tx1"/>
+                    </a:gs>
+                    <a:gs pos="100000">
+                      <a:schemeClr val="tx1"/>
+                    </a:gs>
+                  </a:gsLst>
+                  <a:lin ang="5400000" scaled="0"/>
+                </a:gradFill>
+                <a:latin typeface="+mj-lt"/>
+              </a:defRPr>
+            </a:lvl1pPr>
+          </a:lstStyle>
+          <a:p>
+            <a:pPr lvl="0"/>
+            <a:endParaRPr lang="en-US" dirty="0"/>
+          </a:p>
+        </p:txBody>
+      </p:sp>
+      <p:sp>
+        <p:nvSpPr>
+          <p:cNvPr id="9" name="Title 1"/>
+          <p:cNvSpPr>
+            <a:spLocks noGrp="1"/>
+          </p:cNvSpPr>
+          <p:nvPr>
+            <p:ph type="title" hasCustomPrompt="1"/>
+          </p:nvPr>
+        </p:nvSpPr>
+        <p:spPr>
+          <a:xfrm>
+            <a:off x="203326" y="1060212"/>
+            <a:ext cx="8574913" cy="1801436"/>
+          </a:xfrm>
+          <a:noFill/>
+        </p:spPr>
+        <p:txBody>
+          <a:bodyPr lIns="146304" tIns="91440" rIns="146304" bIns="91440" anchor="t" anchorCtr="0"/>
+          <a:lstStyle>
+            <a:lvl1pPr>
+              <a:defRPr sz="4412" spc="-74" baseline="0">
+                <a:gradFill>
+                  <a:gsLst>
+                    <a:gs pos="3333">
+                      <a:schemeClr val="tx1"/>
+                    </a:gs>
+                    <a:gs pos="39000">
+                      <a:schemeClr val="tx1"/>
+                    </a:gs>
+                  </a:gsLst>
+                  <a:lin ang="5400000" scaled="0"/>
+                </a:gradFill>
+              </a:defRPr>
+            </a:lvl1pPr>
+          </a:lstStyle>
+          <a:p>
+            <a:r>
+              <a:rPr lang="en-US" dirty="0"/>
+              <a:t>Presentation title</a:t>
+            </a:r>
+          </a:p>
+        </p:txBody>
+      </p:sp>
+      <p:pic>
+        <p:nvPicPr>
+          <p:cNvPr id="6" name="Picture 5"/>
+          <p:cNvPicPr>
+            <a:picLocks noChangeAspect="1"/>
+          </p:cNvPicPr>
+          <p:nvPr userDrawn="1"/>
+        </p:nvPicPr>
+        <p:blipFill>
+          <a:blip r:embed="rId2" cstate="print">
+            <a:extLst>
+              <a:ext uri="{BEBA8EAE-BF5A-486C-A8C5-ECC9F3942E4B}">
+                <a14:imgProps xmlns:a14="http://schemas.microsoft.com/office/drawing/2010/main">
+                  <a14:imgLayer r:embed="rId3">
+                    <a14:imgEffect>
+                      <a14:brightnessContrast bright="-1000"/>
+                    </a14:imgEffect>
+                  </a14:imgLayer>
+                </a14:imgProps>
+              </a:ext>
+              <a:ext uri="{28A0092B-C50C-407E-A947-70E740481C1C}">
+                <a14:useLocalDpi xmlns:a14="http://schemas.microsoft.com/office/drawing/2010/main" val="0"/>
+              </a:ext>
+            </a:extLst>
+          </a:blip>
+          <a:stretch>
+            <a:fillRect/>
+          </a:stretch>
+        </p:blipFill>
+        <p:spPr bwMode="black">
+          <a:xfrm>
+            <a:off x="336992" y="6061767"/>
+            <a:ext cx="1141803" cy="326167"/>
+          </a:xfrm>
+          <a:prstGeom prst="rect">
+            <a:avLst/>
+          </a:prstGeom>
+        </p:spPr>
+      </p:pic>
+      <p:sp>
+        <p:nvSpPr>
+          <p:cNvPr id="8" name="Rectangle 6"/>
+          <p:cNvSpPr>
+            <a:spLocks noChangeArrowheads="1"/>
+          </p:cNvSpPr>
+          <p:nvPr userDrawn="1"/>
+        </p:nvSpPr>
+        <p:spPr bwMode="auto">
+          <a:xfrm>
+            <a:off x="2335" y="4309989"/>
+            <a:ext cx="9141665" cy="2551127"/>
+          </a:xfrm>
+          <a:prstGeom prst="rect">
+            <a:avLst/>
+          </a:prstGeom>
+          <a:noFill/>
+          <a:ln>
+            <a:noFill/>
+          </a:ln>
+          <a:extLst>
+            <a:ext uri="{909E8E84-426E-40DD-AFC4-6F175D3DCCD1}">
+              <a14:hiddenFill xmlns:a14="http://schemas.microsoft.com/office/drawing/2010/main">
+                <a:solidFill>
+                  <a:srgbClr val="FFFFFF"/>
+                </a:solidFill>
+              </a14:hiddenFill>
+            </a:ext>
+            <a:ext uri="{91240B29-F687-4F45-9708-019B960494DF}">
+              <a14:hiddenLine xmlns:a14="http://schemas.microsoft.com/office/drawing/2010/main" w="9525">
+                <a:solidFill>
+                  <a:srgbClr val="000000"/>
+                </a:solidFill>
+                <a:miter lim="800000"/>
+                <a:headEnd/>
+                <a:tailEnd/>
+              </a14:hiddenLine>
+            </a:ext>
+          </a:extLst>
+        </p:spPr>
+        <p:txBody>
+          <a:bodyPr vert="horz" wrap="square" lIns="67232" tIns="33616" rIns="67232" bIns="33616" numCol="1" anchor="t" anchorCtr="0" compatLnSpc="1">
+            <a:prstTxWarp prst="textNoShape">
+              <a:avLst/>
+            </a:prstTxWarp>
+          </a:bodyPr>
+          <a:lstStyle/>
+          <a:p>
+            <a:pPr marL="0" marR="0" lvl="0" indent="0" algn="l" defTabSz="342900" rtl="0" eaLnBrk="1" fontAlgn="auto" latinLnBrk="0" hangingPunct="1">
+              <a:lnSpc>
+                <a:spcPct val="100000"/>
+              </a:lnSpc>
+              <a:spcBef>
+                <a:spcPts val="0"/>
+              </a:spcBef>
+              <a:spcAft>
+                <a:spcPts val="0"/>
+              </a:spcAft>
+              <a:buClrTx/>
+              <a:buSzTx/>
+              <a:buFontTx/>
+              <a:buNone/>
+              <a:tabLst/>
+              <a:defRPr/>
+            </a:pPr>
+            <a:endParaRPr kumimoji="0" lang="en-US" sz="1324" b="0" i="0" u="none" strike="noStrike" kern="1200" cap="none" spc="0" normalizeH="0" baseline="0" noProof="0">
+              <a:ln>
+                <a:noFill/>
+              </a:ln>
+              <a:solidFill>
+                <a:prstClr val="black"/>
+              </a:solidFill>
+              <a:effectLst/>
+              <a:uLnTx/>
+              <a:uFillTx/>
+              <a:latin typeface="Calibri" panose="020F0502020204030204"/>
+              <a:ea typeface="+mn-ea"/>
+              <a:cs typeface="+mn-cs"/>
+            </a:endParaRPr>
+          </a:p>
+        </p:txBody>
+      </p:sp>
+    </p:spTree>
+    <p:extLst>
+      <p:ext uri="{BB962C8B-B14F-4D97-AF65-F5344CB8AC3E}">
+        <p14:creationId xmlns:p14="http://schemas.microsoft.com/office/powerpoint/2010/main" val="1077151023"/>
+      </p:ext>
+    </p:extLst>
+  </p:cSld>
+  <p:clrMapOvr>
+    <a:masterClrMapping/>
+  </p:clrMapOvr>
+  <p:transition spd="slow">
+    <p:push/>
+  </p:transition>
+  <p:timing>
+    <p:tnLst>
+      <p:par>
+        <p:cTn id="1" dur="indefinite" restart="never" nodeType="tmRoot">
+          <p:childTnLst>
+            <p:seq concurrent="1" nextAc="seek">
+              <p:cTn id="2" dur="indefinite" nodeType="mainSeq">
+                <p:childTnLst>
+                  <p:par>
+                    <p:cTn id="3" fill="hold">
+                      <p:stCondLst>
+                        <p:cond delay="indefinite"/>
+                        <p:cond evt="onBegin" delay="0">
+                          <p:tn val="2"/>
+                        </p:cond>
+                      </p:stCondLst>
+                      <p:childTnLst>
+                        <p:par>
+                          <p:cTn id="4" fill="hold">
+                            <p:stCondLst>
+                              <p:cond delay="0"/>
+                            </p:stCondLst>
+                            <p:childTnLst>
+                              <p:par>
+                                <p:cTn id="5" presetID="63" presetClass="path" presetSubtype="0" accel="24000" decel="76000" fill="hold" grpId="0" nodeType="withEffect">
+                                  <p:stCondLst>
+                                    <p:cond delay="0"/>
+                                  </p:stCondLst>
+                                  <p:childTnLst>
+                                    <p:animMotion origin="layout" path="M 0 3.25011E-6 L 1.00728 3.25011E-6 " pathEditMode="relative" rAng="0" ptsTypes="AA">
+                                      <p:cBhvr>
+                                        <p:cTn id="6" dur="750" fill="hold"/>
+                                        <p:tgtEl>
+                                          <p:spTgt spid="11"/>
+                                        </p:tgtEl>
+                                        <p:attrNameLst>
+                                          <p:attrName>ppt_x</p:attrName>
+                                          <p:attrName>ppt_y</p:attrName>
+                                        </p:attrNameLst>
+                                      </p:cBhvr>
+                                      <p:rCtr x="50357" y="0"/>
+                                    </p:animMotion>
+                                  </p:childTnLst>
+                                </p:cTn>
+                              </p:par>
+                              <p:par>
+                                <p:cTn id="7" presetID="63" presetClass="path" presetSubtype="0" accel="24000" decel="76000" fill="hold" grpId="0" nodeType="withEffect">
+                                  <p:stCondLst>
+                                    <p:cond delay="250"/>
+                                  </p:stCondLst>
+                                  <p:childTnLst>
+                                    <p:animMotion origin="layout" path="M 0 3.25011E-6 L 1.00728 3.25011E-6 " pathEditMode="relative" rAng="0" ptsTypes="AA">
+                                      <p:cBhvr>
+                                        <p:cTn id="8" dur="750" fill="hold"/>
+                                        <p:tgtEl>
+                                          <p:spTgt spid="12"/>
+                                        </p:tgtEl>
+                                        <p:attrNameLst>
+                                          <p:attrName>ppt_x</p:attrName>
+                                          <p:attrName>ppt_y</p:attrName>
+                                        </p:attrNameLst>
+                                      </p:cBhvr>
+                                      <p:rCtr x="50357" y="0"/>
+                                    </p:animMotion>
+                                  </p:childTnLst>
+                                </p:cTn>
+                              </p:par>
+                              <p:par>
+                                <p:cTn id="9" presetID="63" presetClass="path" presetSubtype="0" accel="24000" decel="76000" fill="hold" grpId="0" nodeType="withEffect">
+                                  <p:stCondLst>
+                                    <p:cond delay="150"/>
+                                  </p:stCondLst>
+                                  <p:childTnLst>
+                                    <p:animMotion origin="layout" path="M 0 3.25011E-6 L 1.00728 3.25011E-6 " pathEditMode="relative" rAng="0" ptsTypes="AA">
+                                      <p:cBhvr>
+                                        <p:cTn id="10" dur="750" fill="hold"/>
+                                        <p:tgtEl>
+                                          <p:spTgt spid="10"/>
+                                        </p:tgtEl>
+                                        <p:attrNameLst>
+                                          <p:attrName>ppt_x</p:attrName>
+                                          <p:attrName>ppt_y</p:attrName>
+                                        </p:attrNameLst>
+                                      </p:cBhvr>
+                                      <p:rCtr x="50357" y="0"/>
+                                    </p:animMotion>
+                                  </p:childTnLst>
+                                </p:cTn>
+                              </p:par>
+                              <p:par>
+                                <p:cTn id="11" presetID="1" presetClass="entr" presetSubtype="0" fill="hold" grpId="0" nodeType="withEffect">
+                                  <p:stCondLst>
+                                    <p:cond delay="1000"/>
+                                  </p:stCondLst>
+                                  <p:childTnLst>
+                                    <p:set>
+                                      <p:cBhvr>
+                                        <p:cTn id="12" dur="1" fill="hold">
+                                          <p:stCondLst>
+                                            <p:cond delay="0"/>
+                                          </p:stCondLst>
+                                        </p:cTn>
+                                        <p:tgtEl>
+                                          <p:spTgt spid="13"/>
+                                        </p:tgtEl>
+                                        <p:attrNameLst>
+                                          <p:attrName>style.visibility</p:attrName>
+                                        </p:attrNameLst>
+                                      </p:cBhvr>
+                                      <p:to>
+                                        <p:strVal val="visible"/>
+                                      </p:to>
+                                    </p:set>
+                                  </p:childTnLst>
+                                </p:cTn>
+                              </p:par>
+                              <p:par>
+                                <p:cTn id="13" presetID="10" presetClass="entr" presetSubtype="0" fill="hold" grpId="0" nodeType="withEffect">
+                                  <p:stCondLst>
+                                    <p:cond delay="750"/>
+                                  </p:stCondLst>
+                                  <p:childTnLst>
+                                    <p:set>
+                                      <p:cBhvr>
+                                        <p:cTn id="14" dur="1" fill="hold">
+                                          <p:stCondLst>
+                                            <p:cond delay="0"/>
+                                          </p:stCondLst>
+                                        </p:cTn>
+                                        <p:tgtEl>
+                                          <p:spTgt spid="9"/>
+                                        </p:tgtEl>
+                                        <p:attrNameLst>
+                                          <p:attrName>style.visibility</p:attrName>
+                                        </p:attrNameLst>
+                                      </p:cBhvr>
+                                      <p:to>
+                                        <p:strVal val="visible"/>
+                                      </p:to>
+                                    </p:set>
+                                    <p:animEffect transition="in" filter="fade">
+                                      <p:cBhvr>
+                                        <p:cTn id="15" dur="950"/>
+                                        <p:tgtEl>
+                                          <p:spTgt spid="9"/>
+                                        </p:tgtEl>
+                                      </p:cBhvr>
+                                    </p:animEffect>
+                                  </p:childTnLst>
+                                </p:cTn>
+                              </p:par>
+                              <p:par>
+                                <p:cTn id="16" presetID="63" presetClass="path" presetSubtype="0" decel="100000" fill="hold" grpId="1" nodeType="withEffect">
+                                  <p:stCondLst>
+                                    <p:cond delay="750"/>
+                                  </p:stCondLst>
+                                  <p:childTnLst>
+                                    <p:animMotion origin="layout" path="M -0.01455 -1.34362E-6 L -3.90605E-7 -1.34362E-6 " pathEditMode="relative" rAng="0" ptsTypes="AA">
+                                      <p:cBhvr>
+                                        <p:cTn id="17" dur="950" fill="hold"/>
+                                        <p:tgtEl>
+                                          <p:spTgt spid="9"/>
+                                        </p:tgtEl>
+                                        <p:attrNameLst>
+                                          <p:attrName>ppt_x</p:attrName>
+                                          <p:attrName>ppt_y</p:attrName>
+                                        </p:attrNameLst>
+                                      </p:cBhvr>
+                                      <p:rCtr x="728" y="0"/>
+                                    </p:animMotion>
+                                  </p:childTnLst>
+                                </p:cTn>
+                              </p:par>
+                              <p:par>
+                                <p:cTn id="18" presetID="6" presetClass="emph" presetSubtype="0" accel="100000" autoRev="1" fill="hold" grpId="2" nodeType="withEffect">
+                                  <p:stCondLst>
+                                    <p:cond delay="50"/>
+                                  </p:stCondLst>
+                                  <p:childTnLst>
+                                    <p:animScale>
+                                      <p:cBhvr>
+                                        <p:cTn id="19" dur="500" fill="hold"/>
+                                        <p:tgtEl>
+                                          <p:spTgt spid="9"/>
+                                        </p:tgtEl>
+                                      </p:cBhvr>
+                                      <p:by x="95000" y="95000"/>
+                                    </p:animScale>
+                                  </p:childTnLst>
+                                </p:cTn>
+                              </p:par>
+                              <p:par>
+                                <p:cTn id="20" presetID="10" presetClass="entr" presetSubtype="0" fill="hold" grpId="0" nodeType="withEffect" nodePh="1">
+                                  <p:stCondLst>
+                                    <p:cond delay="800"/>
+                                  </p:stCondLst>
+                                  <p:endCondLst>
+                                    <p:cond evt="begin" delay="0">
+                                      <p:tn val="20"/>
+                                    </p:cond>
+                                  </p:endCondLst>
+                                  <p:childTnLst>
+                                    <p:set>
+                                      <p:cBhvr>
+                                        <p:cTn id="21" dur="1" fill="hold">
+                                          <p:stCondLst>
+                                            <p:cond delay="0"/>
+                                          </p:stCondLst>
+                                        </p:cTn>
+                                        <p:tgtEl>
+                                          <p:spTgt spid="5"/>
+                                        </p:tgtEl>
+                                        <p:attrNameLst>
+                                          <p:attrName>style.visibility</p:attrName>
+                                        </p:attrNameLst>
+                                      </p:cBhvr>
+                                      <p:to>
+                                        <p:strVal val="visible"/>
+                                      </p:to>
+                                    </p:set>
+                                    <p:animEffect transition="in" filter="fade">
+                                      <p:cBhvr>
+                                        <p:cTn id="22" dur="950"/>
+                                        <p:tgtEl>
+                                          <p:spTgt spid="5"/>
+                                        </p:tgtEl>
+                                      </p:cBhvr>
+                                    </p:animEffect>
+                                  </p:childTnLst>
+                                </p:cTn>
+                              </p:par>
+                              <p:par>
+                                <p:cTn id="23" presetID="63" presetClass="path" presetSubtype="0" decel="100000" fill="hold" grpId="1" nodeType="withEffect" nodePh="1">
+                                  <p:stCondLst>
+                                    <p:cond delay="800"/>
+                                  </p:stCondLst>
+                                  <p:endCondLst>
+                                    <p:cond evt="begin" delay="0">
+                                      <p:tn val="23"/>
+                                    </p:cond>
+                                  </p:endCondLst>
+                                  <p:childTnLst>
+                                    <p:animMotion origin="layout" path="M -0.01455 -1.34362E-6 L -3.90605E-7 -1.34362E-6 " pathEditMode="relative" rAng="0" ptsTypes="AA">
+                                      <p:cBhvr>
+                                        <p:cTn id="24" dur="950" fill="hold"/>
+                                        <p:tgtEl>
+                                          <p:spTgt spid="5"/>
+                                        </p:tgtEl>
+                                        <p:attrNameLst>
+                                          <p:attrName>ppt_x</p:attrName>
+                                          <p:attrName>ppt_y</p:attrName>
+                                        </p:attrNameLst>
+                                      </p:cBhvr>
+                                      <p:rCtr x="728" y="0"/>
+                                    </p:animMotion>
+                                  </p:childTnLst>
+                                </p:cTn>
+                              </p:par>
+                              <p:par>
+                                <p:cTn id="25" presetID="6" presetClass="emph" presetSubtype="0" accel="100000" autoRev="1" fill="hold" grpId="2" nodeType="withEffect" nodePh="1">
+                                  <p:stCondLst>
+                                    <p:cond delay="100"/>
+                                  </p:stCondLst>
+                                  <p:endCondLst>
+                                    <p:cond evt="begin" delay="0">
+                                      <p:tn val="25"/>
+                                    </p:cond>
+                                  </p:endCondLst>
+                                  <p:childTnLst>
+                                    <p:animScale>
+                                      <p:cBhvr>
+                                        <p:cTn id="26" dur="500" fill="hold"/>
+                                        <p:tgtEl>
+                                          <p:spTgt spid="5"/>
+                                        </p:tgtEl>
+                                      </p:cBhvr>
+                                      <p:by x="95000" y="95000"/>
+                                    </p:animScale>
+                                  </p:childTnLst>
+                                </p:cTn>
+                              </p:par>
+                              <p:par>
+                                <p:cTn id="27" presetID="10" presetClass="entr" presetSubtype="0" fill="hold" nodeType="withEffect">
+                                  <p:stCondLst>
+                                    <p:cond delay="900"/>
+                                  </p:stCondLst>
+                                  <p:childTnLst>
+                                    <p:set>
+                                      <p:cBhvr>
+                                        <p:cTn id="28" dur="1" fill="hold">
+                                          <p:stCondLst>
+                                            <p:cond delay="0"/>
+                                          </p:stCondLst>
+                                        </p:cTn>
+                                        <p:tgtEl>
+                                          <p:spTgt spid="6"/>
+                                        </p:tgtEl>
+                                        <p:attrNameLst>
+                                          <p:attrName>style.visibility</p:attrName>
+                                        </p:attrNameLst>
+                                      </p:cBhvr>
+                                      <p:to>
+                                        <p:strVal val="visible"/>
+                                      </p:to>
+                                    </p:set>
+                                    <p:animEffect transition="in" filter="fade">
+                                      <p:cBhvr>
+                                        <p:cTn id="29" dur="950"/>
+                                        <p:tgtEl>
+                                          <p:spTgt spid="6"/>
+                                        </p:tgtEl>
+                                      </p:cBhvr>
+                                    </p:animEffect>
+                                  </p:childTnLst>
+                                </p:cTn>
+                              </p:par>
+                              <p:par>
+                                <p:cTn id="30" presetID="63" presetClass="path" presetSubtype="0" decel="100000" fill="hold" nodeType="withEffect">
+                                  <p:stCondLst>
+                                    <p:cond delay="900"/>
+                                  </p:stCondLst>
+                                  <p:childTnLst>
+                                    <p:animMotion origin="layout" path="M -0.01455 -1.34362E-6 L -3.90605E-7 -1.34362E-6 " pathEditMode="relative" rAng="0" ptsTypes="AA">
+                                      <p:cBhvr>
+                                        <p:cTn id="31" dur="950" fill="hold"/>
+                                        <p:tgtEl>
+                                          <p:spTgt spid="6"/>
+                                        </p:tgtEl>
+                                        <p:attrNameLst>
+                                          <p:attrName>ppt_x</p:attrName>
+                                          <p:attrName>ppt_y</p:attrName>
+                                        </p:attrNameLst>
+                                      </p:cBhvr>
+                                      <p:rCtr x="728" y="0"/>
+                                    </p:animMotion>
+                                  </p:childTnLst>
+                                </p:cTn>
+                              </p:par>
+                              <p:par>
+                                <p:cTn id="32" presetID="6" presetClass="emph" presetSubtype="0" accel="100000" autoRev="1" fill="hold" nodeType="withEffect">
+                                  <p:stCondLst>
+                                    <p:cond delay="200"/>
+                                  </p:stCondLst>
+                                  <p:childTnLst>
+                                    <p:animScale>
+                                      <p:cBhvr>
+                                        <p:cTn id="33" dur="500" fill="hold"/>
+                                        <p:tgtEl>
+                                          <p:spTgt spid="6"/>
+                                        </p:tgtEl>
+                                      </p:cBhvr>
+                                      <p:by x="95000" y="95000"/>
+                                    </p:animScale>
+                                  </p:childTnLst>
+                                </p:cTn>
+                              </p:par>
+                            </p:childTnLst>
+                          </p:cTn>
+                        </p:par>
+                      </p:childTnLst>
+                    </p:cTn>
+                  </p:par>
+                </p:childTnLst>
+              </p:cTn>
+              <p:prevCondLst>
+                <p:cond evt="onPrev" delay="0">
+                  <p:tgtEl>
+                    <p:sldTgt/>
+                  </p:tgtEl>
+                </p:cond>
+              </p:prevCondLst>
+              <p:nextCondLst>
+                <p:cond evt="onNext" delay="0">
+                  <p:tgtEl>
+                    <p:sldTgt/>
+                  </p:tgtEl>
+                </p:cond>
+              </p:nextCondLst>
+            </p:seq>
+          </p:childTnLst>
+        </p:cTn>
+      </p:par>
+    </p:tnLst>
+    <p:bldLst>
+      <p:bldP spid="12" grpId="0" animBg="1"/>
+      <p:bldP spid="12" grpId="1" animBg="1"/>
+      <p:bldP spid="12" grpId="2" animBg="1"/>
+      <p:bldP spid="12" grpId="3" animBg="1"/>
+      <p:bldP spid="12" grpId="4" animBg="1"/>
+      <p:bldP spid="12" grpId="5" animBg="1"/>
+      <p:bldP spid="12" grpId="6" animBg="1"/>
+      <p:bldP spid="12" grpId="7" animBg="1"/>
+      <p:bldP spid="10" grpId="0" animBg="1"/>
+      <p:bldP spid="10" grpId="1" animBg="1"/>
+      <p:bldP spid="10" grpId="2" animBg="1"/>
+      <p:bldP spid="10" grpId="3" animBg="1"/>
+      <p:bldP spid="10" grpId="4" animBg="1"/>
+      <p:bldP spid="10" grpId="5" animBg="1"/>
+      <p:bldP spid="10" grpId="6" animBg="1"/>
+      <p:bldP spid="10" grpId="7" animBg="1"/>
+      <p:bldP spid="11" grpId="0" animBg="1"/>
+      <p:bldP spid="11" grpId="1" animBg="1"/>
+      <p:bldP spid="11" grpId="2" animBg="1"/>
+      <p:bldP spid="11" grpId="3" animBg="1"/>
+      <p:bldP spid="11" grpId="4" animBg="1"/>
+      <p:bldP spid="11" grpId="5" animBg="1"/>
+      <p:bldP spid="11" grpId="6" animBg="1"/>
+      <p:bldP spid="11" grpId="7" animBg="1"/>
+      <p:bldP spid="13" grpId="0" animBg="1"/>
+      <p:bldP spid="13" grpId="1" animBg="1"/>
+      <p:bldP spid="13" grpId="2" animBg="1"/>
+      <p:bldP spid="13" grpId="3" animBg="1"/>
+      <p:bldP spid="13" grpId="4" animBg="1"/>
+      <p:bldP spid="13" grpId="5" animBg="1"/>
+      <p:bldP spid="13" grpId="6" animBg="1"/>
+      <p:bldP spid="13" grpId="7" animBg="1"/>
+      <p:bldP spid="5" grpId="0">
+        <p:tmplLst>
+          <p:tmpl>
+            <p:tnLst>
+              <p:par>
+                <p:cTn presetID="10" presetClass="entr" presetSubtype="0" fill="hold" nodeType="withEffect">
+                  <p:stCondLst>
+                    <p:cond delay="800"/>
+                  </p:stCondLst>
+                  <p:childTnLst>
+                    <p:set>
+                      <p:cBhvr>
+                        <p:cTn dur="1" fill="hold">
+                          <p:stCondLst>
+                            <p:cond delay="0"/>
+                          </p:stCondLst>
+                        </p:cTn>
+                        <p:tgtEl>
+                          <p:spTgt spid="5"/>
+                        </p:tgtEl>
+                        <p:attrNameLst>
+                          <p:attrName>style.visibility</p:attrName>
+                        </p:attrNameLst>
+                      </p:cBhvr>
+                      <p:to>
+                        <p:strVal val="visible"/>
+                      </p:to>
+                    </p:set>
+                    <p:animEffect transition="in" filter="fade">
+                      <p:cBhvr>
+                        <p:cTn dur="950"/>
+                        <p:tgtEl>
+                          <p:spTgt spid="5"/>
+                        </p:tgtEl>
+                      </p:cBhvr>
+                    </p:animEffect>
+                  </p:childTnLst>
+                </p:cTn>
+              </p:par>
+            </p:tnLst>
+          </p:tmpl>
+        </p:tmplLst>
+      </p:bldP>
+      <p:bldP spid="5" grpId="1">
+        <p:tmplLst>
+          <p:tmpl>
+            <p:tnLst>
+              <p:par>
+                <p:cTn presetID="63" presetClass="path" presetSubtype="0" decel="100000" fill="hold" nodeType="withEffect">
+                  <p:stCondLst>
+                    <p:cond delay="800"/>
+                  </p:stCondLst>
+                  <p:childTnLst>
+                    <p:animMotion origin="layout" path="M -0.01455 -1.34362E-6 L -3.90605E-7 -1.34362E-6 " pathEditMode="relative" rAng="0" ptsTypes="AA">
+                      <p:cBhvr>
+                        <p:cTn dur="950" fill="hold"/>
+                        <p:tgtEl>
+                          <p:spTgt spid="5"/>
+                        </p:tgtEl>
+                        <p:attrNameLst>
+                          <p:attrName>ppt_x</p:attrName>
+                          <p:attrName>ppt_y</p:attrName>
+                        </p:attrNameLst>
+                      </p:cBhvr>
+                      <p:rCtr x="728" y="0"/>
+                    </p:animMotion>
+                  </p:childTnLst>
+                </p:cTn>
+              </p:par>
+            </p:tnLst>
+          </p:tmpl>
+        </p:tmplLst>
+      </p:bldP>
+      <p:bldP spid="5" grpId="2">
+        <p:tmplLst>
+          <p:tmpl>
+            <p:tnLst>
+              <p:par>
+                <p:cTn presetID="6" presetClass="emph" presetSubtype="0" accel="100000" autoRev="1" fill="hold" nodeType="withEffect">
+                  <p:stCondLst>
+                    <p:cond delay="100"/>
+                  </p:stCondLst>
+                  <p:childTnLst>
+                    <p:animScale>
+                      <p:cBhvr>
+                        <p:cTn dur="500" fill="hold"/>
+                        <p:tgtEl>
+                          <p:spTgt spid="5"/>
+                        </p:tgtEl>
+                      </p:cBhvr>
+                      <p:by x="95000" y="95000"/>
+                    </p:animScale>
+                  </p:childTnLst>
+                </p:cTn>
+              </p:par>
+            </p:tnLst>
+          </p:tmpl>
+        </p:tmplLst>
+      </p:bldP>
+      <p:bldP spid="9" grpId="0"/>
+      <p:bldP spid="9" grpId="1"/>
+      <p:bldP spid="9" grpId="2"/>
+    </p:bldLst>
+  </p:timing>
+  <p:extLst mod="1">
+    <p:ext uri="{DCECCB84-F9BA-43D5-87BE-67443E8EF086}">
+      <p15:sldGuideLst xmlns:p15="http://schemas.microsoft.com/office/powerpoint/2012/main">
+        <p15:guide id="1" orient="horz" pos="4406">
+          <p15:clr>
+            <a:srgbClr val="C35EA4"/>
+          </p15:clr>
+        </p15:guide>
+      </p15:sldGuideLst>
+    </p:ext>
+  </p:extLst>
+</p:sldLayout>
+</file>
+
+<file path=ppt/slideLayouts/slideLayout3.xml><?xml version="1.0" encoding="utf-8"?>
+<p:sldLayout xmlns:a="http://schemas.openxmlformats.org/drawingml/2006/main" xmlns:r="http://schemas.openxmlformats.org/officeDocument/2006/relationships" xmlns:p="http://schemas.openxmlformats.org/presentationml/2006/main" preserve="1" userDrawn="1">
+  <p:cSld name="Title and Content">
+    <p:spTree>
+      <p:nvGrpSpPr>
+        <p:cNvPr id="1" name=""/>
+        <p:cNvGrpSpPr/>
+        <p:nvPr/>
+      </p:nvGrpSpPr>
+      <p:grpSpPr>
+        <a:xfrm>
+          <a:off x="0" y="0"/>
+          <a:ext cx="0" cy="0"/>
+          <a:chOff x="0" y="0"/>
+          <a:chExt cx="0" cy="0"/>
+        </a:xfrm>
+      </p:grpSpPr>
+      <p:sp>
+        <p:nvSpPr>
           <p:cNvPr id="2" name="Title 1"/>
           <p:cNvSpPr>
             <a:spLocks noGrp="1"/>
           </p:cNvSpPr>
           <p:nvPr>
-            <p:ph type="title"/>
+            <p:ph type="title" hasCustomPrompt="1"/>
+          </p:nvPr>
+        </p:nvSpPr>
+        <p:spPr>
+          <a:xfrm>
+            <a:off x="140677" y="-3"/>
+            <a:ext cx="8920195" cy="896817"/>
+          </a:xfrm>
+        </p:spPr>
+        <p:txBody>
+          <a:bodyPr/>
+          <a:lstStyle>
+            <a:lvl1pPr>
+              <a:defRPr/>
+            </a:lvl1pPr>
+          </a:lstStyle>
+          <a:p>
+            <a:r>
+              <a:rPr lang="en-US" dirty="0"/>
+              <a:t>Click to edit Content title style</a:t>
+            </a:r>
+          </a:p>
+        </p:txBody>
+      </p:sp>
+      <p:sp>
+        <p:nvSpPr>
+          <p:cNvPr id="3" name="Content Placeholder 2"/>
+          <p:cNvSpPr>
+            <a:spLocks noGrp="1"/>
+          </p:cNvSpPr>
+          <p:nvPr>
+            <p:ph idx="1" hasCustomPrompt="1"/>
           </p:nvPr>
         </p:nvSpPr>
         <p:spPr/>
         <p:txBody>
           <a:bodyPr/>
-          <a:lstStyle/>
-          <a:p>
+          <a:lstStyle>
+            <a:lvl1pPr>
+              <a:defRPr/>
+            </a:lvl1pPr>
+          </a:lstStyle>
+          <a:p>
+            <a:pPr lvl="0"/>
             <a:r>
               <a:rPr lang="en-US" dirty="0"/>
-              <a:t>Click to edit Master title style</a:t>
-            </a:r>
-          </a:p>
-        </p:txBody>
-      </p:sp>
-      <p:sp>
-        <p:nvSpPr>
-          <p:cNvPr id="3" name="Text Placeholder 2"/>
-          <p:cNvSpPr>
-            <a:spLocks noGrp="1"/>
-          </p:cNvSpPr>
-          <p:nvPr>
-            <p:ph type="body" idx="1"/>
-          </p:nvPr>
-        </p:nvSpPr>
-        <p:spPr/>
-        <p:txBody>
-          <a:bodyPr/>
-          <a:lstStyle/>
-          <a:p>
-            <a:pPr lvl="0"/>
-            <a:r>
-              <a:rPr lang="en-US" dirty="0"/>
-              <a:t>Edit Master text styles</a:t>
+              <a:t>Edit Content text styles</a:t>
             </a:r>
           </a:p>
           <a:p>
@@ -8538,10 +10032,10 @@
       </p:sp>
       <p:sp>
         <p:nvSpPr>
-          <p:cNvPr id="4" name="Text Placeholder 4">
+          <p:cNvPr id="7" name="Text Placeholder 4">
             <a:extLst>
               <a:ext uri="{FF2B5EF4-FFF2-40B4-BE49-F238E27FC236}">
-                <a16:creationId xmlns:a16="http://schemas.microsoft.com/office/drawing/2014/main" id="{1E308FE5-C3CD-4C2B-84FD-DAE006C3200F}"/>
+                <a16:creationId xmlns:a16="http://schemas.microsoft.com/office/drawing/2014/main" id="{9146F062-CB39-4EE2-BF38-33F62C9E5028}"/>
               </a:ext>
             </a:extLst>
           </p:cNvPr>
@@ -8549,7 +10043,7 @@
             <a:spLocks noGrp="1"/>
           </p:cNvSpPr>
           <p:nvPr>
-            <p:ph type="body" sz="quarter" idx="10" hasCustomPrompt="1"/>
+            <p:ph type="body" sz="quarter" idx="13" hasCustomPrompt="1"/>
           </p:nvPr>
         </p:nvSpPr>
         <p:spPr>
@@ -8599,7 +10093,7 @@
     </p:spTree>
     <p:extLst>
       <p:ext uri="{BB962C8B-B14F-4D97-AF65-F5344CB8AC3E}">
-        <p14:creationId xmlns:p14="http://schemas.microsoft.com/office/powerpoint/2010/main" val="2569415734"/>
+        <p14:creationId xmlns:p14="http://schemas.microsoft.com/office/powerpoint/2010/main" val="3252280867"/>
       </p:ext>
     </p:extLst>
   </p:cSld>
@@ -8611,7 +10105,7 @@
 
 <file path=ppt/slideLayouts/slideLayout4.xml><?xml version="1.0" encoding="utf-8"?>
 <p:sldLayout xmlns:a="http://schemas.openxmlformats.org/drawingml/2006/main" xmlns:r="http://schemas.openxmlformats.org/officeDocument/2006/relationships" xmlns:p="http://schemas.openxmlformats.org/presentationml/2006/main" preserve="1" userDrawn="1">
-  <p:cSld name="Title Only">
+  <p:cSld name="Title and Text">
     <p:spTree>
       <p:nvGrpSpPr>
         <p:cNvPr id="1" name=""/>
@@ -8633,27 +10127,86 @@
             <a:spLocks noGrp="1"/>
           </p:cNvSpPr>
           <p:nvPr>
-            <p:ph type="title"/>
+            <p:ph type="title" hasCustomPrompt="1"/>
           </p:nvPr>
         </p:nvSpPr>
         <p:spPr/>
         <p:txBody>
           <a:bodyPr/>
-          <a:lstStyle/>
-          <a:p>
-            <a:r>
-              <a:rPr lang="en-US"/>
-              <a:t>Click to edit Master title style</a:t>
-            </a:r>
-          </a:p>
-        </p:txBody>
-      </p:sp>
-      <p:sp>
-        <p:nvSpPr>
-          <p:cNvPr id="3" name="Text Placeholder 4">
+          <a:lstStyle>
+            <a:lvl1pPr>
+              <a:defRPr/>
+            </a:lvl1pPr>
+          </a:lstStyle>
+          <a:p>
+            <a:r>
+              <a:rPr lang="en-US" dirty="0"/>
+              <a:t>Click to edit Text title style</a:t>
+            </a:r>
+          </a:p>
+        </p:txBody>
+      </p:sp>
+      <p:sp>
+        <p:nvSpPr>
+          <p:cNvPr id="3" name="Text Placeholder 2"/>
+          <p:cNvSpPr>
+            <a:spLocks noGrp="1"/>
+          </p:cNvSpPr>
+          <p:nvPr>
+            <p:ph type="body" idx="1" hasCustomPrompt="1"/>
+          </p:nvPr>
+        </p:nvSpPr>
+        <p:spPr/>
+        <p:txBody>
+          <a:bodyPr/>
+          <a:lstStyle>
+            <a:lvl1pPr>
+              <a:defRPr/>
+            </a:lvl1pPr>
+          </a:lstStyle>
+          <a:p>
+            <a:pPr lvl="0"/>
+            <a:r>
+              <a:rPr lang="en-US" dirty="0"/>
+              <a:t>Edit Text text styles</a:t>
+            </a:r>
+          </a:p>
+          <a:p>
+            <a:pPr lvl="1"/>
+            <a:r>
+              <a:rPr lang="en-US" dirty="0"/>
+              <a:t>Second level</a:t>
+            </a:r>
+          </a:p>
+          <a:p>
+            <a:pPr lvl="2"/>
+            <a:r>
+              <a:rPr lang="en-US" dirty="0"/>
+              <a:t>Third level</a:t>
+            </a:r>
+          </a:p>
+          <a:p>
+            <a:pPr lvl="3"/>
+            <a:r>
+              <a:rPr lang="en-US" dirty="0"/>
+              <a:t>Fourth level</a:t>
+            </a:r>
+          </a:p>
+          <a:p>
+            <a:pPr lvl="4"/>
+            <a:r>
+              <a:rPr lang="en-US" dirty="0"/>
+              <a:t>Fifth level</a:t>
+            </a:r>
+          </a:p>
+        </p:txBody>
+      </p:sp>
+      <p:sp>
+        <p:nvSpPr>
+          <p:cNvPr id="4" name="Text Placeholder 4">
             <a:extLst>
               <a:ext uri="{FF2B5EF4-FFF2-40B4-BE49-F238E27FC236}">
-                <a16:creationId xmlns:a16="http://schemas.microsoft.com/office/drawing/2014/main" id="{0FDE037B-5AC3-4803-B046-88D8FAB98146}"/>
+                <a16:creationId xmlns:a16="http://schemas.microsoft.com/office/drawing/2014/main" id="{1E308FE5-C3CD-4C2B-84FD-DAE006C3200F}"/>
               </a:ext>
             </a:extLst>
           </p:cNvPr>
@@ -8711,6 +10264,122 @@
     </p:spTree>
     <p:extLst>
       <p:ext uri="{BB962C8B-B14F-4D97-AF65-F5344CB8AC3E}">
+        <p14:creationId xmlns:p14="http://schemas.microsoft.com/office/powerpoint/2010/main" val="2569415734"/>
+      </p:ext>
+    </p:extLst>
+  </p:cSld>
+  <p:clrMapOvr>
+    <a:masterClrMapping/>
+  </p:clrMapOvr>
+</p:sldLayout>
+</file>
+
+<file path=ppt/slideLayouts/slideLayout5.xml><?xml version="1.0" encoding="utf-8"?>
+<p:sldLayout xmlns:a="http://schemas.openxmlformats.org/drawingml/2006/main" xmlns:r="http://schemas.openxmlformats.org/officeDocument/2006/relationships" xmlns:p="http://schemas.openxmlformats.org/presentationml/2006/main" preserve="1" userDrawn="1">
+  <p:cSld name="Title Only">
+    <p:spTree>
+      <p:nvGrpSpPr>
+        <p:cNvPr id="1" name=""/>
+        <p:cNvGrpSpPr/>
+        <p:nvPr/>
+      </p:nvGrpSpPr>
+      <p:grpSpPr>
+        <a:xfrm>
+          <a:off x="0" y="0"/>
+          <a:ext cx="0" cy="0"/>
+          <a:chOff x="0" y="0"/>
+          <a:chExt cx="0" cy="0"/>
+        </a:xfrm>
+      </p:grpSpPr>
+      <p:sp>
+        <p:nvSpPr>
+          <p:cNvPr id="2" name="Title 1"/>
+          <p:cNvSpPr>
+            <a:spLocks noGrp="1"/>
+          </p:cNvSpPr>
+          <p:nvPr>
+            <p:ph type="title" hasCustomPrompt="1"/>
+          </p:nvPr>
+        </p:nvSpPr>
+        <p:spPr/>
+        <p:txBody>
+          <a:bodyPr/>
+          <a:lstStyle>
+            <a:lvl1pPr>
+              <a:defRPr/>
+            </a:lvl1pPr>
+          </a:lstStyle>
+          <a:p>
+            <a:r>
+              <a:rPr lang="en-US" dirty="0"/>
+              <a:t>Click to edit Title Only title style</a:t>
+            </a:r>
+          </a:p>
+        </p:txBody>
+      </p:sp>
+      <p:sp>
+        <p:nvSpPr>
+          <p:cNvPr id="3" name="Text Placeholder 4">
+            <a:extLst>
+              <a:ext uri="{FF2B5EF4-FFF2-40B4-BE49-F238E27FC236}">
+                <a16:creationId xmlns:a16="http://schemas.microsoft.com/office/drawing/2014/main" id="{0FDE037B-5AC3-4803-B046-88D8FAB98146}"/>
+              </a:ext>
+            </a:extLst>
+          </p:cNvPr>
+          <p:cNvSpPr>
+            <a:spLocks noGrp="1"/>
+          </p:cNvSpPr>
+          <p:nvPr>
+            <p:ph type="body" sz="quarter" idx="10" hasCustomPrompt="1"/>
+          </p:nvPr>
+        </p:nvSpPr>
+        <p:spPr>
+          <a:xfrm>
+            <a:off x="261188" y="6307137"/>
+            <a:ext cx="8574837" cy="410903"/>
+          </a:xfrm>
+        </p:spPr>
+        <p:txBody>
+          <a:bodyPr/>
+          <a:lstStyle>
+            <a:lvl1pPr marL="0" indent="0">
+              <a:buFont typeface="Arial" panose="020B0604020202020204" pitchFamily="34" charset="0"/>
+              <a:buNone/>
+              <a:defRPr sz="1400"/>
+            </a:lvl1pPr>
+            <a:lvl2pPr marL="574675" indent="-285750">
+              <a:buFont typeface="Arial" panose="020B0604020202020204" pitchFamily="34" charset="0"/>
+              <a:buChar char="•"/>
+              <a:defRPr sz="1600"/>
+            </a:lvl2pPr>
+            <a:lvl3pPr marL="966787" indent="-285750">
+              <a:buFont typeface="Arial" panose="020B0604020202020204" pitchFamily="34" charset="0"/>
+              <a:buChar char="•"/>
+              <a:defRPr sz="1400"/>
+            </a:lvl3pPr>
+            <a:lvl4pPr marL="1260475" indent="-171450">
+              <a:buFont typeface="Arial" panose="020B0604020202020204" pitchFamily="34" charset="0"/>
+              <a:buChar char="•"/>
+              <a:defRPr sz="1200"/>
+            </a:lvl4pPr>
+            <a:lvl5pPr marL="1547813" indent="-171450">
+              <a:buFont typeface="Arial" panose="020B0604020202020204" pitchFamily="34" charset="0"/>
+              <a:buChar char="•"/>
+              <a:defRPr sz="1200"/>
+            </a:lvl5pPr>
+          </a:lstStyle>
+          <a:p>
+            <a:pPr lvl="0"/>
+            <a:r>
+              <a:rPr lang="en-US" dirty="0"/>
+              <a:t>Edit URL</a:t>
+            </a:r>
+          </a:p>
+        </p:txBody>
+      </p:sp>
+    </p:spTree>
+    <p:extLst>
+      <p:ext uri="{BB962C8B-B14F-4D97-AF65-F5344CB8AC3E}">
         <p14:creationId xmlns:p14="http://schemas.microsoft.com/office/powerpoint/2010/main" val="386383214"/>
       </p:ext>
     </p:extLst>
@@ -8721,7 +10390,7 @@
 </p:sldLayout>
 </file>
 
-<file path=ppt/slideLayouts/slideLayout5.xml><?xml version="1.0" encoding="utf-8"?>
+<file path=ppt/slideLayouts/slideLayout6.xml><?xml version="1.0" encoding="utf-8"?>
 <p:sldLayout xmlns:a="http://schemas.openxmlformats.org/drawingml/2006/main" xmlns:r="http://schemas.openxmlformats.org/officeDocument/2006/relationships" xmlns:p="http://schemas.openxmlformats.org/presentationml/2006/main" preserve="1" userDrawn="1">
   <p:cSld name="Exam Tip">
     <p:spTree>
@@ -8753,7 +10422,7 @@
         <p:spPr>
           <a:xfrm>
             <a:off x="0" y="0"/>
-            <a:ext cx="9144000" cy="6858000"/>
+            <a:ext cx="9144000" cy="5913120"/>
           </a:xfrm>
           <a:prstGeom prst="rect">
             <a:avLst/>
@@ -8938,9 +10607,7 @@
             <a:off x="158354" y="5987143"/>
             <a:ext cx="8784586" cy="823460"/>
           </a:xfrm>
-          <a:solidFill>
-            <a:srgbClr val="00B050"/>
-          </a:solidFill>
+          <a:noFill/>
         </p:spPr>
         <p:txBody>
           <a:bodyPr>
@@ -9061,7 +10728,7 @@
 </p:sldLayout>
 </file>
 
-<file path=ppt/slideLayouts/slideLayout6.xml><?xml version="1.0" encoding="utf-8"?>
+<file path=ppt/slideLayouts/slideLayout7.xml><?xml version="1.0" encoding="utf-8"?>
 <p:sldLayout xmlns:a="http://schemas.openxmlformats.org/drawingml/2006/main" xmlns:r="http://schemas.openxmlformats.org/officeDocument/2006/relationships" xmlns:p="http://schemas.openxmlformats.org/presentationml/2006/main" preserve="1" userDrawn="1">
   <p:cSld name="Case Study Question">
     <p:spTree>
@@ -9303,7 +10970,7 @@
 </p:sldLayout>
 </file>
 
-<file path=ppt/slideLayouts/slideLayout7.xml><?xml version="1.0" encoding="utf-8"?>
+<file path=ppt/slideLayouts/slideLayout8.xml><?xml version="1.0" encoding="utf-8"?>
 <p:sldLayout xmlns:a="http://schemas.openxmlformats.org/drawingml/2006/main" xmlns:r="http://schemas.openxmlformats.org/officeDocument/2006/relationships" xmlns:p="http://schemas.openxmlformats.org/presentationml/2006/main" preserve="1" userDrawn="1">
   <p:cSld name="Question">
     <p:spTree>
@@ -9402,7 +11069,7 @@
           <a:p>
             <a:r>
               <a:rPr lang="en-US" dirty="0"/>
-              <a:t>Question…. This is a test</a:t>
+              <a:t>Question…. </a:t>
             </a:r>
           </a:p>
         </p:txBody>
@@ -9542,7 +11209,7 @@
 </p:sldLayout>
 </file>
 
-<file path=ppt/slideLayouts/slideLayout8.xml><?xml version="1.0" encoding="utf-8"?>
+<file path=ppt/slideLayouts/slideLayout9.xml><?xml version="1.0" encoding="utf-8"?>
 <p:sldLayout xmlns:a="http://schemas.openxmlformats.org/drawingml/2006/main" xmlns:r="http://schemas.openxmlformats.org/officeDocument/2006/relationships" xmlns:p="http://schemas.openxmlformats.org/presentationml/2006/main" preserve="1" userDrawn="1">
   <p:cSld name="Answer">
     <p:spTree>
@@ -9772,353 +11439,6 @@
     <p:extLst>
       <p:ext uri="{BB962C8B-B14F-4D97-AF65-F5344CB8AC3E}">
         <p14:creationId xmlns:p14="http://schemas.microsoft.com/office/powerpoint/2010/main" val="3205732288"/>
-      </p:ext>
-    </p:extLst>
-  </p:cSld>
-  <p:clrMapOvr>
-    <a:masterClrMapping/>
-  </p:clrMapOvr>
-</p:sldLayout>
-</file>
-
-<file path=ppt/slideLayouts/slideLayout9.xml><?xml version="1.0" encoding="utf-8"?>
-<p:sldLayout xmlns:a="http://schemas.openxmlformats.org/drawingml/2006/main" xmlns:r="http://schemas.openxmlformats.org/officeDocument/2006/relationships" xmlns:p="http://schemas.openxmlformats.org/presentationml/2006/main" showMasterSp="0" preserve="1" userDrawn="1">
-  <p:cSld name="Demo">
-    <p:bg>
-      <p:bgPr>
-        <a:solidFill>
-          <a:srgbClr val="7030A0"/>
-        </a:solidFill>
-        <a:effectLst/>
-      </p:bgPr>
-    </p:bg>
-    <p:spTree>
-      <p:nvGrpSpPr>
-        <p:cNvPr id="1" name=""/>
-        <p:cNvGrpSpPr/>
-        <p:nvPr/>
-      </p:nvGrpSpPr>
-      <p:grpSpPr>
-        <a:xfrm>
-          <a:off x="0" y="0"/>
-          <a:ext cx="0" cy="0"/>
-          <a:chOff x="0" y="0"/>
-          <a:chExt cx="0" cy="0"/>
-        </a:xfrm>
-      </p:grpSpPr>
-      <p:sp>
-        <p:nvSpPr>
-          <p:cNvPr id="726019" name="Rectangle 3"/>
-          <p:cNvSpPr>
-            <a:spLocks noGrp="1" noChangeArrowheads="1"/>
-          </p:cNvSpPr>
-          <p:nvPr>
-            <p:ph type="ctrTitle" sz="quarter" hasCustomPrompt="1"/>
-          </p:nvPr>
-        </p:nvSpPr>
-        <p:spPr>
-          <a:xfrm>
-            <a:off x="307911" y="770219"/>
-            <a:ext cx="8379200" cy="1011928"/>
-          </a:xfrm>
-          <a:solidFill>
-            <a:srgbClr val="7030A0"/>
-          </a:solidFill>
-          <a:ln algn="ctr"/>
-        </p:spPr>
-        <p:txBody>
-          <a:bodyPr wrap="square" tIns="0" rIns="0" bIns="0" anchor="t" anchorCtr="0">
-            <a:noAutofit/>
-          </a:bodyPr>
-          <a:lstStyle>
-            <a:lvl1pPr algn="l">
-              <a:spcBef>
-                <a:spcPct val="60000"/>
-              </a:spcBef>
-              <a:buClr>
-                <a:schemeClr val="hlink"/>
-              </a:buClr>
-              <a:buSzPct val="90000"/>
-              <a:buFontTx/>
-              <a:buNone/>
-              <a:defRPr sz="3800" baseline="0">
-                <a:solidFill>
-                  <a:schemeClr val="bg1"/>
-                </a:solidFill>
-                <a:latin typeface="Segoe UI" pitchFamily="34" charset="0"/>
-                <a:ea typeface="Segoe UI" pitchFamily="34" charset="0"/>
-                <a:cs typeface="Segoe UI" pitchFamily="34" charset="0"/>
-              </a:defRPr>
-            </a:lvl1pPr>
-          </a:lstStyle>
-          <a:p>
-            <a:r>
-              <a:rPr lang="en-US" dirty="0"/>
-              <a:t>Demo Title</a:t>
-            </a:r>
-          </a:p>
-        </p:txBody>
-      </p:sp>
-      <p:sp>
-        <p:nvSpPr>
-          <p:cNvPr id="726020" name="Rectangle 4"/>
-          <p:cNvSpPr>
-            <a:spLocks noGrp="1" noChangeArrowheads="1"/>
-          </p:cNvSpPr>
-          <p:nvPr>
-            <p:ph type="subTitle" sz="quarter" idx="1" hasCustomPrompt="1"/>
-          </p:nvPr>
-        </p:nvSpPr>
-        <p:spPr>
-          <a:xfrm>
-            <a:off x="3685592" y="2110581"/>
-            <a:ext cx="5290768" cy="3722293"/>
-          </a:xfrm>
-          <a:solidFill>
-            <a:srgbClr val="7030A0"/>
-          </a:solidFill>
-        </p:spPr>
-        <p:txBody>
-          <a:bodyPr lIns="91440" tIns="45720" rIns="91440" bIns="45720"/>
-          <a:lstStyle>
-            <a:lvl1pPr marL="285750" indent="-285750" algn="l">
-              <a:lnSpc>
-                <a:spcPct val="95000"/>
-              </a:lnSpc>
-              <a:spcBef>
-                <a:spcPct val="60000"/>
-              </a:spcBef>
-              <a:buClr>
-                <a:schemeClr val="bg1"/>
-              </a:buClr>
-              <a:buFont typeface="Wingdings" panose="05000000000000000000" pitchFamily="2" charset="2"/>
-              <a:buChar char="Ø"/>
-              <a:defRPr sz="1800">
-                <a:solidFill>
-                  <a:schemeClr val="bg1"/>
-                </a:solidFill>
-                <a:latin typeface="Segoe UI" pitchFamily="34" charset="0"/>
-                <a:ea typeface="Segoe UI" pitchFamily="34" charset="0"/>
-                <a:cs typeface="Segoe UI" pitchFamily="34" charset="0"/>
-              </a:defRPr>
-            </a:lvl1pPr>
-            <a:lvl2pPr marL="288925" indent="0">
-              <a:buNone/>
-              <a:defRPr/>
-            </a:lvl2pPr>
-          </a:lstStyle>
-          <a:p>
-            <a:r>
-              <a:rPr lang="en-US" dirty="0"/>
-              <a:t>Enter Description(s)</a:t>
-            </a:r>
-          </a:p>
-          <a:p>
-            <a:endParaRPr lang="en-US" dirty="0"/>
-          </a:p>
-        </p:txBody>
-      </p:sp>
-      <p:sp>
-        <p:nvSpPr>
-          <p:cNvPr id="7" name="Text Placeholder 6">
-            <a:extLst>
-              <a:ext uri="{FF2B5EF4-FFF2-40B4-BE49-F238E27FC236}">
-                <a16:creationId xmlns:a16="http://schemas.microsoft.com/office/drawing/2014/main" id="{05E1913A-614D-4F38-AB69-5348B29CCD5D}"/>
-              </a:ext>
-            </a:extLst>
-          </p:cNvPr>
-          <p:cNvSpPr>
-            <a:spLocks noGrp="1"/>
-          </p:cNvSpPr>
-          <p:nvPr>
-            <p:ph type="body" sz="quarter" idx="10"/>
-          </p:nvPr>
-        </p:nvSpPr>
-        <p:spPr>
-          <a:xfrm>
-            <a:off x="261938" y="2756542"/>
-            <a:ext cx="3241675" cy="2851150"/>
-          </a:xfrm>
-        </p:spPr>
-        <p:txBody>
-          <a:bodyPr/>
-          <a:lstStyle>
-            <a:lvl1pPr>
-              <a:defRPr sz="2000">
-                <a:solidFill>
-                  <a:schemeClr val="bg1"/>
-                </a:solidFill>
-              </a:defRPr>
-            </a:lvl1pPr>
-          </a:lstStyle>
-          <a:p>
-            <a:pPr lvl="0"/>
-            <a:r>
-              <a:rPr lang="en-US" dirty="0"/>
-              <a:t>Edit Master text</a:t>
-            </a:r>
-          </a:p>
-        </p:txBody>
-      </p:sp>
-      <p:sp>
-        <p:nvSpPr>
-          <p:cNvPr id="11" name="Text Placeholder 10">
-            <a:extLst>
-              <a:ext uri="{FF2B5EF4-FFF2-40B4-BE49-F238E27FC236}">
-                <a16:creationId xmlns:a16="http://schemas.microsoft.com/office/drawing/2014/main" id="{6A2AE784-2CA5-4194-B30C-8D50C676A59B}"/>
-              </a:ext>
-            </a:extLst>
-          </p:cNvPr>
-          <p:cNvSpPr>
-            <a:spLocks noGrp="1"/>
-          </p:cNvSpPr>
-          <p:nvPr>
-            <p:ph type="body" sz="quarter" idx="11" hasCustomPrompt="1"/>
-          </p:nvPr>
-        </p:nvSpPr>
-        <p:spPr>
-          <a:xfrm>
-            <a:off x="261938" y="6018240"/>
-            <a:ext cx="8714421" cy="391882"/>
-          </a:xfrm>
-          <a:solidFill>
-            <a:schemeClr val="bg1"/>
-          </a:solidFill>
-        </p:spPr>
-        <p:txBody>
-          <a:bodyPr/>
-          <a:lstStyle>
-            <a:lvl1pPr marL="0" indent="0">
-              <a:buNone/>
-              <a:defRPr sz="1400">
-                <a:solidFill>
-                  <a:srgbClr val="3399FF"/>
-                </a:solidFill>
-              </a:defRPr>
-            </a:lvl1pPr>
-            <a:lvl2pPr>
-              <a:defRPr>
-                <a:solidFill>
-                  <a:schemeClr val="bg1">
-                    <a:lumMod val="75000"/>
-                  </a:schemeClr>
-                </a:solidFill>
-              </a:defRPr>
-            </a:lvl2pPr>
-            <a:lvl3pPr>
-              <a:defRPr>
-                <a:solidFill>
-                  <a:schemeClr val="bg1">
-                    <a:lumMod val="75000"/>
-                  </a:schemeClr>
-                </a:solidFill>
-              </a:defRPr>
-            </a:lvl3pPr>
-            <a:lvl4pPr>
-              <a:defRPr>
-                <a:solidFill>
-                  <a:schemeClr val="bg1">
-                    <a:lumMod val="75000"/>
-                  </a:schemeClr>
-                </a:solidFill>
-              </a:defRPr>
-            </a:lvl4pPr>
-            <a:lvl5pPr>
-              <a:defRPr>
-                <a:solidFill>
-                  <a:schemeClr val="bg1">
-                    <a:lumMod val="75000"/>
-                  </a:schemeClr>
-                </a:solidFill>
-              </a:defRPr>
-            </a:lvl5pPr>
-          </a:lstStyle>
-          <a:p>
-            <a:pPr lvl="0"/>
-            <a:r>
-              <a:rPr lang="en-US" dirty="0"/>
-              <a:t>URL</a:t>
-            </a:r>
-          </a:p>
-        </p:txBody>
-      </p:sp>
-      <p:sp>
-        <p:nvSpPr>
-          <p:cNvPr id="12" name="TextBox 11">
-            <a:extLst>
-              <a:ext uri="{FF2B5EF4-FFF2-40B4-BE49-F238E27FC236}">
-                <a16:creationId xmlns:a16="http://schemas.microsoft.com/office/drawing/2014/main" id="{E1C05B86-1160-4370-A04A-9508198B968C}"/>
-              </a:ext>
-            </a:extLst>
-          </p:cNvPr>
-          <p:cNvSpPr txBox="1"/>
-          <p:nvPr userDrawn="1"/>
-        </p:nvSpPr>
-        <p:spPr>
-          <a:xfrm>
-            <a:off x="6662057" y="6512893"/>
-            <a:ext cx="2388641" cy="307777"/>
-          </a:xfrm>
-          <a:prstGeom prst="rect">
-            <a:avLst/>
-          </a:prstGeom>
-          <a:noFill/>
-        </p:spPr>
-        <p:txBody>
-          <a:bodyPr wrap="square" rtlCol="0">
-            <a:spAutoFit/>
-          </a:bodyPr>
-          <a:lstStyle/>
-          <a:p>
-            <a:r>
-              <a:rPr lang="en-US" sz="1400" dirty="0"/>
-              <a:t>#70-533 @ITProGuru</a:t>
-            </a:r>
-          </a:p>
-        </p:txBody>
-      </p:sp>
-      <p:sp>
-        <p:nvSpPr>
-          <p:cNvPr id="8" name="Rectangle 7">
-            <a:extLst>
-              <a:ext uri="{FF2B5EF4-FFF2-40B4-BE49-F238E27FC236}">
-                <a16:creationId xmlns:a16="http://schemas.microsoft.com/office/drawing/2014/main" id="{2E5CD9C4-3903-4CFA-9CED-0878686ABD1A}"/>
-              </a:ext>
-            </a:extLst>
-          </p:cNvPr>
-          <p:cNvSpPr/>
-          <p:nvPr userDrawn="1"/>
-        </p:nvSpPr>
-        <p:spPr>
-          <a:xfrm>
-            <a:off x="158449" y="117610"/>
-            <a:ext cx="1903085" cy="715581"/>
-          </a:xfrm>
-          <a:prstGeom prst="rect">
-            <a:avLst/>
-          </a:prstGeom>
-        </p:spPr>
-        <p:txBody>
-          <a:bodyPr wrap="none">
-            <a:spAutoFit/>
-          </a:bodyPr>
-          <a:lstStyle/>
-          <a:p>
-            <a:r>
-              <a:rPr lang="en-US" sz="4050" dirty="0">
-                <a:solidFill>
-                  <a:srgbClr val="00B0F0"/>
-                </a:solidFill>
-              </a:rPr>
-              <a:t>DEMO</a:t>
-            </a:r>
-          </a:p>
-        </p:txBody>
-      </p:sp>
-    </p:spTree>
-    <p:extLst>
-      <p:ext uri="{BB962C8B-B14F-4D97-AF65-F5344CB8AC3E}">
-        <p14:creationId xmlns:p14="http://schemas.microsoft.com/office/powerpoint/2010/main" val="2828235629"/>
       </p:ext>
     </p:extLst>
   </p:cSld>
@@ -10157,7 +11477,7 @@
         <p:nvSpPr>
           <p:cNvPr id="7" name="Rectangle 6"/>
           <p:cNvSpPr/>
-          <p:nvPr/>
+          <p:nvPr userDrawn="1"/>
         </p:nvSpPr>
         <p:spPr>
           <a:xfrm>
@@ -10402,27 +11722,29 @@
   <p:sldLayoutIdLst>
     <p:sldLayoutId id="2147483709" r:id="rId1"/>
     <p:sldLayoutId id="2147483661" r:id="rId2"/>
-    <p:sldLayoutId id="2147483672" r:id="rId3"/>
-    <p:sldLayoutId id="2147483666" r:id="rId4"/>
-    <p:sldLayoutId id="2147483701" r:id="rId5"/>
-    <p:sldLayoutId id="2147483707" r:id="rId6"/>
-    <p:sldLayoutId id="2147483662" r:id="rId7"/>
-    <p:sldLayoutId id="2147483699" r:id="rId8"/>
-    <p:sldLayoutId id="2147483708" r:id="rId9"/>
-    <p:sldLayoutId id="2147483702" r:id="rId10"/>
-    <p:sldLayoutId id="2147483700" r:id="rId11"/>
-    <p:sldLayoutId id="2147483705" r:id="rId12"/>
-    <p:sldLayoutId id="2147483703" r:id="rId13"/>
-    <p:sldLayoutId id="2147483706" r:id="rId14"/>
-    <p:sldLayoutId id="2147483663" r:id="rId15"/>
-    <p:sldLayoutId id="2147483664" r:id="rId16"/>
-    <p:sldLayoutId id="2147483665" r:id="rId17"/>
-    <p:sldLayoutId id="2147483667" r:id="rId18"/>
-    <p:sldLayoutId id="2147483668" r:id="rId19"/>
-    <p:sldLayoutId id="2147483669" r:id="rId20"/>
-    <p:sldLayoutId id="2147483670" r:id="rId21"/>
-    <p:sldLayoutId id="2147483671" r:id="rId22"/>
-    <p:sldLayoutId id="2147483673" r:id="rId23"/>
+    <p:sldLayoutId id="2147483710" r:id="rId3"/>
+    <p:sldLayoutId id="2147483672" r:id="rId4"/>
+    <p:sldLayoutId id="2147483666" r:id="rId5"/>
+    <p:sldLayoutId id="2147483701" r:id="rId6"/>
+    <p:sldLayoutId id="2147483707" r:id="rId7"/>
+    <p:sldLayoutId id="2147483662" r:id="rId8"/>
+    <p:sldLayoutId id="2147483699" r:id="rId9"/>
+    <p:sldLayoutId id="2147483708" r:id="rId10"/>
+    <p:sldLayoutId id="2147483702" r:id="rId11"/>
+    <p:sldLayoutId id="2147483700" r:id="rId12"/>
+    <p:sldLayoutId id="2147483705" r:id="rId13"/>
+    <p:sldLayoutId id="2147483703" r:id="rId14"/>
+    <p:sldLayoutId id="2147483706" r:id="rId15"/>
+    <p:sldLayoutId id="2147483663" r:id="rId16"/>
+    <p:sldLayoutId id="2147483664" r:id="rId17"/>
+    <p:sldLayoutId id="2147483665" r:id="rId18"/>
+    <p:sldLayoutId id="2147483667" r:id="rId19"/>
+    <p:sldLayoutId id="2147483668" r:id="rId20"/>
+    <p:sldLayoutId id="2147483669" r:id="rId21"/>
+    <p:sldLayoutId id="2147483670" r:id="rId22"/>
+    <p:sldLayoutId id="2147483671" r:id="rId23"/>
+    <p:sldLayoutId id="2147483711" r:id="rId24"/>
+    <p:sldLayoutId id="2147483712" r:id="rId25"/>
   </p:sldLayoutIdLst>
   <p:txStyles>
     <p:titleStyle>
@@ -11775,15 +13097,10 @@
             <a:spLocks noGrp="1"/>
           </p:cNvSpPr>
           <p:nvPr>
-            <p:ph type="body" sz="quarter" idx="13"/>
-          </p:nvPr>
-        </p:nvSpPr>
-        <p:spPr>
-          <a:xfrm>
-            <a:off x="457200" y="1066800"/>
-            <a:ext cx="7924800" cy="5105400"/>
-          </a:xfrm>
-        </p:spPr>
+            <p:ph type="body" idx="1"/>
+          </p:nvPr>
+        </p:nvSpPr>
+        <p:spPr/>
         <p:txBody>
           <a:bodyPr/>
           <a:lstStyle/>
@@ -11989,6 +13306,31 @@
               <a:t>Implementing Azure App Service</a:t>
             </a:r>
             <a:endParaRPr lang="en-US" dirty="0"/>
+          </a:p>
+        </p:txBody>
+      </p:sp>
+      <p:sp>
+        <p:nvSpPr>
+          <p:cNvPr id="6" name="Text Placeholder 5">
+            <a:extLst>
+              <a:ext uri="{FF2B5EF4-FFF2-40B4-BE49-F238E27FC236}">
+                <a16:creationId xmlns:a16="http://schemas.microsoft.com/office/drawing/2014/main" id="{B4CA796A-DBCA-43EC-830A-6F81755517DB}"/>
+              </a:ext>
+            </a:extLst>
+          </p:cNvPr>
+          <p:cNvSpPr>
+            <a:spLocks noGrp="1"/>
+          </p:cNvSpPr>
+          <p:nvPr>
+            <p:ph type="body" sz="quarter" idx="10"/>
+          </p:nvPr>
+        </p:nvSpPr>
+        <p:spPr/>
+        <p:txBody>
+          <a:bodyPr/>
+          <a:lstStyle/>
+          <a:p>
+            <a:endParaRPr lang="en-US"/>
           </a:p>
         </p:txBody>
       </p:sp>
@@ -12059,15 +13401,10 @@
             <a:spLocks noGrp="1"/>
           </p:cNvSpPr>
           <p:nvPr>
-            <p:ph type="body" sz="quarter" idx="13"/>
-          </p:nvPr>
-        </p:nvSpPr>
-        <p:spPr>
-          <a:xfrm>
-            <a:off x="457200" y="1066800"/>
-            <a:ext cx="7924800" cy="5105400"/>
-          </a:xfrm>
-        </p:spPr>
+            <p:ph type="body" idx="1"/>
+          </p:nvPr>
+        </p:nvSpPr>
+        <p:spPr/>
         <p:txBody>
           <a:bodyPr/>
           <a:lstStyle/>
@@ -12297,6 +13634,31 @@
               <a:buNone/>
             </a:pPr>
             <a:endParaRPr lang="en-US" dirty="0"/>
+          </a:p>
+        </p:txBody>
+      </p:sp>
+      <p:sp>
+        <p:nvSpPr>
+          <p:cNvPr id="3" name="Text Placeholder 2">
+            <a:extLst>
+              <a:ext uri="{FF2B5EF4-FFF2-40B4-BE49-F238E27FC236}">
+                <a16:creationId xmlns:a16="http://schemas.microsoft.com/office/drawing/2014/main" id="{2A00D62F-A465-4656-B9A9-E31D79D3F330}"/>
+              </a:ext>
+            </a:extLst>
+          </p:cNvPr>
+          <p:cNvSpPr>
+            <a:spLocks noGrp="1"/>
+          </p:cNvSpPr>
+          <p:nvPr>
+            <p:ph type="body" sz="quarter" idx="10"/>
+          </p:nvPr>
+        </p:nvSpPr>
+        <p:spPr/>
+        <p:txBody>
+          <a:bodyPr/>
+          <a:lstStyle/>
+          <a:p>
+            <a:endParaRPr lang="en-US"/>
           </a:p>
         </p:txBody>
       </p:sp>

</xml_diff>